<commit_message>
added model data transformation to powerpoint
</commit_message>
<xml_diff>
--- a/Airbnb Price Predictions (Model).pptx
+++ b/Airbnb Price Predictions (Model).pptx
@@ -5,12 +5,20 @@
     <p:sldMasterId id="2147483648" r:id="rId1"/>
   </p:sldMasterIdLst>
   <p:notesMasterIdLst>
-    <p:notesMasterId r:id="rId5"/>
+    <p:notesMasterId r:id="rId13"/>
   </p:notesMasterIdLst>
   <p:sldIdLst>
     <p:sldId id="280" r:id="rId2"/>
-    <p:sldId id="286" r:id="rId3"/>
-    <p:sldId id="274" r:id="rId4"/>
+    <p:sldId id="293" r:id="rId3"/>
+    <p:sldId id="294" r:id="rId4"/>
+    <p:sldId id="286" r:id="rId5"/>
+    <p:sldId id="287" r:id="rId6"/>
+    <p:sldId id="289" r:id="rId7"/>
+    <p:sldId id="290" r:id="rId8"/>
+    <p:sldId id="291" r:id="rId9"/>
+    <p:sldId id="292" r:id="rId10"/>
+    <p:sldId id="288" r:id="rId11"/>
+    <p:sldId id="274" r:id="rId12"/>
   </p:sldIdLst>
   <p:sldSz cx="12192000" cy="6858000"/>
   <p:notesSz cx="6858000" cy="9144000"/>
@@ -524,35 +532,27 @@
           <a:p>
             <a:r>
               <a:rPr lang="en-US" dirty="0"/>
-              <a:t>-To help users explore all listings available in NYC, we created a marker cluster map using Leaflet. </a:t>
-            </a:r>
-          </a:p>
-          <a:p>
+              <a:t>To predict prices, we decided to use the Random Forest &amp; LGBM Regressor methods to determine which features are the most important to price an </a:t>
+            </a:r>
+            <a:r>
+              <a:rPr lang="en-US" dirty="0" err="1"/>
+              <a:t>AirBNB</a:t>
+            </a:r>
             <a:r>
               <a:rPr lang="en-US" dirty="0"/>
-              <a:t>-The clusters display the number of listings with the different boroughs and </a:t>
-            </a:r>
-            <a:r>
-              <a:rPr lang="en-US" dirty="0" err="1"/>
-              <a:t>neighbourhoods</a:t>
-            </a:r>
+              <a:t>.</a:t>
+            </a:r>
+          </a:p>
+          <a:p>
             <a:r>
               <a:rPr lang="en-US" dirty="0"/>
-              <a:t> in NYC. </a:t>
+              <a:t>We then use the KNN Regressor to see how the price is affected with having listings close to your area.</a:t>
             </a:r>
           </a:p>
           <a:p>
             <a:r>
               <a:rPr lang="en-US" dirty="0"/>
-              <a:t>-In this example, we selected the the well-known New York borough of Manhattan, and then further zoomed in to the Upper West Side </a:t>
-            </a:r>
-            <a:r>
-              <a:rPr lang="en-US" dirty="0" err="1"/>
-              <a:t>neighbourhood</a:t>
-            </a:r>
-            <a:r>
-              <a:rPr lang="en-US" dirty="0"/>
-              <a:t>. </a:t>
+              <a:t>Finally, we used the Facebook Prophet to how prices are affected by time &amp; seasonality to predict Airbnb future prices.</a:t>
             </a:r>
           </a:p>
           <a:p>
@@ -587,6 +587,208 @@
     <p:extLst>
       <p:ext uri="{BB962C8B-B14F-4D97-AF65-F5344CB8AC3E}">
         <p14:creationId xmlns:p14="http://schemas.microsoft.com/office/powerpoint/2010/main" val="1301000147"/>
+      </p:ext>
+    </p:extLst>
+  </p:cSld>
+  <p:clrMapOvr>
+    <a:masterClrMapping/>
+  </p:clrMapOvr>
+</p:notes>
+</file>
+
+<file path=ppt/notesSlides/notesSlide10.xml><?xml version="1.0" encoding="utf-8"?>
+<p:notes xmlns:a="http://schemas.openxmlformats.org/drawingml/2006/main" xmlns:r="http://schemas.openxmlformats.org/officeDocument/2006/relationships" xmlns:p="http://schemas.openxmlformats.org/presentationml/2006/main">
+  <p:cSld>
+    <p:spTree>
+      <p:nvGrpSpPr>
+        <p:cNvPr id="1" name=""/>
+        <p:cNvGrpSpPr/>
+        <p:nvPr/>
+      </p:nvGrpSpPr>
+      <p:grpSpPr>
+        <a:xfrm>
+          <a:off x="0" y="0"/>
+          <a:ext cx="0" cy="0"/>
+          <a:chOff x="0" y="0"/>
+          <a:chExt cx="0" cy="0"/>
+        </a:xfrm>
+      </p:grpSpPr>
+      <p:sp>
+        <p:nvSpPr>
+          <p:cNvPr id="2" name="Slide Image Placeholder 1"/>
+          <p:cNvSpPr>
+            <a:spLocks noGrp="1" noRot="1" noChangeAspect="1"/>
+          </p:cNvSpPr>
+          <p:nvPr>
+            <p:ph type="sldImg"/>
+          </p:nvPr>
+        </p:nvSpPr>
+        <p:spPr/>
+      </p:sp>
+      <p:sp>
+        <p:nvSpPr>
+          <p:cNvPr id="3" name="Notes Placeholder 2"/>
+          <p:cNvSpPr>
+            <a:spLocks noGrp="1"/>
+          </p:cNvSpPr>
+          <p:nvPr>
+            <p:ph type="body" idx="1"/>
+          </p:nvPr>
+        </p:nvSpPr>
+        <p:spPr/>
+        <p:txBody>
+          <a:bodyPr/>
+          <a:lstStyle/>
+          <a:p>
+            <a:r>
+              <a:rPr lang="en-US" dirty="0"/>
+              <a:t>-To help users explore all listings available in NYC, we created a marker cluster map using Leaflet. </a:t>
+            </a:r>
+          </a:p>
+          <a:p>
+            <a:r>
+              <a:rPr lang="en-US" dirty="0"/>
+              <a:t>-The clusters display the number of listings with the different boroughs and </a:t>
+            </a:r>
+            <a:r>
+              <a:rPr lang="en-US" dirty="0" err="1"/>
+              <a:t>neighbourhoods</a:t>
+            </a:r>
+            <a:r>
+              <a:rPr lang="en-US" dirty="0"/>
+              <a:t> in NYC. </a:t>
+            </a:r>
+          </a:p>
+          <a:p>
+            <a:r>
+              <a:rPr lang="en-US" dirty="0"/>
+              <a:t>-In this example, we selected the the well-known New York borough of Manhattan, and then further zoomed in to the Upper West Side </a:t>
+            </a:r>
+            <a:r>
+              <a:rPr lang="en-US" dirty="0" err="1"/>
+              <a:t>neighbourhood</a:t>
+            </a:r>
+            <a:r>
+              <a:rPr lang="en-US" dirty="0"/>
+              <a:t>. </a:t>
+            </a:r>
+          </a:p>
+          <a:p>
+            <a:endParaRPr lang="en-US" dirty="0"/>
+          </a:p>
+        </p:txBody>
+      </p:sp>
+      <p:sp>
+        <p:nvSpPr>
+          <p:cNvPr id="4" name="Slide Number Placeholder 3"/>
+          <p:cNvSpPr>
+            <a:spLocks noGrp="1"/>
+          </p:cNvSpPr>
+          <p:nvPr>
+            <p:ph type="sldNum" sz="quarter" idx="5"/>
+          </p:nvPr>
+        </p:nvSpPr>
+        <p:spPr/>
+        <p:txBody>
+          <a:bodyPr/>
+          <a:lstStyle/>
+          <a:p>
+            <a:fld id="{DF2352D6-35AF-0544-A99E-554CC41E76C4}" type="slidenum">
+              <a:rPr lang="en-US" smtClean="0"/>
+              <a:t>10</a:t>
+            </a:fld>
+            <a:endParaRPr lang="en-US"/>
+          </a:p>
+        </p:txBody>
+      </p:sp>
+    </p:spTree>
+    <p:extLst>
+      <p:ext uri="{BB962C8B-B14F-4D97-AF65-F5344CB8AC3E}">
+        <p14:creationId xmlns:p14="http://schemas.microsoft.com/office/powerpoint/2010/main" val="498058897"/>
+      </p:ext>
+    </p:extLst>
+  </p:cSld>
+  <p:clrMapOvr>
+    <a:masterClrMapping/>
+  </p:clrMapOvr>
+</p:notes>
+</file>
+
+<file path=ppt/notesSlides/notesSlide11.xml><?xml version="1.0" encoding="utf-8"?>
+<p:notes xmlns:a="http://schemas.openxmlformats.org/drawingml/2006/main" xmlns:r="http://schemas.openxmlformats.org/officeDocument/2006/relationships" xmlns:p="http://schemas.openxmlformats.org/presentationml/2006/main">
+  <p:cSld>
+    <p:spTree>
+      <p:nvGrpSpPr>
+        <p:cNvPr id="1" name=""/>
+        <p:cNvGrpSpPr/>
+        <p:nvPr/>
+      </p:nvGrpSpPr>
+      <p:grpSpPr>
+        <a:xfrm>
+          <a:off x="0" y="0"/>
+          <a:ext cx="0" cy="0"/>
+          <a:chOff x="0" y="0"/>
+          <a:chExt cx="0" cy="0"/>
+        </a:xfrm>
+      </p:grpSpPr>
+      <p:sp>
+        <p:nvSpPr>
+          <p:cNvPr id="2" name="Slide Image Placeholder 1"/>
+          <p:cNvSpPr>
+            <a:spLocks noGrp="1" noRot="1" noChangeAspect="1"/>
+          </p:cNvSpPr>
+          <p:nvPr>
+            <p:ph type="sldImg"/>
+          </p:nvPr>
+        </p:nvSpPr>
+        <p:spPr/>
+      </p:sp>
+      <p:sp>
+        <p:nvSpPr>
+          <p:cNvPr id="3" name="Notes Placeholder 2"/>
+          <p:cNvSpPr>
+            <a:spLocks noGrp="1"/>
+          </p:cNvSpPr>
+          <p:nvPr>
+            <p:ph type="body" idx="1"/>
+          </p:nvPr>
+        </p:nvSpPr>
+        <p:spPr/>
+        <p:txBody>
+          <a:bodyPr/>
+          <a:lstStyle/>
+          <a:p>
+            <a:endParaRPr lang="en-US" dirty="0"/>
+          </a:p>
+        </p:txBody>
+      </p:sp>
+      <p:sp>
+        <p:nvSpPr>
+          <p:cNvPr id="4" name="Slide Number Placeholder 3"/>
+          <p:cNvSpPr>
+            <a:spLocks noGrp="1"/>
+          </p:cNvSpPr>
+          <p:nvPr>
+            <p:ph type="sldNum" sz="quarter" idx="5"/>
+          </p:nvPr>
+        </p:nvSpPr>
+        <p:spPr/>
+        <p:txBody>
+          <a:bodyPr/>
+          <a:lstStyle/>
+          <a:p>
+            <a:fld id="{DF2352D6-35AF-0544-A99E-554CC41E76C4}" type="slidenum">
+              <a:rPr lang="en-US" smtClean="0"/>
+              <a:t>11</a:t>
+            </a:fld>
+            <a:endParaRPr lang="en-US"/>
+          </a:p>
+        </p:txBody>
+      </p:sp>
+    </p:spTree>
+    <p:extLst>
+      <p:ext uri="{BB962C8B-B14F-4D97-AF65-F5344CB8AC3E}">
+        <p14:creationId xmlns:p14="http://schemas.microsoft.com/office/powerpoint/2010/main" val="2087272324"/>
       </p:ext>
     </p:extLst>
   </p:cSld>
@@ -642,38 +844,13 @@
           <a:p>
             <a:r>
               <a:rPr lang="en-US" dirty="0"/>
-              <a:t>-To help users explore all listings available in NYC, we created a marker cluster map using Leaflet. </a:t>
-            </a:r>
-          </a:p>
-          <a:p>
-            <a:r>
-              <a:rPr lang="en-US" dirty="0"/>
-              <a:t>-The clusters display the number of listings with the different boroughs and </a:t>
-            </a:r>
-            <a:r>
-              <a:rPr lang="en-US" dirty="0" err="1"/>
-              <a:t>neighbourhoods</a:t>
-            </a:r>
-            <a:r>
-              <a:rPr lang="en-US" dirty="0"/>
-              <a:t> in NYC. </a:t>
-            </a:r>
-          </a:p>
-          <a:p>
-            <a:r>
-              <a:rPr lang="en-US" dirty="0"/>
-              <a:t>-In this example, we selected the the well-known New York borough of Manhattan, and then further zoomed in to the Upper West Side </a:t>
-            </a:r>
-            <a:r>
-              <a:rPr lang="en-US" dirty="0" err="1"/>
-              <a:t>neighbourhood</a:t>
-            </a:r>
-            <a:r>
-              <a:rPr lang="en-US" dirty="0"/>
-              <a:t>. </a:t>
-            </a:r>
-          </a:p>
-          <a:p>
+              <a:t>The diagram summarizes the way we need to transform our data to run the Random Forest, LGBM &amp; KNN Regressor Models.</a:t>
+            </a:r>
+          </a:p>
+          <a:p>
+            <a:pPr marL="228600" indent="-228600">
+              <a:buAutoNum type="arabicParenR"/>
+            </a:pPr>
             <a:endParaRPr lang="en-US" dirty="0"/>
           </a:p>
         </p:txBody>
@@ -704,7 +881,7 @@
     </p:spTree>
     <p:extLst>
       <p:ext uri="{BB962C8B-B14F-4D97-AF65-F5344CB8AC3E}">
-        <p14:creationId xmlns:p14="http://schemas.microsoft.com/office/powerpoint/2010/main" val="818292738"/>
+        <p14:creationId xmlns:p14="http://schemas.microsoft.com/office/powerpoint/2010/main" val="382606239"/>
       </p:ext>
     </p:extLst>
   </p:cSld>
@@ -758,7 +935,36 @@
           <a:bodyPr/>
           <a:lstStyle/>
           <a:p>
-            <a:endParaRPr lang="en-US" dirty="0"/>
+            <a:pPr marL="228600" indent="-228600">
+              <a:buAutoNum type="arabicParenR"/>
+            </a:pPr>
+            <a:r>
+              <a:rPr lang="en-US" dirty="0"/>
+              <a:t>With existing numeric data, input N/A fields with the average value for that specific column.</a:t>
+            </a:r>
+          </a:p>
+          <a:p>
+            <a:pPr marL="228600" indent="-228600">
+              <a:buAutoNum type="arabicParenR"/>
+            </a:pPr>
+            <a:r>
+              <a:rPr lang="en-US" dirty="0"/>
+              <a:t>Then, for certain data like room type, boroughs, &amp; </a:t>
+            </a:r>
+            <a:r>
+              <a:rPr lang="en-US" dirty="0" err="1"/>
+              <a:t>neighbourhoods</a:t>
+            </a:r>
+            <a:r>
+              <a:rPr lang="en-US" dirty="0"/>
+              <a:t>, we need to categorize them into numbers.</a:t>
+            </a:r>
+          </a:p>
+          <a:p>
+            <a:r>
+              <a:rPr lang="en-US" dirty="0"/>
+              <a:t>3)   Finally, with text data, we need to vectorize them</a:t>
+            </a:r>
           </a:p>
         </p:txBody>
       </p:sp>
@@ -788,7 +994,715 @@
     </p:spTree>
     <p:extLst>
       <p:ext uri="{BB962C8B-B14F-4D97-AF65-F5344CB8AC3E}">
-        <p14:creationId xmlns:p14="http://schemas.microsoft.com/office/powerpoint/2010/main" val="2087272324"/>
+        <p14:creationId xmlns:p14="http://schemas.microsoft.com/office/powerpoint/2010/main" val="1451080133"/>
+      </p:ext>
+    </p:extLst>
+  </p:cSld>
+  <p:clrMapOvr>
+    <a:masterClrMapping/>
+  </p:clrMapOvr>
+</p:notes>
+</file>
+
+<file path=ppt/notesSlides/notesSlide4.xml><?xml version="1.0" encoding="utf-8"?>
+<p:notes xmlns:a="http://schemas.openxmlformats.org/drawingml/2006/main" xmlns:r="http://schemas.openxmlformats.org/officeDocument/2006/relationships" xmlns:p="http://schemas.openxmlformats.org/presentationml/2006/main">
+  <p:cSld>
+    <p:spTree>
+      <p:nvGrpSpPr>
+        <p:cNvPr id="1" name=""/>
+        <p:cNvGrpSpPr/>
+        <p:nvPr/>
+      </p:nvGrpSpPr>
+      <p:grpSpPr>
+        <a:xfrm>
+          <a:off x="0" y="0"/>
+          <a:ext cx="0" cy="0"/>
+          <a:chOff x="0" y="0"/>
+          <a:chExt cx="0" cy="0"/>
+        </a:xfrm>
+      </p:grpSpPr>
+      <p:sp>
+        <p:nvSpPr>
+          <p:cNvPr id="2" name="Slide Image Placeholder 1"/>
+          <p:cNvSpPr>
+            <a:spLocks noGrp="1" noRot="1" noChangeAspect="1"/>
+          </p:cNvSpPr>
+          <p:nvPr>
+            <p:ph type="sldImg"/>
+          </p:nvPr>
+        </p:nvSpPr>
+        <p:spPr/>
+      </p:sp>
+      <p:sp>
+        <p:nvSpPr>
+          <p:cNvPr id="3" name="Notes Placeholder 2"/>
+          <p:cNvSpPr>
+            <a:spLocks noGrp="1"/>
+          </p:cNvSpPr>
+          <p:nvPr>
+            <p:ph type="body" idx="1"/>
+          </p:nvPr>
+        </p:nvSpPr>
+        <p:spPr/>
+        <p:txBody>
+          <a:bodyPr/>
+          <a:lstStyle/>
+          <a:p>
+            <a:r>
+              <a:rPr lang="en-US" dirty="0"/>
+              <a:t>-To help users explore all listings available in NYC, we created a marker cluster map using Leaflet. </a:t>
+            </a:r>
+          </a:p>
+          <a:p>
+            <a:r>
+              <a:rPr lang="en-US" dirty="0"/>
+              <a:t>-The clusters display the number of listings with the different boroughs and </a:t>
+            </a:r>
+            <a:r>
+              <a:rPr lang="en-US" dirty="0" err="1"/>
+              <a:t>neighbourhoods</a:t>
+            </a:r>
+            <a:r>
+              <a:rPr lang="en-US" dirty="0"/>
+              <a:t> in NYC. </a:t>
+            </a:r>
+          </a:p>
+          <a:p>
+            <a:r>
+              <a:rPr lang="en-US" dirty="0"/>
+              <a:t>-In this example, we selected the the well-known New York borough of Manhattan, and then further zoomed in to the Upper West Side </a:t>
+            </a:r>
+            <a:r>
+              <a:rPr lang="en-US" dirty="0" err="1"/>
+              <a:t>neighbourhood</a:t>
+            </a:r>
+            <a:r>
+              <a:rPr lang="en-US" dirty="0"/>
+              <a:t>. </a:t>
+            </a:r>
+          </a:p>
+          <a:p>
+            <a:endParaRPr lang="en-US" dirty="0"/>
+          </a:p>
+        </p:txBody>
+      </p:sp>
+      <p:sp>
+        <p:nvSpPr>
+          <p:cNvPr id="4" name="Slide Number Placeholder 3"/>
+          <p:cNvSpPr>
+            <a:spLocks noGrp="1"/>
+          </p:cNvSpPr>
+          <p:nvPr>
+            <p:ph type="sldNum" sz="quarter" idx="5"/>
+          </p:nvPr>
+        </p:nvSpPr>
+        <p:spPr/>
+        <p:txBody>
+          <a:bodyPr/>
+          <a:lstStyle/>
+          <a:p>
+            <a:fld id="{DF2352D6-35AF-0544-A99E-554CC41E76C4}" type="slidenum">
+              <a:rPr lang="en-US" smtClean="0"/>
+              <a:t>4</a:t>
+            </a:fld>
+            <a:endParaRPr lang="en-US"/>
+          </a:p>
+        </p:txBody>
+      </p:sp>
+    </p:spTree>
+    <p:extLst>
+      <p:ext uri="{BB962C8B-B14F-4D97-AF65-F5344CB8AC3E}">
+        <p14:creationId xmlns:p14="http://schemas.microsoft.com/office/powerpoint/2010/main" val="818292738"/>
+      </p:ext>
+    </p:extLst>
+  </p:cSld>
+  <p:clrMapOvr>
+    <a:masterClrMapping/>
+  </p:clrMapOvr>
+</p:notes>
+</file>
+
+<file path=ppt/notesSlides/notesSlide5.xml><?xml version="1.0" encoding="utf-8"?>
+<p:notes xmlns:a="http://schemas.openxmlformats.org/drawingml/2006/main" xmlns:r="http://schemas.openxmlformats.org/officeDocument/2006/relationships" xmlns:p="http://schemas.openxmlformats.org/presentationml/2006/main">
+  <p:cSld>
+    <p:spTree>
+      <p:nvGrpSpPr>
+        <p:cNvPr id="1" name=""/>
+        <p:cNvGrpSpPr/>
+        <p:nvPr/>
+      </p:nvGrpSpPr>
+      <p:grpSpPr>
+        <a:xfrm>
+          <a:off x="0" y="0"/>
+          <a:ext cx="0" cy="0"/>
+          <a:chOff x="0" y="0"/>
+          <a:chExt cx="0" cy="0"/>
+        </a:xfrm>
+      </p:grpSpPr>
+      <p:sp>
+        <p:nvSpPr>
+          <p:cNvPr id="2" name="Slide Image Placeholder 1"/>
+          <p:cNvSpPr>
+            <a:spLocks noGrp="1" noRot="1" noChangeAspect="1"/>
+          </p:cNvSpPr>
+          <p:nvPr>
+            <p:ph type="sldImg"/>
+          </p:nvPr>
+        </p:nvSpPr>
+        <p:spPr/>
+      </p:sp>
+      <p:sp>
+        <p:nvSpPr>
+          <p:cNvPr id="3" name="Notes Placeholder 2"/>
+          <p:cNvSpPr>
+            <a:spLocks noGrp="1"/>
+          </p:cNvSpPr>
+          <p:nvPr>
+            <p:ph type="body" idx="1"/>
+          </p:nvPr>
+        </p:nvSpPr>
+        <p:spPr/>
+        <p:txBody>
+          <a:bodyPr/>
+          <a:lstStyle/>
+          <a:p>
+            <a:r>
+              <a:rPr lang="en-US" dirty="0"/>
+              <a:t>-To help users explore all listings available in NYC, we created a marker cluster map using Leaflet. </a:t>
+            </a:r>
+          </a:p>
+          <a:p>
+            <a:r>
+              <a:rPr lang="en-US" dirty="0"/>
+              <a:t>-The clusters display the number of listings with the different boroughs and </a:t>
+            </a:r>
+            <a:r>
+              <a:rPr lang="en-US" dirty="0" err="1"/>
+              <a:t>neighbourhoods</a:t>
+            </a:r>
+            <a:r>
+              <a:rPr lang="en-US" dirty="0"/>
+              <a:t> in NYC. </a:t>
+            </a:r>
+          </a:p>
+          <a:p>
+            <a:r>
+              <a:rPr lang="en-US" dirty="0"/>
+              <a:t>-In this example, we selected the the well-known New York borough of Manhattan, and then further zoomed in to the Upper West Side </a:t>
+            </a:r>
+            <a:r>
+              <a:rPr lang="en-US" dirty="0" err="1"/>
+              <a:t>neighbourhood</a:t>
+            </a:r>
+            <a:r>
+              <a:rPr lang="en-US" dirty="0"/>
+              <a:t>. </a:t>
+            </a:r>
+          </a:p>
+          <a:p>
+            <a:endParaRPr lang="en-US" dirty="0"/>
+          </a:p>
+        </p:txBody>
+      </p:sp>
+      <p:sp>
+        <p:nvSpPr>
+          <p:cNvPr id="4" name="Slide Number Placeholder 3"/>
+          <p:cNvSpPr>
+            <a:spLocks noGrp="1"/>
+          </p:cNvSpPr>
+          <p:nvPr>
+            <p:ph type="sldNum" sz="quarter" idx="5"/>
+          </p:nvPr>
+        </p:nvSpPr>
+        <p:spPr/>
+        <p:txBody>
+          <a:bodyPr/>
+          <a:lstStyle/>
+          <a:p>
+            <a:fld id="{DF2352D6-35AF-0544-A99E-554CC41E76C4}" type="slidenum">
+              <a:rPr lang="en-US" smtClean="0"/>
+              <a:t>5</a:t>
+            </a:fld>
+            <a:endParaRPr lang="en-US"/>
+          </a:p>
+        </p:txBody>
+      </p:sp>
+    </p:spTree>
+    <p:extLst>
+      <p:ext uri="{BB962C8B-B14F-4D97-AF65-F5344CB8AC3E}">
+        <p14:creationId xmlns:p14="http://schemas.microsoft.com/office/powerpoint/2010/main" val="2744486609"/>
+      </p:ext>
+    </p:extLst>
+  </p:cSld>
+  <p:clrMapOvr>
+    <a:masterClrMapping/>
+  </p:clrMapOvr>
+</p:notes>
+</file>
+
+<file path=ppt/notesSlides/notesSlide6.xml><?xml version="1.0" encoding="utf-8"?>
+<p:notes xmlns:a="http://schemas.openxmlformats.org/drawingml/2006/main" xmlns:r="http://schemas.openxmlformats.org/officeDocument/2006/relationships" xmlns:p="http://schemas.openxmlformats.org/presentationml/2006/main">
+  <p:cSld>
+    <p:spTree>
+      <p:nvGrpSpPr>
+        <p:cNvPr id="1" name=""/>
+        <p:cNvGrpSpPr/>
+        <p:nvPr/>
+      </p:nvGrpSpPr>
+      <p:grpSpPr>
+        <a:xfrm>
+          <a:off x="0" y="0"/>
+          <a:ext cx="0" cy="0"/>
+          <a:chOff x="0" y="0"/>
+          <a:chExt cx="0" cy="0"/>
+        </a:xfrm>
+      </p:grpSpPr>
+      <p:sp>
+        <p:nvSpPr>
+          <p:cNvPr id="2" name="Slide Image Placeholder 1"/>
+          <p:cNvSpPr>
+            <a:spLocks noGrp="1" noRot="1" noChangeAspect="1"/>
+          </p:cNvSpPr>
+          <p:nvPr>
+            <p:ph type="sldImg"/>
+          </p:nvPr>
+        </p:nvSpPr>
+        <p:spPr/>
+      </p:sp>
+      <p:sp>
+        <p:nvSpPr>
+          <p:cNvPr id="3" name="Notes Placeholder 2"/>
+          <p:cNvSpPr>
+            <a:spLocks noGrp="1"/>
+          </p:cNvSpPr>
+          <p:nvPr>
+            <p:ph type="body" idx="1"/>
+          </p:nvPr>
+        </p:nvSpPr>
+        <p:spPr/>
+        <p:txBody>
+          <a:bodyPr/>
+          <a:lstStyle/>
+          <a:p>
+            <a:r>
+              <a:rPr lang="en-US" dirty="0"/>
+              <a:t>-To help users explore all listings available in NYC, we created a marker cluster map using Leaflet. </a:t>
+            </a:r>
+          </a:p>
+          <a:p>
+            <a:r>
+              <a:rPr lang="en-US" dirty="0"/>
+              <a:t>-The clusters display the number of listings with the different boroughs and </a:t>
+            </a:r>
+            <a:r>
+              <a:rPr lang="en-US" dirty="0" err="1"/>
+              <a:t>neighbourhoods</a:t>
+            </a:r>
+            <a:r>
+              <a:rPr lang="en-US" dirty="0"/>
+              <a:t> in NYC. </a:t>
+            </a:r>
+          </a:p>
+          <a:p>
+            <a:r>
+              <a:rPr lang="en-US" dirty="0"/>
+              <a:t>-In this example, we selected the the well-known New York borough of Manhattan, and then further zoomed in to the Upper West Side </a:t>
+            </a:r>
+            <a:r>
+              <a:rPr lang="en-US" dirty="0" err="1"/>
+              <a:t>neighbourhood</a:t>
+            </a:r>
+            <a:r>
+              <a:rPr lang="en-US" dirty="0"/>
+              <a:t>. </a:t>
+            </a:r>
+          </a:p>
+          <a:p>
+            <a:endParaRPr lang="en-US" dirty="0"/>
+          </a:p>
+        </p:txBody>
+      </p:sp>
+      <p:sp>
+        <p:nvSpPr>
+          <p:cNvPr id="4" name="Slide Number Placeholder 3"/>
+          <p:cNvSpPr>
+            <a:spLocks noGrp="1"/>
+          </p:cNvSpPr>
+          <p:nvPr>
+            <p:ph type="sldNum" sz="quarter" idx="5"/>
+          </p:nvPr>
+        </p:nvSpPr>
+        <p:spPr/>
+        <p:txBody>
+          <a:bodyPr/>
+          <a:lstStyle/>
+          <a:p>
+            <a:fld id="{DF2352D6-35AF-0544-A99E-554CC41E76C4}" type="slidenum">
+              <a:rPr lang="en-US" smtClean="0"/>
+              <a:t>6</a:t>
+            </a:fld>
+            <a:endParaRPr lang="en-US"/>
+          </a:p>
+        </p:txBody>
+      </p:sp>
+    </p:spTree>
+    <p:extLst>
+      <p:ext uri="{BB962C8B-B14F-4D97-AF65-F5344CB8AC3E}">
+        <p14:creationId xmlns:p14="http://schemas.microsoft.com/office/powerpoint/2010/main" val="3177731070"/>
+      </p:ext>
+    </p:extLst>
+  </p:cSld>
+  <p:clrMapOvr>
+    <a:masterClrMapping/>
+  </p:clrMapOvr>
+</p:notes>
+</file>
+
+<file path=ppt/notesSlides/notesSlide7.xml><?xml version="1.0" encoding="utf-8"?>
+<p:notes xmlns:a="http://schemas.openxmlformats.org/drawingml/2006/main" xmlns:r="http://schemas.openxmlformats.org/officeDocument/2006/relationships" xmlns:p="http://schemas.openxmlformats.org/presentationml/2006/main">
+  <p:cSld>
+    <p:spTree>
+      <p:nvGrpSpPr>
+        <p:cNvPr id="1" name=""/>
+        <p:cNvGrpSpPr/>
+        <p:nvPr/>
+      </p:nvGrpSpPr>
+      <p:grpSpPr>
+        <a:xfrm>
+          <a:off x="0" y="0"/>
+          <a:ext cx="0" cy="0"/>
+          <a:chOff x="0" y="0"/>
+          <a:chExt cx="0" cy="0"/>
+        </a:xfrm>
+      </p:grpSpPr>
+      <p:sp>
+        <p:nvSpPr>
+          <p:cNvPr id="2" name="Slide Image Placeholder 1"/>
+          <p:cNvSpPr>
+            <a:spLocks noGrp="1" noRot="1" noChangeAspect="1"/>
+          </p:cNvSpPr>
+          <p:nvPr>
+            <p:ph type="sldImg"/>
+          </p:nvPr>
+        </p:nvSpPr>
+        <p:spPr/>
+      </p:sp>
+      <p:sp>
+        <p:nvSpPr>
+          <p:cNvPr id="3" name="Notes Placeholder 2"/>
+          <p:cNvSpPr>
+            <a:spLocks noGrp="1"/>
+          </p:cNvSpPr>
+          <p:nvPr>
+            <p:ph type="body" idx="1"/>
+          </p:nvPr>
+        </p:nvSpPr>
+        <p:spPr/>
+        <p:txBody>
+          <a:bodyPr/>
+          <a:lstStyle/>
+          <a:p>
+            <a:r>
+              <a:rPr lang="en-US" dirty="0"/>
+              <a:t>-To help users explore all listings available in NYC, we created a marker cluster map using Leaflet. </a:t>
+            </a:r>
+          </a:p>
+          <a:p>
+            <a:r>
+              <a:rPr lang="en-US" dirty="0"/>
+              <a:t>-The clusters display the number of listings with the different boroughs and </a:t>
+            </a:r>
+            <a:r>
+              <a:rPr lang="en-US" dirty="0" err="1"/>
+              <a:t>neighbourhoods</a:t>
+            </a:r>
+            <a:r>
+              <a:rPr lang="en-US" dirty="0"/>
+              <a:t> in NYC. </a:t>
+            </a:r>
+          </a:p>
+          <a:p>
+            <a:r>
+              <a:rPr lang="en-US" dirty="0"/>
+              <a:t>-In this example, we selected the the well-known New York borough of Manhattan, and then further zoomed in to the Upper West Side </a:t>
+            </a:r>
+            <a:r>
+              <a:rPr lang="en-US" dirty="0" err="1"/>
+              <a:t>neighbourhood</a:t>
+            </a:r>
+            <a:r>
+              <a:rPr lang="en-US" dirty="0"/>
+              <a:t>. </a:t>
+            </a:r>
+          </a:p>
+          <a:p>
+            <a:endParaRPr lang="en-US" dirty="0"/>
+          </a:p>
+        </p:txBody>
+      </p:sp>
+      <p:sp>
+        <p:nvSpPr>
+          <p:cNvPr id="4" name="Slide Number Placeholder 3"/>
+          <p:cNvSpPr>
+            <a:spLocks noGrp="1"/>
+          </p:cNvSpPr>
+          <p:nvPr>
+            <p:ph type="sldNum" sz="quarter" idx="5"/>
+          </p:nvPr>
+        </p:nvSpPr>
+        <p:spPr/>
+        <p:txBody>
+          <a:bodyPr/>
+          <a:lstStyle/>
+          <a:p>
+            <a:fld id="{DF2352D6-35AF-0544-A99E-554CC41E76C4}" type="slidenum">
+              <a:rPr lang="en-US" smtClean="0"/>
+              <a:t>7</a:t>
+            </a:fld>
+            <a:endParaRPr lang="en-US"/>
+          </a:p>
+        </p:txBody>
+      </p:sp>
+    </p:spTree>
+    <p:extLst>
+      <p:ext uri="{BB962C8B-B14F-4D97-AF65-F5344CB8AC3E}">
+        <p14:creationId xmlns:p14="http://schemas.microsoft.com/office/powerpoint/2010/main" val="266214348"/>
+      </p:ext>
+    </p:extLst>
+  </p:cSld>
+  <p:clrMapOvr>
+    <a:masterClrMapping/>
+  </p:clrMapOvr>
+</p:notes>
+</file>
+
+<file path=ppt/notesSlides/notesSlide8.xml><?xml version="1.0" encoding="utf-8"?>
+<p:notes xmlns:a="http://schemas.openxmlformats.org/drawingml/2006/main" xmlns:r="http://schemas.openxmlformats.org/officeDocument/2006/relationships" xmlns:p="http://schemas.openxmlformats.org/presentationml/2006/main">
+  <p:cSld>
+    <p:spTree>
+      <p:nvGrpSpPr>
+        <p:cNvPr id="1" name=""/>
+        <p:cNvGrpSpPr/>
+        <p:nvPr/>
+      </p:nvGrpSpPr>
+      <p:grpSpPr>
+        <a:xfrm>
+          <a:off x="0" y="0"/>
+          <a:ext cx="0" cy="0"/>
+          <a:chOff x="0" y="0"/>
+          <a:chExt cx="0" cy="0"/>
+        </a:xfrm>
+      </p:grpSpPr>
+      <p:sp>
+        <p:nvSpPr>
+          <p:cNvPr id="2" name="Slide Image Placeholder 1"/>
+          <p:cNvSpPr>
+            <a:spLocks noGrp="1" noRot="1" noChangeAspect="1"/>
+          </p:cNvSpPr>
+          <p:nvPr>
+            <p:ph type="sldImg"/>
+          </p:nvPr>
+        </p:nvSpPr>
+        <p:spPr/>
+      </p:sp>
+      <p:sp>
+        <p:nvSpPr>
+          <p:cNvPr id="3" name="Notes Placeholder 2"/>
+          <p:cNvSpPr>
+            <a:spLocks noGrp="1"/>
+          </p:cNvSpPr>
+          <p:nvPr>
+            <p:ph type="body" idx="1"/>
+          </p:nvPr>
+        </p:nvSpPr>
+        <p:spPr/>
+        <p:txBody>
+          <a:bodyPr/>
+          <a:lstStyle/>
+          <a:p>
+            <a:r>
+              <a:rPr lang="en-US" dirty="0"/>
+              <a:t>-To help users explore all listings available in NYC, we created a marker cluster map using Leaflet. </a:t>
+            </a:r>
+          </a:p>
+          <a:p>
+            <a:r>
+              <a:rPr lang="en-US" dirty="0"/>
+              <a:t>-The clusters display the number of listings with the different boroughs and </a:t>
+            </a:r>
+            <a:r>
+              <a:rPr lang="en-US" dirty="0" err="1"/>
+              <a:t>neighbourhoods</a:t>
+            </a:r>
+            <a:r>
+              <a:rPr lang="en-US" dirty="0"/>
+              <a:t> in NYC. </a:t>
+            </a:r>
+          </a:p>
+          <a:p>
+            <a:r>
+              <a:rPr lang="en-US" dirty="0"/>
+              <a:t>-In this example, we selected the the well-known New York borough of Manhattan, and then further zoomed in to the Upper West Side </a:t>
+            </a:r>
+            <a:r>
+              <a:rPr lang="en-US" dirty="0" err="1"/>
+              <a:t>neighbourhood</a:t>
+            </a:r>
+            <a:r>
+              <a:rPr lang="en-US" dirty="0"/>
+              <a:t>. </a:t>
+            </a:r>
+          </a:p>
+          <a:p>
+            <a:endParaRPr lang="en-US" dirty="0"/>
+          </a:p>
+        </p:txBody>
+      </p:sp>
+      <p:sp>
+        <p:nvSpPr>
+          <p:cNvPr id="4" name="Slide Number Placeholder 3"/>
+          <p:cNvSpPr>
+            <a:spLocks noGrp="1"/>
+          </p:cNvSpPr>
+          <p:nvPr>
+            <p:ph type="sldNum" sz="quarter" idx="5"/>
+          </p:nvPr>
+        </p:nvSpPr>
+        <p:spPr/>
+        <p:txBody>
+          <a:bodyPr/>
+          <a:lstStyle/>
+          <a:p>
+            <a:fld id="{DF2352D6-35AF-0544-A99E-554CC41E76C4}" type="slidenum">
+              <a:rPr lang="en-US" smtClean="0"/>
+              <a:t>8</a:t>
+            </a:fld>
+            <a:endParaRPr lang="en-US"/>
+          </a:p>
+        </p:txBody>
+      </p:sp>
+    </p:spTree>
+    <p:extLst>
+      <p:ext uri="{BB962C8B-B14F-4D97-AF65-F5344CB8AC3E}">
+        <p14:creationId xmlns:p14="http://schemas.microsoft.com/office/powerpoint/2010/main" val="847075339"/>
+      </p:ext>
+    </p:extLst>
+  </p:cSld>
+  <p:clrMapOvr>
+    <a:masterClrMapping/>
+  </p:clrMapOvr>
+</p:notes>
+</file>
+
+<file path=ppt/notesSlides/notesSlide9.xml><?xml version="1.0" encoding="utf-8"?>
+<p:notes xmlns:a="http://schemas.openxmlformats.org/drawingml/2006/main" xmlns:r="http://schemas.openxmlformats.org/officeDocument/2006/relationships" xmlns:p="http://schemas.openxmlformats.org/presentationml/2006/main">
+  <p:cSld>
+    <p:spTree>
+      <p:nvGrpSpPr>
+        <p:cNvPr id="1" name=""/>
+        <p:cNvGrpSpPr/>
+        <p:nvPr/>
+      </p:nvGrpSpPr>
+      <p:grpSpPr>
+        <a:xfrm>
+          <a:off x="0" y="0"/>
+          <a:ext cx="0" cy="0"/>
+          <a:chOff x="0" y="0"/>
+          <a:chExt cx="0" cy="0"/>
+        </a:xfrm>
+      </p:grpSpPr>
+      <p:sp>
+        <p:nvSpPr>
+          <p:cNvPr id="2" name="Slide Image Placeholder 1"/>
+          <p:cNvSpPr>
+            <a:spLocks noGrp="1" noRot="1" noChangeAspect="1"/>
+          </p:cNvSpPr>
+          <p:nvPr>
+            <p:ph type="sldImg"/>
+          </p:nvPr>
+        </p:nvSpPr>
+        <p:spPr/>
+      </p:sp>
+      <p:sp>
+        <p:nvSpPr>
+          <p:cNvPr id="3" name="Notes Placeholder 2"/>
+          <p:cNvSpPr>
+            <a:spLocks noGrp="1"/>
+          </p:cNvSpPr>
+          <p:nvPr>
+            <p:ph type="body" idx="1"/>
+          </p:nvPr>
+        </p:nvSpPr>
+        <p:spPr/>
+        <p:txBody>
+          <a:bodyPr/>
+          <a:lstStyle/>
+          <a:p>
+            <a:r>
+              <a:rPr lang="en-US" dirty="0"/>
+              <a:t>-To help users explore all listings available in NYC, we created a marker cluster map using Leaflet. </a:t>
+            </a:r>
+          </a:p>
+          <a:p>
+            <a:r>
+              <a:rPr lang="en-US" dirty="0"/>
+              <a:t>-The clusters display the number of listings with the different boroughs and </a:t>
+            </a:r>
+            <a:r>
+              <a:rPr lang="en-US" dirty="0" err="1"/>
+              <a:t>neighbourhoods</a:t>
+            </a:r>
+            <a:r>
+              <a:rPr lang="en-US" dirty="0"/>
+              <a:t> in NYC. </a:t>
+            </a:r>
+          </a:p>
+          <a:p>
+            <a:r>
+              <a:rPr lang="en-US" dirty="0"/>
+              <a:t>-In this example, we selected the the well-known New York borough of Manhattan, and then further zoomed in to the Upper West Side </a:t>
+            </a:r>
+            <a:r>
+              <a:rPr lang="en-US" dirty="0" err="1"/>
+              <a:t>neighbourhood</a:t>
+            </a:r>
+            <a:r>
+              <a:rPr lang="en-US" dirty="0"/>
+              <a:t>. </a:t>
+            </a:r>
+          </a:p>
+          <a:p>
+            <a:endParaRPr lang="en-US" dirty="0"/>
+          </a:p>
+        </p:txBody>
+      </p:sp>
+      <p:sp>
+        <p:nvSpPr>
+          <p:cNvPr id="4" name="Slide Number Placeholder 3"/>
+          <p:cNvSpPr>
+            <a:spLocks noGrp="1"/>
+          </p:cNvSpPr>
+          <p:nvPr>
+            <p:ph type="sldNum" sz="quarter" idx="5"/>
+          </p:nvPr>
+        </p:nvSpPr>
+        <p:spPr/>
+        <p:txBody>
+          <a:bodyPr/>
+          <a:lstStyle/>
+          <a:p>
+            <a:fld id="{DF2352D6-35AF-0544-A99E-554CC41E76C4}" type="slidenum">
+              <a:rPr lang="en-US" smtClean="0"/>
+              <a:t>9</a:t>
+            </a:fld>
+            <a:endParaRPr lang="en-US"/>
+          </a:p>
+        </p:txBody>
+      </p:sp>
+    </p:spTree>
+    <p:extLst>
+      <p:ext uri="{BB962C8B-B14F-4D97-AF65-F5344CB8AC3E}">
+        <p14:creationId xmlns:p14="http://schemas.microsoft.com/office/powerpoint/2010/main" val="533258538"/>
       </p:ext>
     </p:extLst>
   </p:cSld>
@@ -4030,21 +4944,23 @@
         </p:nvSpPr>
         <p:spPr>
           <a:xfrm>
-            <a:off x="4272238" y="588197"/>
+            <a:off x="3371495" y="696475"/>
             <a:ext cx="10515600" cy="1325563"/>
           </a:xfrm>
         </p:spPr>
         <p:txBody>
-          <a:bodyPr/>
-          <a:lstStyle/>
-          <a:p>
-            <a:r>
-              <a:rPr lang="en-US" dirty="0">
+          <a:bodyPr>
+            <a:normAutofit/>
+          </a:bodyPr>
+          <a:lstStyle/>
+          <a:p>
+            <a:r>
+              <a:rPr lang="en-US" sz="4000" dirty="0">
                 <a:solidFill>
                   <a:srgbClr val="EA5E46"/>
                 </a:solidFill>
               </a:rPr>
-              <a:t>Models</a:t>
+              <a:t>Price Predictor Models</a:t>
             </a:r>
           </a:p>
         </p:txBody>
@@ -4078,7 +4994,7 @@
         </p:blipFill>
         <p:spPr bwMode="auto">
           <a:xfrm>
-            <a:off x="2080820" y="0"/>
+            <a:off x="1180077" y="108278"/>
             <a:ext cx="2189605" cy="2022038"/>
           </a:xfrm>
           <a:prstGeom prst="rect">
@@ -4112,7 +5028,7 @@
         </p:nvCxnSpPr>
         <p:spPr>
           <a:xfrm>
-            <a:off x="2526110" y="1576551"/>
+            <a:off x="1625367" y="1684829"/>
             <a:ext cx="9518745" cy="1"/>
           </a:xfrm>
           <a:prstGeom prst="line">
@@ -4139,210 +5055,273 @@
           </a:fontRef>
         </p:style>
       </p:cxnSp>
-      <p:pic>
-        <p:nvPicPr>
-          <p:cNvPr id="2071" name="Picture 2070">
-            <a:extLst>
-              <a:ext uri="{FF2B5EF4-FFF2-40B4-BE49-F238E27FC236}">
-                <a16:creationId xmlns:a16="http://schemas.microsoft.com/office/drawing/2014/main" id="{93FFCA0F-EBBD-4B16-B1D9-64DE5B4E1326}"/>
-              </a:ext>
-            </a:extLst>
-          </p:cNvPr>
-          <p:cNvPicPr>
-            <a:picLocks noChangeAspect="1"/>
-          </p:cNvPicPr>
+      <p:grpSp>
+        <p:nvGrpSpPr>
+          <p:cNvPr id="4" name="Group 3">
+            <a:extLst>
+              <a:ext uri="{FF2B5EF4-FFF2-40B4-BE49-F238E27FC236}">
+                <a16:creationId xmlns:a16="http://schemas.microsoft.com/office/drawing/2014/main" id="{9B941F75-E90C-488B-AA2B-921C2318D973}"/>
+              </a:ext>
+            </a:extLst>
+          </p:cNvPr>
+          <p:cNvGrpSpPr/>
           <p:nvPr/>
-        </p:nvPicPr>
-        <p:blipFill>
-          <a:blip r:embed="rId4"/>
-          <a:stretch>
-            <a:fillRect/>
-          </a:stretch>
-        </p:blipFill>
-        <p:spPr>
+        </p:nvGrpSpPr>
+        <p:grpSpPr>
           <a:xfrm>
-            <a:off x="1508423" y="2845526"/>
-            <a:ext cx="2189605" cy="1657172"/>
+            <a:off x="1453073" y="2884453"/>
+            <a:ext cx="2845864" cy="2645488"/>
+            <a:chOff x="1404492" y="2564906"/>
+            <a:chExt cx="2845864" cy="2645488"/>
           </a:xfrm>
-          <a:prstGeom prst="rect">
-            <a:avLst/>
-          </a:prstGeom>
-        </p:spPr>
-      </p:pic>
-      <p:pic>
-        <p:nvPicPr>
-          <p:cNvPr id="2073" name="Picture 2072">
-            <a:extLst>
-              <a:ext uri="{FF2B5EF4-FFF2-40B4-BE49-F238E27FC236}">
-                <a16:creationId xmlns:a16="http://schemas.microsoft.com/office/drawing/2014/main" id="{673FC951-30E1-4E11-B7E0-DA9A36525151}"/>
-              </a:ext>
-            </a:extLst>
-          </p:cNvPr>
-          <p:cNvPicPr>
-            <a:picLocks noChangeAspect="1"/>
-          </p:cNvPicPr>
+        </p:grpSpPr>
+        <p:pic>
+          <p:nvPicPr>
+            <p:cNvPr id="2071" name="Picture 2070">
+              <a:extLst>
+                <a:ext uri="{FF2B5EF4-FFF2-40B4-BE49-F238E27FC236}">
+                  <a16:creationId xmlns:a16="http://schemas.microsoft.com/office/drawing/2014/main" id="{93FFCA0F-EBBD-4B16-B1D9-64DE5B4E1326}"/>
+                </a:ext>
+              </a:extLst>
+            </p:cNvPr>
+            <p:cNvPicPr>
+              <a:picLocks noChangeAspect="1"/>
+            </p:cNvPicPr>
+            <p:nvPr/>
+          </p:nvPicPr>
+          <p:blipFill>
+            <a:blip r:embed="rId4"/>
+            <a:stretch>
+              <a:fillRect/>
+            </a:stretch>
+          </p:blipFill>
+          <p:spPr>
+            <a:xfrm>
+              <a:off x="1418384" y="2564906"/>
+              <a:ext cx="2189605" cy="1657172"/>
+            </a:xfrm>
+            <a:prstGeom prst="rect">
+              <a:avLst/>
+            </a:prstGeom>
+          </p:spPr>
+        </p:pic>
+        <p:sp>
+          <p:nvSpPr>
+            <p:cNvPr id="35" name="TextBox 34">
+              <a:extLst>
+                <a:ext uri="{FF2B5EF4-FFF2-40B4-BE49-F238E27FC236}">
+                  <a16:creationId xmlns:a16="http://schemas.microsoft.com/office/drawing/2014/main" id="{1AE4750C-C8EA-444F-9B83-0A0518E8F8C0}"/>
+                </a:ext>
+              </a:extLst>
+            </p:cNvPr>
+            <p:cNvSpPr txBox="1"/>
+            <p:nvPr/>
+          </p:nvSpPr>
+          <p:spPr>
+            <a:xfrm>
+              <a:off x="1404492" y="4564063"/>
+              <a:ext cx="2845864" cy="646331"/>
+            </a:xfrm>
+            <a:prstGeom prst="rect">
+              <a:avLst/>
+            </a:prstGeom>
+            <a:noFill/>
+          </p:spPr>
+          <p:txBody>
+            <a:bodyPr wrap="square" rtlCol="0">
+              <a:spAutoFit/>
+            </a:bodyPr>
+            <a:lstStyle/>
+            <a:p>
+              <a:r>
+                <a:rPr lang="en-US" dirty="0"/>
+                <a:t>Random Forest </a:t>
+              </a:r>
+            </a:p>
+            <a:p>
+              <a:r>
+                <a:rPr lang="en-US" dirty="0"/>
+                <a:t>LGBM</a:t>
+              </a:r>
+              <a:endParaRPr lang="en-CA" dirty="0"/>
+            </a:p>
+          </p:txBody>
+        </p:sp>
+      </p:grpSp>
+      <p:grpSp>
+        <p:nvGrpSpPr>
+          <p:cNvPr id="7" name="Group 6">
+            <a:extLst>
+              <a:ext uri="{FF2B5EF4-FFF2-40B4-BE49-F238E27FC236}">
+                <a16:creationId xmlns:a16="http://schemas.microsoft.com/office/drawing/2014/main" id="{0FC5296A-CF7F-41B7-A45A-025B6F042A54}"/>
+              </a:ext>
+            </a:extLst>
+          </p:cNvPr>
+          <p:cNvGrpSpPr/>
           <p:nvPr/>
-        </p:nvPicPr>
-        <p:blipFill>
-          <a:blip r:embed="rId5"/>
-          <a:stretch>
-            <a:fillRect/>
-          </a:stretch>
-        </p:blipFill>
-        <p:spPr>
+        </p:nvGrpSpPr>
+        <p:grpSpPr>
           <a:xfrm>
-            <a:off x="5345917" y="2961319"/>
-            <a:ext cx="1708027" cy="1550966"/>
+            <a:off x="5304459" y="3000246"/>
+            <a:ext cx="3324836" cy="2281203"/>
+            <a:chOff x="5255878" y="2680699"/>
+            <a:chExt cx="3324836" cy="2281203"/>
           </a:xfrm>
-          <a:prstGeom prst="rect">
-            <a:avLst/>
-          </a:prstGeom>
-        </p:spPr>
-      </p:pic>
-      <p:pic>
-        <p:nvPicPr>
-          <p:cNvPr id="2079" name="Picture 2078">
-            <a:extLst>
-              <a:ext uri="{FF2B5EF4-FFF2-40B4-BE49-F238E27FC236}">
-                <a16:creationId xmlns:a16="http://schemas.microsoft.com/office/drawing/2014/main" id="{A5CA83BB-0863-4E6B-B621-304CD708D09A}"/>
-              </a:ext>
-            </a:extLst>
-          </p:cNvPr>
-          <p:cNvPicPr>
-            <a:picLocks noChangeAspect="1"/>
-          </p:cNvPicPr>
+        </p:grpSpPr>
+        <p:pic>
+          <p:nvPicPr>
+            <p:cNvPr id="2073" name="Picture 2072">
+              <a:extLst>
+                <a:ext uri="{FF2B5EF4-FFF2-40B4-BE49-F238E27FC236}">
+                  <a16:creationId xmlns:a16="http://schemas.microsoft.com/office/drawing/2014/main" id="{673FC951-30E1-4E11-B7E0-DA9A36525151}"/>
+                </a:ext>
+              </a:extLst>
+            </p:cNvPr>
+            <p:cNvPicPr>
+              <a:picLocks noChangeAspect="1"/>
+            </p:cNvPicPr>
+            <p:nvPr/>
+          </p:nvPicPr>
+          <p:blipFill>
+            <a:blip r:embed="rId5"/>
+            <a:stretch>
+              <a:fillRect/>
+            </a:stretch>
+          </p:blipFill>
+          <p:spPr>
+            <a:xfrm>
+              <a:off x="5255878" y="2680699"/>
+              <a:ext cx="1708027" cy="1550966"/>
+            </a:xfrm>
+            <a:prstGeom prst="rect">
+              <a:avLst/>
+            </a:prstGeom>
+          </p:spPr>
+        </p:pic>
+        <p:sp>
+          <p:nvSpPr>
+            <p:cNvPr id="78" name="TextBox 77">
+              <a:extLst>
+                <a:ext uri="{FF2B5EF4-FFF2-40B4-BE49-F238E27FC236}">
+                  <a16:creationId xmlns:a16="http://schemas.microsoft.com/office/drawing/2014/main" id="{E2C38085-80CC-4B83-9F32-B05BD09C9CB8}"/>
+                </a:ext>
+              </a:extLst>
+            </p:cNvPr>
+            <p:cNvSpPr txBox="1"/>
+            <p:nvPr/>
+          </p:nvSpPr>
+          <p:spPr>
+            <a:xfrm>
+              <a:off x="5734850" y="4592570"/>
+              <a:ext cx="2845864" cy="369332"/>
+            </a:xfrm>
+            <a:prstGeom prst="rect">
+              <a:avLst/>
+            </a:prstGeom>
+            <a:noFill/>
+          </p:spPr>
+          <p:txBody>
+            <a:bodyPr wrap="square" rtlCol="0">
+              <a:spAutoFit/>
+            </a:bodyPr>
+            <a:lstStyle/>
+            <a:p>
+              <a:r>
+                <a:rPr lang="en-US" dirty="0"/>
+                <a:t>KNN	</a:t>
+              </a:r>
+              <a:endParaRPr lang="en-CA" dirty="0"/>
+            </a:p>
+          </p:txBody>
+        </p:sp>
+      </p:grpSp>
+      <p:grpSp>
+        <p:nvGrpSpPr>
+          <p:cNvPr id="5" name="Group 4">
+            <a:extLst>
+              <a:ext uri="{FF2B5EF4-FFF2-40B4-BE49-F238E27FC236}">
+                <a16:creationId xmlns:a16="http://schemas.microsoft.com/office/drawing/2014/main" id="{CF2F19B8-C6DA-44BA-BFBD-7E63DC91250B}"/>
+              </a:ext>
+            </a:extLst>
+          </p:cNvPr>
+          <p:cNvGrpSpPr/>
           <p:nvPr/>
-        </p:nvPicPr>
-        <p:blipFill>
-          <a:blip r:embed="rId6"/>
-          <a:stretch>
-            <a:fillRect/>
-          </a:stretch>
-        </p:blipFill>
-        <p:spPr>
+        </p:nvGrpSpPr>
+        <p:grpSpPr>
           <a:xfrm>
-            <a:off x="8418122" y="3086726"/>
-            <a:ext cx="2378458" cy="1406358"/>
+            <a:off x="8376664" y="3125653"/>
+            <a:ext cx="3147076" cy="2156579"/>
+            <a:chOff x="8328083" y="2806106"/>
+            <a:chExt cx="3147076" cy="2156579"/>
           </a:xfrm>
-          <a:prstGeom prst="rect">
-            <a:avLst/>
-          </a:prstGeom>
-        </p:spPr>
-      </p:pic>
-      <p:sp>
-        <p:nvSpPr>
-          <p:cNvPr id="35" name="TextBox 34">
-            <a:extLst>
-              <a:ext uri="{FF2B5EF4-FFF2-40B4-BE49-F238E27FC236}">
-                <a16:creationId xmlns:a16="http://schemas.microsoft.com/office/drawing/2014/main" id="{1AE4750C-C8EA-444F-9B83-0A0518E8F8C0}"/>
-              </a:ext>
-            </a:extLst>
-          </p:cNvPr>
-          <p:cNvSpPr txBox="1"/>
-          <p:nvPr/>
-        </p:nvSpPr>
-        <p:spPr>
-          <a:xfrm>
-            <a:off x="1494531" y="4844683"/>
-            <a:ext cx="2845864" cy="646331"/>
-          </a:xfrm>
-          <a:prstGeom prst="rect">
-            <a:avLst/>
-          </a:prstGeom>
-          <a:noFill/>
-        </p:spPr>
-        <p:txBody>
-          <a:bodyPr wrap="square" rtlCol="0">
-            <a:spAutoFit/>
-          </a:bodyPr>
-          <a:lstStyle/>
-          <a:p>
-            <a:r>
-              <a:rPr lang="en-US" dirty="0"/>
-              <a:t>Random Forest Regressor</a:t>
-            </a:r>
-          </a:p>
-          <a:p>
-            <a:r>
-              <a:rPr lang="en-US" dirty="0"/>
-              <a:t>LGBM Regressor</a:t>
-            </a:r>
-            <a:endParaRPr lang="en-CA" dirty="0"/>
-          </a:p>
-        </p:txBody>
-      </p:sp>
-      <p:sp>
-        <p:nvSpPr>
-          <p:cNvPr id="78" name="TextBox 77">
-            <a:extLst>
-              <a:ext uri="{FF2B5EF4-FFF2-40B4-BE49-F238E27FC236}">
-                <a16:creationId xmlns:a16="http://schemas.microsoft.com/office/drawing/2014/main" id="{E2C38085-80CC-4B83-9F32-B05BD09C9CB8}"/>
-              </a:ext>
-            </a:extLst>
-          </p:cNvPr>
-          <p:cNvSpPr txBox="1"/>
-          <p:nvPr/>
-        </p:nvSpPr>
-        <p:spPr>
-          <a:xfrm>
-            <a:off x="5824889" y="4873190"/>
-            <a:ext cx="2845864" cy="369332"/>
-          </a:xfrm>
-          <a:prstGeom prst="rect">
-            <a:avLst/>
-          </a:prstGeom>
-          <a:noFill/>
-        </p:spPr>
-        <p:txBody>
-          <a:bodyPr wrap="square" rtlCol="0">
-            <a:spAutoFit/>
-          </a:bodyPr>
-          <a:lstStyle/>
-          <a:p>
-            <a:r>
-              <a:rPr lang="en-US" dirty="0"/>
-              <a:t>KNN	</a:t>
-            </a:r>
-            <a:endParaRPr lang="en-CA" dirty="0"/>
-          </a:p>
-        </p:txBody>
-      </p:sp>
-      <p:sp>
-        <p:nvSpPr>
-          <p:cNvPr id="79" name="TextBox 78">
-            <a:extLst>
-              <a:ext uri="{FF2B5EF4-FFF2-40B4-BE49-F238E27FC236}">
-                <a16:creationId xmlns:a16="http://schemas.microsoft.com/office/drawing/2014/main" id="{51610A38-B103-41F1-97A6-2590D50A7EDD}"/>
-              </a:ext>
-            </a:extLst>
-          </p:cNvPr>
-          <p:cNvSpPr txBox="1"/>
-          <p:nvPr/>
-        </p:nvSpPr>
-        <p:spPr>
-          <a:xfrm>
-            <a:off x="8719334" y="4873973"/>
-            <a:ext cx="2845864" cy="369332"/>
-          </a:xfrm>
-          <a:prstGeom prst="rect">
-            <a:avLst/>
-          </a:prstGeom>
-          <a:noFill/>
-        </p:spPr>
-        <p:txBody>
-          <a:bodyPr wrap="square" rtlCol="0">
-            <a:spAutoFit/>
-          </a:bodyPr>
-          <a:lstStyle/>
-          <a:p>
-            <a:r>
-              <a:rPr lang="en-US" dirty="0"/>
-              <a:t>Facebook Prophet	</a:t>
-            </a:r>
-            <a:endParaRPr lang="en-CA" dirty="0"/>
-          </a:p>
-        </p:txBody>
-      </p:sp>
+        </p:grpSpPr>
+        <p:pic>
+          <p:nvPicPr>
+            <p:cNvPr id="2079" name="Picture 2078">
+              <a:extLst>
+                <a:ext uri="{FF2B5EF4-FFF2-40B4-BE49-F238E27FC236}">
+                  <a16:creationId xmlns:a16="http://schemas.microsoft.com/office/drawing/2014/main" id="{A5CA83BB-0863-4E6B-B621-304CD708D09A}"/>
+                </a:ext>
+              </a:extLst>
+            </p:cNvPr>
+            <p:cNvPicPr>
+              <a:picLocks noChangeAspect="1"/>
+            </p:cNvPicPr>
+            <p:nvPr/>
+          </p:nvPicPr>
+          <p:blipFill>
+            <a:blip r:embed="rId6"/>
+            <a:stretch>
+              <a:fillRect/>
+            </a:stretch>
+          </p:blipFill>
+          <p:spPr>
+            <a:xfrm>
+              <a:off x="8328083" y="2806106"/>
+              <a:ext cx="2378458" cy="1406358"/>
+            </a:xfrm>
+            <a:prstGeom prst="rect">
+              <a:avLst/>
+            </a:prstGeom>
+          </p:spPr>
+        </p:pic>
+        <p:sp>
+          <p:nvSpPr>
+            <p:cNvPr id="79" name="TextBox 78">
+              <a:extLst>
+                <a:ext uri="{FF2B5EF4-FFF2-40B4-BE49-F238E27FC236}">
+                  <a16:creationId xmlns:a16="http://schemas.microsoft.com/office/drawing/2014/main" id="{51610A38-B103-41F1-97A6-2590D50A7EDD}"/>
+                </a:ext>
+              </a:extLst>
+            </p:cNvPr>
+            <p:cNvSpPr txBox="1"/>
+            <p:nvPr/>
+          </p:nvSpPr>
+          <p:spPr>
+            <a:xfrm>
+              <a:off x="8629295" y="4593353"/>
+              <a:ext cx="2845864" cy="369332"/>
+            </a:xfrm>
+            <a:prstGeom prst="rect">
+              <a:avLst/>
+            </a:prstGeom>
+            <a:noFill/>
+          </p:spPr>
+          <p:txBody>
+            <a:bodyPr wrap="square" rtlCol="0">
+              <a:spAutoFit/>
+            </a:bodyPr>
+            <a:lstStyle/>
+            <a:p>
+              <a:r>
+                <a:rPr lang="en-US" dirty="0"/>
+                <a:t>Facebook Prophet	</a:t>
+              </a:r>
+              <a:endParaRPr lang="en-CA" dirty="0"/>
+            </a:p>
+          </p:txBody>
+        </p:sp>
+      </p:grpSp>
     </p:spTree>
     <p:extLst>
       <p:ext uri="{BB962C8B-B14F-4D97-AF65-F5344CB8AC3E}">
@@ -4353,10 +5332,175 @@
   <p:clrMapOvr>
     <a:masterClrMapping/>
   </p:clrMapOvr>
+  <p:timing>
+    <p:tnLst>
+      <p:par>
+        <p:cTn id="1" dur="indefinite" restart="never" nodeType="tmRoot">
+          <p:childTnLst>
+            <p:seq concurrent="1" nextAc="seek">
+              <p:cTn id="2" dur="indefinite" nodeType="mainSeq">
+                <p:childTnLst>
+                  <p:par>
+                    <p:cTn id="3" fill="hold">
+                      <p:stCondLst>
+                        <p:cond delay="indefinite"/>
+                      </p:stCondLst>
+                      <p:childTnLst>
+                        <p:par>
+                          <p:cTn id="4" fill="hold">
+                            <p:stCondLst>
+                              <p:cond delay="0"/>
+                            </p:stCondLst>
+                            <p:childTnLst>
+                              <p:par>
+                                <p:cTn id="5" presetID="1" presetClass="entr" presetSubtype="0" fill="hold" nodeType="clickEffect">
+                                  <p:stCondLst>
+                                    <p:cond delay="0"/>
+                                  </p:stCondLst>
+                                  <p:childTnLst>
+                                    <p:set>
+                                      <p:cBhvr>
+                                        <p:cTn id="6" dur="1" fill="hold">
+                                          <p:stCondLst>
+                                            <p:cond delay="0"/>
+                                          </p:stCondLst>
+                                        </p:cTn>
+                                        <p:tgtEl>
+                                          <p:spTgt spid="4"/>
+                                        </p:tgtEl>
+                                        <p:attrNameLst>
+                                          <p:attrName>style.visibility</p:attrName>
+                                        </p:attrNameLst>
+                                      </p:cBhvr>
+                                      <p:to>
+                                        <p:strVal val="visible"/>
+                                      </p:to>
+                                    </p:set>
+                                  </p:childTnLst>
+                                </p:cTn>
+                              </p:par>
+                            </p:childTnLst>
+                          </p:cTn>
+                        </p:par>
+                      </p:childTnLst>
+                    </p:cTn>
+                  </p:par>
+                  <p:par>
+                    <p:cTn id="7" fill="hold">
+                      <p:stCondLst>
+                        <p:cond delay="indefinite"/>
+                      </p:stCondLst>
+                      <p:childTnLst>
+                        <p:par>
+                          <p:cTn id="8" fill="hold">
+                            <p:stCondLst>
+                              <p:cond delay="0"/>
+                            </p:stCondLst>
+                            <p:childTnLst>
+                              <p:par>
+                                <p:cTn id="9" presetID="1" presetClass="entr" presetSubtype="0" fill="hold" nodeType="clickEffect">
+                                  <p:stCondLst>
+                                    <p:cond delay="0"/>
+                                  </p:stCondLst>
+                                  <p:childTnLst>
+                                    <p:set>
+                                      <p:cBhvr>
+                                        <p:cTn id="10" dur="1" fill="hold">
+                                          <p:stCondLst>
+                                            <p:cond delay="0"/>
+                                          </p:stCondLst>
+                                        </p:cTn>
+                                        <p:tgtEl>
+                                          <p:spTgt spid="7"/>
+                                        </p:tgtEl>
+                                        <p:attrNameLst>
+                                          <p:attrName>style.visibility</p:attrName>
+                                        </p:attrNameLst>
+                                      </p:cBhvr>
+                                      <p:to>
+                                        <p:strVal val="visible"/>
+                                      </p:to>
+                                    </p:set>
+                                  </p:childTnLst>
+                                </p:cTn>
+                              </p:par>
+                            </p:childTnLst>
+                          </p:cTn>
+                        </p:par>
+                      </p:childTnLst>
+                    </p:cTn>
+                  </p:par>
+                  <p:par>
+                    <p:cTn id="11" fill="hold">
+                      <p:stCondLst>
+                        <p:cond delay="indefinite"/>
+                      </p:stCondLst>
+                      <p:childTnLst>
+                        <p:par>
+                          <p:cTn id="12" fill="hold">
+                            <p:stCondLst>
+                              <p:cond delay="0"/>
+                            </p:stCondLst>
+                            <p:childTnLst>
+                              <p:par>
+                                <p:cTn id="13" presetID="1" presetClass="entr" presetSubtype="0" fill="hold" nodeType="clickEffect">
+                                  <p:stCondLst>
+                                    <p:cond delay="0"/>
+                                  </p:stCondLst>
+                                  <p:childTnLst>
+                                    <p:set>
+                                      <p:cBhvr>
+                                        <p:cTn id="14" dur="1" fill="hold">
+                                          <p:stCondLst>
+                                            <p:cond delay="0"/>
+                                          </p:stCondLst>
+                                        </p:cTn>
+                                        <p:tgtEl>
+                                          <p:spTgt spid="5"/>
+                                        </p:tgtEl>
+                                        <p:attrNameLst>
+                                          <p:attrName>style.visibility</p:attrName>
+                                        </p:attrNameLst>
+                                      </p:cBhvr>
+                                      <p:to>
+                                        <p:strVal val="visible"/>
+                                      </p:to>
+                                    </p:set>
+                                  </p:childTnLst>
+                                </p:cTn>
+                              </p:par>
+                            </p:childTnLst>
+                          </p:cTn>
+                        </p:par>
+                      </p:childTnLst>
+                    </p:cTn>
+                  </p:par>
+                </p:childTnLst>
+              </p:cTn>
+              <p:prevCondLst>
+                <p:cond evt="onPrev" delay="0">
+                  <p:tgtEl>
+                    <p:sldTgt/>
+                  </p:tgtEl>
+                </p:cond>
+              </p:prevCondLst>
+              <p:nextCondLst>
+                <p:cond evt="onNext" delay="0">
+                  <p:tgtEl>
+                    <p:sldTgt/>
+                  </p:tgtEl>
+                </p:cond>
+              </p:nextCondLst>
+            </p:seq>
+          </p:childTnLst>
+        </p:cTn>
+      </p:par>
+    </p:tnLst>
+  </p:timing>
 </p:sld>
 </file>
 
-<file path=ppt/slides/slide2.xml><?xml version="1.0" encoding="utf-8"?>
+<file path=ppt/slides/slide10.xml><?xml version="1.0" encoding="utf-8"?>
 <p:sld xmlns:a="http://schemas.openxmlformats.org/drawingml/2006/main" xmlns:r="http://schemas.openxmlformats.org/officeDocument/2006/relationships" xmlns:p="http://schemas.openxmlformats.org/presentationml/2006/main">
   <p:cSld>
     <p:spTree>
@@ -4405,7 +5549,7 @@
                   <a:srgbClr val="EA5E46"/>
                 </a:solidFill>
               </a:rPr>
-              <a:t>Model Data Transformation</a:t>
+              <a:t>Results</a:t>
             </a:r>
           </a:p>
         </p:txBody>
@@ -4503,7 +5647,7 @@
     </p:spTree>
     <p:extLst>
       <p:ext uri="{BB962C8B-B14F-4D97-AF65-F5344CB8AC3E}">
-        <p14:creationId xmlns:p14="http://schemas.microsoft.com/office/powerpoint/2010/main" val="46653007"/>
+        <p14:creationId xmlns:p14="http://schemas.microsoft.com/office/powerpoint/2010/main" val="2559599854"/>
       </p:ext>
     </p:extLst>
   </p:cSld>
@@ -4513,7 +5657,7 @@
 </p:sld>
 </file>
 
-<file path=ppt/slides/slide3.xml><?xml version="1.0" encoding="utf-8"?>
+<file path=ppt/slides/slide11.xml><?xml version="1.0" encoding="utf-8"?>
 <p:sld xmlns:a="http://schemas.openxmlformats.org/drawingml/2006/main" xmlns:r="http://schemas.openxmlformats.org/officeDocument/2006/relationships" xmlns:p="http://schemas.openxmlformats.org/presentationml/2006/main">
   <p:cSld>
     <p:spTree>
@@ -4869,6 +6013,1742 @@
       <p:bldP spid="4" grpId="0"/>
     </p:bldLst>
   </p:timing>
+</p:sld>
+</file>
+
+<file path=ppt/slides/slide2.xml><?xml version="1.0" encoding="utf-8"?>
+<p:sld xmlns:a="http://schemas.openxmlformats.org/drawingml/2006/main" xmlns:r="http://schemas.openxmlformats.org/officeDocument/2006/relationships" xmlns:p="http://schemas.openxmlformats.org/presentationml/2006/main">
+  <p:cSld>
+    <p:spTree>
+      <p:nvGrpSpPr>
+        <p:cNvPr id="1" name=""/>
+        <p:cNvGrpSpPr/>
+        <p:nvPr/>
+      </p:nvGrpSpPr>
+      <p:grpSpPr>
+        <a:xfrm>
+          <a:off x="0" y="0"/>
+          <a:ext cx="0" cy="0"/>
+          <a:chOff x="0" y="0"/>
+          <a:chExt cx="0" cy="0"/>
+        </a:xfrm>
+      </p:grpSpPr>
+      <p:sp>
+        <p:nvSpPr>
+          <p:cNvPr id="2" name="Title 1">
+            <a:extLst>
+              <a:ext uri="{FF2B5EF4-FFF2-40B4-BE49-F238E27FC236}">
+                <a16:creationId xmlns:a16="http://schemas.microsoft.com/office/drawing/2014/main" id="{59B8B577-5676-3C4B-A107-E41DB331FD85}"/>
+              </a:ext>
+            </a:extLst>
+          </p:cNvPr>
+          <p:cNvSpPr>
+            <a:spLocks noGrp="1"/>
+          </p:cNvSpPr>
+          <p:nvPr>
+            <p:ph type="title"/>
+          </p:nvPr>
+        </p:nvSpPr>
+        <p:spPr>
+          <a:xfrm>
+            <a:off x="3371495" y="696475"/>
+            <a:ext cx="10515600" cy="1325563"/>
+          </a:xfrm>
+        </p:spPr>
+        <p:txBody>
+          <a:bodyPr>
+            <a:normAutofit/>
+          </a:bodyPr>
+          <a:lstStyle/>
+          <a:p>
+            <a:r>
+              <a:rPr lang="en-US" sz="4000" dirty="0">
+                <a:solidFill>
+                  <a:srgbClr val="EA5E46"/>
+                </a:solidFill>
+              </a:rPr>
+              <a:t>Model Data Transformation Process</a:t>
+            </a:r>
+          </a:p>
+        </p:txBody>
+      </p:sp>
+      <p:pic>
+        <p:nvPicPr>
+          <p:cNvPr id="2050" name="Picture 2" descr="Image result for air bnb logo">
+            <a:extLst>
+              <a:ext uri="{FF2B5EF4-FFF2-40B4-BE49-F238E27FC236}">
+                <a16:creationId xmlns:a16="http://schemas.microsoft.com/office/drawing/2014/main" id="{A162C291-208B-BE48-BF44-7D5CD7EF6151}"/>
+              </a:ext>
+            </a:extLst>
+          </p:cNvPr>
+          <p:cNvPicPr>
+            <a:picLocks noChangeAspect="1" noChangeArrowheads="1"/>
+          </p:cNvPicPr>
+          <p:nvPr/>
+        </p:nvPicPr>
+        <p:blipFill>
+          <a:blip r:embed="rId3">
+            <a:extLst>
+              <a:ext uri="{28A0092B-C50C-407E-A947-70E740481C1C}">
+                <a14:useLocalDpi xmlns:a14="http://schemas.microsoft.com/office/drawing/2010/main" val="0"/>
+              </a:ext>
+            </a:extLst>
+          </a:blip>
+          <a:srcRect/>
+          <a:stretch>
+            <a:fillRect/>
+          </a:stretch>
+        </p:blipFill>
+        <p:spPr bwMode="auto">
+          <a:xfrm>
+            <a:off x="1180077" y="108278"/>
+            <a:ext cx="2189605" cy="2022038"/>
+          </a:xfrm>
+          <a:prstGeom prst="rect">
+            <a:avLst/>
+          </a:prstGeom>
+          <a:noFill/>
+          <a:extLst>
+            <a:ext uri="{909E8E84-426E-40DD-AFC4-6F175D3DCCD1}">
+              <a14:hiddenFill xmlns:a14="http://schemas.microsoft.com/office/drawing/2010/main">
+                <a:solidFill>
+                  <a:srgbClr val="FFFFFF"/>
+                </a:solidFill>
+              </a14:hiddenFill>
+            </a:ext>
+          </a:extLst>
+        </p:spPr>
+      </p:pic>
+      <p:cxnSp>
+        <p:nvCxnSpPr>
+          <p:cNvPr id="6" name="Straight Connector 5">
+            <a:extLst>
+              <a:ext uri="{FF2B5EF4-FFF2-40B4-BE49-F238E27FC236}">
+                <a16:creationId xmlns:a16="http://schemas.microsoft.com/office/drawing/2014/main" id="{7D0926DC-6298-B648-9DF9-0D78D09F9FC8}"/>
+              </a:ext>
+            </a:extLst>
+          </p:cNvPr>
+          <p:cNvCxnSpPr>
+            <a:cxnSpLocks/>
+          </p:cNvCxnSpPr>
+          <p:nvPr/>
+        </p:nvCxnSpPr>
+        <p:spPr>
+          <a:xfrm>
+            <a:off x="1625367" y="1684829"/>
+            <a:ext cx="9518745" cy="1"/>
+          </a:xfrm>
+          <a:prstGeom prst="line">
+            <a:avLst/>
+          </a:prstGeom>
+          <a:ln w="12700">
+            <a:solidFill>
+              <a:srgbClr val="EA5E46"/>
+            </a:solidFill>
+          </a:ln>
+        </p:spPr>
+        <p:style>
+          <a:lnRef idx="1">
+            <a:schemeClr val="accent2"/>
+          </a:lnRef>
+          <a:fillRef idx="0">
+            <a:schemeClr val="accent2"/>
+          </a:fillRef>
+          <a:effectRef idx="0">
+            <a:schemeClr val="accent2"/>
+          </a:effectRef>
+          <a:fontRef idx="minor">
+            <a:schemeClr val="tx1"/>
+          </a:fontRef>
+        </p:style>
+      </p:cxnSp>
+      <p:pic>
+        <p:nvPicPr>
+          <p:cNvPr id="8" name="Picture 7">
+            <a:extLst>
+              <a:ext uri="{FF2B5EF4-FFF2-40B4-BE49-F238E27FC236}">
+                <a16:creationId xmlns:a16="http://schemas.microsoft.com/office/drawing/2014/main" id="{DC2D0061-8FD6-4F00-962B-F205E4AE0BA9}"/>
+              </a:ext>
+            </a:extLst>
+          </p:cNvPr>
+          <p:cNvPicPr>
+            <a:picLocks noChangeAspect="1"/>
+          </p:cNvPicPr>
+          <p:nvPr/>
+        </p:nvPicPr>
+        <p:blipFill>
+          <a:blip r:embed="rId4"/>
+          <a:stretch>
+            <a:fillRect/>
+          </a:stretch>
+        </p:blipFill>
+        <p:spPr>
+          <a:xfrm>
+            <a:off x="1720768" y="2022038"/>
+            <a:ext cx="7806003" cy="4108894"/>
+          </a:xfrm>
+          <a:prstGeom prst="rect">
+            <a:avLst/>
+          </a:prstGeom>
+        </p:spPr>
+      </p:pic>
+    </p:spTree>
+    <p:extLst>
+      <p:ext uri="{BB962C8B-B14F-4D97-AF65-F5344CB8AC3E}">
+        <p14:creationId xmlns:p14="http://schemas.microsoft.com/office/powerpoint/2010/main" val="3433687183"/>
+      </p:ext>
+    </p:extLst>
+  </p:cSld>
+  <p:clrMapOvr>
+    <a:masterClrMapping/>
+  </p:clrMapOvr>
+  <p:timing>
+    <p:tnLst>
+      <p:par>
+        <p:cTn id="1" dur="indefinite" restart="never" nodeType="tmRoot">
+          <p:childTnLst>
+            <p:seq concurrent="1" nextAc="seek">
+              <p:cTn id="2" dur="indefinite" nodeType="mainSeq">
+                <p:childTnLst>
+                  <p:par>
+                    <p:cTn id="3" fill="hold">
+                      <p:stCondLst>
+                        <p:cond delay="indefinite"/>
+                      </p:stCondLst>
+                      <p:childTnLst>
+                        <p:par>
+                          <p:cTn id="4" fill="hold">
+                            <p:stCondLst>
+                              <p:cond delay="0"/>
+                            </p:stCondLst>
+                            <p:childTnLst>
+                              <p:par>
+                                <p:cTn id="5" presetID="10" presetClass="entr" presetSubtype="0" fill="hold" nodeType="clickEffect">
+                                  <p:stCondLst>
+                                    <p:cond delay="0"/>
+                                  </p:stCondLst>
+                                  <p:childTnLst>
+                                    <p:set>
+                                      <p:cBhvr>
+                                        <p:cTn id="6" dur="1" fill="hold">
+                                          <p:stCondLst>
+                                            <p:cond delay="0"/>
+                                          </p:stCondLst>
+                                        </p:cTn>
+                                        <p:tgtEl>
+                                          <p:spTgt spid="8"/>
+                                        </p:tgtEl>
+                                        <p:attrNameLst>
+                                          <p:attrName>style.visibility</p:attrName>
+                                        </p:attrNameLst>
+                                      </p:cBhvr>
+                                      <p:to>
+                                        <p:strVal val="visible"/>
+                                      </p:to>
+                                    </p:set>
+                                    <p:animEffect transition="in" filter="fade">
+                                      <p:cBhvr>
+                                        <p:cTn id="7" dur="500"/>
+                                        <p:tgtEl>
+                                          <p:spTgt spid="8"/>
+                                        </p:tgtEl>
+                                      </p:cBhvr>
+                                    </p:animEffect>
+                                  </p:childTnLst>
+                                </p:cTn>
+                              </p:par>
+                            </p:childTnLst>
+                          </p:cTn>
+                        </p:par>
+                      </p:childTnLst>
+                    </p:cTn>
+                  </p:par>
+                </p:childTnLst>
+              </p:cTn>
+              <p:prevCondLst>
+                <p:cond evt="onPrev" delay="0">
+                  <p:tgtEl>
+                    <p:sldTgt/>
+                  </p:tgtEl>
+                </p:cond>
+              </p:prevCondLst>
+              <p:nextCondLst>
+                <p:cond evt="onNext" delay="0">
+                  <p:tgtEl>
+                    <p:sldTgt/>
+                  </p:tgtEl>
+                </p:cond>
+              </p:nextCondLst>
+            </p:seq>
+          </p:childTnLst>
+        </p:cTn>
+      </p:par>
+    </p:tnLst>
+  </p:timing>
+</p:sld>
+</file>
+
+<file path=ppt/slides/slide3.xml><?xml version="1.0" encoding="utf-8"?>
+<p:sld xmlns:a="http://schemas.openxmlformats.org/drawingml/2006/main" xmlns:r="http://schemas.openxmlformats.org/officeDocument/2006/relationships" xmlns:p="http://schemas.openxmlformats.org/presentationml/2006/main">
+  <p:cSld>
+    <p:spTree>
+      <p:nvGrpSpPr>
+        <p:cNvPr id="1" name=""/>
+        <p:cNvGrpSpPr/>
+        <p:nvPr/>
+      </p:nvGrpSpPr>
+      <p:grpSpPr>
+        <a:xfrm>
+          <a:off x="0" y="0"/>
+          <a:ext cx="0" cy="0"/>
+          <a:chOff x="0" y="0"/>
+          <a:chExt cx="0" cy="0"/>
+        </a:xfrm>
+      </p:grpSpPr>
+      <p:sp>
+        <p:nvSpPr>
+          <p:cNvPr id="2" name="Title 1">
+            <a:extLst>
+              <a:ext uri="{FF2B5EF4-FFF2-40B4-BE49-F238E27FC236}">
+                <a16:creationId xmlns:a16="http://schemas.microsoft.com/office/drawing/2014/main" id="{59B8B577-5676-3C4B-A107-E41DB331FD85}"/>
+              </a:ext>
+            </a:extLst>
+          </p:cNvPr>
+          <p:cNvSpPr>
+            <a:spLocks noGrp="1"/>
+          </p:cNvSpPr>
+          <p:nvPr>
+            <p:ph type="title"/>
+          </p:nvPr>
+        </p:nvSpPr>
+        <p:spPr>
+          <a:xfrm>
+            <a:off x="3371495" y="696475"/>
+            <a:ext cx="10515600" cy="1325563"/>
+          </a:xfrm>
+        </p:spPr>
+        <p:txBody>
+          <a:bodyPr>
+            <a:normAutofit/>
+          </a:bodyPr>
+          <a:lstStyle/>
+          <a:p>
+            <a:r>
+              <a:rPr lang="en-US" sz="4000" dirty="0">
+                <a:solidFill>
+                  <a:srgbClr val="EA5E46"/>
+                </a:solidFill>
+              </a:rPr>
+              <a:t>Model Data Transformation Breakdown</a:t>
+            </a:r>
+          </a:p>
+        </p:txBody>
+      </p:sp>
+      <p:pic>
+        <p:nvPicPr>
+          <p:cNvPr id="2050" name="Picture 2" descr="Image result for air bnb logo">
+            <a:extLst>
+              <a:ext uri="{FF2B5EF4-FFF2-40B4-BE49-F238E27FC236}">
+                <a16:creationId xmlns:a16="http://schemas.microsoft.com/office/drawing/2014/main" id="{A162C291-208B-BE48-BF44-7D5CD7EF6151}"/>
+              </a:ext>
+            </a:extLst>
+          </p:cNvPr>
+          <p:cNvPicPr>
+            <a:picLocks noChangeAspect="1" noChangeArrowheads="1"/>
+          </p:cNvPicPr>
+          <p:nvPr/>
+        </p:nvPicPr>
+        <p:blipFill>
+          <a:blip r:embed="rId3">
+            <a:extLst>
+              <a:ext uri="{28A0092B-C50C-407E-A947-70E740481C1C}">
+                <a14:useLocalDpi xmlns:a14="http://schemas.microsoft.com/office/drawing/2010/main" val="0"/>
+              </a:ext>
+            </a:extLst>
+          </a:blip>
+          <a:srcRect/>
+          <a:stretch>
+            <a:fillRect/>
+          </a:stretch>
+        </p:blipFill>
+        <p:spPr bwMode="auto">
+          <a:xfrm>
+            <a:off x="1180077" y="108278"/>
+            <a:ext cx="2189605" cy="2022038"/>
+          </a:xfrm>
+          <a:prstGeom prst="rect">
+            <a:avLst/>
+          </a:prstGeom>
+          <a:noFill/>
+          <a:extLst>
+            <a:ext uri="{909E8E84-426E-40DD-AFC4-6F175D3DCCD1}">
+              <a14:hiddenFill xmlns:a14="http://schemas.microsoft.com/office/drawing/2010/main">
+                <a:solidFill>
+                  <a:srgbClr val="FFFFFF"/>
+                </a:solidFill>
+              </a14:hiddenFill>
+            </a:ext>
+          </a:extLst>
+        </p:spPr>
+      </p:pic>
+      <p:cxnSp>
+        <p:nvCxnSpPr>
+          <p:cNvPr id="6" name="Straight Connector 5">
+            <a:extLst>
+              <a:ext uri="{FF2B5EF4-FFF2-40B4-BE49-F238E27FC236}">
+                <a16:creationId xmlns:a16="http://schemas.microsoft.com/office/drawing/2014/main" id="{7D0926DC-6298-B648-9DF9-0D78D09F9FC8}"/>
+              </a:ext>
+            </a:extLst>
+          </p:cNvPr>
+          <p:cNvCxnSpPr>
+            <a:cxnSpLocks/>
+          </p:cNvCxnSpPr>
+          <p:nvPr/>
+        </p:nvCxnSpPr>
+        <p:spPr>
+          <a:xfrm>
+            <a:off x="1625367" y="1684829"/>
+            <a:ext cx="9518745" cy="1"/>
+          </a:xfrm>
+          <a:prstGeom prst="line">
+            <a:avLst/>
+          </a:prstGeom>
+          <a:ln w="12700">
+            <a:solidFill>
+              <a:srgbClr val="EA5E46"/>
+            </a:solidFill>
+          </a:ln>
+        </p:spPr>
+        <p:style>
+          <a:lnRef idx="1">
+            <a:schemeClr val="accent2"/>
+          </a:lnRef>
+          <a:fillRef idx="0">
+            <a:schemeClr val="accent2"/>
+          </a:fillRef>
+          <a:effectRef idx="0">
+            <a:schemeClr val="accent2"/>
+          </a:effectRef>
+          <a:fontRef idx="minor">
+            <a:schemeClr val="tx1"/>
+          </a:fontRef>
+        </p:style>
+      </p:cxnSp>
+      <p:sp>
+        <p:nvSpPr>
+          <p:cNvPr id="5" name="TextBox 4">
+            <a:extLst>
+              <a:ext uri="{FF2B5EF4-FFF2-40B4-BE49-F238E27FC236}">
+                <a16:creationId xmlns:a16="http://schemas.microsoft.com/office/drawing/2014/main" id="{3C66E404-41EF-44AC-ABB8-1EEB513C9DE3}"/>
+              </a:ext>
+            </a:extLst>
+          </p:cNvPr>
+          <p:cNvSpPr txBox="1"/>
+          <p:nvPr/>
+        </p:nvSpPr>
+        <p:spPr>
+          <a:xfrm>
+            <a:off x="946298" y="2022038"/>
+            <a:ext cx="1607959" cy="369332"/>
+          </a:xfrm>
+          <a:prstGeom prst="rect">
+            <a:avLst/>
+          </a:prstGeom>
+          <a:noFill/>
+        </p:spPr>
+        <p:txBody>
+          <a:bodyPr wrap="square" rtlCol="0">
+            <a:spAutoFit/>
+          </a:bodyPr>
+          <a:lstStyle/>
+          <a:p>
+            <a:r>
+              <a:rPr lang="en-US" dirty="0"/>
+              <a:t>Numeric Data </a:t>
+            </a:r>
+            <a:endParaRPr lang="en-CA" dirty="0"/>
+          </a:p>
+        </p:txBody>
+      </p:sp>
+      <p:pic>
+        <p:nvPicPr>
+          <p:cNvPr id="9" name="Picture 8">
+            <a:extLst>
+              <a:ext uri="{FF2B5EF4-FFF2-40B4-BE49-F238E27FC236}">
+                <a16:creationId xmlns:a16="http://schemas.microsoft.com/office/drawing/2014/main" id="{5DFEE87E-C6D3-43BD-B9E3-E4588F1FAE24}"/>
+              </a:ext>
+            </a:extLst>
+          </p:cNvPr>
+          <p:cNvPicPr>
+            <a:picLocks noChangeAspect="1"/>
+          </p:cNvPicPr>
+          <p:nvPr/>
+        </p:nvPicPr>
+        <p:blipFill>
+          <a:blip r:embed="rId4"/>
+          <a:stretch>
+            <a:fillRect/>
+          </a:stretch>
+        </p:blipFill>
+        <p:spPr>
+          <a:xfrm>
+            <a:off x="1002228" y="2467523"/>
+            <a:ext cx="1634193" cy="1360197"/>
+          </a:xfrm>
+          <a:prstGeom prst="rect">
+            <a:avLst/>
+          </a:prstGeom>
+        </p:spPr>
+      </p:pic>
+      <p:sp>
+        <p:nvSpPr>
+          <p:cNvPr id="10" name="Arrow: Right 9">
+            <a:extLst>
+              <a:ext uri="{FF2B5EF4-FFF2-40B4-BE49-F238E27FC236}">
+                <a16:creationId xmlns:a16="http://schemas.microsoft.com/office/drawing/2014/main" id="{CD17D319-9A92-45E9-85CA-D73F4333A977}"/>
+              </a:ext>
+            </a:extLst>
+          </p:cNvPr>
+          <p:cNvSpPr/>
+          <p:nvPr/>
+        </p:nvSpPr>
+        <p:spPr>
+          <a:xfrm>
+            <a:off x="2972835" y="3207881"/>
+            <a:ext cx="552893" cy="352089"/>
+          </a:xfrm>
+          <a:prstGeom prst="rightArrow">
+            <a:avLst/>
+          </a:prstGeom>
+          <a:solidFill>
+            <a:schemeClr val="bg2">
+              <a:lumMod val="75000"/>
+            </a:schemeClr>
+          </a:solidFill>
+          <a:ln>
+            <a:solidFill>
+              <a:schemeClr val="bg2">
+                <a:lumMod val="75000"/>
+              </a:schemeClr>
+            </a:solidFill>
+          </a:ln>
+        </p:spPr>
+        <p:style>
+          <a:lnRef idx="2">
+            <a:schemeClr val="accent1">
+              <a:shade val="50000"/>
+            </a:schemeClr>
+          </a:lnRef>
+          <a:fillRef idx="1">
+            <a:schemeClr val="accent1"/>
+          </a:fillRef>
+          <a:effectRef idx="0">
+            <a:schemeClr val="accent1"/>
+          </a:effectRef>
+          <a:fontRef idx="minor">
+            <a:schemeClr val="lt1"/>
+          </a:fontRef>
+        </p:style>
+        <p:txBody>
+          <a:bodyPr rtlCol="0" anchor="ctr"/>
+          <a:lstStyle/>
+          <a:p>
+            <a:pPr algn="ctr"/>
+            <a:endParaRPr lang="en-CA"/>
+          </a:p>
+        </p:txBody>
+      </p:sp>
+      <p:pic>
+        <p:nvPicPr>
+          <p:cNvPr id="12" name="Picture 11">
+            <a:extLst>
+              <a:ext uri="{FF2B5EF4-FFF2-40B4-BE49-F238E27FC236}">
+                <a16:creationId xmlns:a16="http://schemas.microsoft.com/office/drawing/2014/main" id="{B3919613-C218-4BCD-A86F-E020C1E91AFE}"/>
+              </a:ext>
+            </a:extLst>
+          </p:cNvPr>
+          <p:cNvPicPr>
+            <a:picLocks noChangeAspect="1"/>
+          </p:cNvPicPr>
+          <p:nvPr/>
+        </p:nvPicPr>
+        <p:blipFill>
+          <a:blip r:embed="rId5"/>
+          <a:stretch>
+            <a:fillRect/>
+          </a:stretch>
+        </p:blipFill>
+        <p:spPr>
+          <a:xfrm>
+            <a:off x="8940509" y="2889663"/>
+            <a:ext cx="2509203" cy="1012486"/>
+          </a:xfrm>
+          <a:prstGeom prst="rect">
+            <a:avLst/>
+          </a:prstGeom>
+        </p:spPr>
+      </p:pic>
+      <p:sp>
+        <p:nvSpPr>
+          <p:cNvPr id="13" name="Rectangle 12">
+            <a:extLst>
+              <a:ext uri="{FF2B5EF4-FFF2-40B4-BE49-F238E27FC236}">
+                <a16:creationId xmlns:a16="http://schemas.microsoft.com/office/drawing/2014/main" id="{EDC53F4A-537D-43ED-BF9C-54DB52A0EBE7}"/>
+              </a:ext>
+            </a:extLst>
+          </p:cNvPr>
+          <p:cNvSpPr/>
+          <p:nvPr/>
+        </p:nvSpPr>
+        <p:spPr>
+          <a:xfrm>
+            <a:off x="10313581" y="3430377"/>
+            <a:ext cx="1136131" cy="471771"/>
+          </a:xfrm>
+          <a:prstGeom prst="rect">
+            <a:avLst/>
+          </a:prstGeom>
+          <a:noFill/>
+          <a:ln w="28575">
+            <a:solidFill>
+              <a:srgbClr val="EA6155"/>
+            </a:solidFill>
+          </a:ln>
+        </p:spPr>
+        <p:style>
+          <a:lnRef idx="2">
+            <a:schemeClr val="accent1">
+              <a:shade val="50000"/>
+            </a:schemeClr>
+          </a:lnRef>
+          <a:fillRef idx="1">
+            <a:schemeClr val="accent1"/>
+          </a:fillRef>
+          <a:effectRef idx="0">
+            <a:schemeClr val="accent1"/>
+          </a:effectRef>
+          <a:fontRef idx="minor">
+            <a:schemeClr val="lt1"/>
+          </a:fontRef>
+        </p:style>
+        <p:txBody>
+          <a:bodyPr rtlCol="0" anchor="ctr"/>
+          <a:lstStyle/>
+          <a:p>
+            <a:pPr algn="ctr"/>
+            <a:endParaRPr lang="en-CA"/>
+          </a:p>
+        </p:txBody>
+      </p:sp>
+      <p:sp>
+        <p:nvSpPr>
+          <p:cNvPr id="15" name="Rectangle 14">
+            <a:extLst>
+              <a:ext uri="{FF2B5EF4-FFF2-40B4-BE49-F238E27FC236}">
+                <a16:creationId xmlns:a16="http://schemas.microsoft.com/office/drawing/2014/main" id="{70C16DC1-FC18-471A-987D-87AF15CD5F9B}"/>
+              </a:ext>
+            </a:extLst>
+          </p:cNvPr>
+          <p:cNvSpPr/>
+          <p:nvPr/>
+        </p:nvSpPr>
+        <p:spPr>
+          <a:xfrm>
+            <a:off x="2083528" y="2953488"/>
+            <a:ext cx="552893" cy="874232"/>
+          </a:xfrm>
+          <a:prstGeom prst="rect">
+            <a:avLst/>
+          </a:prstGeom>
+          <a:noFill/>
+          <a:ln w="28575">
+            <a:solidFill>
+              <a:srgbClr val="EA6155"/>
+            </a:solidFill>
+          </a:ln>
+        </p:spPr>
+        <p:style>
+          <a:lnRef idx="2">
+            <a:schemeClr val="accent1">
+              <a:shade val="50000"/>
+            </a:schemeClr>
+          </a:lnRef>
+          <a:fillRef idx="1">
+            <a:schemeClr val="accent1"/>
+          </a:fillRef>
+          <a:effectRef idx="0">
+            <a:schemeClr val="accent1"/>
+          </a:effectRef>
+          <a:fontRef idx="minor">
+            <a:schemeClr val="lt1"/>
+          </a:fontRef>
+        </p:style>
+        <p:txBody>
+          <a:bodyPr rtlCol="0" anchor="ctr"/>
+          <a:lstStyle/>
+          <a:p>
+            <a:pPr algn="ctr"/>
+            <a:endParaRPr lang="en-CA"/>
+          </a:p>
+        </p:txBody>
+      </p:sp>
+      <p:pic>
+        <p:nvPicPr>
+          <p:cNvPr id="16" name="Picture 15">
+            <a:extLst>
+              <a:ext uri="{FF2B5EF4-FFF2-40B4-BE49-F238E27FC236}">
+                <a16:creationId xmlns:a16="http://schemas.microsoft.com/office/drawing/2014/main" id="{19B39FB3-2832-4113-821F-0B5ADFCC607D}"/>
+              </a:ext>
+            </a:extLst>
+          </p:cNvPr>
+          <p:cNvPicPr>
+            <a:picLocks noChangeAspect="1"/>
+          </p:cNvPicPr>
+          <p:nvPr/>
+        </p:nvPicPr>
+        <p:blipFill>
+          <a:blip r:embed="rId6"/>
+          <a:stretch>
+            <a:fillRect/>
+          </a:stretch>
+        </p:blipFill>
+        <p:spPr>
+          <a:xfrm>
+            <a:off x="3862141" y="2953488"/>
+            <a:ext cx="3883183" cy="948661"/>
+          </a:xfrm>
+          <a:prstGeom prst="rect">
+            <a:avLst/>
+          </a:prstGeom>
+        </p:spPr>
+      </p:pic>
+      <p:sp>
+        <p:nvSpPr>
+          <p:cNvPr id="18" name="Arrow: Right 17">
+            <a:extLst>
+              <a:ext uri="{FF2B5EF4-FFF2-40B4-BE49-F238E27FC236}">
+                <a16:creationId xmlns:a16="http://schemas.microsoft.com/office/drawing/2014/main" id="{A3AF85D0-FDA1-4910-8CD4-1F9E27056000}"/>
+              </a:ext>
+            </a:extLst>
+          </p:cNvPr>
+          <p:cNvSpPr/>
+          <p:nvPr/>
+        </p:nvSpPr>
+        <p:spPr>
+          <a:xfrm>
+            <a:off x="8066470" y="3175893"/>
+            <a:ext cx="552893" cy="352089"/>
+          </a:xfrm>
+          <a:prstGeom prst="rightArrow">
+            <a:avLst/>
+          </a:prstGeom>
+          <a:solidFill>
+            <a:schemeClr val="bg2">
+              <a:lumMod val="75000"/>
+            </a:schemeClr>
+          </a:solidFill>
+          <a:ln>
+            <a:solidFill>
+              <a:schemeClr val="bg2">
+                <a:lumMod val="75000"/>
+              </a:schemeClr>
+            </a:solidFill>
+          </a:ln>
+        </p:spPr>
+        <p:style>
+          <a:lnRef idx="2">
+            <a:schemeClr val="accent1">
+              <a:shade val="50000"/>
+            </a:schemeClr>
+          </a:lnRef>
+          <a:fillRef idx="1">
+            <a:schemeClr val="accent1"/>
+          </a:fillRef>
+          <a:effectRef idx="0">
+            <a:schemeClr val="accent1"/>
+          </a:effectRef>
+          <a:fontRef idx="minor">
+            <a:schemeClr val="lt1"/>
+          </a:fontRef>
+        </p:style>
+        <p:txBody>
+          <a:bodyPr rtlCol="0" anchor="ctr"/>
+          <a:lstStyle/>
+          <a:p>
+            <a:pPr algn="ctr"/>
+            <a:endParaRPr lang="en-CA"/>
+          </a:p>
+        </p:txBody>
+      </p:sp>
+    </p:spTree>
+    <p:extLst>
+      <p:ext uri="{BB962C8B-B14F-4D97-AF65-F5344CB8AC3E}">
+        <p14:creationId xmlns:p14="http://schemas.microsoft.com/office/powerpoint/2010/main" val="1946509034"/>
+      </p:ext>
+    </p:extLst>
+  </p:cSld>
+  <p:clrMapOvr>
+    <a:masterClrMapping/>
+  </p:clrMapOvr>
+</p:sld>
+</file>
+
+<file path=ppt/slides/slide4.xml><?xml version="1.0" encoding="utf-8"?>
+<p:sld xmlns:a="http://schemas.openxmlformats.org/drawingml/2006/main" xmlns:r="http://schemas.openxmlformats.org/officeDocument/2006/relationships" xmlns:p="http://schemas.openxmlformats.org/presentationml/2006/main">
+  <p:cSld>
+    <p:spTree>
+      <p:nvGrpSpPr>
+        <p:cNvPr id="1" name=""/>
+        <p:cNvGrpSpPr/>
+        <p:nvPr/>
+      </p:nvGrpSpPr>
+      <p:grpSpPr>
+        <a:xfrm>
+          <a:off x="0" y="0"/>
+          <a:ext cx="0" cy="0"/>
+          <a:chOff x="0" y="0"/>
+          <a:chExt cx="0" cy="0"/>
+        </a:xfrm>
+      </p:grpSpPr>
+      <p:sp>
+        <p:nvSpPr>
+          <p:cNvPr id="2" name="Title 1">
+            <a:extLst>
+              <a:ext uri="{FF2B5EF4-FFF2-40B4-BE49-F238E27FC236}">
+                <a16:creationId xmlns:a16="http://schemas.microsoft.com/office/drawing/2014/main" id="{59B8B577-5676-3C4B-A107-E41DB331FD85}"/>
+              </a:ext>
+            </a:extLst>
+          </p:cNvPr>
+          <p:cNvSpPr>
+            <a:spLocks noGrp="1"/>
+          </p:cNvSpPr>
+          <p:nvPr>
+            <p:ph type="title"/>
+          </p:nvPr>
+        </p:nvSpPr>
+        <p:spPr>
+          <a:xfrm>
+            <a:off x="4272238" y="588197"/>
+            <a:ext cx="10515600" cy="1325563"/>
+          </a:xfrm>
+        </p:spPr>
+        <p:txBody>
+          <a:bodyPr/>
+          <a:lstStyle/>
+          <a:p>
+            <a:r>
+              <a:rPr lang="en-US" dirty="0">
+                <a:solidFill>
+                  <a:srgbClr val="EA5E46"/>
+                </a:solidFill>
+              </a:rPr>
+              <a:t>Model Data Transformation</a:t>
+            </a:r>
+          </a:p>
+        </p:txBody>
+      </p:sp>
+      <p:pic>
+        <p:nvPicPr>
+          <p:cNvPr id="2050" name="Picture 2" descr="Image result for air bnb logo">
+            <a:extLst>
+              <a:ext uri="{FF2B5EF4-FFF2-40B4-BE49-F238E27FC236}">
+                <a16:creationId xmlns:a16="http://schemas.microsoft.com/office/drawing/2014/main" id="{A162C291-208B-BE48-BF44-7D5CD7EF6151}"/>
+              </a:ext>
+            </a:extLst>
+          </p:cNvPr>
+          <p:cNvPicPr>
+            <a:picLocks noChangeAspect="1" noChangeArrowheads="1"/>
+          </p:cNvPicPr>
+          <p:nvPr/>
+        </p:nvPicPr>
+        <p:blipFill>
+          <a:blip r:embed="rId3">
+            <a:extLst>
+              <a:ext uri="{28A0092B-C50C-407E-A947-70E740481C1C}">
+                <a14:useLocalDpi xmlns:a14="http://schemas.microsoft.com/office/drawing/2010/main" val="0"/>
+              </a:ext>
+            </a:extLst>
+          </a:blip>
+          <a:srcRect/>
+          <a:stretch>
+            <a:fillRect/>
+          </a:stretch>
+        </p:blipFill>
+        <p:spPr bwMode="auto">
+          <a:xfrm>
+            <a:off x="2082633" y="0"/>
+            <a:ext cx="2189605" cy="2022038"/>
+          </a:xfrm>
+          <a:prstGeom prst="rect">
+            <a:avLst/>
+          </a:prstGeom>
+          <a:noFill/>
+          <a:extLst>
+            <a:ext uri="{909E8E84-426E-40DD-AFC4-6F175D3DCCD1}">
+              <a14:hiddenFill xmlns:a14="http://schemas.microsoft.com/office/drawing/2010/main">
+                <a:solidFill>
+                  <a:srgbClr val="FFFFFF"/>
+                </a:solidFill>
+              </a14:hiddenFill>
+            </a:ext>
+          </a:extLst>
+        </p:spPr>
+      </p:pic>
+      <p:cxnSp>
+        <p:nvCxnSpPr>
+          <p:cNvPr id="6" name="Straight Connector 5">
+            <a:extLst>
+              <a:ext uri="{FF2B5EF4-FFF2-40B4-BE49-F238E27FC236}">
+                <a16:creationId xmlns:a16="http://schemas.microsoft.com/office/drawing/2014/main" id="{7D0926DC-6298-B648-9DF9-0D78D09F9FC8}"/>
+              </a:ext>
+            </a:extLst>
+          </p:cNvPr>
+          <p:cNvCxnSpPr>
+            <a:cxnSpLocks/>
+          </p:cNvCxnSpPr>
+          <p:nvPr/>
+        </p:nvCxnSpPr>
+        <p:spPr>
+          <a:xfrm>
+            <a:off x="2526110" y="1576551"/>
+            <a:ext cx="9518745" cy="1"/>
+          </a:xfrm>
+          <a:prstGeom prst="line">
+            <a:avLst/>
+          </a:prstGeom>
+          <a:ln w="12700">
+            <a:solidFill>
+              <a:srgbClr val="EA5E46"/>
+            </a:solidFill>
+          </a:ln>
+        </p:spPr>
+        <p:style>
+          <a:lnRef idx="1">
+            <a:schemeClr val="accent2"/>
+          </a:lnRef>
+          <a:fillRef idx="0">
+            <a:schemeClr val="accent2"/>
+          </a:fillRef>
+          <a:effectRef idx="0">
+            <a:schemeClr val="accent2"/>
+          </a:effectRef>
+          <a:fontRef idx="minor">
+            <a:schemeClr val="tx1"/>
+          </a:fontRef>
+        </p:style>
+      </p:cxnSp>
+    </p:spTree>
+    <p:extLst>
+      <p:ext uri="{BB962C8B-B14F-4D97-AF65-F5344CB8AC3E}">
+        <p14:creationId xmlns:p14="http://schemas.microsoft.com/office/powerpoint/2010/main" val="46653007"/>
+      </p:ext>
+    </p:extLst>
+  </p:cSld>
+  <p:clrMapOvr>
+    <a:masterClrMapping/>
+  </p:clrMapOvr>
+</p:sld>
+</file>
+
+<file path=ppt/slides/slide5.xml><?xml version="1.0" encoding="utf-8"?>
+<p:sld xmlns:a="http://schemas.openxmlformats.org/drawingml/2006/main" xmlns:r="http://schemas.openxmlformats.org/officeDocument/2006/relationships" xmlns:p="http://schemas.openxmlformats.org/presentationml/2006/main">
+  <p:cSld>
+    <p:spTree>
+      <p:nvGrpSpPr>
+        <p:cNvPr id="1" name=""/>
+        <p:cNvGrpSpPr/>
+        <p:nvPr/>
+      </p:nvGrpSpPr>
+      <p:grpSpPr>
+        <a:xfrm>
+          <a:off x="0" y="0"/>
+          <a:ext cx="0" cy="0"/>
+          <a:chOff x="0" y="0"/>
+          <a:chExt cx="0" cy="0"/>
+        </a:xfrm>
+      </p:grpSpPr>
+      <p:sp>
+        <p:nvSpPr>
+          <p:cNvPr id="2" name="Title 1">
+            <a:extLst>
+              <a:ext uri="{FF2B5EF4-FFF2-40B4-BE49-F238E27FC236}">
+                <a16:creationId xmlns:a16="http://schemas.microsoft.com/office/drawing/2014/main" id="{59B8B577-5676-3C4B-A107-E41DB331FD85}"/>
+              </a:ext>
+            </a:extLst>
+          </p:cNvPr>
+          <p:cNvSpPr>
+            <a:spLocks noGrp="1"/>
+          </p:cNvSpPr>
+          <p:nvPr>
+            <p:ph type="title"/>
+          </p:nvPr>
+        </p:nvSpPr>
+        <p:spPr>
+          <a:xfrm>
+            <a:off x="4272238" y="588197"/>
+            <a:ext cx="10515600" cy="1325563"/>
+          </a:xfrm>
+        </p:spPr>
+        <p:txBody>
+          <a:bodyPr/>
+          <a:lstStyle/>
+          <a:p>
+            <a:r>
+              <a:rPr lang="en-US" dirty="0">
+                <a:solidFill>
+                  <a:srgbClr val="EA5E46"/>
+                </a:solidFill>
+              </a:rPr>
+              <a:t>Model Challenges</a:t>
+            </a:r>
+          </a:p>
+        </p:txBody>
+      </p:sp>
+      <p:pic>
+        <p:nvPicPr>
+          <p:cNvPr id="2050" name="Picture 2" descr="Image result for air bnb logo">
+            <a:extLst>
+              <a:ext uri="{FF2B5EF4-FFF2-40B4-BE49-F238E27FC236}">
+                <a16:creationId xmlns:a16="http://schemas.microsoft.com/office/drawing/2014/main" id="{A162C291-208B-BE48-BF44-7D5CD7EF6151}"/>
+              </a:ext>
+            </a:extLst>
+          </p:cNvPr>
+          <p:cNvPicPr>
+            <a:picLocks noChangeAspect="1" noChangeArrowheads="1"/>
+          </p:cNvPicPr>
+          <p:nvPr/>
+        </p:nvPicPr>
+        <p:blipFill>
+          <a:blip r:embed="rId3">
+            <a:extLst>
+              <a:ext uri="{28A0092B-C50C-407E-A947-70E740481C1C}">
+                <a14:useLocalDpi xmlns:a14="http://schemas.microsoft.com/office/drawing/2010/main" val="0"/>
+              </a:ext>
+            </a:extLst>
+          </a:blip>
+          <a:srcRect/>
+          <a:stretch>
+            <a:fillRect/>
+          </a:stretch>
+        </p:blipFill>
+        <p:spPr bwMode="auto">
+          <a:xfrm>
+            <a:off x="2080820" y="0"/>
+            <a:ext cx="2189605" cy="2022038"/>
+          </a:xfrm>
+          <a:prstGeom prst="rect">
+            <a:avLst/>
+          </a:prstGeom>
+          <a:noFill/>
+          <a:extLst>
+            <a:ext uri="{909E8E84-426E-40DD-AFC4-6F175D3DCCD1}">
+              <a14:hiddenFill xmlns:a14="http://schemas.microsoft.com/office/drawing/2010/main">
+                <a:solidFill>
+                  <a:srgbClr val="FFFFFF"/>
+                </a:solidFill>
+              </a14:hiddenFill>
+            </a:ext>
+          </a:extLst>
+        </p:spPr>
+      </p:pic>
+      <p:cxnSp>
+        <p:nvCxnSpPr>
+          <p:cNvPr id="6" name="Straight Connector 5">
+            <a:extLst>
+              <a:ext uri="{FF2B5EF4-FFF2-40B4-BE49-F238E27FC236}">
+                <a16:creationId xmlns:a16="http://schemas.microsoft.com/office/drawing/2014/main" id="{7D0926DC-6298-B648-9DF9-0D78D09F9FC8}"/>
+              </a:ext>
+            </a:extLst>
+          </p:cNvPr>
+          <p:cNvCxnSpPr>
+            <a:cxnSpLocks/>
+          </p:cNvCxnSpPr>
+          <p:nvPr/>
+        </p:nvCxnSpPr>
+        <p:spPr>
+          <a:xfrm>
+            <a:off x="2526110" y="1576551"/>
+            <a:ext cx="9518745" cy="1"/>
+          </a:xfrm>
+          <a:prstGeom prst="line">
+            <a:avLst/>
+          </a:prstGeom>
+          <a:ln w="12700">
+            <a:solidFill>
+              <a:srgbClr val="EA5E46"/>
+            </a:solidFill>
+          </a:ln>
+        </p:spPr>
+        <p:style>
+          <a:lnRef idx="1">
+            <a:schemeClr val="accent2"/>
+          </a:lnRef>
+          <a:fillRef idx="0">
+            <a:schemeClr val="accent2"/>
+          </a:fillRef>
+          <a:effectRef idx="0">
+            <a:schemeClr val="accent2"/>
+          </a:effectRef>
+          <a:fontRef idx="minor">
+            <a:schemeClr val="tx1"/>
+          </a:fontRef>
+        </p:style>
+      </p:cxnSp>
+    </p:spTree>
+    <p:extLst>
+      <p:ext uri="{BB962C8B-B14F-4D97-AF65-F5344CB8AC3E}">
+        <p14:creationId xmlns:p14="http://schemas.microsoft.com/office/powerpoint/2010/main" val="2243286875"/>
+      </p:ext>
+    </p:extLst>
+  </p:cSld>
+  <p:clrMapOvr>
+    <a:masterClrMapping/>
+  </p:clrMapOvr>
+</p:sld>
+</file>
+
+<file path=ppt/slides/slide6.xml><?xml version="1.0" encoding="utf-8"?>
+<p:sld xmlns:a="http://schemas.openxmlformats.org/drawingml/2006/main" xmlns:r="http://schemas.openxmlformats.org/officeDocument/2006/relationships" xmlns:p="http://schemas.openxmlformats.org/presentationml/2006/main">
+  <p:cSld>
+    <p:spTree>
+      <p:nvGrpSpPr>
+        <p:cNvPr id="1" name=""/>
+        <p:cNvGrpSpPr/>
+        <p:nvPr/>
+      </p:nvGrpSpPr>
+      <p:grpSpPr>
+        <a:xfrm>
+          <a:off x="0" y="0"/>
+          <a:ext cx="0" cy="0"/>
+          <a:chOff x="0" y="0"/>
+          <a:chExt cx="0" cy="0"/>
+        </a:xfrm>
+      </p:grpSpPr>
+      <p:sp>
+        <p:nvSpPr>
+          <p:cNvPr id="2" name="Title 1">
+            <a:extLst>
+              <a:ext uri="{FF2B5EF4-FFF2-40B4-BE49-F238E27FC236}">
+                <a16:creationId xmlns:a16="http://schemas.microsoft.com/office/drawing/2014/main" id="{59B8B577-5676-3C4B-A107-E41DB331FD85}"/>
+              </a:ext>
+            </a:extLst>
+          </p:cNvPr>
+          <p:cNvSpPr>
+            <a:spLocks noGrp="1"/>
+          </p:cNvSpPr>
+          <p:nvPr>
+            <p:ph type="title"/>
+          </p:nvPr>
+        </p:nvSpPr>
+        <p:spPr>
+          <a:xfrm>
+            <a:off x="4123382" y="513769"/>
+            <a:ext cx="10515600" cy="1325563"/>
+          </a:xfrm>
+        </p:spPr>
+        <p:txBody>
+          <a:bodyPr/>
+          <a:lstStyle/>
+          <a:p>
+            <a:r>
+              <a:rPr lang="en-US" dirty="0">
+                <a:solidFill>
+                  <a:srgbClr val="EA5E46"/>
+                </a:solidFill>
+              </a:rPr>
+              <a:t>Model Findings – Price Correlation</a:t>
+            </a:r>
+          </a:p>
+        </p:txBody>
+      </p:sp>
+      <p:pic>
+        <p:nvPicPr>
+          <p:cNvPr id="2050" name="Picture 2" descr="Image result for air bnb logo">
+            <a:extLst>
+              <a:ext uri="{FF2B5EF4-FFF2-40B4-BE49-F238E27FC236}">
+                <a16:creationId xmlns:a16="http://schemas.microsoft.com/office/drawing/2014/main" id="{A162C291-208B-BE48-BF44-7D5CD7EF6151}"/>
+              </a:ext>
+            </a:extLst>
+          </p:cNvPr>
+          <p:cNvPicPr>
+            <a:picLocks noChangeAspect="1" noChangeArrowheads="1"/>
+          </p:cNvPicPr>
+          <p:nvPr/>
+        </p:nvPicPr>
+        <p:blipFill>
+          <a:blip r:embed="rId3">
+            <a:extLst>
+              <a:ext uri="{28A0092B-C50C-407E-A947-70E740481C1C}">
+                <a14:useLocalDpi xmlns:a14="http://schemas.microsoft.com/office/drawing/2010/main" val="0"/>
+              </a:ext>
+            </a:extLst>
+          </a:blip>
+          <a:srcRect/>
+          <a:stretch>
+            <a:fillRect/>
+          </a:stretch>
+        </p:blipFill>
+        <p:spPr bwMode="auto">
+          <a:xfrm>
+            <a:off x="2080820" y="0"/>
+            <a:ext cx="2189605" cy="2022038"/>
+          </a:xfrm>
+          <a:prstGeom prst="rect">
+            <a:avLst/>
+          </a:prstGeom>
+          <a:noFill/>
+          <a:extLst>
+            <a:ext uri="{909E8E84-426E-40DD-AFC4-6F175D3DCCD1}">
+              <a14:hiddenFill xmlns:a14="http://schemas.microsoft.com/office/drawing/2010/main">
+                <a:solidFill>
+                  <a:srgbClr val="FFFFFF"/>
+                </a:solidFill>
+              </a14:hiddenFill>
+            </a:ext>
+          </a:extLst>
+        </p:spPr>
+      </p:pic>
+      <p:cxnSp>
+        <p:nvCxnSpPr>
+          <p:cNvPr id="6" name="Straight Connector 5">
+            <a:extLst>
+              <a:ext uri="{FF2B5EF4-FFF2-40B4-BE49-F238E27FC236}">
+                <a16:creationId xmlns:a16="http://schemas.microsoft.com/office/drawing/2014/main" id="{7D0926DC-6298-B648-9DF9-0D78D09F9FC8}"/>
+              </a:ext>
+            </a:extLst>
+          </p:cNvPr>
+          <p:cNvCxnSpPr>
+            <a:cxnSpLocks/>
+          </p:cNvCxnSpPr>
+          <p:nvPr/>
+        </p:nvCxnSpPr>
+        <p:spPr>
+          <a:xfrm>
+            <a:off x="2526110" y="1576551"/>
+            <a:ext cx="9518745" cy="1"/>
+          </a:xfrm>
+          <a:prstGeom prst="line">
+            <a:avLst/>
+          </a:prstGeom>
+          <a:ln w="12700">
+            <a:solidFill>
+              <a:srgbClr val="EA5E46"/>
+            </a:solidFill>
+          </a:ln>
+        </p:spPr>
+        <p:style>
+          <a:lnRef idx="1">
+            <a:schemeClr val="accent2"/>
+          </a:lnRef>
+          <a:fillRef idx="0">
+            <a:schemeClr val="accent2"/>
+          </a:fillRef>
+          <a:effectRef idx="0">
+            <a:schemeClr val="accent2"/>
+          </a:effectRef>
+          <a:fontRef idx="minor">
+            <a:schemeClr val="tx1"/>
+          </a:fontRef>
+        </p:style>
+      </p:cxnSp>
+    </p:spTree>
+    <p:extLst>
+      <p:ext uri="{BB962C8B-B14F-4D97-AF65-F5344CB8AC3E}">
+        <p14:creationId xmlns:p14="http://schemas.microsoft.com/office/powerpoint/2010/main" val="191879790"/>
+      </p:ext>
+    </p:extLst>
+  </p:cSld>
+  <p:clrMapOvr>
+    <a:masterClrMapping/>
+  </p:clrMapOvr>
+</p:sld>
+</file>
+
+<file path=ppt/slides/slide7.xml><?xml version="1.0" encoding="utf-8"?>
+<p:sld xmlns:a="http://schemas.openxmlformats.org/drawingml/2006/main" xmlns:r="http://schemas.openxmlformats.org/officeDocument/2006/relationships" xmlns:p="http://schemas.openxmlformats.org/presentationml/2006/main">
+  <p:cSld>
+    <p:spTree>
+      <p:nvGrpSpPr>
+        <p:cNvPr id="1" name=""/>
+        <p:cNvGrpSpPr/>
+        <p:nvPr/>
+      </p:nvGrpSpPr>
+      <p:grpSpPr>
+        <a:xfrm>
+          <a:off x="0" y="0"/>
+          <a:ext cx="0" cy="0"/>
+          <a:chOff x="0" y="0"/>
+          <a:chExt cx="0" cy="0"/>
+        </a:xfrm>
+      </p:grpSpPr>
+      <p:sp>
+        <p:nvSpPr>
+          <p:cNvPr id="2" name="Title 1">
+            <a:extLst>
+              <a:ext uri="{FF2B5EF4-FFF2-40B4-BE49-F238E27FC236}">
+                <a16:creationId xmlns:a16="http://schemas.microsoft.com/office/drawing/2014/main" id="{59B8B577-5676-3C4B-A107-E41DB331FD85}"/>
+              </a:ext>
+            </a:extLst>
+          </p:cNvPr>
+          <p:cNvSpPr>
+            <a:spLocks noGrp="1"/>
+          </p:cNvSpPr>
+          <p:nvPr>
+            <p:ph type="title"/>
+          </p:nvPr>
+        </p:nvSpPr>
+        <p:spPr>
+          <a:xfrm>
+            <a:off x="4272238" y="588197"/>
+            <a:ext cx="10515600" cy="1325563"/>
+          </a:xfrm>
+        </p:spPr>
+        <p:txBody>
+          <a:bodyPr/>
+          <a:lstStyle/>
+          <a:p>
+            <a:r>
+              <a:rPr lang="en-US" dirty="0">
+                <a:solidFill>
+                  <a:srgbClr val="EA5E46"/>
+                </a:solidFill>
+              </a:rPr>
+              <a:t>Model Findings – Features </a:t>
+            </a:r>
+          </a:p>
+        </p:txBody>
+      </p:sp>
+      <p:pic>
+        <p:nvPicPr>
+          <p:cNvPr id="2050" name="Picture 2" descr="Image result for air bnb logo">
+            <a:extLst>
+              <a:ext uri="{FF2B5EF4-FFF2-40B4-BE49-F238E27FC236}">
+                <a16:creationId xmlns:a16="http://schemas.microsoft.com/office/drawing/2014/main" id="{A162C291-208B-BE48-BF44-7D5CD7EF6151}"/>
+              </a:ext>
+            </a:extLst>
+          </p:cNvPr>
+          <p:cNvPicPr>
+            <a:picLocks noChangeAspect="1" noChangeArrowheads="1"/>
+          </p:cNvPicPr>
+          <p:nvPr/>
+        </p:nvPicPr>
+        <p:blipFill>
+          <a:blip r:embed="rId3">
+            <a:extLst>
+              <a:ext uri="{28A0092B-C50C-407E-A947-70E740481C1C}">
+                <a14:useLocalDpi xmlns:a14="http://schemas.microsoft.com/office/drawing/2010/main" val="0"/>
+              </a:ext>
+            </a:extLst>
+          </a:blip>
+          <a:srcRect/>
+          <a:stretch>
+            <a:fillRect/>
+          </a:stretch>
+        </p:blipFill>
+        <p:spPr bwMode="auto">
+          <a:xfrm>
+            <a:off x="2080820" y="0"/>
+            <a:ext cx="2189605" cy="2022038"/>
+          </a:xfrm>
+          <a:prstGeom prst="rect">
+            <a:avLst/>
+          </a:prstGeom>
+          <a:noFill/>
+          <a:extLst>
+            <a:ext uri="{909E8E84-426E-40DD-AFC4-6F175D3DCCD1}">
+              <a14:hiddenFill xmlns:a14="http://schemas.microsoft.com/office/drawing/2010/main">
+                <a:solidFill>
+                  <a:srgbClr val="FFFFFF"/>
+                </a:solidFill>
+              </a14:hiddenFill>
+            </a:ext>
+          </a:extLst>
+        </p:spPr>
+      </p:pic>
+      <p:cxnSp>
+        <p:nvCxnSpPr>
+          <p:cNvPr id="6" name="Straight Connector 5">
+            <a:extLst>
+              <a:ext uri="{FF2B5EF4-FFF2-40B4-BE49-F238E27FC236}">
+                <a16:creationId xmlns:a16="http://schemas.microsoft.com/office/drawing/2014/main" id="{7D0926DC-6298-B648-9DF9-0D78D09F9FC8}"/>
+              </a:ext>
+            </a:extLst>
+          </p:cNvPr>
+          <p:cNvCxnSpPr>
+            <a:cxnSpLocks/>
+          </p:cNvCxnSpPr>
+          <p:nvPr/>
+        </p:nvCxnSpPr>
+        <p:spPr>
+          <a:xfrm>
+            <a:off x="2526110" y="1576551"/>
+            <a:ext cx="9518745" cy="1"/>
+          </a:xfrm>
+          <a:prstGeom prst="line">
+            <a:avLst/>
+          </a:prstGeom>
+          <a:ln w="12700">
+            <a:solidFill>
+              <a:srgbClr val="EA5E46"/>
+            </a:solidFill>
+          </a:ln>
+        </p:spPr>
+        <p:style>
+          <a:lnRef idx="1">
+            <a:schemeClr val="accent2"/>
+          </a:lnRef>
+          <a:fillRef idx="0">
+            <a:schemeClr val="accent2"/>
+          </a:fillRef>
+          <a:effectRef idx="0">
+            <a:schemeClr val="accent2"/>
+          </a:effectRef>
+          <a:fontRef idx="minor">
+            <a:schemeClr val="tx1"/>
+          </a:fontRef>
+        </p:style>
+      </p:cxnSp>
+    </p:spTree>
+    <p:extLst>
+      <p:ext uri="{BB962C8B-B14F-4D97-AF65-F5344CB8AC3E}">
+        <p14:creationId xmlns:p14="http://schemas.microsoft.com/office/powerpoint/2010/main" val="2072027101"/>
+      </p:ext>
+    </p:extLst>
+  </p:cSld>
+  <p:clrMapOvr>
+    <a:masterClrMapping/>
+  </p:clrMapOvr>
+</p:sld>
+</file>
+
+<file path=ppt/slides/slide8.xml><?xml version="1.0" encoding="utf-8"?>
+<p:sld xmlns:a="http://schemas.openxmlformats.org/drawingml/2006/main" xmlns:r="http://schemas.openxmlformats.org/officeDocument/2006/relationships" xmlns:p="http://schemas.openxmlformats.org/presentationml/2006/main">
+  <p:cSld>
+    <p:spTree>
+      <p:nvGrpSpPr>
+        <p:cNvPr id="1" name=""/>
+        <p:cNvGrpSpPr/>
+        <p:nvPr/>
+      </p:nvGrpSpPr>
+      <p:grpSpPr>
+        <a:xfrm>
+          <a:off x="0" y="0"/>
+          <a:ext cx="0" cy="0"/>
+          <a:chOff x="0" y="0"/>
+          <a:chExt cx="0" cy="0"/>
+        </a:xfrm>
+      </p:grpSpPr>
+      <p:sp>
+        <p:nvSpPr>
+          <p:cNvPr id="2" name="Title 1">
+            <a:extLst>
+              <a:ext uri="{FF2B5EF4-FFF2-40B4-BE49-F238E27FC236}">
+                <a16:creationId xmlns:a16="http://schemas.microsoft.com/office/drawing/2014/main" id="{59B8B577-5676-3C4B-A107-E41DB331FD85}"/>
+              </a:ext>
+            </a:extLst>
+          </p:cNvPr>
+          <p:cNvSpPr>
+            <a:spLocks noGrp="1"/>
+          </p:cNvSpPr>
+          <p:nvPr>
+            <p:ph type="title"/>
+          </p:nvPr>
+        </p:nvSpPr>
+        <p:spPr>
+          <a:xfrm>
+            <a:off x="4272238" y="588197"/>
+            <a:ext cx="10515600" cy="1325563"/>
+          </a:xfrm>
+        </p:spPr>
+        <p:txBody>
+          <a:bodyPr>
+            <a:normAutofit/>
+          </a:bodyPr>
+          <a:lstStyle/>
+          <a:p>
+            <a:r>
+              <a:rPr lang="en-US" sz="4000" dirty="0">
+                <a:solidFill>
+                  <a:srgbClr val="EA5E46"/>
+                </a:solidFill>
+              </a:rPr>
+              <a:t>Model Findings – Nearest </a:t>
+            </a:r>
+            <a:r>
+              <a:rPr lang="en-US" sz="4000" dirty="0" err="1">
+                <a:solidFill>
+                  <a:srgbClr val="EA5E46"/>
+                </a:solidFill>
+              </a:rPr>
+              <a:t>Neighbour</a:t>
+            </a:r>
+            <a:endParaRPr lang="en-US" sz="4000" dirty="0">
+              <a:solidFill>
+                <a:srgbClr val="EA5E46"/>
+              </a:solidFill>
+            </a:endParaRPr>
+          </a:p>
+        </p:txBody>
+      </p:sp>
+      <p:pic>
+        <p:nvPicPr>
+          <p:cNvPr id="2050" name="Picture 2" descr="Image result for air bnb logo">
+            <a:extLst>
+              <a:ext uri="{FF2B5EF4-FFF2-40B4-BE49-F238E27FC236}">
+                <a16:creationId xmlns:a16="http://schemas.microsoft.com/office/drawing/2014/main" id="{A162C291-208B-BE48-BF44-7D5CD7EF6151}"/>
+              </a:ext>
+            </a:extLst>
+          </p:cNvPr>
+          <p:cNvPicPr>
+            <a:picLocks noChangeAspect="1" noChangeArrowheads="1"/>
+          </p:cNvPicPr>
+          <p:nvPr/>
+        </p:nvPicPr>
+        <p:blipFill>
+          <a:blip r:embed="rId3">
+            <a:extLst>
+              <a:ext uri="{28A0092B-C50C-407E-A947-70E740481C1C}">
+                <a14:useLocalDpi xmlns:a14="http://schemas.microsoft.com/office/drawing/2010/main" val="0"/>
+              </a:ext>
+            </a:extLst>
+          </a:blip>
+          <a:srcRect/>
+          <a:stretch>
+            <a:fillRect/>
+          </a:stretch>
+        </p:blipFill>
+        <p:spPr bwMode="auto">
+          <a:xfrm>
+            <a:off x="2080820" y="0"/>
+            <a:ext cx="2189605" cy="2022038"/>
+          </a:xfrm>
+          <a:prstGeom prst="rect">
+            <a:avLst/>
+          </a:prstGeom>
+          <a:noFill/>
+          <a:extLst>
+            <a:ext uri="{909E8E84-426E-40DD-AFC4-6F175D3DCCD1}">
+              <a14:hiddenFill xmlns:a14="http://schemas.microsoft.com/office/drawing/2010/main">
+                <a:solidFill>
+                  <a:srgbClr val="FFFFFF"/>
+                </a:solidFill>
+              </a14:hiddenFill>
+            </a:ext>
+          </a:extLst>
+        </p:spPr>
+      </p:pic>
+      <p:cxnSp>
+        <p:nvCxnSpPr>
+          <p:cNvPr id="6" name="Straight Connector 5">
+            <a:extLst>
+              <a:ext uri="{FF2B5EF4-FFF2-40B4-BE49-F238E27FC236}">
+                <a16:creationId xmlns:a16="http://schemas.microsoft.com/office/drawing/2014/main" id="{7D0926DC-6298-B648-9DF9-0D78D09F9FC8}"/>
+              </a:ext>
+            </a:extLst>
+          </p:cNvPr>
+          <p:cNvCxnSpPr>
+            <a:cxnSpLocks/>
+          </p:cNvCxnSpPr>
+          <p:nvPr/>
+        </p:nvCxnSpPr>
+        <p:spPr>
+          <a:xfrm>
+            <a:off x="2526110" y="1576551"/>
+            <a:ext cx="9518745" cy="1"/>
+          </a:xfrm>
+          <a:prstGeom prst="line">
+            <a:avLst/>
+          </a:prstGeom>
+          <a:ln w="12700">
+            <a:solidFill>
+              <a:srgbClr val="EA5E46"/>
+            </a:solidFill>
+          </a:ln>
+        </p:spPr>
+        <p:style>
+          <a:lnRef idx="1">
+            <a:schemeClr val="accent2"/>
+          </a:lnRef>
+          <a:fillRef idx="0">
+            <a:schemeClr val="accent2"/>
+          </a:fillRef>
+          <a:effectRef idx="0">
+            <a:schemeClr val="accent2"/>
+          </a:effectRef>
+          <a:fontRef idx="minor">
+            <a:schemeClr val="tx1"/>
+          </a:fontRef>
+        </p:style>
+      </p:cxnSp>
+    </p:spTree>
+    <p:extLst>
+      <p:ext uri="{BB962C8B-B14F-4D97-AF65-F5344CB8AC3E}">
+        <p14:creationId xmlns:p14="http://schemas.microsoft.com/office/powerpoint/2010/main" val="1701961482"/>
+      </p:ext>
+    </p:extLst>
+  </p:cSld>
+  <p:clrMapOvr>
+    <a:masterClrMapping/>
+  </p:clrMapOvr>
+</p:sld>
+</file>
+
+<file path=ppt/slides/slide9.xml><?xml version="1.0" encoding="utf-8"?>
+<p:sld xmlns:a="http://schemas.openxmlformats.org/drawingml/2006/main" xmlns:r="http://schemas.openxmlformats.org/officeDocument/2006/relationships" xmlns:p="http://schemas.openxmlformats.org/presentationml/2006/main">
+  <p:cSld>
+    <p:spTree>
+      <p:nvGrpSpPr>
+        <p:cNvPr id="1" name=""/>
+        <p:cNvGrpSpPr/>
+        <p:nvPr/>
+      </p:nvGrpSpPr>
+      <p:grpSpPr>
+        <a:xfrm>
+          <a:off x="0" y="0"/>
+          <a:ext cx="0" cy="0"/>
+          <a:chOff x="0" y="0"/>
+          <a:chExt cx="0" cy="0"/>
+        </a:xfrm>
+      </p:grpSpPr>
+      <p:sp>
+        <p:nvSpPr>
+          <p:cNvPr id="2" name="Title 1">
+            <a:extLst>
+              <a:ext uri="{FF2B5EF4-FFF2-40B4-BE49-F238E27FC236}">
+                <a16:creationId xmlns:a16="http://schemas.microsoft.com/office/drawing/2014/main" id="{59B8B577-5676-3C4B-A107-E41DB331FD85}"/>
+              </a:ext>
+            </a:extLst>
+          </p:cNvPr>
+          <p:cNvSpPr>
+            <a:spLocks noGrp="1"/>
+          </p:cNvSpPr>
+          <p:nvPr>
+            <p:ph type="title"/>
+          </p:nvPr>
+        </p:nvSpPr>
+        <p:spPr>
+          <a:xfrm>
+            <a:off x="4272238" y="588197"/>
+            <a:ext cx="10515600" cy="1325563"/>
+          </a:xfrm>
+        </p:spPr>
+        <p:txBody>
+          <a:bodyPr>
+            <a:normAutofit/>
+          </a:bodyPr>
+          <a:lstStyle/>
+          <a:p>
+            <a:r>
+              <a:rPr lang="en-US" sz="4000" dirty="0">
+                <a:solidFill>
+                  <a:srgbClr val="EA5E46"/>
+                </a:solidFill>
+              </a:rPr>
+              <a:t>Model Findings – Trends &amp; Seasonality</a:t>
+            </a:r>
+          </a:p>
+        </p:txBody>
+      </p:sp>
+      <p:pic>
+        <p:nvPicPr>
+          <p:cNvPr id="2050" name="Picture 2" descr="Image result for air bnb logo">
+            <a:extLst>
+              <a:ext uri="{FF2B5EF4-FFF2-40B4-BE49-F238E27FC236}">
+                <a16:creationId xmlns:a16="http://schemas.microsoft.com/office/drawing/2014/main" id="{A162C291-208B-BE48-BF44-7D5CD7EF6151}"/>
+              </a:ext>
+            </a:extLst>
+          </p:cNvPr>
+          <p:cNvPicPr>
+            <a:picLocks noChangeAspect="1" noChangeArrowheads="1"/>
+          </p:cNvPicPr>
+          <p:nvPr/>
+        </p:nvPicPr>
+        <p:blipFill>
+          <a:blip r:embed="rId3">
+            <a:extLst>
+              <a:ext uri="{28A0092B-C50C-407E-A947-70E740481C1C}">
+                <a14:useLocalDpi xmlns:a14="http://schemas.microsoft.com/office/drawing/2010/main" val="0"/>
+              </a:ext>
+            </a:extLst>
+          </a:blip>
+          <a:srcRect/>
+          <a:stretch>
+            <a:fillRect/>
+          </a:stretch>
+        </p:blipFill>
+        <p:spPr bwMode="auto">
+          <a:xfrm>
+            <a:off x="2080820" y="0"/>
+            <a:ext cx="2189605" cy="2022038"/>
+          </a:xfrm>
+          <a:prstGeom prst="rect">
+            <a:avLst/>
+          </a:prstGeom>
+          <a:noFill/>
+          <a:extLst>
+            <a:ext uri="{909E8E84-426E-40DD-AFC4-6F175D3DCCD1}">
+              <a14:hiddenFill xmlns:a14="http://schemas.microsoft.com/office/drawing/2010/main">
+                <a:solidFill>
+                  <a:srgbClr val="FFFFFF"/>
+                </a:solidFill>
+              </a14:hiddenFill>
+            </a:ext>
+          </a:extLst>
+        </p:spPr>
+      </p:pic>
+      <p:cxnSp>
+        <p:nvCxnSpPr>
+          <p:cNvPr id="6" name="Straight Connector 5">
+            <a:extLst>
+              <a:ext uri="{FF2B5EF4-FFF2-40B4-BE49-F238E27FC236}">
+                <a16:creationId xmlns:a16="http://schemas.microsoft.com/office/drawing/2014/main" id="{7D0926DC-6298-B648-9DF9-0D78D09F9FC8}"/>
+              </a:ext>
+            </a:extLst>
+          </p:cNvPr>
+          <p:cNvCxnSpPr>
+            <a:cxnSpLocks/>
+          </p:cNvCxnSpPr>
+          <p:nvPr/>
+        </p:nvCxnSpPr>
+        <p:spPr>
+          <a:xfrm>
+            <a:off x="2526110" y="1576551"/>
+            <a:ext cx="9518745" cy="1"/>
+          </a:xfrm>
+          <a:prstGeom prst="line">
+            <a:avLst/>
+          </a:prstGeom>
+          <a:ln w="12700">
+            <a:solidFill>
+              <a:srgbClr val="EA5E46"/>
+            </a:solidFill>
+          </a:ln>
+        </p:spPr>
+        <p:style>
+          <a:lnRef idx="1">
+            <a:schemeClr val="accent2"/>
+          </a:lnRef>
+          <a:fillRef idx="0">
+            <a:schemeClr val="accent2"/>
+          </a:fillRef>
+          <a:effectRef idx="0">
+            <a:schemeClr val="accent2"/>
+          </a:effectRef>
+          <a:fontRef idx="minor">
+            <a:schemeClr val="tx1"/>
+          </a:fontRef>
+        </p:style>
+      </p:cxnSp>
+    </p:spTree>
+    <p:extLst>
+      <p:ext uri="{BB962C8B-B14F-4D97-AF65-F5344CB8AC3E}">
+        <p14:creationId xmlns:p14="http://schemas.microsoft.com/office/powerpoint/2010/main" val="2932517798"/>
+      </p:ext>
+    </p:extLst>
+  </p:cSld>
+  <p:clrMapOvr>
+    <a:masterClrMapping/>
+  </p:clrMapOvr>
 </p:sld>
 </file>
 

</xml_diff>

<commit_message>
added graph outputs & updated powerpoint
</commit_message>
<xml_diff>
--- a/Airbnb Price Predictions (Model).pptx
+++ b/Airbnb Price Predictions (Model).pptx
@@ -5,24 +5,23 @@
     <p:sldMasterId id="2147483648" r:id="rId1"/>
   </p:sldMasterIdLst>
   <p:notesMasterIdLst>
-    <p:notesMasterId r:id="rId17"/>
+    <p:notesMasterId r:id="rId16"/>
   </p:notesMasterIdLst>
   <p:sldIdLst>
     <p:sldId id="280" r:id="rId2"/>
     <p:sldId id="299" r:id="rId3"/>
     <p:sldId id="296" r:id="rId4"/>
-    <p:sldId id="297" r:id="rId5"/>
-    <p:sldId id="300" r:id="rId6"/>
-    <p:sldId id="298" r:id="rId7"/>
-    <p:sldId id="295" r:id="rId8"/>
-    <p:sldId id="286" r:id="rId9"/>
-    <p:sldId id="287" r:id="rId10"/>
-    <p:sldId id="289" r:id="rId11"/>
-    <p:sldId id="290" r:id="rId12"/>
-    <p:sldId id="291" r:id="rId13"/>
-    <p:sldId id="292" r:id="rId14"/>
-    <p:sldId id="288" r:id="rId15"/>
-    <p:sldId id="274" r:id="rId16"/>
+    <p:sldId id="300" r:id="rId5"/>
+    <p:sldId id="298" r:id="rId6"/>
+    <p:sldId id="295" r:id="rId7"/>
+    <p:sldId id="286" r:id="rId8"/>
+    <p:sldId id="287" r:id="rId9"/>
+    <p:sldId id="289" r:id="rId10"/>
+    <p:sldId id="290" r:id="rId11"/>
+    <p:sldId id="291" r:id="rId12"/>
+    <p:sldId id="292" r:id="rId13"/>
+    <p:sldId id="288" r:id="rId14"/>
+    <p:sldId id="274" r:id="rId15"/>
   </p:sldIdLst>
   <p:sldSz cx="12192000" cy="6858000"/>
   <p:notesSz cx="6858000" cy="9144000"/>
@@ -708,7 +707,7 @@
     </p:spTree>
     <p:extLst>
       <p:ext uri="{BB962C8B-B14F-4D97-AF65-F5344CB8AC3E}">
-        <p14:creationId xmlns:p14="http://schemas.microsoft.com/office/powerpoint/2010/main" val="3177731070"/>
+        <p14:creationId xmlns:p14="http://schemas.microsoft.com/office/powerpoint/2010/main" val="266214348"/>
       </p:ext>
     </p:extLst>
   </p:cSld>
@@ -826,7 +825,7 @@
     </p:spTree>
     <p:extLst>
       <p:ext uri="{BB962C8B-B14F-4D97-AF65-F5344CB8AC3E}">
-        <p14:creationId xmlns:p14="http://schemas.microsoft.com/office/powerpoint/2010/main" val="266214348"/>
+        <p14:creationId xmlns:p14="http://schemas.microsoft.com/office/powerpoint/2010/main" val="847075339"/>
       </p:ext>
     </p:extLst>
   </p:cSld>
@@ -944,7 +943,7 @@
     </p:spTree>
     <p:extLst>
       <p:ext uri="{BB962C8B-B14F-4D97-AF65-F5344CB8AC3E}">
-        <p14:creationId xmlns:p14="http://schemas.microsoft.com/office/powerpoint/2010/main" val="847075339"/>
+        <p14:creationId xmlns:p14="http://schemas.microsoft.com/office/powerpoint/2010/main" val="533258538"/>
       </p:ext>
     </p:extLst>
   </p:cSld>
@@ -1062,7 +1061,7 @@
     </p:spTree>
     <p:extLst>
       <p:ext uri="{BB962C8B-B14F-4D97-AF65-F5344CB8AC3E}">
-        <p14:creationId xmlns:p14="http://schemas.microsoft.com/office/powerpoint/2010/main" val="533258538"/>
+        <p14:creationId xmlns:p14="http://schemas.microsoft.com/office/powerpoint/2010/main" val="498058897"/>
       </p:ext>
     </p:extLst>
   </p:cSld>
@@ -1116,40 +1115,6 @@
           <a:bodyPr/>
           <a:lstStyle/>
           <a:p>
-            <a:r>
-              <a:rPr lang="en-US" dirty="0"/>
-              <a:t>-To help users explore all listings available in NYC, we created a marker cluster map using Leaflet. </a:t>
-            </a:r>
-          </a:p>
-          <a:p>
-            <a:r>
-              <a:rPr lang="en-US" dirty="0"/>
-              <a:t>-The clusters display the number of listings with the different boroughs and </a:t>
-            </a:r>
-            <a:r>
-              <a:rPr lang="en-US" dirty="0" err="1"/>
-              <a:t>neighbourhoods</a:t>
-            </a:r>
-            <a:r>
-              <a:rPr lang="en-US" dirty="0"/>
-              <a:t> in NYC. </a:t>
-            </a:r>
-          </a:p>
-          <a:p>
-            <a:r>
-              <a:rPr lang="en-US" dirty="0"/>
-              <a:t>-In this example, we selected the the well-known New York borough of Manhattan, and then further zoomed in to the Upper West Side </a:t>
-            </a:r>
-            <a:r>
-              <a:rPr lang="en-US" dirty="0" err="1"/>
-              <a:t>neighbourhood</a:t>
-            </a:r>
-            <a:r>
-              <a:rPr lang="en-US" dirty="0"/>
-              <a:t>. </a:t>
-            </a:r>
-          </a:p>
-          <a:p>
             <a:endParaRPr lang="en-US" dirty="0"/>
           </a:p>
         </p:txBody>
@@ -1172,90 +1137,6 @@
             <a:fld id="{DF2352D6-35AF-0544-A99E-554CC41E76C4}" type="slidenum">
               <a:rPr lang="en-US" smtClean="0"/>
               <a:t>14</a:t>
-            </a:fld>
-            <a:endParaRPr lang="en-US"/>
-          </a:p>
-        </p:txBody>
-      </p:sp>
-    </p:spTree>
-    <p:extLst>
-      <p:ext uri="{BB962C8B-B14F-4D97-AF65-F5344CB8AC3E}">
-        <p14:creationId xmlns:p14="http://schemas.microsoft.com/office/powerpoint/2010/main" val="498058897"/>
-      </p:ext>
-    </p:extLst>
-  </p:cSld>
-  <p:clrMapOvr>
-    <a:masterClrMapping/>
-  </p:clrMapOvr>
-</p:notes>
-</file>
-
-<file path=ppt/notesSlides/notesSlide15.xml><?xml version="1.0" encoding="utf-8"?>
-<p:notes xmlns:a="http://schemas.openxmlformats.org/drawingml/2006/main" xmlns:r="http://schemas.openxmlformats.org/officeDocument/2006/relationships" xmlns:p="http://schemas.openxmlformats.org/presentationml/2006/main">
-  <p:cSld>
-    <p:spTree>
-      <p:nvGrpSpPr>
-        <p:cNvPr id="1" name=""/>
-        <p:cNvGrpSpPr/>
-        <p:nvPr/>
-      </p:nvGrpSpPr>
-      <p:grpSpPr>
-        <a:xfrm>
-          <a:off x="0" y="0"/>
-          <a:ext cx="0" cy="0"/>
-          <a:chOff x="0" y="0"/>
-          <a:chExt cx="0" cy="0"/>
-        </a:xfrm>
-      </p:grpSpPr>
-      <p:sp>
-        <p:nvSpPr>
-          <p:cNvPr id="2" name="Slide Image Placeholder 1"/>
-          <p:cNvSpPr>
-            <a:spLocks noGrp="1" noRot="1" noChangeAspect="1"/>
-          </p:cNvSpPr>
-          <p:nvPr>
-            <p:ph type="sldImg"/>
-          </p:nvPr>
-        </p:nvSpPr>
-        <p:spPr/>
-      </p:sp>
-      <p:sp>
-        <p:nvSpPr>
-          <p:cNvPr id="3" name="Notes Placeholder 2"/>
-          <p:cNvSpPr>
-            <a:spLocks noGrp="1"/>
-          </p:cNvSpPr>
-          <p:nvPr>
-            <p:ph type="body" idx="1"/>
-          </p:nvPr>
-        </p:nvSpPr>
-        <p:spPr/>
-        <p:txBody>
-          <a:bodyPr/>
-          <a:lstStyle/>
-          <a:p>
-            <a:endParaRPr lang="en-US" dirty="0"/>
-          </a:p>
-        </p:txBody>
-      </p:sp>
-      <p:sp>
-        <p:nvSpPr>
-          <p:cNvPr id="4" name="Slide Number Placeholder 3"/>
-          <p:cNvSpPr>
-            <a:spLocks noGrp="1"/>
-          </p:cNvSpPr>
-          <p:nvPr>
-            <p:ph type="sldNum" sz="quarter" idx="5"/>
-          </p:nvPr>
-        </p:nvSpPr>
-        <p:spPr/>
-        <p:txBody>
-          <a:bodyPr/>
-          <a:lstStyle/>
-          <a:p>
-            <a:fld id="{DF2352D6-35AF-0544-A99E-554CC41E76C4}" type="slidenum">
-              <a:rPr lang="en-US" smtClean="0"/>
-              <a:t>15</a:t>
             </a:fld>
             <a:endParaRPr lang="en-US"/>
           </a:p>
@@ -1320,27 +1201,7 @@
           <a:p>
             <a:r>
               <a:rPr lang="en-US" dirty="0"/>
-              <a:t>To predict prices, we decided to use the Random Forest &amp; LGBM Regressor methods to determine which features are the most important to price an </a:t>
-            </a:r>
-            <a:r>
-              <a:rPr lang="en-US" dirty="0" err="1"/>
-              <a:t>AirBNB</a:t>
-            </a:r>
-            <a:r>
-              <a:rPr lang="en-US" dirty="0"/>
-              <a:t>.</a:t>
-            </a:r>
-          </a:p>
-          <a:p>
-            <a:r>
-              <a:rPr lang="en-US" dirty="0"/>
-              <a:t>We then use the KNN Regressor to see how the price is affected with having listings close to your area.</a:t>
-            </a:r>
-          </a:p>
-          <a:p>
-            <a:r>
-              <a:rPr lang="en-US" dirty="0"/>
-              <a:t>Finally, we used the Facebook Prophet to how prices are affected by time &amp; seasonality to predict Airbnb future prices.</a:t>
+              <a:t>To clean the database, we added the amenities count column to the existing dataset to see if there is a positive correlation between the listing price.</a:t>
             </a:r>
           </a:p>
           <a:p>
@@ -1594,7 +1455,7 @@
     </p:spTree>
     <p:extLst>
       <p:ext uri="{BB962C8B-B14F-4D97-AF65-F5344CB8AC3E}">
-        <p14:creationId xmlns:p14="http://schemas.microsoft.com/office/powerpoint/2010/main" val="4053816974"/>
+        <p14:creationId xmlns:p14="http://schemas.microsoft.com/office/powerpoint/2010/main" val="2102900166"/>
       </p:ext>
     </p:extLst>
   </p:cSld>
@@ -1704,7 +1565,7 @@
     </p:spTree>
     <p:extLst>
       <p:ext uri="{BB962C8B-B14F-4D97-AF65-F5344CB8AC3E}">
-        <p14:creationId xmlns:p14="http://schemas.microsoft.com/office/powerpoint/2010/main" val="2102900166"/>
+        <p14:creationId xmlns:p14="http://schemas.microsoft.com/office/powerpoint/2010/main" val="1272532608"/>
       </p:ext>
     </p:extLst>
   </p:cSld>
@@ -1758,33 +1619,36 @@
           <a:bodyPr/>
           <a:lstStyle/>
           <a:p>
+            <a:pPr marL="228600" indent="-228600">
+              <a:buAutoNum type="arabicParenR"/>
+            </a:pPr>
             <a:r>
               <a:rPr lang="en-US" dirty="0"/>
-              <a:t>To predict prices, we decided to use the Random Forest &amp; LGBM Regressor methods to determine which features are the most important to price an </a:t>
+              <a:t>With existing numeric data, input N/A fields with the average value for that specific column.</a:t>
+            </a:r>
+          </a:p>
+          <a:p>
+            <a:pPr marL="228600" indent="-228600">
+              <a:buAutoNum type="arabicParenR"/>
+            </a:pPr>
+            <a:r>
+              <a:rPr lang="en-US" dirty="0"/>
+              <a:t>Then, for certain data like room type, boroughs, &amp; </a:t>
             </a:r>
             <a:r>
               <a:rPr lang="en-US" dirty="0" err="1"/>
-              <a:t>AirBNB</a:t>
+              <a:t>neighbourhoods</a:t>
             </a:r>
             <a:r>
               <a:rPr lang="en-US" dirty="0"/>
-              <a:t>.</a:t>
+              <a:t>, we need to categorize them into numbers.</a:t>
             </a:r>
           </a:p>
           <a:p>
             <a:r>
               <a:rPr lang="en-US" dirty="0"/>
-              <a:t>We then use the KNN Regressor to see how the price is affected with having listings close to your area.</a:t>
-            </a:r>
-          </a:p>
-          <a:p>
-            <a:r>
-              <a:rPr lang="en-US" dirty="0"/>
-              <a:t>Finally, we used the Facebook Prophet to how prices are affected by time &amp; seasonality to predict Airbnb future prices.</a:t>
-            </a:r>
-          </a:p>
-          <a:p>
-            <a:endParaRPr lang="en-US" dirty="0"/>
+              <a:t>3)   Finally, with text data, we need to vectorize them</a:t>
+            </a:r>
           </a:p>
         </p:txBody>
       </p:sp>
@@ -1814,7 +1678,7 @@
     </p:spTree>
     <p:extLst>
       <p:ext uri="{BB962C8B-B14F-4D97-AF65-F5344CB8AC3E}">
-        <p14:creationId xmlns:p14="http://schemas.microsoft.com/office/powerpoint/2010/main" val="1272532608"/>
+        <p14:creationId xmlns:p14="http://schemas.microsoft.com/office/powerpoint/2010/main" val="627921549"/>
       </p:ext>
     </p:extLst>
   </p:cSld>
@@ -1868,21 +1732,15 @@
           <a:bodyPr/>
           <a:lstStyle/>
           <a:p>
-            <a:pPr marL="228600" indent="-228600">
-              <a:buAutoNum type="arabicParenR"/>
-            </a:pPr>
             <a:r>
               <a:rPr lang="en-US" dirty="0"/>
-              <a:t>With existing numeric data, input N/A fields with the average value for that specific column.</a:t>
-            </a:r>
-          </a:p>
-          <a:p>
-            <a:pPr marL="228600" indent="-228600">
-              <a:buAutoNum type="arabicParenR"/>
-            </a:pPr>
+              <a:t>-To help users explore all listings available in NYC, we created a marker cluster map using Leaflet. </a:t>
+            </a:r>
+          </a:p>
+          <a:p>
             <a:r>
               <a:rPr lang="en-US" dirty="0"/>
-              <a:t>Then, for certain data like room type, boroughs, &amp; </a:t>
+              <a:t>-The clusters display the number of listings with the different boroughs and </a:t>
             </a:r>
             <a:r>
               <a:rPr lang="en-US" dirty="0" err="1"/>
@@ -1890,14 +1748,25 @@
             </a:r>
             <a:r>
               <a:rPr lang="en-US" dirty="0"/>
-              <a:t>, we need to categorize them into numbers.</a:t>
+              <a:t> in NYC. </a:t>
             </a:r>
           </a:p>
           <a:p>
             <a:r>
               <a:rPr lang="en-US" dirty="0"/>
-              <a:t>3)   Finally, with text data, we need to vectorize them</a:t>
-            </a:r>
+              <a:t>-In this example, we selected the the well-known New York borough of Manhattan, and then further zoomed in to the Upper West Side </a:t>
+            </a:r>
+            <a:r>
+              <a:rPr lang="en-US" dirty="0" err="1"/>
+              <a:t>neighbourhood</a:t>
+            </a:r>
+            <a:r>
+              <a:rPr lang="en-US" dirty="0"/>
+              <a:t>. </a:t>
+            </a:r>
+          </a:p>
+          <a:p>
+            <a:endParaRPr lang="en-US" dirty="0"/>
           </a:p>
         </p:txBody>
       </p:sp>
@@ -1927,7 +1796,7 @@
     </p:spTree>
     <p:extLst>
       <p:ext uri="{BB962C8B-B14F-4D97-AF65-F5344CB8AC3E}">
-        <p14:creationId xmlns:p14="http://schemas.microsoft.com/office/powerpoint/2010/main" val="627921549"/>
+        <p14:creationId xmlns:p14="http://schemas.microsoft.com/office/powerpoint/2010/main" val="818292738"/>
       </p:ext>
     </p:extLst>
   </p:cSld>
@@ -2045,7 +1914,7 @@
     </p:spTree>
     <p:extLst>
       <p:ext uri="{BB962C8B-B14F-4D97-AF65-F5344CB8AC3E}">
-        <p14:creationId xmlns:p14="http://schemas.microsoft.com/office/powerpoint/2010/main" val="818292738"/>
+        <p14:creationId xmlns:p14="http://schemas.microsoft.com/office/powerpoint/2010/main" val="2744486609"/>
       </p:ext>
     </p:extLst>
   </p:cSld>
@@ -2163,7 +2032,7 @@
     </p:spTree>
     <p:extLst>
       <p:ext uri="{BB962C8B-B14F-4D97-AF65-F5344CB8AC3E}">
-        <p14:creationId xmlns:p14="http://schemas.microsoft.com/office/powerpoint/2010/main" val="2744486609"/>
+        <p14:creationId xmlns:p14="http://schemas.microsoft.com/office/powerpoint/2010/main" val="3177731070"/>
       </p:ext>
     </p:extLst>
   </p:cSld>
@@ -5996,163 +5865,6 @@
         </p:nvSpPr>
         <p:spPr>
           <a:xfrm>
-            <a:off x="4123382" y="513769"/>
-            <a:ext cx="10515600" cy="1325563"/>
-          </a:xfrm>
-        </p:spPr>
-        <p:txBody>
-          <a:bodyPr/>
-          <a:lstStyle/>
-          <a:p>
-            <a:r>
-              <a:rPr lang="en-US" dirty="0">
-                <a:solidFill>
-                  <a:srgbClr val="EA5E46"/>
-                </a:solidFill>
-              </a:rPr>
-              <a:t>Model Findings – Price Correlation</a:t>
-            </a:r>
-          </a:p>
-        </p:txBody>
-      </p:sp>
-      <p:pic>
-        <p:nvPicPr>
-          <p:cNvPr id="2050" name="Picture 2" descr="Image result for air bnb logo">
-            <a:extLst>
-              <a:ext uri="{FF2B5EF4-FFF2-40B4-BE49-F238E27FC236}">
-                <a16:creationId xmlns:a16="http://schemas.microsoft.com/office/drawing/2014/main" id="{A162C291-208B-BE48-BF44-7D5CD7EF6151}"/>
-              </a:ext>
-            </a:extLst>
-          </p:cNvPr>
-          <p:cNvPicPr>
-            <a:picLocks noChangeAspect="1" noChangeArrowheads="1"/>
-          </p:cNvPicPr>
-          <p:nvPr/>
-        </p:nvPicPr>
-        <p:blipFill>
-          <a:blip r:embed="rId3">
-            <a:extLst>
-              <a:ext uri="{28A0092B-C50C-407E-A947-70E740481C1C}">
-                <a14:useLocalDpi xmlns:a14="http://schemas.microsoft.com/office/drawing/2010/main" val="0"/>
-              </a:ext>
-            </a:extLst>
-          </a:blip>
-          <a:srcRect/>
-          <a:stretch>
-            <a:fillRect/>
-          </a:stretch>
-        </p:blipFill>
-        <p:spPr bwMode="auto">
-          <a:xfrm>
-            <a:off x="2080820" y="0"/>
-            <a:ext cx="2189605" cy="2022038"/>
-          </a:xfrm>
-          <a:prstGeom prst="rect">
-            <a:avLst/>
-          </a:prstGeom>
-          <a:noFill/>
-          <a:extLst>
-            <a:ext uri="{909E8E84-426E-40DD-AFC4-6F175D3DCCD1}">
-              <a14:hiddenFill xmlns:a14="http://schemas.microsoft.com/office/drawing/2010/main">
-                <a:solidFill>
-                  <a:srgbClr val="FFFFFF"/>
-                </a:solidFill>
-              </a14:hiddenFill>
-            </a:ext>
-          </a:extLst>
-        </p:spPr>
-      </p:pic>
-      <p:cxnSp>
-        <p:nvCxnSpPr>
-          <p:cNvPr id="6" name="Straight Connector 5">
-            <a:extLst>
-              <a:ext uri="{FF2B5EF4-FFF2-40B4-BE49-F238E27FC236}">
-                <a16:creationId xmlns:a16="http://schemas.microsoft.com/office/drawing/2014/main" id="{7D0926DC-6298-B648-9DF9-0D78D09F9FC8}"/>
-              </a:ext>
-            </a:extLst>
-          </p:cNvPr>
-          <p:cNvCxnSpPr>
-            <a:cxnSpLocks/>
-          </p:cNvCxnSpPr>
-          <p:nvPr/>
-        </p:nvCxnSpPr>
-        <p:spPr>
-          <a:xfrm>
-            <a:off x="2526110" y="1576551"/>
-            <a:ext cx="9518745" cy="1"/>
-          </a:xfrm>
-          <a:prstGeom prst="line">
-            <a:avLst/>
-          </a:prstGeom>
-          <a:ln w="12700">
-            <a:solidFill>
-              <a:srgbClr val="EA5E46"/>
-            </a:solidFill>
-          </a:ln>
-        </p:spPr>
-        <p:style>
-          <a:lnRef idx="1">
-            <a:schemeClr val="accent2"/>
-          </a:lnRef>
-          <a:fillRef idx="0">
-            <a:schemeClr val="accent2"/>
-          </a:fillRef>
-          <a:effectRef idx="0">
-            <a:schemeClr val="accent2"/>
-          </a:effectRef>
-          <a:fontRef idx="minor">
-            <a:schemeClr val="tx1"/>
-          </a:fontRef>
-        </p:style>
-      </p:cxnSp>
-    </p:spTree>
-    <p:extLst>
-      <p:ext uri="{BB962C8B-B14F-4D97-AF65-F5344CB8AC3E}">
-        <p14:creationId xmlns:p14="http://schemas.microsoft.com/office/powerpoint/2010/main" val="191879790"/>
-      </p:ext>
-    </p:extLst>
-  </p:cSld>
-  <p:clrMapOvr>
-    <a:masterClrMapping/>
-  </p:clrMapOvr>
-</p:sld>
-</file>
-
-<file path=ppt/slides/slide11.xml><?xml version="1.0" encoding="utf-8"?>
-<p:sld xmlns:a="http://schemas.openxmlformats.org/drawingml/2006/main" xmlns:r="http://schemas.openxmlformats.org/officeDocument/2006/relationships" xmlns:p="http://schemas.openxmlformats.org/presentationml/2006/main">
-  <p:cSld>
-    <p:spTree>
-      <p:nvGrpSpPr>
-        <p:cNvPr id="1" name=""/>
-        <p:cNvGrpSpPr/>
-        <p:nvPr/>
-      </p:nvGrpSpPr>
-      <p:grpSpPr>
-        <a:xfrm>
-          <a:off x="0" y="0"/>
-          <a:ext cx="0" cy="0"/>
-          <a:chOff x="0" y="0"/>
-          <a:chExt cx="0" cy="0"/>
-        </a:xfrm>
-      </p:grpSpPr>
-      <p:sp>
-        <p:nvSpPr>
-          <p:cNvPr id="2" name="Title 1">
-            <a:extLst>
-              <a:ext uri="{FF2B5EF4-FFF2-40B4-BE49-F238E27FC236}">
-                <a16:creationId xmlns:a16="http://schemas.microsoft.com/office/drawing/2014/main" id="{59B8B577-5676-3C4B-A107-E41DB331FD85}"/>
-              </a:ext>
-            </a:extLst>
-          </p:cNvPr>
-          <p:cNvSpPr>
-            <a:spLocks noGrp="1"/>
-          </p:cNvSpPr>
-          <p:nvPr>
-            <p:ph type="title"/>
-          </p:nvPr>
-        </p:nvSpPr>
-        <p:spPr>
-          <a:xfrm>
             <a:off x="4272238" y="588197"/>
             <a:ext cx="10515600" cy="1325563"/>
           </a:xfrm>
@@ -6275,7 +5987,7 @@
 </p:sld>
 </file>
 
-<file path=ppt/slides/slide12.xml><?xml version="1.0" encoding="utf-8"?>
+<file path=ppt/slides/slide11.xml><?xml version="1.0" encoding="utf-8"?>
 <p:sld xmlns:a="http://schemas.openxmlformats.org/drawingml/2006/main" xmlns:r="http://schemas.openxmlformats.org/officeDocument/2006/relationships" xmlns:p="http://schemas.openxmlformats.org/presentationml/2006/main">
   <p:cSld>
     <p:spTree>
@@ -6447,7 +6159,7 @@
 </p:sld>
 </file>
 
-<file path=ppt/slides/slide13.xml><?xml version="1.0" encoding="utf-8"?>
+<file path=ppt/slides/slide12.xml><?xml version="1.0" encoding="utf-8"?>
 <p:sld xmlns:a="http://schemas.openxmlformats.org/drawingml/2006/main" xmlns:r="http://schemas.openxmlformats.org/officeDocument/2006/relationships" xmlns:p="http://schemas.openxmlformats.org/presentationml/2006/main">
   <p:cSld>
     <p:spTree>
@@ -6606,7 +6318,7 @@
 </p:sld>
 </file>
 
-<file path=ppt/slides/slide14.xml><?xml version="1.0" encoding="utf-8"?>
+<file path=ppt/slides/slide13.xml><?xml version="1.0" encoding="utf-8"?>
 <p:sld xmlns:a="http://schemas.openxmlformats.org/drawingml/2006/main" xmlns:r="http://schemas.openxmlformats.org/officeDocument/2006/relationships" xmlns:p="http://schemas.openxmlformats.org/presentationml/2006/main">
   <p:cSld>
     <p:spTree>
@@ -6763,7 +6475,7 @@
 </p:sld>
 </file>
 
-<file path=ppt/slides/slide15.xml><?xml version="1.0" encoding="utf-8"?>
+<file path=ppt/slides/slide14.xml><?xml version="1.0" encoding="utf-8"?>
 <p:sld xmlns:a="http://schemas.openxmlformats.org/drawingml/2006/main" xmlns:r="http://schemas.openxmlformats.org/officeDocument/2006/relationships" xmlns:p="http://schemas.openxmlformats.org/presentationml/2006/main">
   <p:cSld>
     <p:spTree>
@@ -7173,7 +6885,7 @@
                   <a:srgbClr val="EA5E46"/>
                 </a:solidFill>
               </a:rPr>
-              <a:t>Model Data Cleaning</a:t>
+              <a:t>Model Data Cleaning – Adding Columns</a:t>
             </a:r>
           </a:p>
         </p:txBody>
@@ -7268,106 +6980,6 @@
           </a:fontRef>
         </p:style>
       </p:cxnSp>
-      <p:sp>
-        <p:nvSpPr>
-          <p:cNvPr id="3" name="TextBox 2">
-            <a:extLst>
-              <a:ext uri="{FF2B5EF4-FFF2-40B4-BE49-F238E27FC236}">
-                <a16:creationId xmlns:a16="http://schemas.microsoft.com/office/drawing/2014/main" id="{76D81AFC-F7DB-49B4-89B6-57701799BA62}"/>
-              </a:ext>
-            </a:extLst>
-          </p:cNvPr>
-          <p:cNvSpPr txBox="1"/>
-          <p:nvPr/>
-        </p:nvSpPr>
-        <p:spPr>
-          <a:xfrm>
-            <a:off x="975853" y="2130317"/>
-            <a:ext cx="9518745" cy="369332"/>
-          </a:xfrm>
-          <a:prstGeom prst="rect">
-            <a:avLst/>
-          </a:prstGeom>
-          <a:noFill/>
-        </p:spPr>
-        <p:txBody>
-          <a:bodyPr wrap="square" rtlCol="0">
-            <a:spAutoFit/>
-          </a:bodyPr>
-          <a:lstStyle/>
-          <a:p>
-            <a:pPr marL="285750" indent="-285750">
-              <a:buFont typeface="Arial" panose="020B0604020202020204" pitchFamily="34" charset="0"/>
-              <a:buChar char="•"/>
-            </a:pPr>
-            <a:r>
-              <a:rPr lang="en-US" dirty="0"/>
-              <a:t>Added additional column to provide the total amenities count to see how it affects price</a:t>
-            </a:r>
-            <a:endParaRPr lang="en-CA" dirty="0"/>
-          </a:p>
-        </p:txBody>
-      </p:sp>
-      <p:pic>
-        <p:nvPicPr>
-          <p:cNvPr id="8" name="Picture 7">
-            <a:extLst>
-              <a:ext uri="{FF2B5EF4-FFF2-40B4-BE49-F238E27FC236}">
-                <a16:creationId xmlns:a16="http://schemas.microsoft.com/office/drawing/2014/main" id="{6C502A07-8C5A-4606-9D20-78216B8AD106}"/>
-              </a:ext>
-            </a:extLst>
-          </p:cNvPr>
-          <p:cNvPicPr>
-            <a:picLocks noChangeAspect="1"/>
-          </p:cNvPicPr>
-          <p:nvPr/>
-        </p:nvPicPr>
-        <p:blipFill>
-          <a:blip r:embed="rId4"/>
-          <a:stretch>
-            <a:fillRect/>
-          </a:stretch>
-        </p:blipFill>
-        <p:spPr>
-          <a:xfrm>
-            <a:off x="1309393" y="3116266"/>
-            <a:ext cx="3673158" cy="1181202"/>
-          </a:xfrm>
-          <a:prstGeom prst="rect">
-            <a:avLst/>
-          </a:prstGeom>
-        </p:spPr>
-      </p:pic>
-      <p:pic>
-        <p:nvPicPr>
-          <p:cNvPr id="10" name="Picture 9">
-            <a:extLst>
-              <a:ext uri="{FF2B5EF4-FFF2-40B4-BE49-F238E27FC236}">
-                <a16:creationId xmlns:a16="http://schemas.microsoft.com/office/drawing/2014/main" id="{0233D9E3-FACF-48F1-A3EF-8E158AFA9C30}"/>
-              </a:ext>
-            </a:extLst>
-          </p:cNvPr>
-          <p:cNvPicPr>
-            <a:picLocks noChangeAspect="1"/>
-          </p:cNvPicPr>
-          <p:nvPr/>
-        </p:nvPicPr>
-        <p:blipFill>
-          <a:blip r:embed="rId5"/>
-          <a:stretch>
-            <a:fillRect/>
-          </a:stretch>
-        </p:blipFill>
-        <p:spPr>
-          <a:xfrm>
-            <a:off x="7530687" y="3068390"/>
-            <a:ext cx="1158340" cy="1135478"/>
-          </a:xfrm>
-          <a:prstGeom prst="rect">
-            <a:avLst/>
-          </a:prstGeom>
-        </p:spPr>
-      </p:pic>
       <p:sp>
         <p:nvSpPr>
           <p:cNvPr id="13" name="Arrow: Right 12">
@@ -7426,6 +7038,184 @@
           </a:p>
         </p:txBody>
       </p:sp>
+      <p:graphicFrame>
+        <p:nvGraphicFramePr>
+          <p:cNvPr id="4" name="Table 4">
+            <a:extLst>
+              <a:ext uri="{FF2B5EF4-FFF2-40B4-BE49-F238E27FC236}">
+                <a16:creationId xmlns:a16="http://schemas.microsoft.com/office/drawing/2014/main" id="{21B26308-D3E0-4424-8F97-2E7634C3FA7A}"/>
+              </a:ext>
+            </a:extLst>
+          </p:cNvPr>
+          <p:cNvGraphicFramePr>
+            <a:graphicFrameLocks noGrp="1"/>
+          </p:cNvGraphicFramePr>
+          <p:nvPr>
+            <p:extLst>
+              <p:ext uri="{D42A27DB-BD31-4B8C-83A1-F6EECF244321}">
+                <p14:modId xmlns:p14="http://schemas.microsoft.com/office/powerpoint/2010/main" val="2000541183"/>
+              </p:ext>
+            </p:extLst>
+          </p:nvPr>
+        </p:nvGraphicFramePr>
+        <p:xfrm>
+          <a:off x="1061616" y="2906771"/>
+          <a:ext cx="4611395" cy="1089728"/>
+        </p:xfrm>
+        <a:graphic>
+          <a:graphicData uri="http://schemas.openxmlformats.org/drawingml/2006/table">
+            <a:tbl>
+              <a:tblPr firstRow="1" bandRow="1">
+                <a:tableStyleId>{073A0DAA-6AF3-43AB-8588-CEC1D06C72B9}</a:tableStyleId>
+              </a:tblPr>
+              <a:tblGrid>
+                <a:gridCol w="4611395">
+                  <a:extLst>
+                    <a:ext uri="{9D8B030D-6E8A-4147-A177-3AD203B41FA5}">
+                      <a16:colId xmlns:a16="http://schemas.microsoft.com/office/drawing/2014/main" val="2478899434"/>
+                    </a:ext>
+                  </a:extLst>
+                </a:gridCol>
+              </a:tblGrid>
+              <a:tr h="511685">
+                <a:tc>
+                  <a:txBody>
+                    <a:bodyPr/>
+                    <a:lstStyle/>
+                    <a:p>
+                      <a:r>
+                        <a:rPr lang="en-US" dirty="0"/>
+                        <a:t>amenities</a:t>
+                      </a:r>
+                      <a:endParaRPr lang="en-CA" dirty="0"/>
+                    </a:p>
+                  </a:txBody>
+                  <a:tcPr/>
+                </a:tc>
+                <a:extLst>
+                  <a:ext uri="{0D108BD9-81ED-4DB2-BD59-A6C34878D82A}">
+                    <a16:rowId xmlns:a16="http://schemas.microsoft.com/office/drawing/2014/main" val="2665256824"/>
+                  </a:ext>
+                </a:extLst>
+              </a:tr>
+              <a:tr h="578043">
+                <a:tc>
+                  <a:txBody>
+                    <a:bodyPr/>
+                    <a:lstStyle/>
+                    <a:p>
+                      <a:r>
+                        <a:rPr lang="en-US" dirty="0"/>
+                        <a:t>[“</a:t>
+                      </a:r>
+                      <a:r>
+                        <a:rPr lang="en-US" dirty="0" err="1"/>
+                        <a:t>Wifi</a:t>
+                      </a:r>
+                      <a:r>
+                        <a:rPr lang="en-US" dirty="0"/>
+                        <a:t>”, “Kitchen”, “Heating”, “Air Conditioning]</a:t>
+                      </a:r>
+                      <a:endParaRPr lang="en-CA" dirty="0"/>
+                    </a:p>
+                  </a:txBody>
+                  <a:tcPr/>
+                </a:tc>
+                <a:extLst>
+                  <a:ext uri="{0D108BD9-81ED-4DB2-BD59-A6C34878D82A}">
+                    <a16:rowId xmlns:a16="http://schemas.microsoft.com/office/drawing/2014/main" val="1667322077"/>
+                  </a:ext>
+                </a:extLst>
+              </a:tr>
+            </a:tbl>
+          </a:graphicData>
+        </a:graphic>
+      </p:graphicFrame>
+      <p:graphicFrame>
+        <p:nvGraphicFramePr>
+          <p:cNvPr id="11" name="Table 4">
+            <a:extLst>
+              <a:ext uri="{FF2B5EF4-FFF2-40B4-BE49-F238E27FC236}">
+                <a16:creationId xmlns:a16="http://schemas.microsoft.com/office/drawing/2014/main" id="{08D2C7D8-9F85-4228-B2F2-8B108D86BB77}"/>
+              </a:ext>
+            </a:extLst>
+          </p:cNvPr>
+          <p:cNvGraphicFramePr>
+            <a:graphicFrameLocks noGrp="1"/>
+          </p:cNvGraphicFramePr>
+          <p:nvPr>
+            <p:extLst>
+              <p:ext uri="{D42A27DB-BD31-4B8C-83A1-F6EECF244321}">
+                <p14:modId xmlns:p14="http://schemas.microsoft.com/office/powerpoint/2010/main" val="3170007013"/>
+              </p:ext>
+            </p:extLst>
+          </p:nvPr>
+        </p:nvGraphicFramePr>
+        <p:xfrm>
+          <a:off x="6840226" y="2906771"/>
+          <a:ext cx="4611395" cy="1089728"/>
+        </p:xfrm>
+        <a:graphic>
+          <a:graphicData uri="http://schemas.openxmlformats.org/drawingml/2006/table">
+            <a:tbl>
+              <a:tblPr firstRow="1" bandRow="1">
+                <a:tableStyleId>{073A0DAA-6AF3-43AB-8588-CEC1D06C72B9}</a:tableStyleId>
+              </a:tblPr>
+              <a:tblGrid>
+                <a:gridCol w="4611395">
+                  <a:extLst>
+                    <a:ext uri="{9D8B030D-6E8A-4147-A177-3AD203B41FA5}">
+                      <a16:colId xmlns:a16="http://schemas.microsoft.com/office/drawing/2014/main" val="2478899434"/>
+                    </a:ext>
+                  </a:extLst>
+                </a:gridCol>
+              </a:tblGrid>
+              <a:tr h="511685">
+                <a:tc>
+                  <a:txBody>
+                    <a:bodyPr/>
+                    <a:lstStyle/>
+                    <a:p>
+                      <a:r>
+                        <a:rPr lang="en-US" dirty="0" err="1"/>
+                        <a:t>amenities_count</a:t>
+                      </a:r>
+                      <a:endParaRPr lang="en-CA" dirty="0"/>
+                    </a:p>
+                  </a:txBody>
+                  <a:tcPr/>
+                </a:tc>
+                <a:extLst>
+                  <a:ext uri="{0D108BD9-81ED-4DB2-BD59-A6C34878D82A}">
+                    <a16:rowId xmlns:a16="http://schemas.microsoft.com/office/drawing/2014/main" val="2665256824"/>
+                  </a:ext>
+                </a:extLst>
+              </a:tr>
+              <a:tr h="578043">
+                <a:tc>
+                  <a:txBody>
+                    <a:bodyPr/>
+                    <a:lstStyle/>
+                    <a:p>
+                      <a:r>
+                        <a:rPr lang="en-US" dirty="0"/>
+                        <a:t>4</a:t>
+                      </a:r>
+                      <a:endParaRPr lang="en-CA" dirty="0"/>
+                    </a:p>
+                  </a:txBody>
+                  <a:tcPr/>
+                </a:tc>
+                <a:extLst>
+                  <a:ext uri="{0D108BD9-81ED-4DB2-BD59-A6C34878D82A}">
+                    <a16:rowId xmlns:a16="http://schemas.microsoft.com/office/drawing/2014/main" val="1667322077"/>
+                  </a:ext>
+                </a:extLst>
+              </a:tr>
+            </a:tbl>
+          </a:graphicData>
+        </a:graphic>
+      </p:graphicFrame>
     </p:spTree>
     <p:extLst>
       <p:ext uri="{BB962C8B-B14F-4D97-AF65-F5344CB8AC3E}">
@@ -7887,7 +7677,7 @@
           <a:p>
             <a:r>
               <a:rPr lang="en-US" dirty="0"/>
-              <a:t>1. Numerical Data – Impute Missing Values</a:t>
+              <a:t>1. Imputing Missing Numerical Data</a:t>
             </a:r>
             <a:endParaRPr lang="en-CA" dirty="0"/>
           </a:p>
@@ -8233,7 +8023,7 @@
           <a:p>
             <a:r>
               <a:rPr lang="en-US" dirty="0"/>
-              <a:t>2. Categorical Data – Encode</a:t>
+              <a:t>2. Encoding Categorical Data</a:t>
             </a:r>
             <a:endParaRPr lang="en-CA" dirty="0"/>
           </a:p>
@@ -8387,7 +8177,7 @@
           <a:p>
             <a:r>
               <a:rPr lang="en-US" dirty="0"/>
-              <a:t>3. Text Data - Vectorize</a:t>
+              <a:t>3. Vectorizing Text Data </a:t>
             </a:r>
             <a:endParaRPr lang="en-CA" dirty="0"/>
           </a:p>
@@ -8514,7 +8304,7 @@
     </p:spTree>
     <p:extLst>
       <p:ext uri="{BB962C8B-B14F-4D97-AF65-F5344CB8AC3E}">
-        <p14:creationId xmlns:p14="http://schemas.microsoft.com/office/powerpoint/2010/main" val="3565089974"/>
+        <p14:creationId xmlns:p14="http://schemas.microsoft.com/office/powerpoint/2010/main" val="3207546834"/>
       </p:ext>
     </p:extLst>
   </p:cSld>
@@ -8672,10 +8462,10 @@
       </p:cxnSp>
       <p:sp>
         <p:nvSpPr>
-          <p:cNvPr id="7" name="TextBox 6">
-            <a:extLst>
-              <a:ext uri="{FF2B5EF4-FFF2-40B4-BE49-F238E27FC236}">
-                <a16:creationId xmlns:a16="http://schemas.microsoft.com/office/drawing/2014/main" id="{1865850F-F88F-4006-B3AA-72BCC3C8DC47}"/>
+          <p:cNvPr id="3" name="TextBox 2">
+            <a:extLst>
+              <a:ext uri="{FF2B5EF4-FFF2-40B4-BE49-F238E27FC236}">
+                <a16:creationId xmlns:a16="http://schemas.microsoft.com/office/drawing/2014/main" id="{30193E11-24DC-41C6-98FD-B1F7EC80C36D}"/>
               </a:ext>
             </a:extLst>
           </p:cNvPr>
@@ -8684,8 +8474,8 @@
         </p:nvSpPr>
         <p:spPr>
           <a:xfrm>
-            <a:off x="957258" y="1935605"/>
-            <a:ext cx="4583645" cy="369332"/>
+            <a:off x="975854" y="1986170"/>
+            <a:ext cx="10052930" cy="369332"/>
           </a:xfrm>
           <a:prstGeom prst="rect">
             <a:avLst/>
@@ -8700,7 +8490,7 @@
           <a:p>
             <a:r>
               <a:rPr lang="en-US" dirty="0"/>
-              <a:t>1. Numerical Data – Impute Missing Values</a:t>
+              <a:t>4.  Normalizing Data </a:t>
             </a:r>
             <a:endParaRPr lang="en-CA" dirty="0"/>
           </a:p>
@@ -8708,10 +8498,10 @@
       </p:sp>
       <p:pic>
         <p:nvPicPr>
-          <p:cNvPr id="8" name="Picture 7">
-            <a:extLst>
-              <a:ext uri="{FF2B5EF4-FFF2-40B4-BE49-F238E27FC236}">
-                <a16:creationId xmlns:a16="http://schemas.microsoft.com/office/drawing/2014/main" id="{0028919E-1E36-4323-863A-5D6F88EFE6F2}"/>
+          <p:cNvPr id="24" name="Picture 23" descr="Shape&#10;&#10;Description automatically generated">
+            <a:extLst>
+              <a:ext uri="{FF2B5EF4-FFF2-40B4-BE49-F238E27FC236}">
+                <a16:creationId xmlns:a16="http://schemas.microsoft.com/office/drawing/2014/main" id="{B9BB8CC3-7E67-4727-85D8-D15B7BC3EDDD}"/>
               </a:ext>
             </a:extLst>
           </p:cNvPr>
@@ -8728,20 +8518,110 @@
         </p:blipFill>
         <p:spPr>
           <a:xfrm>
-            <a:off x="1013189" y="2304937"/>
-            <a:ext cx="1152574" cy="959328"/>
+            <a:off x="823359" y="4502499"/>
+            <a:ext cx="3482149" cy="2180569"/>
           </a:xfrm>
           <a:prstGeom prst="rect">
             <a:avLst/>
           </a:prstGeom>
         </p:spPr>
       </p:pic>
-      <p:sp>
-        <p:nvSpPr>
-          <p:cNvPr id="9" name="Arrow: Right 8">
-            <a:extLst>
-              <a:ext uri="{FF2B5EF4-FFF2-40B4-BE49-F238E27FC236}">
-                <a16:creationId xmlns:a16="http://schemas.microsoft.com/office/drawing/2014/main" id="{DA358ABB-CEBD-4DBB-99CA-634454236DEB}"/>
+      <p:pic>
+        <p:nvPicPr>
+          <p:cNvPr id="26" name="Picture 25" descr="Chart, histogram&#10;&#10;Description automatically generated">
+            <a:extLst>
+              <a:ext uri="{FF2B5EF4-FFF2-40B4-BE49-F238E27FC236}">
+                <a16:creationId xmlns:a16="http://schemas.microsoft.com/office/drawing/2014/main" id="{A10DB8E1-4FF7-418D-BF81-9DF24A091652}"/>
+              </a:ext>
+            </a:extLst>
+          </p:cNvPr>
+          <p:cNvPicPr>
+            <a:picLocks noChangeAspect="1"/>
+          </p:cNvPicPr>
+          <p:nvPr/>
+        </p:nvPicPr>
+        <p:blipFill>
+          <a:blip r:embed="rId5"/>
+          <a:stretch>
+            <a:fillRect/>
+          </a:stretch>
+        </p:blipFill>
+        <p:spPr>
+          <a:xfrm>
+            <a:off x="7012450" y="2340338"/>
+            <a:ext cx="3482149" cy="2231280"/>
+          </a:xfrm>
+          <a:prstGeom prst="rect">
+            <a:avLst/>
+          </a:prstGeom>
+        </p:spPr>
+      </p:pic>
+      <p:pic>
+        <p:nvPicPr>
+          <p:cNvPr id="28" name="Picture 27" descr="Shape&#10;&#10;Description automatically generated">
+            <a:extLst>
+              <a:ext uri="{FF2B5EF4-FFF2-40B4-BE49-F238E27FC236}">
+                <a16:creationId xmlns:a16="http://schemas.microsoft.com/office/drawing/2014/main" id="{D387D988-FBE0-40B6-BE19-490A1FDF03CB}"/>
+              </a:ext>
+            </a:extLst>
+          </p:cNvPr>
+          <p:cNvPicPr>
+            <a:picLocks noChangeAspect="1"/>
+          </p:cNvPicPr>
+          <p:nvPr/>
+        </p:nvPicPr>
+        <p:blipFill>
+          <a:blip r:embed="rId6"/>
+          <a:stretch>
+            <a:fillRect/>
+          </a:stretch>
+        </p:blipFill>
+        <p:spPr>
+          <a:xfrm>
+            <a:off x="857069" y="2325173"/>
+            <a:ext cx="3504687" cy="2231280"/>
+          </a:xfrm>
+          <a:prstGeom prst="rect">
+            <a:avLst/>
+          </a:prstGeom>
+        </p:spPr>
+      </p:pic>
+      <p:pic>
+        <p:nvPicPr>
+          <p:cNvPr id="30" name="Picture 29" descr="Chart, histogram&#10;&#10;Description automatically generated">
+            <a:extLst>
+              <a:ext uri="{FF2B5EF4-FFF2-40B4-BE49-F238E27FC236}">
+                <a16:creationId xmlns:a16="http://schemas.microsoft.com/office/drawing/2014/main" id="{487734C5-23B7-4D65-9D50-3812F6EB4E95}"/>
+              </a:ext>
+            </a:extLst>
+          </p:cNvPr>
+          <p:cNvPicPr>
+            <a:picLocks noChangeAspect="1"/>
+          </p:cNvPicPr>
+          <p:nvPr/>
+        </p:nvPicPr>
+        <p:blipFill>
+          <a:blip r:embed="rId7"/>
+          <a:stretch>
+            <a:fillRect/>
+          </a:stretch>
+        </p:blipFill>
+        <p:spPr>
+          <a:xfrm>
+            <a:off x="7068698" y="4502498"/>
+            <a:ext cx="3482149" cy="2180569"/>
+          </a:xfrm>
+          <a:prstGeom prst="rect">
+            <a:avLst/>
+          </a:prstGeom>
+        </p:spPr>
+      </p:pic>
+      <p:sp>
+        <p:nvSpPr>
+          <p:cNvPr id="32" name="Arrow: Right 31">
+            <a:extLst>
+              <a:ext uri="{FF2B5EF4-FFF2-40B4-BE49-F238E27FC236}">
+                <a16:creationId xmlns:a16="http://schemas.microsoft.com/office/drawing/2014/main" id="{C96885B1-378A-4AD3-A948-77D3FF6628BA}"/>
               </a:ext>
             </a:extLst>
           </p:cNvPr>
@@ -8750,8 +8630,8 @@
         </p:nvSpPr>
         <p:spPr>
           <a:xfrm>
-            <a:off x="2792164" y="2784601"/>
-            <a:ext cx="552893" cy="352089"/>
+            <a:off x="5382533" y="3480802"/>
+            <a:ext cx="954767" cy="1701830"/>
           </a:xfrm>
           <a:prstGeom prst="rightArrow">
             <a:avLst/>
@@ -8794,249 +8674,67 @@
           </a:p>
         </p:txBody>
       </p:sp>
-      <p:pic>
-        <p:nvPicPr>
-          <p:cNvPr id="10" name="Picture 9">
-            <a:extLst>
-              <a:ext uri="{FF2B5EF4-FFF2-40B4-BE49-F238E27FC236}">
-                <a16:creationId xmlns:a16="http://schemas.microsoft.com/office/drawing/2014/main" id="{9B59E3D0-4537-41D9-90DE-A1ACFAEE402F}"/>
-              </a:ext>
-            </a:extLst>
-          </p:cNvPr>
-          <p:cNvPicPr>
-            <a:picLocks noChangeAspect="1"/>
-          </p:cNvPicPr>
+      <p:sp>
+        <p:nvSpPr>
+          <p:cNvPr id="2048" name="TextBox 2047">
+            <a:extLst>
+              <a:ext uri="{FF2B5EF4-FFF2-40B4-BE49-F238E27FC236}">
+                <a16:creationId xmlns:a16="http://schemas.microsoft.com/office/drawing/2014/main" id="{9E617A20-72C8-4A71-A613-5884ED092595}"/>
+              </a:ext>
+            </a:extLst>
+          </p:cNvPr>
+          <p:cNvSpPr txBox="1"/>
           <p:nvPr/>
-        </p:nvPicPr>
-        <p:blipFill>
-          <a:blip r:embed="rId5"/>
-          <a:stretch>
-            <a:fillRect/>
-          </a:stretch>
-        </p:blipFill>
+        </p:nvSpPr>
         <p:spPr>
           <a:xfrm>
-            <a:off x="8199437" y="2612655"/>
-            <a:ext cx="1559822" cy="629402"/>
-          </a:xfrm>
-          <a:prstGeom prst="rect">
-            <a:avLst/>
-          </a:prstGeom>
-        </p:spPr>
-      </p:pic>
-      <p:sp>
-        <p:nvSpPr>
-          <p:cNvPr id="11" name="Rectangle 10">
-            <a:extLst>
-              <a:ext uri="{FF2B5EF4-FFF2-40B4-BE49-F238E27FC236}">
-                <a16:creationId xmlns:a16="http://schemas.microsoft.com/office/drawing/2014/main" id="{2ACC4B44-271A-489E-88BE-398A531DD335}"/>
-              </a:ext>
-            </a:extLst>
-          </p:cNvPr>
-          <p:cNvSpPr/>
-          <p:nvPr/>
-        </p:nvSpPr>
-        <p:spPr>
-          <a:xfrm>
-            <a:off x="9032965" y="2981269"/>
-            <a:ext cx="726294" cy="282997"/>
+            <a:off x="4884175" y="2425419"/>
+            <a:ext cx="1790700" cy="646331"/>
           </a:xfrm>
           <a:prstGeom prst="rect">
             <a:avLst/>
           </a:prstGeom>
           <a:noFill/>
-          <a:ln w="28575">
-            <a:solidFill>
-              <a:srgbClr val="EA6155"/>
-            </a:solidFill>
-          </a:ln>
-        </p:spPr>
-        <p:style>
-          <a:lnRef idx="2">
-            <a:schemeClr val="accent1">
-              <a:shade val="50000"/>
-            </a:schemeClr>
-          </a:lnRef>
-          <a:fillRef idx="1">
-            <a:schemeClr val="accent1"/>
-          </a:fillRef>
-          <a:effectRef idx="0">
-            <a:schemeClr val="accent1"/>
-          </a:effectRef>
-          <a:fontRef idx="minor">
-            <a:schemeClr val="lt1"/>
-          </a:fontRef>
-        </p:style>
-        <p:txBody>
-          <a:bodyPr rtlCol="0" anchor="ctr"/>
-          <a:lstStyle/>
-          <a:p>
-            <a:pPr algn="ctr"/>
-            <a:endParaRPr lang="en-CA"/>
-          </a:p>
-        </p:txBody>
-      </p:sp>
-      <p:sp>
-        <p:nvSpPr>
-          <p:cNvPr id="12" name="Rectangle 11">
-            <a:extLst>
-              <a:ext uri="{FF2B5EF4-FFF2-40B4-BE49-F238E27FC236}">
-                <a16:creationId xmlns:a16="http://schemas.microsoft.com/office/drawing/2014/main" id="{6A223A28-B730-4B94-B885-F9A86FB05512}"/>
-              </a:ext>
-            </a:extLst>
-          </p:cNvPr>
-          <p:cNvSpPr/>
+        </p:spPr>
+        <p:txBody>
+          <a:bodyPr wrap="square" rtlCol="0">
+            <a:spAutoFit/>
+          </a:bodyPr>
+          <a:lstStyle/>
+          <a:p>
+            <a:r>
+              <a:rPr lang="en-US" dirty="0" err="1"/>
+              <a:t>Neighbourhood</a:t>
+            </a:r>
+            <a:r>
+              <a:rPr lang="en-US" dirty="0"/>
+              <a:t> Over 100 Listings</a:t>
+            </a:r>
+            <a:endParaRPr lang="en-CA" dirty="0"/>
+          </a:p>
+        </p:txBody>
+      </p:sp>
+      <p:sp>
+        <p:nvSpPr>
+          <p:cNvPr id="35" name="TextBox 34">
+            <a:extLst>
+              <a:ext uri="{FF2B5EF4-FFF2-40B4-BE49-F238E27FC236}">
+                <a16:creationId xmlns:a16="http://schemas.microsoft.com/office/drawing/2014/main" id="{A5DC83BF-506A-4F89-AB3A-D9AB2C410C96}"/>
+              </a:ext>
+            </a:extLst>
+          </p:cNvPr>
+          <p:cNvSpPr txBox="1"/>
           <p:nvPr/>
         </p:nvSpPr>
         <p:spPr>
           <a:xfrm>
-            <a:off x="1775966" y="2635886"/>
-            <a:ext cx="389797" cy="628380"/>
+            <a:off x="4884175" y="5469925"/>
+            <a:ext cx="1790700" cy="646331"/>
           </a:xfrm>
           <a:prstGeom prst="rect">
             <a:avLst/>
           </a:prstGeom>
           <a:noFill/>
-          <a:ln w="28575">
-            <a:solidFill>
-              <a:srgbClr val="EA6155"/>
-            </a:solidFill>
-          </a:ln>
-        </p:spPr>
-        <p:style>
-          <a:lnRef idx="2">
-            <a:schemeClr val="accent1">
-              <a:shade val="50000"/>
-            </a:schemeClr>
-          </a:lnRef>
-          <a:fillRef idx="1">
-            <a:schemeClr val="accent1"/>
-          </a:fillRef>
-          <a:effectRef idx="0">
-            <a:schemeClr val="accent1"/>
-          </a:effectRef>
-          <a:fontRef idx="minor">
-            <a:schemeClr val="lt1"/>
-          </a:fontRef>
-        </p:style>
-        <p:txBody>
-          <a:bodyPr rtlCol="0" anchor="ctr"/>
-          <a:lstStyle/>
-          <a:p>
-            <a:pPr algn="ctr"/>
-            <a:endParaRPr lang="en-CA"/>
-          </a:p>
-        </p:txBody>
-      </p:sp>
-      <p:pic>
-        <p:nvPicPr>
-          <p:cNvPr id="13" name="Picture 12">
-            <a:extLst>
-              <a:ext uri="{FF2B5EF4-FFF2-40B4-BE49-F238E27FC236}">
-                <a16:creationId xmlns:a16="http://schemas.microsoft.com/office/drawing/2014/main" id="{1523FCCC-D0DE-4C78-8762-DB4ADA8FEF40}"/>
-              </a:ext>
-            </a:extLst>
-          </p:cNvPr>
-          <p:cNvPicPr>
-            <a:picLocks noChangeAspect="1"/>
-          </p:cNvPicPr>
-          <p:nvPr/>
-        </p:nvPicPr>
-        <p:blipFill>
-          <a:blip r:embed="rId6"/>
-          <a:stretch>
-            <a:fillRect/>
-          </a:stretch>
-        </p:blipFill>
-        <p:spPr>
-          <a:xfrm>
-            <a:off x="3886096" y="2606616"/>
-            <a:ext cx="2572168" cy="628380"/>
-          </a:xfrm>
-          <a:prstGeom prst="rect">
-            <a:avLst/>
-          </a:prstGeom>
-        </p:spPr>
-      </p:pic>
-      <p:sp>
-        <p:nvSpPr>
-          <p:cNvPr id="15" name="Arrow: Right 14">
-            <a:extLst>
-              <a:ext uri="{FF2B5EF4-FFF2-40B4-BE49-F238E27FC236}">
-                <a16:creationId xmlns:a16="http://schemas.microsoft.com/office/drawing/2014/main" id="{404B15BF-25FD-412E-9A04-7F882754FD89}"/>
-              </a:ext>
-            </a:extLst>
-          </p:cNvPr>
-          <p:cNvSpPr/>
-          <p:nvPr/>
-        </p:nvSpPr>
-        <p:spPr>
-          <a:xfrm>
-            <a:off x="7041741" y="2803229"/>
-            <a:ext cx="552893" cy="352089"/>
-          </a:xfrm>
-          <a:prstGeom prst="rightArrow">
-            <a:avLst/>
-          </a:prstGeom>
-          <a:solidFill>
-            <a:schemeClr val="bg2">
-              <a:lumMod val="75000"/>
-            </a:schemeClr>
-          </a:solidFill>
-          <a:ln>
-            <a:solidFill>
-              <a:schemeClr val="bg2">
-                <a:lumMod val="75000"/>
-              </a:schemeClr>
-            </a:solidFill>
-          </a:ln>
-        </p:spPr>
-        <p:style>
-          <a:lnRef idx="2">
-            <a:schemeClr val="accent1">
-              <a:shade val="50000"/>
-            </a:schemeClr>
-          </a:lnRef>
-          <a:fillRef idx="1">
-            <a:schemeClr val="accent1"/>
-          </a:fillRef>
-          <a:effectRef idx="0">
-            <a:schemeClr val="accent1"/>
-          </a:effectRef>
-          <a:fontRef idx="minor">
-            <a:schemeClr val="lt1"/>
-          </a:fontRef>
-        </p:style>
-        <p:txBody>
-          <a:bodyPr rtlCol="0" anchor="ctr"/>
-          <a:lstStyle/>
-          <a:p>
-            <a:pPr algn="ctr"/>
-            <a:endParaRPr lang="en-CA"/>
-          </a:p>
-        </p:txBody>
-      </p:sp>
-      <p:sp>
-        <p:nvSpPr>
-          <p:cNvPr id="16" name="TextBox 15">
-            <a:extLst>
-              <a:ext uri="{FF2B5EF4-FFF2-40B4-BE49-F238E27FC236}">
-                <a16:creationId xmlns:a16="http://schemas.microsoft.com/office/drawing/2014/main" id="{DF7416E9-F43B-4AB6-8689-50D5C4C4BB22}"/>
-              </a:ext>
-            </a:extLst>
-          </p:cNvPr>
-          <p:cNvSpPr txBox="1"/>
-          <p:nvPr/>
-        </p:nvSpPr>
-        <p:spPr>
-          <a:xfrm>
-            <a:off x="975854" y="3503410"/>
-            <a:ext cx="4797517" cy="369332"/>
-          </a:xfrm>
-          <a:prstGeom prst="rect">
-            <a:avLst/>
-          </a:prstGeom>
-          <a:noFill/>
         </p:spPr>
         <p:txBody>
           <a:bodyPr wrap="square" rtlCol="0">
@@ -9046,288 +8744,16 @@
           <a:p>
             <a:r>
               <a:rPr lang="en-US" dirty="0"/>
-              <a:t>2. Categorical Data – Encode</a:t>
+              <a:t>Listing Prices Under 600</a:t>
             </a:r>
             <a:endParaRPr lang="en-CA" dirty="0"/>
           </a:p>
         </p:txBody>
       </p:sp>
-      <p:sp>
-        <p:nvSpPr>
-          <p:cNvPr id="17" name="Arrow: Right 16">
-            <a:extLst>
-              <a:ext uri="{FF2B5EF4-FFF2-40B4-BE49-F238E27FC236}">
-                <a16:creationId xmlns:a16="http://schemas.microsoft.com/office/drawing/2014/main" id="{DC6FBA63-237E-47CE-A963-3821E3F4F252}"/>
-              </a:ext>
-            </a:extLst>
-          </p:cNvPr>
-          <p:cNvSpPr/>
-          <p:nvPr/>
-        </p:nvSpPr>
-        <p:spPr>
-          <a:xfrm>
-            <a:off x="2795027" y="4456461"/>
-            <a:ext cx="552893" cy="352089"/>
-          </a:xfrm>
-          <a:prstGeom prst="rightArrow">
-            <a:avLst/>
-          </a:prstGeom>
-          <a:solidFill>
-            <a:schemeClr val="bg2">
-              <a:lumMod val="75000"/>
-            </a:schemeClr>
-          </a:solidFill>
-          <a:ln>
-            <a:solidFill>
-              <a:schemeClr val="bg2">
-                <a:lumMod val="75000"/>
-              </a:schemeClr>
-            </a:solidFill>
-          </a:ln>
-        </p:spPr>
-        <p:style>
-          <a:lnRef idx="2">
-            <a:schemeClr val="accent1">
-              <a:shade val="50000"/>
-            </a:schemeClr>
-          </a:lnRef>
-          <a:fillRef idx="1">
-            <a:schemeClr val="accent1"/>
-          </a:fillRef>
-          <a:effectRef idx="0">
-            <a:schemeClr val="accent1"/>
-          </a:effectRef>
-          <a:fontRef idx="minor">
-            <a:schemeClr val="lt1"/>
-          </a:fontRef>
-        </p:style>
-        <p:txBody>
-          <a:bodyPr rtlCol="0" anchor="ctr"/>
-          <a:lstStyle/>
-          <a:p>
-            <a:pPr algn="ctr"/>
-            <a:endParaRPr lang="en-CA"/>
-          </a:p>
-        </p:txBody>
-      </p:sp>
-      <p:pic>
-        <p:nvPicPr>
-          <p:cNvPr id="18" name="Picture 17">
-            <a:extLst>
-              <a:ext uri="{FF2B5EF4-FFF2-40B4-BE49-F238E27FC236}">
-                <a16:creationId xmlns:a16="http://schemas.microsoft.com/office/drawing/2014/main" id="{1AE78CD3-F9E1-4165-A46B-4D09B040E6F2}"/>
-              </a:ext>
-            </a:extLst>
-          </p:cNvPr>
-          <p:cNvPicPr>
-            <a:picLocks noChangeAspect="1"/>
-          </p:cNvPicPr>
-          <p:nvPr/>
-        </p:nvPicPr>
-        <p:blipFill>
-          <a:blip r:embed="rId7"/>
-          <a:stretch>
-            <a:fillRect/>
-          </a:stretch>
-        </p:blipFill>
-        <p:spPr>
-          <a:xfrm>
-            <a:off x="1072717" y="4037153"/>
-            <a:ext cx="623138" cy="838615"/>
-          </a:xfrm>
-          <a:prstGeom prst="rect">
-            <a:avLst/>
-          </a:prstGeom>
-        </p:spPr>
-      </p:pic>
-      <p:pic>
-        <p:nvPicPr>
-          <p:cNvPr id="19" name="Picture 18">
-            <a:extLst>
-              <a:ext uri="{FF2B5EF4-FFF2-40B4-BE49-F238E27FC236}">
-                <a16:creationId xmlns:a16="http://schemas.microsoft.com/office/drawing/2014/main" id="{ACD958EF-27E4-413F-B65B-E87C0C4488E7}"/>
-              </a:ext>
-            </a:extLst>
-          </p:cNvPr>
-          <p:cNvPicPr>
-            <a:picLocks noChangeAspect="1"/>
-          </p:cNvPicPr>
-          <p:nvPr/>
-        </p:nvPicPr>
-        <p:blipFill>
-          <a:blip r:embed="rId8"/>
-          <a:stretch>
-            <a:fillRect/>
-          </a:stretch>
-        </p:blipFill>
-        <p:spPr>
-          <a:xfrm>
-            <a:off x="3875236" y="4089028"/>
-            <a:ext cx="688257" cy="901853"/>
-          </a:xfrm>
-          <a:prstGeom prst="rect">
-            <a:avLst/>
-          </a:prstGeom>
-        </p:spPr>
-      </p:pic>
-      <p:sp>
-        <p:nvSpPr>
-          <p:cNvPr id="20" name="TextBox 19">
-            <a:extLst>
-              <a:ext uri="{FF2B5EF4-FFF2-40B4-BE49-F238E27FC236}">
-                <a16:creationId xmlns:a16="http://schemas.microsoft.com/office/drawing/2014/main" id="{402E63BF-3E80-4CD6-BBC0-2D1687E375A9}"/>
-              </a:ext>
-            </a:extLst>
-          </p:cNvPr>
-          <p:cNvSpPr txBox="1"/>
-          <p:nvPr/>
-        </p:nvSpPr>
-        <p:spPr>
-          <a:xfrm>
-            <a:off x="975854" y="5092054"/>
-            <a:ext cx="3418873" cy="369332"/>
-          </a:xfrm>
-          <a:prstGeom prst="rect">
-            <a:avLst/>
-          </a:prstGeom>
-          <a:noFill/>
-        </p:spPr>
-        <p:txBody>
-          <a:bodyPr wrap="square" rtlCol="0">
-            <a:spAutoFit/>
-          </a:bodyPr>
-          <a:lstStyle/>
-          <a:p>
-            <a:r>
-              <a:rPr lang="en-US" dirty="0"/>
-              <a:t>3. Text Data - Vectorize</a:t>
-            </a:r>
-            <a:endParaRPr lang="en-CA" dirty="0"/>
-          </a:p>
-        </p:txBody>
-      </p:sp>
-      <p:sp>
-        <p:nvSpPr>
-          <p:cNvPr id="21" name="Arrow: Right 20">
-            <a:extLst>
-              <a:ext uri="{FF2B5EF4-FFF2-40B4-BE49-F238E27FC236}">
-                <a16:creationId xmlns:a16="http://schemas.microsoft.com/office/drawing/2014/main" id="{79203AC8-B69E-4FB6-A3DD-4706710BD628}"/>
-              </a:ext>
-            </a:extLst>
-          </p:cNvPr>
-          <p:cNvSpPr/>
-          <p:nvPr/>
-        </p:nvSpPr>
-        <p:spPr>
-          <a:xfrm>
-            <a:off x="4703675" y="5748610"/>
-            <a:ext cx="552893" cy="352089"/>
-          </a:xfrm>
-          <a:prstGeom prst="rightArrow">
-            <a:avLst/>
-          </a:prstGeom>
-          <a:solidFill>
-            <a:schemeClr val="bg2">
-              <a:lumMod val="75000"/>
-            </a:schemeClr>
-          </a:solidFill>
-          <a:ln>
-            <a:solidFill>
-              <a:schemeClr val="bg2">
-                <a:lumMod val="75000"/>
-              </a:schemeClr>
-            </a:solidFill>
-          </a:ln>
-        </p:spPr>
-        <p:style>
-          <a:lnRef idx="2">
-            <a:schemeClr val="accent1">
-              <a:shade val="50000"/>
-            </a:schemeClr>
-          </a:lnRef>
-          <a:fillRef idx="1">
-            <a:schemeClr val="accent1"/>
-          </a:fillRef>
-          <a:effectRef idx="0">
-            <a:schemeClr val="accent1"/>
-          </a:effectRef>
-          <a:fontRef idx="minor">
-            <a:schemeClr val="lt1"/>
-          </a:fontRef>
-        </p:style>
-        <p:txBody>
-          <a:bodyPr rtlCol="0" anchor="ctr"/>
-          <a:lstStyle/>
-          <a:p>
-            <a:pPr algn="ctr"/>
-            <a:endParaRPr lang="en-CA"/>
-          </a:p>
-        </p:txBody>
-      </p:sp>
-      <p:pic>
-        <p:nvPicPr>
-          <p:cNvPr id="22" name="Picture 21">
-            <a:extLst>
-              <a:ext uri="{FF2B5EF4-FFF2-40B4-BE49-F238E27FC236}">
-                <a16:creationId xmlns:a16="http://schemas.microsoft.com/office/drawing/2014/main" id="{C3DF3974-8E72-452C-85F3-F1019B6B97ED}"/>
-              </a:ext>
-            </a:extLst>
-          </p:cNvPr>
-          <p:cNvPicPr>
-            <a:picLocks noChangeAspect="1"/>
-          </p:cNvPicPr>
-          <p:nvPr/>
-        </p:nvPicPr>
-        <p:blipFill>
-          <a:blip r:embed="rId9"/>
-          <a:stretch>
-            <a:fillRect/>
-          </a:stretch>
-        </p:blipFill>
-        <p:spPr>
-          <a:xfrm>
-            <a:off x="1073058" y="5748532"/>
-            <a:ext cx="2984212" cy="364587"/>
-          </a:xfrm>
-          <a:prstGeom prst="rect">
-            <a:avLst/>
-          </a:prstGeom>
-        </p:spPr>
-      </p:pic>
-      <p:pic>
-        <p:nvPicPr>
-          <p:cNvPr id="23" name="Picture 22">
-            <a:extLst>
-              <a:ext uri="{FF2B5EF4-FFF2-40B4-BE49-F238E27FC236}">
-                <a16:creationId xmlns:a16="http://schemas.microsoft.com/office/drawing/2014/main" id="{852F8D74-023E-438B-A73A-BDADEDFC73F7}"/>
-              </a:ext>
-            </a:extLst>
-          </p:cNvPr>
-          <p:cNvPicPr>
-            <a:picLocks noChangeAspect="1"/>
-          </p:cNvPicPr>
-          <p:nvPr/>
-        </p:nvPicPr>
-        <p:blipFill>
-          <a:blip r:embed="rId10"/>
-          <a:stretch>
-            <a:fillRect/>
-          </a:stretch>
-        </p:blipFill>
-        <p:spPr>
-          <a:xfrm>
-            <a:off x="5902973" y="5748531"/>
-            <a:ext cx="5736663" cy="364587"/>
-          </a:xfrm>
-          <a:prstGeom prst="rect">
-            <a:avLst/>
-          </a:prstGeom>
-        </p:spPr>
-      </p:pic>
     </p:spTree>
     <p:extLst>
       <p:ext uri="{BB962C8B-B14F-4D97-AF65-F5344CB8AC3E}">
-        <p14:creationId xmlns:p14="http://schemas.microsoft.com/office/powerpoint/2010/main" val="3207546834"/>
+        <p14:creationId xmlns:p14="http://schemas.microsoft.com/office/powerpoint/2010/main" val="2577355925"/>
       </p:ext>
     </p:extLst>
   </p:cSld>
@@ -9372,7 +8798,7 @@
         </p:nvSpPr>
         <p:spPr>
           <a:xfrm>
-            <a:off x="2721982" y="696475"/>
+            <a:off x="3371495" y="696475"/>
             <a:ext cx="10515600" cy="1325563"/>
           </a:xfrm>
         </p:spPr>
@@ -9388,7 +8814,7 @@
                   <a:srgbClr val="EA5E46"/>
                 </a:solidFill>
               </a:rPr>
-              <a:t>Model Data Transformation Methods</a:t>
+              <a:t>Model Data Transformation Breakdown</a:t>
             </a:r>
           </a:p>
         </p:txBody>
@@ -9422,7 +8848,7 @@
         </p:blipFill>
         <p:spPr bwMode="auto">
           <a:xfrm>
-            <a:off x="530564" y="108278"/>
+            <a:off x="1180077" y="108278"/>
             <a:ext cx="2189605" cy="2022038"/>
           </a:xfrm>
           <a:prstGeom prst="rect">
@@ -9456,7 +8882,7 @@
         </p:nvCxnSpPr>
         <p:spPr>
           <a:xfrm>
-            <a:off x="975854" y="1684829"/>
+            <a:off x="1625367" y="1684829"/>
             <a:ext cx="9518745" cy="1"/>
           </a:xfrm>
           <a:prstGeom prst="line">
@@ -9485,10 +8911,10 @@
       </p:cxnSp>
       <p:sp>
         <p:nvSpPr>
-          <p:cNvPr id="20" name="TextBox 19">
-            <a:extLst>
-              <a:ext uri="{FF2B5EF4-FFF2-40B4-BE49-F238E27FC236}">
-                <a16:creationId xmlns:a16="http://schemas.microsoft.com/office/drawing/2014/main" id="{928097DE-506F-40FC-B650-5B06916D277D}"/>
+          <p:cNvPr id="5" name="TextBox 4">
+            <a:extLst>
+              <a:ext uri="{FF2B5EF4-FFF2-40B4-BE49-F238E27FC236}">
+                <a16:creationId xmlns:a16="http://schemas.microsoft.com/office/drawing/2014/main" id="{3C66E404-41EF-44AC-ABB8-1EEB513C9DE3}"/>
               </a:ext>
             </a:extLst>
           </p:cNvPr>
@@ -9497,8 +8923,8 @@
         </p:nvSpPr>
         <p:spPr>
           <a:xfrm>
-            <a:off x="934645" y="2077437"/>
-            <a:ext cx="3418873" cy="369332"/>
+            <a:off x="946298" y="2022039"/>
+            <a:ext cx="4583645" cy="369332"/>
           </a:xfrm>
           <a:prstGeom prst="rect">
             <a:avLst/>
@@ -9513,18 +8939,48 @@
           <a:p>
             <a:r>
               <a:rPr lang="en-US" dirty="0"/>
-              <a:t>Text Data - Vectorize</a:t>
+              <a:t>Numerical Data – Impute Missing Values</a:t>
             </a:r>
             <a:endParaRPr lang="en-CA" dirty="0"/>
           </a:p>
         </p:txBody>
       </p:sp>
-      <p:sp>
-        <p:nvSpPr>
-          <p:cNvPr id="21" name="Arrow: Right 20">
-            <a:extLst>
-              <a:ext uri="{FF2B5EF4-FFF2-40B4-BE49-F238E27FC236}">
-                <a16:creationId xmlns:a16="http://schemas.microsoft.com/office/drawing/2014/main" id="{8EE0A187-602C-46F4-AD90-1D130DE5B185}"/>
+      <p:pic>
+        <p:nvPicPr>
+          <p:cNvPr id="9" name="Picture 8">
+            <a:extLst>
+              <a:ext uri="{FF2B5EF4-FFF2-40B4-BE49-F238E27FC236}">
+                <a16:creationId xmlns:a16="http://schemas.microsoft.com/office/drawing/2014/main" id="{5DFEE87E-C6D3-43BD-B9E3-E4588F1FAE24}"/>
+              </a:ext>
+            </a:extLst>
+          </p:cNvPr>
+          <p:cNvPicPr>
+            <a:picLocks noChangeAspect="1"/>
+          </p:cNvPicPr>
+          <p:nvPr/>
+        </p:nvPicPr>
+        <p:blipFill>
+          <a:blip r:embed="rId4"/>
+          <a:stretch>
+            <a:fillRect/>
+          </a:stretch>
+        </p:blipFill>
+        <p:spPr>
+          <a:xfrm>
+            <a:off x="1002229" y="2391371"/>
+            <a:ext cx="1152574" cy="959328"/>
+          </a:xfrm>
+          <a:prstGeom prst="rect">
+            <a:avLst/>
+          </a:prstGeom>
+        </p:spPr>
+      </p:pic>
+      <p:sp>
+        <p:nvSpPr>
+          <p:cNvPr id="10" name="Arrow: Right 9">
+            <a:extLst>
+              <a:ext uri="{FF2B5EF4-FFF2-40B4-BE49-F238E27FC236}">
+                <a16:creationId xmlns:a16="http://schemas.microsoft.com/office/drawing/2014/main" id="{CD17D319-9A92-45E9-85CA-D73F4333A977}"/>
               </a:ext>
             </a:extLst>
           </p:cNvPr>
@@ -9533,7 +8989,7 @@
         </p:nvSpPr>
         <p:spPr>
           <a:xfrm>
-            <a:off x="4662466" y="2733993"/>
+            <a:off x="2781204" y="2871035"/>
             <a:ext cx="552893" cy="352089"/>
           </a:xfrm>
           <a:prstGeom prst="rightArrow">
@@ -9579,40 +9035,10 @@
       </p:sp>
       <p:pic>
         <p:nvPicPr>
-          <p:cNvPr id="22" name="Picture 21">
-            <a:extLst>
-              <a:ext uri="{FF2B5EF4-FFF2-40B4-BE49-F238E27FC236}">
-                <a16:creationId xmlns:a16="http://schemas.microsoft.com/office/drawing/2014/main" id="{1072C1DE-BAE0-403D-A94C-645817C91119}"/>
-              </a:ext>
-            </a:extLst>
-          </p:cNvPr>
-          <p:cNvPicPr>
-            <a:picLocks noChangeAspect="1"/>
-          </p:cNvPicPr>
-          <p:nvPr/>
-        </p:nvPicPr>
-        <p:blipFill>
-          <a:blip r:embed="rId4"/>
-          <a:stretch>
-            <a:fillRect/>
-          </a:stretch>
-        </p:blipFill>
-        <p:spPr>
-          <a:xfrm>
-            <a:off x="1031849" y="2733915"/>
-            <a:ext cx="2984212" cy="364587"/>
-          </a:xfrm>
-          <a:prstGeom prst="rect">
-            <a:avLst/>
-          </a:prstGeom>
-        </p:spPr>
-      </p:pic>
-      <p:pic>
-        <p:nvPicPr>
-          <p:cNvPr id="23" name="Picture 22">
-            <a:extLst>
-              <a:ext uri="{FF2B5EF4-FFF2-40B4-BE49-F238E27FC236}">
-                <a16:creationId xmlns:a16="http://schemas.microsoft.com/office/drawing/2014/main" id="{7E7C315F-27FB-447F-AF8A-5C0E74ED0602}"/>
+          <p:cNvPr id="12" name="Picture 11">
+            <a:extLst>
+              <a:ext uri="{FF2B5EF4-FFF2-40B4-BE49-F238E27FC236}">
+                <a16:creationId xmlns:a16="http://schemas.microsoft.com/office/drawing/2014/main" id="{B3919613-C218-4BCD-A86F-E020C1E91AFE}"/>
               </a:ext>
             </a:extLst>
           </p:cNvPr>
@@ -9629,269 +9055,38 @@
         </p:blipFill>
         <p:spPr>
           <a:xfrm>
-            <a:off x="5861764" y="2733914"/>
-            <a:ext cx="5736663" cy="364587"/>
+            <a:off x="8188477" y="2699089"/>
+            <a:ext cx="1559822" cy="629402"/>
           </a:xfrm>
           <a:prstGeom prst="rect">
             <a:avLst/>
           </a:prstGeom>
         </p:spPr>
       </p:pic>
-    </p:spTree>
-    <p:extLst>
-      <p:ext uri="{BB962C8B-B14F-4D97-AF65-F5344CB8AC3E}">
-        <p14:creationId xmlns:p14="http://schemas.microsoft.com/office/powerpoint/2010/main" val="2577355925"/>
-      </p:ext>
-    </p:extLst>
-  </p:cSld>
-  <p:clrMapOvr>
-    <a:masterClrMapping/>
-  </p:clrMapOvr>
-</p:sld>
-</file>
-
-<file path=ppt/slides/slide7.xml><?xml version="1.0" encoding="utf-8"?>
-<p:sld xmlns:a="http://schemas.openxmlformats.org/drawingml/2006/main" xmlns:r="http://schemas.openxmlformats.org/officeDocument/2006/relationships" xmlns:p="http://schemas.openxmlformats.org/presentationml/2006/main">
-  <p:cSld>
-    <p:spTree>
-      <p:nvGrpSpPr>
-        <p:cNvPr id="1" name=""/>
-        <p:cNvGrpSpPr/>
-        <p:nvPr/>
-      </p:nvGrpSpPr>
-      <p:grpSpPr>
-        <a:xfrm>
-          <a:off x="0" y="0"/>
-          <a:ext cx="0" cy="0"/>
-          <a:chOff x="0" y="0"/>
-          <a:chExt cx="0" cy="0"/>
-        </a:xfrm>
-      </p:grpSpPr>
-      <p:sp>
-        <p:nvSpPr>
-          <p:cNvPr id="2" name="Title 1">
-            <a:extLst>
-              <a:ext uri="{FF2B5EF4-FFF2-40B4-BE49-F238E27FC236}">
-                <a16:creationId xmlns:a16="http://schemas.microsoft.com/office/drawing/2014/main" id="{59B8B577-5676-3C4B-A107-E41DB331FD85}"/>
-              </a:ext>
-            </a:extLst>
-          </p:cNvPr>
-          <p:cNvSpPr>
-            <a:spLocks noGrp="1"/>
-          </p:cNvSpPr>
-          <p:nvPr>
-            <p:ph type="title"/>
-          </p:nvPr>
+      <p:sp>
+        <p:nvSpPr>
+          <p:cNvPr id="13" name="Rectangle 12">
+            <a:extLst>
+              <a:ext uri="{FF2B5EF4-FFF2-40B4-BE49-F238E27FC236}">
+                <a16:creationId xmlns:a16="http://schemas.microsoft.com/office/drawing/2014/main" id="{EDC53F4A-537D-43ED-BF9C-54DB52A0EBE7}"/>
+              </a:ext>
+            </a:extLst>
+          </p:cNvPr>
+          <p:cNvSpPr/>
+          <p:nvPr/>
         </p:nvSpPr>
         <p:spPr>
           <a:xfrm>
-            <a:off x="3371495" y="696475"/>
-            <a:ext cx="10515600" cy="1325563"/>
-          </a:xfrm>
-        </p:spPr>
-        <p:txBody>
-          <a:bodyPr>
-            <a:normAutofit/>
-          </a:bodyPr>
-          <a:lstStyle/>
-          <a:p>
-            <a:r>
-              <a:rPr lang="en-US" sz="4000" dirty="0">
-                <a:solidFill>
-                  <a:srgbClr val="EA5E46"/>
-                </a:solidFill>
-              </a:rPr>
-              <a:t>Model Data Transformation Breakdown</a:t>
-            </a:r>
-          </a:p>
-        </p:txBody>
-      </p:sp>
-      <p:pic>
-        <p:nvPicPr>
-          <p:cNvPr id="2050" name="Picture 2" descr="Image result for air bnb logo">
-            <a:extLst>
-              <a:ext uri="{FF2B5EF4-FFF2-40B4-BE49-F238E27FC236}">
-                <a16:creationId xmlns:a16="http://schemas.microsoft.com/office/drawing/2014/main" id="{A162C291-208B-BE48-BF44-7D5CD7EF6151}"/>
-              </a:ext>
-            </a:extLst>
-          </p:cNvPr>
-          <p:cNvPicPr>
-            <a:picLocks noChangeAspect="1" noChangeArrowheads="1"/>
-          </p:cNvPicPr>
-          <p:nvPr/>
-        </p:nvPicPr>
-        <p:blipFill>
-          <a:blip r:embed="rId3">
-            <a:extLst>
-              <a:ext uri="{28A0092B-C50C-407E-A947-70E740481C1C}">
-                <a14:useLocalDpi xmlns:a14="http://schemas.microsoft.com/office/drawing/2010/main" val="0"/>
-              </a:ext>
-            </a:extLst>
-          </a:blip>
-          <a:srcRect/>
-          <a:stretch>
-            <a:fillRect/>
-          </a:stretch>
-        </p:blipFill>
-        <p:spPr bwMode="auto">
-          <a:xfrm>
-            <a:off x="1180077" y="108278"/>
-            <a:ext cx="2189605" cy="2022038"/>
+            <a:off x="9022005" y="3067703"/>
+            <a:ext cx="726294" cy="282997"/>
           </a:xfrm>
           <a:prstGeom prst="rect">
             <a:avLst/>
           </a:prstGeom>
           <a:noFill/>
-          <a:extLst>
-            <a:ext uri="{909E8E84-426E-40DD-AFC4-6F175D3DCCD1}">
-              <a14:hiddenFill xmlns:a14="http://schemas.microsoft.com/office/drawing/2010/main">
-                <a:solidFill>
-                  <a:srgbClr val="FFFFFF"/>
-                </a:solidFill>
-              </a14:hiddenFill>
-            </a:ext>
-          </a:extLst>
-        </p:spPr>
-      </p:pic>
-      <p:cxnSp>
-        <p:nvCxnSpPr>
-          <p:cNvPr id="6" name="Straight Connector 5">
-            <a:extLst>
-              <a:ext uri="{FF2B5EF4-FFF2-40B4-BE49-F238E27FC236}">
-                <a16:creationId xmlns:a16="http://schemas.microsoft.com/office/drawing/2014/main" id="{7D0926DC-6298-B648-9DF9-0D78D09F9FC8}"/>
-              </a:ext>
-            </a:extLst>
-          </p:cNvPr>
-          <p:cNvCxnSpPr>
-            <a:cxnSpLocks/>
-          </p:cNvCxnSpPr>
-          <p:nvPr/>
-        </p:nvCxnSpPr>
-        <p:spPr>
-          <a:xfrm>
-            <a:off x="1625367" y="1684829"/>
-            <a:ext cx="9518745" cy="1"/>
-          </a:xfrm>
-          <a:prstGeom prst="line">
-            <a:avLst/>
-          </a:prstGeom>
-          <a:ln w="12700">
+          <a:ln w="28575">
             <a:solidFill>
-              <a:srgbClr val="EA5E46"/>
-            </a:solidFill>
-          </a:ln>
-        </p:spPr>
-        <p:style>
-          <a:lnRef idx="1">
-            <a:schemeClr val="accent2"/>
-          </a:lnRef>
-          <a:fillRef idx="0">
-            <a:schemeClr val="accent2"/>
-          </a:fillRef>
-          <a:effectRef idx="0">
-            <a:schemeClr val="accent2"/>
-          </a:effectRef>
-          <a:fontRef idx="minor">
-            <a:schemeClr val="tx1"/>
-          </a:fontRef>
-        </p:style>
-      </p:cxnSp>
-      <p:sp>
-        <p:nvSpPr>
-          <p:cNvPr id="5" name="TextBox 4">
-            <a:extLst>
-              <a:ext uri="{FF2B5EF4-FFF2-40B4-BE49-F238E27FC236}">
-                <a16:creationId xmlns:a16="http://schemas.microsoft.com/office/drawing/2014/main" id="{3C66E404-41EF-44AC-ABB8-1EEB513C9DE3}"/>
-              </a:ext>
-            </a:extLst>
-          </p:cNvPr>
-          <p:cNvSpPr txBox="1"/>
-          <p:nvPr/>
-        </p:nvSpPr>
-        <p:spPr>
-          <a:xfrm>
-            <a:off x="946298" y="2022039"/>
-            <a:ext cx="4583645" cy="369332"/>
-          </a:xfrm>
-          <a:prstGeom prst="rect">
-            <a:avLst/>
-          </a:prstGeom>
-          <a:noFill/>
-        </p:spPr>
-        <p:txBody>
-          <a:bodyPr wrap="square" rtlCol="0">
-            <a:spAutoFit/>
-          </a:bodyPr>
-          <a:lstStyle/>
-          <a:p>
-            <a:r>
-              <a:rPr lang="en-US" dirty="0"/>
-              <a:t>Numerical Data – Impute Missing Values</a:t>
-            </a:r>
-            <a:endParaRPr lang="en-CA" dirty="0"/>
-          </a:p>
-        </p:txBody>
-      </p:sp>
-      <p:pic>
-        <p:nvPicPr>
-          <p:cNvPr id="9" name="Picture 8">
-            <a:extLst>
-              <a:ext uri="{FF2B5EF4-FFF2-40B4-BE49-F238E27FC236}">
-                <a16:creationId xmlns:a16="http://schemas.microsoft.com/office/drawing/2014/main" id="{5DFEE87E-C6D3-43BD-B9E3-E4588F1FAE24}"/>
-              </a:ext>
-            </a:extLst>
-          </p:cNvPr>
-          <p:cNvPicPr>
-            <a:picLocks noChangeAspect="1"/>
-          </p:cNvPicPr>
-          <p:nvPr/>
-        </p:nvPicPr>
-        <p:blipFill>
-          <a:blip r:embed="rId4"/>
-          <a:stretch>
-            <a:fillRect/>
-          </a:stretch>
-        </p:blipFill>
-        <p:spPr>
-          <a:xfrm>
-            <a:off x="1002229" y="2391371"/>
-            <a:ext cx="1152574" cy="959328"/>
-          </a:xfrm>
-          <a:prstGeom prst="rect">
-            <a:avLst/>
-          </a:prstGeom>
-        </p:spPr>
-      </p:pic>
-      <p:sp>
-        <p:nvSpPr>
-          <p:cNvPr id="10" name="Arrow: Right 9">
-            <a:extLst>
-              <a:ext uri="{FF2B5EF4-FFF2-40B4-BE49-F238E27FC236}">
-                <a16:creationId xmlns:a16="http://schemas.microsoft.com/office/drawing/2014/main" id="{CD17D319-9A92-45E9-85CA-D73F4333A977}"/>
-              </a:ext>
-            </a:extLst>
-          </p:cNvPr>
-          <p:cNvSpPr/>
-          <p:nvPr/>
-        </p:nvSpPr>
-        <p:spPr>
-          <a:xfrm>
-            <a:off x="2781204" y="2871035"/>
-            <a:ext cx="552893" cy="352089"/>
-          </a:xfrm>
-          <a:prstGeom prst="rightArrow">
-            <a:avLst/>
-          </a:prstGeom>
-          <a:solidFill>
-            <a:schemeClr val="bg2">
-              <a:lumMod val="75000"/>
-            </a:schemeClr>
-          </a:solidFill>
-          <a:ln>
-            <a:solidFill>
-              <a:schemeClr val="bg2">
-                <a:lumMod val="75000"/>
-              </a:schemeClr>
+              <a:srgbClr val="EA6155"/>
             </a:solidFill>
           </a:ln>
         </p:spPr>
@@ -9920,42 +9115,12 @@
           </a:p>
         </p:txBody>
       </p:sp>
-      <p:pic>
-        <p:nvPicPr>
-          <p:cNvPr id="12" name="Picture 11">
-            <a:extLst>
-              <a:ext uri="{FF2B5EF4-FFF2-40B4-BE49-F238E27FC236}">
-                <a16:creationId xmlns:a16="http://schemas.microsoft.com/office/drawing/2014/main" id="{B3919613-C218-4BCD-A86F-E020C1E91AFE}"/>
-              </a:ext>
-            </a:extLst>
-          </p:cNvPr>
-          <p:cNvPicPr>
-            <a:picLocks noChangeAspect="1"/>
-          </p:cNvPicPr>
-          <p:nvPr/>
-        </p:nvPicPr>
-        <p:blipFill>
-          <a:blip r:embed="rId5"/>
-          <a:stretch>
-            <a:fillRect/>
-          </a:stretch>
-        </p:blipFill>
-        <p:spPr>
-          <a:xfrm>
-            <a:off x="8188477" y="2699089"/>
-            <a:ext cx="1559822" cy="629402"/>
-          </a:xfrm>
-          <a:prstGeom prst="rect">
-            <a:avLst/>
-          </a:prstGeom>
-        </p:spPr>
-      </p:pic>
-      <p:sp>
-        <p:nvSpPr>
-          <p:cNvPr id="13" name="Rectangle 12">
-            <a:extLst>
-              <a:ext uri="{FF2B5EF4-FFF2-40B4-BE49-F238E27FC236}">
-                <a16:creationId xmlns:a16="http://schemas.microsoft.com/office/drawing/2014/main" id="{EDC53F4A-537D-43ED-BF9C-54DB52A0EBE7}"/>
+      <p:sp>
+        <p:nvSpPr>
+          <p:cNvPr id="15" name="Rectangle 14">
+            <a:extLst>
+              <a:ext uri="{FF2B5EF4-FFF2-40B4-BE49-F238E27FC236}">
+                <a16:creationId xmlns:a16="http://schemas.microsoft.com/office/drawing/2014/main" id="{70C16DC1-FC18-471A-987D-87AF15CD5F9B}"/>
               </a:ext>
             </a:extLst>
           </p:cNvPr>
@@ -9964,8 +9129,8 @@
         </p:nvSpPr>
         <p:spPr>
           <a:xfrm>
-            <a:off x="9022005" y="3067703"/>
-            <a:ext cx="726294" cy="282997"/>
+            <a:off x="1765006" y="2722320"/>
+            <a:ext cx="389797" cy="628380"/>
           </a:xfrm>
           <a:prstGeom prst="rect">
             <a:avLst/>
@@ -10002,30 +9167,66 @@
           </a:p>
         </p:txBody>
       </p:sp>
-      <p:sp>
-        <p:nvSpPr>
-          <p:cNvPr id="15" name="Rectangle 14">
-            <a:extLst>
-              <a:ext uri="{FF2B5EF4-FFF2-40B4-BE49-F238E27FC236}">
-                <a16:creationId xmlns:a16="http://schemas.microsoft.com/office/drawing/2014/main" id="{70C16DC1-FC18-471A-987D-87AF15CD5F9B}"/>
-              </a:ext>
-            </a:extLst>
-          </p:cNvPr>
-          <p:cNvSpPr/>
+      <p:pic>
+        <p:nvPicPr>
+          <p:cNvPr id="16" name="Picture 15">
+            <a:extLst>
+              <a:ext uri="{FF2B5EF4-FFF2-40B4-BE49-F238E27FC236}">
+                <a16:creationId xmlns:a16="http://schemas.microsoft.com/office/drawing/2014/main" id="{19B39FB3-2832-4113-821F-0B5ADFCC607D}"/>
+              </a:ext>
+            </a:extLst>
+          </p:cNvPr>
+          <p:cNvPicPr>
+            <a:picLocks noChangeAspect="1"/>
+          </p:cNvPicPr>
           <p:nvPr/>
-        </p:nvSpPr>
+        </p:nvPicPr>
+        <p:blipFill>
+          <a:blip r:embed="rId6"/>
+          <a:stretch>
+            <a:fillRect/>
+          </a:stretch>
+        </p:blipFill>
         <p:spPr>
           <a:xfrm>
-            <a:off x="1765006" y="2722320"/>
-            <a:ext cx="389797" cy="628380"/>
+            <a:off x="3875136" y="2693050"/>
+            <a:ext cx="2572168" cy="628380"/>
           </a:xfrm>
           <a:prstGeom prst="rect">
             <a:avLst/>
           </a:prstGeom>
-          <a:noFill/>
-          <a:ln w="28575">
+        </p:spPr>
+      </p:pic>
+      <p:sp>
+        <p:nvSpPr>
+          <p:cNvPr id="18" name="Arrow: Right 17">
+            <a:extLst>
+              <a:ext uri="{FF2B5EF4-FFF2-40B4-BE49-F238E27FC236}">
+                <a16:creationId xmlns:a16="http://schemas.microsoft.com/office/drawing/2014/main" id="{A3AF85D0-FDA1-4910-8CD4-1F9E27056000}"/>
+              </a:ext>
+            </a:extLst>
+          </p:cNvPr>
+          <p:cNvSpPr/>
+          <p:nvPr/>
+        </p:nvSpPr>
+        <p:spPr>
+          <a:xfrm>
+            <a:off x="7030781" y="2889663"/>
+            <a:ext cx="552893" cy="352089"/>
+          </a:xfrm>
+          <a:prstGeom prst="rightArrow">
+            <a:avLst/>
+          </a:prstGeom>
+          <a:solidFill>
+            <a:schemeClr val="bg2">
+              <a:lumMod val="75000"/>
+            </a:schemeClr>
+          </a:solidFill>
+          <a:ln>
             <a:solidFill>
-              <a:srgbClr val="EA6155"/>
+              <a:schemeClr val="bg2">
+                <a:lumMod val="75000"/>
+              </a:schemeClr>
             </a:solidFill>
           </a:ln>
         </p:spPr>
@@ -10054,42 +9255,48 @@
           </a:p>
         </p:txBody>
       </p:sp>
-      <p:pic>
-        <p:nvPicPr>
-          <p:cNvPr id="16" name="Picture 15">
-            <a:extLst>
-              <a:ext uri="{FF2B5EF4-FFF2-40B4-BE49-F238E27FC236}">
-                <a16:creationId xmlns:a16="http://schemas.microsoft.com/office/drawing/2014/main" id="{19B39FB3-2832-4113-821F-0B5ADFCC607D}"/>
-              </a:ext>
-            </a:extLst>
-          </p:cNvPr>
-          <p:cNvPicPr>
-            <a:picLocks noChangeAspect="1"/>
-          </p:cNvPicPr>
+      <p:sp>
+        <p:nvSpPr>
+          <p:cNvPr id="14" name="TextBox 13">
+            <a:extLst>
+              <a:ext uri="{FF2B5EF4-FFF2-40B4-BE49-F238E27FC236}">
+                <a16:creationId xmlns:a16="http://schemas.microsoft.com/office/drawing/2014/main" id="{6DF76CAB-5499-4486-8441-478E8BE1139C}"/>
+              </a:ext>
+            </a:extLst>
+          </p:cNvPr>
+          <p:cNvSpPr txBox="1"/>
           <p:nvPr/>
-        </p:nvPicPr>
-        <p:blipFill>
-          <a:blip r:embed="rId6"/>
-          <a:stretch>
-            <a:fillRect/>
-          </a:stretch>
-        </p:blipFill>
+        </p:nvSpPr>
         <p:spPr>
           <a:xfrm>
-            <a:off x="3875136" y="2693050"/>
-            <a:ext cx="2572168" cy="628380"/>
+            <a:off x="961026" y="3598589"/>
+            <a:ext cx="4797517" cy="369332"/>
           </a:xfrm>
           <a:prstGeom prst="rect">
             <a:avLst/>
           </a:prstGeom>
-        </p:spPr>
-      </p:pic>
-      <p:sp>
-        <p:nvSpPr>
-          <p:cNvPr id="18" name="Arrow: Right 17">
-            <a:extLst>
-              <a:ext uri="{FF2B5EF4-FFF2-40B4-BE49-F238E27FC236}">
-                <a16:creationId xmlns:a16="http://schemas.microsoft.com/office/drawing/2014/main" id="{A3AF85D0-FDA1-4910-8CD4-1F9E27056000}"/>
+          <a:noFill/>
+        </p:spPr>
+        <p:txBody>
+          <a:bodyPr wrap="square" rtlCol="0">
+            <a:spAutoFit/>
+          </a:bodyPr>
+          <a:lstStyle/>
+          <a:p>
+            <a:r>
+              <a:rPr lang="en-US" dirty="0"/>
+              <a:t>Categorical Data – Encode</a:t>
+            </a:r>
+            <a:endParaRPr lang="en-CA" dirty="0"/>
+          </a:p>
+        </p:txBody>
+      </p:sp>
+      <p:sp>
+        <p:nvSpPr>
+          <p:cNvPr id="19" name="Arrow: Right 18">
+            <a:extLst>
+              <a:ext uri="{FF2B5EF4-FFF2-40B4-BE49-F238E27FC236}">
+                <a16:creationId xmlns:a16="http://schemas.microsoft.com/office/drawing/2014/main" id="{A92180FA-4AFA-4DBC-8F19-4C1C04DDA213}"/>
               </a:ext>
             </a:extLst>
           </p:cNvPr>
@@ -10098,7 +9305,7 @@
         </p:nvSpPr>
         <p:spPr>
           <a:xfrm>
-            <a:off x="7030781" y="2889663"/>
+            <a:off x="2780199" y="4551640"/>
             <a:ext cx="552893" cy="352089"/>
           </a:xfrm>
           <a:prstGeom prst="rightArrow">
@@ -10142,12 +9349,72 @@
           </a:p>
         </p:txBody>
       </p:sp>
-      <p:sp>
-        <p:nvSpPr>
-          <p:cNvPr id="14" name="TextBox 13">
-            <a:extLst>
-              <a:ext uri="{FF2B5EF4-FFF2-40B4-BE49-F238E27FC236}">
-                <a16:creationId xmlns:a16="http://schemas.microsoft.com/office/drawing/2014/main" id="{6DF76CAB-5499-4486-8441-478E8BE1139C}"/>
+      <p:pic>
+        <p:nvPicPr>
+          <p:cNvPr id="21" name="Picture 20">
+            <a:extLst>
+              <a:ext uri="{FF2B5EF4-FFF2-40B4-BE49-F238E27FC236}">
+                <a16:creationId xmlns:a16="http://schemas.microsoft.com/office/drawing/2014/main" id="{6DC3566A-257C-4244-89A5-CA163D6EA75C}"/>
+              </a:ext>
+            </a:extLst>
+          </p:cNvPr>
+          <p:cNvPicPr>
+            <a:picLocks noChangeAspect="1"/>
+          </p:cNvPicPr>
+          <p:nvPr/>
+        </p:nvPicPr>
+        <p:blipFill>
+          <a:blip r:embed="rId7"/>
+          <a:stretch>
+            <a:fillRect/>
+          </a:stretch>
+        </p:blipFill>
+        <p:spPr>
+          <a:xfrm>
+            <a:off x="1057889" y="4132332"/>
+            <a:ext cx="623138" cy="838615"/>
+          </a:xfrm>
+          <a:prstGeom prst="rect">
+            <a:avLst/>
+          </a:prstGeom>
+        </p:spPr>
+      </p:pic>
+      <p:pic>
+        <p:nvPicPr>
+          <p:cNvPr id="23" name="Picture 22">
+            <a:extLst>
+              <a:ext uri="{FF2B5EF4-FFF2-40B4-BE49-F238E27FC236}">
+                <a16:creationId xmlns:a16="http://schemas.microsoft.com/office/drawing/2014/main" id="{F329B7E1-68B0-4894-A420-92A8F05D5A39}"/>
+              </a:ext>
+            </a:extLst>
+          </p:cNvPr>
+          <p:cNvPicPr>
+            <a:picLocks noChangeAspect="1"/>
+          </p:cNvPicPr>
+          <p:nvPr/>
+        </p:nvPicPr>
+        <p:blipFill>
+          <a:blip r:embed="rId8"/>
+          <a:stretch>
+            <a:fillRect/>
+          </a:stretch>
+        </p:blipFill>
+        <p:spPr>
+          <a:xfrm>
+            <a:off x="3860408" y="4184207"/>
+            <a:ext cx="688257" cy="901853"/>
+          </a:xfrm>
+          <a:prstGeom prst="rect">
+            <a:avLst/>
+          </a:prstGeom>
+        </p:spPr>
+      </p:pic>
+      <p:sp>
+        <p:nvSpPr>
+          <p:cNvPr id="25" name="TextBox 24">
+            <a:extLst>
+              <a:ext uri="{FF2B5EF4-FFF2-40B4-BE49-F238E27FC236}">
+                <a16:creationId xmlns:a16="http://schemas.microsoft.com/office/drawing/2014/main" id="{69F909F2-9044-40F7-B61E-91C619DE6BC3}"/>
               </a:ext>
             </a:extLst>
           </p:cNvPr>
@@ -10156,8 +9423,8 @@
         </p:nvSpPr>
         <p:spPr>
           <a:xfrm>
-            <a:off x="961026" y="3598589"/>
-            <a:ext cx="4797517" cy="369332"/>
+            <a:off x="946298" y="5211351"/>
+            <a:ext cx="3418873" cy="369332"/>
           </a:xfrm>
           <a:prstGeom prst="rect">
             <a:avLst/>
@@ -10172,7 +9439,7 @@
           <a:p>
             <a:r>
               <a:rPr lang="en-US" dirty="0"/>
-              <a:t>Categorical Data – Encode</a:t>
+              <a:t>Text Data - Vectorize</a:t>
             </a:r>
             <a:endParaRPr lang="en-CA" dirty="0"/>
           </a:p>
@@ -10180,10 +9447,10 @@
       </p:sp>
       <p:sp>
         <p:nvSpPr>
-          <p:cNvPr id="19" name="Arrow: Right 18">
-            <a:extLst>
-              <a:ext uri="{FF2B5EF4-FFF2-40B4-BE49-F238E27FC236}">
-                <a16:creationId xmlns:a16="http://schemas.microsoft.com/office/drawing/2014/main" id="{A92180FA-4AFA-4DBC-8F19-4C1C04DDA213}"/>
+          <p:cNvPr id="26" name="Arrow: Right 25">
+            <a:extLst>
+              <a:ext uri="{FF2B5EF4-FFF2-40B4-BE49-F238E27FC236}">
+                <a16:creationId xmlns:a16="http://schemas.microsoft.com/office/drawing/2014/main" id="{8FB7D03B-EBFD-4FF8-8629-EF32C3A3E5C5}"/>
               </a:ext>
             </a:extLst>
           </p:cNvPr>
@@ -10192,7 +9459,7 @@
         </p:nvSpPr>
         <p:spPr>
           <a:xfrm>
-            <a:off x="2780199" y="4551640"/>
+            <a:off x="4674119" y="5867907"/>
             <a:ext cx="552893" cy="352089"/>
           </a:xfrm>
           <a:prstGeom prst="rightArrow">
@@ -10238,160 +9505,6 @@
       </p:sp>
       <p:pic>
         <p:nvPicPr>
-          <p:cNvPr id="21" name="Picture 20">
-            <a:extLst>
-              <a:ext uri="{FF2B5EF4-FFF2-40B4-BE49-F238E27FC236}">
-                <a16:creationId xmlns:a16="http://schemas.microsoft.com/office/drawing/2014/main" id="{6DC3566A-257C-4244-89A5-CA163D6EA75C}"/>
-              </a:ext>
-            </a:extLst>
-          </p:cNvPr>
-          <p:cNvPicPr>
-            <a:picLocks noChangeAspect="1"/>
-          </p:cNvPicPr>
-          <p:nvPr/>
-        </p:nvPicPr>
-        <p:blipFill>
-          <a:blip r:embed="rId7"/>
-          <a:stretch>
-            <a:fillRect/>
-          </a:stretch>
-        </p:blipFill>
-        <p:spPr>
-          <a:xfrm>
-            <a:off x="1057889" y="4132332"/>
-            <a:ext cx="623138" cy="838615"/>
-          </a:xfrm>
-          <a:prstGeom prst="rect">
-            <a:avLst/>
-          </a:prstGeom>
-        </p:spPr>
-      </p:pic>
-      <p:pic>
-        <p:nvPicPr>
-          <p:cNvPr id="23" name="Picture 22">
-            <a:extLst>
-              <a:ext uri="{FF2B5EF4-FFF2-40B4-BE49-F238E27FC236}">
-                <a16:creationId xmlns:a16="http://schemas.microsoft.com/office/drawing/2014/main" id="{F329B7E1-68B0-4894-A420-92A8F05D5A39}"/>
-              </a:ext>
-            </a:extLst>
-          </p:cNvPr>
-          <p:cNvPicPr>
-            <a:picLocks noChangeAspect="1"/>
-          </p:cNvPicPr>
-          <p:nvPr/>
-        </p:nvPicPr>
-        <p:blipFill>
-          <a:blip r:embed="rId8"/>
-          <a:stretch>
-            <a:fillRect/>
-          </a:stretch>
-        </p:blipFill>
-        <p:spPr>
-          <a:xfrm>
-            <a:off x="3860408" y="4184207"/>
-            <a:ext cx="688257" cy="901853"/>
-          </a:xfrm>
-          <a:prstGeom prst="rect">
-            <a:avLst/>
-          </a:prstGeom>
-        </p:spPr>
-      </p:pic>
-      <p:sp>
-        <p:nvSpPr>
-          <p:cNvPr id="25" name="TextBox 24">
-            <a:extLst>
-              <a:ext uri="{FF2B5EF4-FFF2-40B4-BE49-F238E27FC236}">
-                <a16:creationId xmlns:a16="http://schemas.microsoft.com/office/drawing/2014/main" id="{69F909F2-9044-40F7-B61E-91C619DE6BC3}"/>
-              </a:ext>
-            </a:extLst>
-          </p:cNvPr>
-          <p:cNvSpPr txBox="1"/>
-          <p:nvPr/>
-        </p:nvSpPr>
-        <p:spPr>
-          <a:xfrm>
-            <a:off x="946298" y="5211351"/>
-            <a:ext cx="3418873" cy="369332"/>
-          </a:xfrm>
-          <a:prstGeom prst="rect">
-            <a:avLst/>
-          </a:prstGeom>
-          <a:noFill/>
-        </p:spPr>
-        <p:txBody>
-          <a:bodyPr wrap="square" rtlCol="0">
-            <a:spAutoFit/>
-          </a:bodyPr>
-          <a:lstStyle/>
-          <a:p>
-            <a:r>
-              <a:rPr lang="en-US" dirty="0"/>
-              <a:t>Text Data - Vectorize</a:t>
-            </a:r>
-            <a:endParaRPr lang="en-CA" dirty="0"/>
-          </a:p>
-        </p:txBody>
-      </p:sp>
-      <p:sp>
-        <p:nvSpPr>
-          <p:cNvPr id="26" name="Arrow: Right 25">
-            <a:extLst>
-              <a:ext uri="{FF2B5EF4-FFF2-40B4-BE49-F238E27FC236}">
-                <a16:creationId xmlns:a16="http://schemas.microsoft.com/office/drawing/2014/main" id="{8FB7D03B-EBFD-4FF8-8629-EF32C3A3E5C5}"/>
-              </a:ext>
-            </a:extLst>
-          </p:cNvPr>
-          <p:cNvSpPr/>
-          <p:nvPr/>
-        </p:nvSpPr>
-        <p:spPr>
-          <a:xfrm>
-            <a:off x="4674119" y="5867907"/>
-            <a:ext cx="552893" cy="352089"/>
-          </a:xfrm>
-          <a:prstGeom prst="rightArrow">
-            <a:avLst/>
-          </a:prstGeom>
-          <a:solidFill>
-            <a:schemeClr val="bg2">
-              <a:lumMod val="75000"/>
-            </a:schemeClr>
-          </a:solidFill>
-          <a:ln>
-            <a:solidFill>
-              <a:schemeClr val="bg2">
-                <a:lumMod val="75000"/>
-              </a:schemeClr>
-            </a:solidFill>
-          </a:ln>
-        </p:spPr>
-        <p:style>
-          <a:lnRef idx="2">
-            <a:schemeClr val="accent1">
-              <a:shade val="50000"/>
-            </a:schemeClr>
-          </a:lnRef>
-          <a:fillRef idx="1">
-            <a:schemeClr val="accent1"/>
-          </a:fillRef>
-          <a:effectRef idx="0">
-            <a:schemeClr val="accent1"/>
-          </a:effectRef>
-          <a:fontRef idx="minor">
-            <a:schemeClr val="lt1"/>
-          </a:fontRef>
-        </p:style>
-        <p:txBody>
-          <a:bodyPr rtlCol="0" anchor="ctr"/>
-          <a:lstStyle/>
-          <a:p>
-            <a:pPr algn="ctr"/>
-            <a:endParaRPr lang="en-CA"/>
-          </a:p>
-        </p:txBody>
-      </p:sp>
-      <p:pic>
-        <p:nvPicPr>
           <p:cNvPr id="29" name="Picture 28">
             <a:extLst>
               <a:ext uri="{FF2B5EF4-FFF2-40B4-BE49-F238E27FC236}">
@@ -10463,7 +9576,7 @@
 </p:sld>
 </file>
 
-<file path=ppt/slides/slide8.xml><?xml version="1.0" encoding="utf-8"?>
+<file path=ppt/slides/slide7.xml><?xml version="1.0" encoding="utf-8"?>
 <p:sld xmlns:a="http://schemas.openxmlformats.org/drawingml/2006/main" xmlns:r="http://schemas.openxmlformats.org/officeDocument/2006/relationships" xmlns:p="http://schemas.openxmlformats.org/presentationml/2006/main">
   <p:cSld>
     <p:spTree>
@@ -10620,7 +9733,7 @@
 </p:sld>
 </file>
 
-<file path=ppt/slides/slide9.xml><?xml version="1.0" encoding="utf-8"?>
+<file path=ppt/slides/slide8.xml><?xml version="1.0" encoding="utf-8"?>
 <p:sld xmlns:a="http://schemas.openxmlformats.org/drawingml/2006/main" xmlns:r="http://schemas.openxmlformats.org/officeDocument/2006/relationships" xmlns:p="http://schemas.openxmlformats.org/presentationml/2006/main">
   <p:cSld>
     <p:spTree>
@@ -10768,6 +9881,163 @@
     <p:extLst>
       <p:ext uri="{BB962C8B-B14F-4D97-AF65-F5344CB8AC3E}">
         <p14:creationId xmlns:p14="http://schemas.microsoft.com/office/powerpoint/2010/main" val="2243286875"/>
+      </p:ext>
+    </p:extLst>
+  </p:cSld>
+  <p:clrMapOvr>
+    <a:masterClrMapping/>
+  </p:clrMapOvr>
+</p:sld>
+</file>
+
+<file path=ppt/slides/slide9.xml><?xml version="1.0" encoding="utf-8"?>
+<p:sld xmlns:a="http://schemas.openxmlformats.org/drawingml/2006/main" xmlns:r="http://schemas.openxmlformats.org/officeDocument/2006/relationships" xmlns:p="http://schemas.openxmlformats.org/presentationml/2006/main">
+  <p:cSld>
+    <p:spTree>
+      <p:nvGrpSpPr>
+        <p:cNvPr id="1" name=""/>
+        <p:cNvGrpSpPr/>
+        <p:nvPr/>
+      </p:nvGrpSpPr>
+      <p:grpSpPr>
+        <a:xfrm>
+          <a:off x="0" y="0"/>
+          <a:ext cx="0" cy="0"/>
+          <a:chOff x="0" y="0"/>
+          <a:chExt cx="0" cy="0"/>
+        </a:xfrm>
+      </p:grpSpPr>
+      <p:sp>
+        <p:nvSpPr>
+          <p:cNvPr id="2" name="Title 1">
+            <a:extLst>
+              <a:ext uri="{FF2B5EF4-FFF2-40B4-BE49-F238E27FC236}">
+                <a16:creationId xmlns:a16="http://schemas.microsoft.com/office/drawing/2014/main" id="{59B8B577-5676-3C4B-A107-E41DB331FD85}"/>
+              </a:ext>
+            </a:extLst>
+          </p:cNvPr>
+          <p:cNvSpPr>
+            <a:spLocks noGrp="1"/>
+          </p:cNvSpPr>
+          <p:nvPr>
+            <p:ph type="title"/>
+          </p:nvPr>
+        </p:nvSpPr>
+        <p:spPr>
+          <a:xfrm>
+            <a:off x="4123382" y="513769"/>
+            <a:ext cx="10515600" cy="1325563"/>
+          </a:xfrm>
+        </p:spPr>
+        <p:txBody>
+          <a:bodyPr/>
+          <a:lstStyle/>
+          <a:p>
+            <a:r>
+              <a:rPr lang="en-US" dirty="0">
+                <a:solidFill>
+                  <a:srgbClr val="EA5E46"/>
+                </a:solidFill>
+              </a:rPr>
+              <a:t>Model Findings – Price Correlation</a:t>
+            </a:r>
+          </a:p>
+        </p:txBody>
+      </p:sp>
+      <p:pic>
+        <p:nvPicPr>
+          <p:cNvPr id="2050" name="Picture 2" descr="Image result for air bnb logo">
+            <a:extLst>
+              <a:ext uri="{FF2B5EF4-FFF2-40B4-BE49-F238E27FC236}">
+                <a16:creationId xmlns:a16="http://schemas.microsoft.com/office/drawing/2014/main" id="{A162C291-208B-BE48-BF44-7D5CD7EF6151}"/>
+              </a:ext>
+            </a:extLst>
+          </p:cNvPr>
+          <p:cNvPicPr>
+            <a:picLocks noChangeAspect="1" noChangeArrowheads="1"/>
+          </p:cNvPicPr>
+          <p:nvPr/>
+        </p:nvPicPr>
+        <p:blipFill>
+          <a:blip r:embed="rId3">
+            <a:extLst>
+              <a:ext uri="{28A0092B-C50C-407E-A947-70E740481C1C}">
+                <a14:useLocalDpi xmlns:a14="http://schemas.microsoft.com/office/drawing/2010/main" val="0"/>
+              </a:ext>
+            </a:extLst>
+          </a:blip>
+          <a:srcRect/>
+          <a:stretch>
+            <a:fillRect/>
+          </a:stretch>
+        </p:blipFill>
+        <p:spPr bwMode="auto">
+          <a:xfrm>
+            <a:off x="2080820" y="0"/>
+            <a:ext cx="2189605" cy="2022038"/>
+          </a:xfrm>
+          <a:prstGeom prst="rect">
+            <a:avLst/>
+          </a:prstGeom>
+          <a:noFill/>
+          <a:extLst>
+            <a:ext uri="{909E8E84-426E-40DD-AFC4-6F175D3DCCD1}">
+              <a14:hiddenFill xmlns:a14="http://schemas.microsoft.com/office/drawing/2010/main">
+                <a:solidFill>
+                  <a:srgbClr val="FFFFFF"/>
+                </a:solidFill>
+              </a14:hiddenFill>
+            </a:ext>
+          </a:extLst>
+        </p:spPr>
+      </p:pic>
+      <p:cxnSp>
+        <p:nvCxnSpPr>
+          <p:cNvPr id="6" name="Straight Connector 5">
+            <a:extLst>
+              <a:ext uri="{FF2B5EF4-FFF2-40B4-BE49-F238E27FC236}">
+                <a16:creationId xmlns:a16="http://schemas.microsoft.com/office/drawing/2014/main" id="{7D0926DC-6298-B648-9DF9-0D78D09F9FC8}"/>
+              </a:ext>
+            </a:extLst>
+          </p:cNvPr>
+          <p:cNvCxnSpPr>
+            <a:cxnSpLocks/>
+          </p:cNvCxnSpPr>
+          <p:nvPr/>
+        </p:nvCxnSpPr>
+        <p:spPr>
+          <a:xfrm>
+            <a:off x="2526110" y="1576551"/>
+            <a:ext cx="9518745" cy="1"/>
+          </a:xfrm>
+          <a:prstGeom prst="line">
+            <a:avLst/>
+          </a:prstGeom>
+          <a:ln w="12700">
+            <a:solidFill>
+              <a:srgbClr val="EA5E46"/>
+            </a:solidFill>
+          </a:ln>
+        </p:spPr>
+        <p:style>
+          <a:lnRef idx="1">
+            <a:schemeClr val="accent2"/>
+          </a:lnRef>
+          <a:fillRef idx="0">
+            <a:schemeClr val="accent2"/>
+          </a:fillRef>
+          <a:effectRef idx="0">
+            <a:schemeClr val="accent2"/>
+          </a:effectRef>
+          <a:fontRef idx="minor">
+            <a:schemeClr val="tx1"/>
+          </a:fontRef>
+        </p:style>
+      </p:cxnSp>
+    </p:spTree>
+    <p:extLst>
+      <p:ext uri="{BB962C8B-B14F-4D97-AF65-F5344CB8AC3E}">
+        <p14:creationId xmlns:p14="http://schemas.microsoft.com/office/powerpoint/2010/main" val="191879790"/>
       </p:ext>
     </p:extLst>
   </p:cSld>

</xml_diff>

<commit_message>
added comments to prophet overall model & update powerpoint
</commit_message>
<xml_diff>
--- a/Airbnb Price Predictions (Model).pptx
+++ b/Airbnb Price Predictions (Model).pptx
@@ -8407,7 +8407,7 @@
                   <a:srgbClr val="EA5E46"/>
                 </a:solidFill>
               </a:rPr>
-              <a:t>Model Data Transformation Process</a:t>
+              <a:t>Model Data Transformation - Regressor</a:t>
             </a:r>
           </a:p>
         </p:txBody>
@@ -8715,7 +8715,7 @@
                   <a:srgbClr val="EA5E46"/>
                 </a:solidFill>
               </a:rPr>
-              <a:t>Model Data Transformation Methods</a:t>
+              <a:t>Model Data Transformation Methods </a:t>
             </a:r>
           </a:p>
         </p:txBody>
@@ -10025,7 +10025,7 @@
         </p:nvSpPr>
         <p:spPr>
           <a:xfrm>
-            <a:off x="975854" y="1986170"/>
+            <a:off x="897777" y="1876021"/>
             <a:ext cx="10052930" cy="646331"/>
           </a:xfrm>
           <a:prstGeom prst="rect">
@@ -10071,8 +10071,8 @@
         </p:blipFill>
         <p:spPr>
           <a:xfrm>
-            <a:off x="975854" y="3026025"/>
-            <a:ext cx="4821936" cy="2447411"/>
+            <a:off x="975854" y="3026026"/>
+            <a:ext cx="3423151" cy="1737447"/>
           </a:xfrm>
           <a:prstGeom prst="rect">
             <a:avLst/>
@@ -10093,8 +10093,8 @@
         </p:nvSpPr>
         <p:spPr>
           <a:xfrm>
-            <a:off x="6308868" y="3062968"/>
-            <a:ext cx="1699837" cy="2110203"/>
+            <a:off x="5344935" y="2934876"/>
+            <a:ext cx="1699837" cy="1709809"/>
           </a:xfrm>
           <a:prstGeom prst="rightArrow">
             <a:avLst/>
@@ -10196,8 +10196,8 @@
         </p:blipFill>
         <p:spPr>
           <a:xfrm>
-            <a:off x="8519784" y="2902949"/>
-            <a:ext cx="1699838" cy="2558607"/>
+            <a:off x="8034116" y="2857678"/>
+            <a:ext cx="1377978" cy="2074141"/>
           </a:xfrm>
           <a:prstGeom prst="rect">
             <a:avLst/>
@@ -10254,7 +10254,7 @@
         </p:nvSpPr>
         <p:spPr>
           <a:xfrm>
-            <a:off x="8351521" y="2440958"/>
+            <a:off x="7979782" y="2503907"/>
             <a:ext cx="2864624" cy="338554"/>
           </a:xfrm>
           <a:prstGeom prst="rect">
@@ -10276,6 +10276,71 @@
           </a:p>
         </p:txBody>
       </p:sp>
+      <p:sp>
+        <p:nvSpPr>
+          <p:cNvPr id="19" name="TextBox 18">
+            <a:extLst>
+              <a:ext uri="{FF2B5EF4-FFF2-40B4-BE49-F238E27FC236}">
+                <a16:creationId xmlns:a16="http://schemas.microsoft.com/office/drawing/2014/main" id="{E42A3C08-B7C1-4B1A-99A6-E9055F13251D}"/>
+              </a:ext>
+            </a:extLst>
+          </p:cNvPr>
+          <p:cNvSpPr txBox="1"/>
+          <p:nvPr/>
+        </p:nvSpPr>
+        <p:spPr>
+          <a:xfrm>
+            <a:off x="897777" y="5186609"/>
+            <a:ext cx="6617042" cy="369332"/>
+          </a:xfrm>
+          <a:prstGeom prst="rect">
+            <a:avLst/>
+          </a:prstGeom>
+          <a:noFill/>
+        </p:spPr>
+        <p:txBody>
+          <a:bodyPr wrap="square">
+            <a:spAutoFit/>
+          </a:bodyPr>
+          <a:lstStyle/>
+          <a:p>
+            <a:r>
+              <a:rPr lang="en-US" dirty="0"/>
+              <a:t>6. Create New Holiday Dataset for the Prophet Model</a:t>
+            </a:r>
+          </a:p>
+        </p:txBody>
+      </p:sp>
+      <p:pic>
+        <p:nvPicPr>
+          <p:cNvPr id="11" name="Picture 10">
+            <a:extLst>
+              <a:ext uri="{FF2B5EF4-FFF2-40B4-BE49-F238E27FC236}">
+                <a16:creationId xmlns:a16="http://schemas.microsoft.com/office/drawing/2014/main" id="{D3F91F5A-C03E-42C7-B053-99DF10DF6E9D}"/>
+              </a:ext>
+            </a:extLst>
+          </p:cNvPr>
+          <p:cNvPicPr>
+            <a:picLocks noChangeAspect="1"/>
+          </p:cNvPicPr>
+          <p:nvPr/>
+        </p:nvPicPr>
+        <p:blipFill>
+          <a:blip r:embed="rId6"/>
+          <a:stretch>
+            <a:fillRect/>
+          </a:stretch>
+        </p:blipFill>
+        <p:spPr>
+          <a:xfrm>
+            <a:off x="955481" y="5751125"/>
+            <a:ext cx="4237087" cy="693480"/>
+          </a:xfrm>
+          <a:prstGeom prst="rect">
+            <a:avLst/>
+          </a:prstGeom>
+        </p:spPr>
+      </p:pic>
     </p:spTree>
     <p:extLst>
       <p:ext uri="{BB962C8B-B14F-4D97-AF65-F5344CB8AC3E}">

</xml_diff>

<commit_message>
powerpoint update & add image
</commit_message>
<xml_diff>
--- a/Airbnb Price Predictions (Model).pptx
+++ b/Airbnb Price Predictions (Model).pptx
@@ -5,7 +5,7 @@
     <p:sldMasterId id="2147483648" r:id="rId1"/>
   </p:sldMasterIdLst>
   <p:notesMasterIdLst>
-    <p:notesMasterId r:id="rId21"/>
+    <p:notesMasterId r:id="rId18"/>
   </p:notesMasterIdLst>
   <p:sldIdLst>
     <p:sldId id="280" r:id="rId2"/>
@@ -20,13 +20,10 @@
     <p:sldId id="304" r:id="rId11"/>
     <p:sldId id="311" r:id="rId12"/>
     <p:sldId id="310" r:id="rId13"/>
-    <p:sldId id="286" r:id="rId14"/>
-    <p:sldId id="287" r:id="rId15"/>
-    <p:sldId id="289" r:id="rId16"/>
-    <p:sldId id="290" r:id="rId17"/>
-    <p:sldId id="291" r:id="rId18"/>
-    <p:sldId id="292" r:id="rId19"/>
-    <p:sldId id="274" r:id="rId20"/>
+    <p:sldId id="312" r:id="rId14"/>
+    <p:sldId id="291" r:id="rId15"/>
+    <p:sldId id="292" r:id="rId16"/>
+    <p:sldId id="274" r:id="rId17"/>
   </p:sldIdLst>
   <p:sldSz cx="12192000" cy="6858000"/>
   <p:notesSz cx="6858000" cy="9144000"/>
@@ -1024,36 +1021,32 @@
           <a:p>
             <a:r>
               <a:rPr lang="en-US" dirty="0"/>
-              <a:t>-To help users explore all listings available in NYC, we created a marker cluster map using Leaflet. </a:t>
+              <a:t>This table shows you the coefficient of correlation (R2) &amp; Mean Squared Error (MSE)</a:t>
             </a:r>
           </a:p>
           <a:p>
             <a:r>
               <a:rPr lang="en-US" dirty="0"/>
-              <a:t>-The clusters display the number of listings with the different boroughs and </a:t>
-            </a:r>
-            <a:r>
-              <a:rPr lang="en-US" dirty="0" err="1"/>
-              <a:t>neighbourhoods</a:t>
-            </a:r>
+              <a:t>The r2 tells you how close the data fits to the regression line.  MSE is the squared average difference between the actual &amp; predicted values.</a:t>
+            </a:r>
+          </a:p>
+          <a:p>
             <a:r>
               <a:rPr lang="en-US" dirty="0"/>
-              <a:t> in NYC. </a:t>
-            </a:r>
-          </a:p>
-          <a:p>
-            <a:r>
-              <a:rPr lang="en-US" dirty="0"/>
-              <a:t>-In this example, we selected the the well-known New York borough of Manhattan, and then further zoomed in to the Upper West Side </a:t>
-            </a:r>
-            <a:r>
-              <a:rPr lang="en-US" dirty="0" err="1"/>
-              <a:t>neighbourhood</a:t>
-            </a:r>
-            <a:r>
-              <a:rPr lang="en-US" dirty="0"/>
-              <a:t>. </a:t>
-            </a:r>
+              <a:t>Based on the model,  it tells us that the time trends have the strong impact on the price.  The features have a moderate correlation to the price and the clustering have a fairly weak correlation</a:t>
+            </a:r>
+          </a:p>
+          <a:p>
+            <a:endParaRPr lang="en-US" dirty="0"/>
+          </a:p>
+          <a:p>
+            <a:endParaRPr lang="en-US" dirty="0"/>
+          </a:p>
+          <a:p>
+            <a:endParaRPr lang="en-US" dirty="0"/>
+          </a:p>
+          <a:p>
+            <a:endParaRPr lang="en-US" dirty="0"/>
           </a:p>
           <a:p>
             <a:endParaRPr lang="en-US" dirty="0"/>
@@ -1086,7 +1079,7 @@
     </p:spTree>
     <p:extLst>
       <p:ext uri="{BB962C8B-B14F-4D97-AF65-F5344CB8AC3E}">
-        <p14:creationId xmlns:p14="http://schemas.microsoft.com/office/powerpoint/2010/main" val="818292738"/>
+        <p14:creationId xmlns:p14="http://schemas.microsoft.com/office/powerpoint/2010/main" val="733089083"/>
       </p:ext>
     </p:extLst>
   </p:cSld>
@@ -1204,7 +1197,7 @@
     </p:spTree>
     <p:extLst>
       <p:ext uri="{BB962C8B-B14F-4D97-AF65-F5344CB8AC3E}">
-        <p14:creationId xmlns:p14="http://schemas.microsoft.com/office/powerpoint/2010/main" val="2744486609"/>
+        <p14:creationId xmlns:p14="http://schemas.microsoft.com/office/powerpoint/2010/main" val="847075339"/>
       </p:ext>
     </p:extLst>
   </p:cSld>
@@ -1322,7 +1315,7 @@
     </p:spTree>
     <p:extLst>
       <p:ext uri="{BB962C8B-B14F-4D97-AF65-F5344CB8AC3E}">
-        <p14:creationId xmlns:p14="http://schemas.microsoft.com/office/powerpoint/2010/main" val="3177731070"/>
+        <p14:creationId xmlns:p14="http://schemas.microsoft.com/office/powerpoint/2010/main" val="533258538"/>
       </p:ext>
     </p:extLst>
   </p:cSld>
@@ -1376,40 +1369,6 @@
           <a:bodyPr/>
           <a:lstStyle/>
           <a:p>
-            <a:r>
-              <a:rPr lang="en-US" dirty="0"/>
-              <a:t>-To help users explore all listings available in NYC, we created a marker cluster map using Leaflet. </a:t>
-            </a:r>
-          </a:p>
-          <a:p>
-            <a:r>
-              <a:rPr lang="en-US" dirty="0"/>
-              <a:t>-The clusters display the number of listings with the different boroughs and </a:t>
-            </a:r>
-            <a:r>
-              <a:rPr lang="en-US" dirty="0" err="1"/>
-              <a:t>neighbourhoods</a:t>
-            </a:r>
-            <a:r>
-              <a:rPr lang="en-US" dirty="0"/>
-              <a:t> in NYC. </a:t>
-            </a:r>
-          </a:p>
-          <a:p>
-            <a:r>
-              <a:rPr lang="en-US" dirty="0"/>
-              <a:t>-In this example, we selected the the well-known New York borough of Manhattan, and then further zoomed in to the Upper West Side </a:t>
-            </a:r>
-            <a:r>
-              <a:rPr lang="en-US" dirty="0" err="1"/>
-              <a:t>neighbourhood</a:t>
-            </a:r>
-            <a:r>
-              <a:rPr lang="en-US" dirty="0"/>
-              <a:t>. </a:t>
-            </a:r>
-          </a:p>
-          <a:p>
             <a:endParaRPr lang="en-US" dirty="0"/>
           </a:p>
         </p:txBody>
@@ -1432,326 +1391,6 @@
             <a:fld id="{DF2352D6-35AF-0544-A99E-554CC41E76C4}" type="slidenum">
               <a:rPr lang="en-US" smtClean="0"/>
               <a:t>16</a:t>
-            </a:fld>
-            <a:endParaRPr lang="en-US"/>
-          </a:p>
-        </p:txBody>
-      </p:sp>
-    </p:spTree>
-    <p:extLst>
-      <p:ext uri="{BB962C8B-B14F-4D97-AF65-F5344CB8AC3E}">
-        <p14:creationId xmlns:p14="http://schemas.microsoft.com/office/powerpoint/2010/main" val="266214348"/>
-      </p:ext>
-    </p:extLst>
-  </p:cSld>
-  <p:clrMapOvr>
-    <a:masterClrMapping/>
-  </p:clrMapOvr>
-</p:notes>
-</file>
-
-<file path=ppt/notesSlides/notesSlide17.xml><?xml version="1.0" encoding="utf-8"?>
-<p:notes xmlns:a="http://schemas.openxmlformats.org/drawingml/2006/main" xmlns:r="http://schemas.openxmlformats.org/officeDocument/2006/relationships" xmlns:p="http://schemas.openxmlformats.org/presentationml/2006/main">
-  <p:cSld>
-    <p:spTree>
-      <p:nvGrpSpPr>
-        <p:cNvPr id="1" name=""/>
-        <p:cNvGrpSpPr/>
-        <p:nvPr/>
-      </p:nvGrpSpPr>
-      <p:grpSpPr>
-        <a:xfrm>
-          <a:off x="0" y="0"/>
-          <a:ext cx="0" cy="0"/>
-          <a:chOff x="0" y="0"/>
-          <a:chExt cx="0" cy="0"/>
-        </a:xfrm>
-      </p:grpSpPr>
-      <p:sp>
-        <p:nvSpPr>
-          <p:cNvPr id="2" name="Slide Image Placeholder 1"/>
-          <p:cNvSpPr>
-            <a:spLocks noGrp="1" noRot="1" noChangeAspect="1"/>
-          </p:cNvSpPr>
-          <p:nvPr>
-            <p:ph type="sldImg"/>
-          </p:nvPr>
-        </p:nvSpPr>
-        <p:spPr/>
-      </p:sp>
-      <p:sp>
-        <p:nvSpPr>
-          <p:cNvPr id="3" name="Notes Placeholder 2"/>
-          <p:cNvSpPr>
-            <a:spLocks noGrp="1"/>
-          </p:cNvSpPr>
-          <p:nvPr>
-            <p:ph type="body" idx="1"/>
-          </p:nvPr>
-        </p:nvSpPr>
-        <p:spPr/>
-        <p:txBody>
-          <a:bodyPr/>
-          <a:lstStyle/>
-          <a:p>
-            <a:r>
-              <a:rPr lang="en-US" dirty="0"/>
-              <a:t>-To help users explore all listings available in NYC, we created a marker cluster map using Leaflet. </a:t>
-            </a:r>
-          </a:p>
-          <a:p>
-            <a:r>
-              <a:rPr lang="en-US" dirty="0"/>
-              <a:t>-The clusters display the number of listings with the different boroughs and </a:t>
-            </a:r>
-            <a:r>
-              <a:rPr lang="en-US" dirty="0" err="1"/>
-              <a:t>neighbourhoods</a:t>
-            </a:r>
-            <a:r>
-              <a:rPr lang="en-US" dirty="0"/>
-              <a:t> in NYC. </a:t>
-            </a:r>
-          </a:p>
-          <a:p>
-            <a:r>
-              <a:rPr lang="en-US" dirty="0"/>
-              <a:t>-In this example, we selected the the well-known New York borough of Manhattan, and then further zoomed in to the Upper West Side </a:t>
-            </a:r>
-            <a:r>
-              <a:rPr lang="en-US" dirty="0" err="1"/>
-              <a:t>neighbourhood</a:t>
-            </a:r>
-            <a:r>
-              <a:rPr lang="en-US" dirty="0"/>
-              <a:t>. </a:t>
-            </a:r>
-          </a:p>
-          <a:p>
-            <a:endParaRPr lang="en-US" dirty="0"/>
-          </a:p>
-        </p:txBody>
-      </p:sp>
-      <p:sp>
-        <p:nvSpPr>
-          <p:cNvPr id="4" name="Slide Number Placeholder 3"/>
-          <p:cNvSpPr>
-            <a:spLocks noGrp="1"/>
-          </p:cNvSpPr>
-          <p:nvPr>
-            <p:ph type="sldNum" sz="quarter" idx="5"/>
-          </p:nvPr>
-        </p:nvSpPr>
-        <p:spPr/>
-        <p:txBody>
-          <a:bodyPr/>
-          <a:lstStyle/>
-          <a:p>
-            <a:fld id="{DF2352D6-35AF-0544-A99E-554CC41E76C4}" type="slidenum">
-              <a:rPr lang="en-US" smtClean="0"/>
-              <a:t>17</a:t>
-            </a:fld>
-            <a:endParaRPr lang="en-US"/>
-          </a:p>
-        </p:txBody>
-      </p:sp>
-    </p:spTree>
-    <p:extLst>
-      <p:ext uri="{BB962C8B-B14F-4D97-AF65-F5344CB8AC3E}">
-        <p14:creationId xmlns:p14="http://schemas.microsoft.com/office/powerpoint/2010/main" val="847075339"/>
-      </p:ext>
-    </p:extLst>
-  </p:cSld>
-  <p:clrMapOvr>
-    <a:masterClrMapping/>
-  </p:clrMapOvr>
-</p:notes>
-</file>
-
-<file path=ppt/notesSlides/notesSlide18.xml><?xml version="1.0" encoding="utf-8"?>
-<p:notes xmlns:a="http://schemas.openxmlformats.org/drawingml/2006/main" xmlns:r="http://schemas.openxmlformats.org/officeDocument/2006/relationships" xmlns:p="http://schemas.openxmlformats.org/presentationml/2006/main">
-  <p:cSld>
-    <p:spTree>
-      <p:nvGrpSpPr>
-        <p:cNvPr id="1" name=""/>
-        <p:cNvGrpSpPr/>
-        <p:nvPr/>
-      </p:nvGrpSpPr>
-      <p:grpSpPr>
-        <a:xfrm>
-          <a:off x="0" y="0"/>
-          <a:ext cx="0" cy="0"/>
-          <a:chOff x="0" y="0"/>
-          <a:chExt cx="0" cy="0"/>
-        </a:xfrm>
-      </p:grpSpPr>
-      <p:sp>
-        <p:nvSpPr>
-          <p:cNvPr id="2" name="Slide Image Placeholder 1"/>
-          <p:cNvSpPr>
-            <a:spLocks noGrp="1" noRot="1" noChangeAspect="1"/>
-          </p:cNvSpPr>
-          <p:nvPr>
-            <p:ph type="sldImg"/>
-          </p:nvPr>
-        </p:nvSpPr>
-        <p:spPr/>
-      </p:sp>
-      <p:sp>
-        <p:nvSpPr>
-          <p:cNvPr id="3" name="Notes Placeholder 2"/>
-          <p:cNvSpPr>
-            <a:spLocks noGrp="1"/>
-          </p:cNvSpPr>
-          <p:nvPr>
-            <p:ph type="body" idx="1"/>
-          </p:nvPr>
-        </p:nvSpPr>
-        <p:spPr/>
-        <p:txBody>
-          <a:bodyPr/>
-          <a:lstStyle/>
-          <a:p>
-            <a:r>
-              <a:rPr lang="en-US" dirty="0"/>
-              <a:t>-To help users explore all listings available in NYC, we created a marker cluster map using Leaflet. </a:t>
-            </a:r>
-          </a:p>
-          <a:p>
-            <a:r>
-              <a:rPr lang="en-US" dirty="0"/>
-              <a:t>-The clusters display the number of listings with the different boroughs and </a:t>
-            </a:r>
-            <a:r>
-              <a:rPr lang="en-US" dirty="0" err="1"/>
-              <a:t>neighbourhoods</a:t>
-            </a:r>
-            <a:r>
-              <a:rPr lang="en-US" dirty="0"/>
-              <a:t> in NYC. </a:t>
-            </a:r>
-          </a:p>
-          <a:p>
-            <a:r>
-              <a:rPr lang="en-US" dirty="0"/>
-              <a:t>-In this example, we selected the the well-known New York borough of Manhattan, and then further zoomed in to the Upper West Side </a:t>
-            </a:r>
-            <a:r>
-              <a:rPr lang="en-US" dirty="0" err="1"/>
-              <a:t>neighbourhood</a:t>
-            </a:r>
-            <a:r>
-              <a:rPr lang="en-US" dirty="0"/>
-              <a:t>. </a:t>
-            </a:r>
-          </a:p>
-          <a:p>
-            <a:endParaRPr lang="en-US" dirty="0"/>
-          </a:p>
-        </p:txBody>
-      </p:sp>
-      <p:sp>
-        <p:nvSpPr>
-          <p:cNvPr id="4" name="Slide Number Placeholder 3"/>
-          <p:cNvSpPr>
-            <a:spLocks noGrp="1"/>
-          </p:cNvSpPr>
-          <p:nvPr>
-            <p:ph type="sldNum" sz="quarter" idx="5"/>
-          </p:nvPr>
-        </p:nvSpPr>
-        <p:spPr/>
-        <p:txBody>
-          <a:bodyPr/>
-          <a:lstStyle/>
-          <a:p>
-            <a:fld id="{DF2352D6-35AF-0544-A99E-554CC41E76C4}" type="slidenum">
-              <a:rPr lang="en-US" smtClean="0"/>
-              <a:t>18</a:t>
-            </a:fld>
-            <a:endParaRPr lang="en-US"/>
-          </a:p>
-        </p:txBody>
-      </p:sp>
-    </p:spTree>
-    <p:extLst>
-      <p:ext uri="{BB962C8B-B14F-4D97-AF65-F5344CB8AC3E}">
-        <p14:creationId xmlns:p14="http://schemas.microsoft.com/office/powerpoint/2010/main" val="533258538"/>
-      </p:ext>
-    </p:extLst>
-  </p:cSld>
-  <p:clrMapOvr>
-    <a:masterClrMapping/>
-  </p:clrMapOvr>
-</p:notes>
-</file>
-
-<file path=ppt/notesSlides/notesSlide19.xml><?xml version="1.0" encoding="utf-8"?>
-<p:notes xmlns:a="http://schemas.openxmlformats.org/drawingml/2006/main" xmlns:r="http://schemas.openxmlformats.org/officeDocument/2006/relationships" xmlns:p="http://schemas.openxmlformats.org/presentationml/2006/main">
-  <p:cSld>
-    <p:spTree>
-      <p:nvGrpSpPr>
-        <p:cNvPr id="1" name=""/>
-        <p:cNvGrpSpPr/>
-        <p:nvPr/>
-      </p:nvGrpSpPr>
-      <p:grpSpPr>
-        <a:xfrm>
-          <a:off x="0" y="0"/>
-          <a:ext cx="0" cy="0"/>
-          <a:chOff x="0" y="0"/>
-          <a:chExt cx="0" cy="0"/>
-        </a:xfrm>
-      </p:grpSpPr>
-      <p:sp>
-        <p:nvSpPr>
-          <p:cNvPr id="2" name="Slide Image Placeholder 1"/>
-          <p:cNvSpPr>
-            <a:spLocks noGrp="1" noRot="1" noChangeAspect="1"/>
-          </p:cNvSpPr>
-          <p:nvPr>
-            <p:ph type="sldImg"/>
-          </p:nvPr>
-        </p:nvSpPr>
-        <p:spPr/>
-      </p:sp>
-      <p:sp>
-        <p:nvSpPr>
-          <p:cNvPr id="3" name="Notes Placeholder 2"/>
-          <p:cNvSpPr>
-            <a:spLocks noGrp="1"/>
-          </p:cNvSpPr>
-          <p:nvPr>
-            <p:ph type="body" idx="1"/>
-          </p:nvPr>
-        </p:nvSpPr>
-        <p:spPr/>
-        <p:txBody>
-          <a:bodyPr/>
-          <a:lstStyle/>
-          <a:p>
-            <a:endParaRPr lang="en-US" dirty="0"/>
-          </a:p>
-        </p:txBody>
-      </p:sp>
-      <p:sp>
-        <p:nvSpPr>
-          <p:cNvPr id="4" name="Slide Number Placeholder 3"/>
-          <p:cNvSpPr>
-            <a:spLocks noGrp="1"/>
-          </p:cNvSpPr>
-          <p:nvPr>
-            <p:ph type="sldNum" sz="quarter" idx="5"/>
-          </p:nvPr>
-        </p:nvSpPr>
-        <p:spPr/>
-        <p:txBody>
-          <a:bodyPr/>
-          <a:lstStyle/>
-          <a:p>
-            <a:fld id="{DF2352D6-35AF-0544-A99E-554CC41E76C4}" type="slidenum">
-              <a:rPr lang="en-US" smtClean="0"/>
-              <a:t>19</a:t>
             </a:fld>
             <a:endParaRPr lang="en-US"/>
           </a:p>
@@ -7516,21 +7155,23 @@
         </p:nvSpPr>
         <p:spPr>
           <a:xfrm>
-            <a:off x="4272238" y="588197"/>
+            <a:off x="2721982" y="696475"/>
             <a:ext cx="10515600" cy="1325563"/>
           </a:xfrm>
         </p:spPr>
         <p:txBody>
-          <a:bodyPr/>
+          <a:bodyPr>
+            <a:normAutofit/>
+          </a:bodyPr>
           <a:lstStyle/>
           <a:p>
             <a:r>
-              <a:rPr lang="en-US" dirty="0">
+              <a:rPr lang="en-US" sz="4000" dirty="0">
                 <a:solidFill>
                   <a:srgbClr val="EA5E46"/>
                 </a:solidFill>
               </a:rPr>
-              <a:t>Running the model</a:t>
+              <a:t>Model Results Breakdown- Features</a:t>
             </a:r>
           </a:p>
         </p:txBody>
@@ -7564,7 +7205,7 @@
         </p:blipFill>
         <p:spPr bwMode="auto">
           <a:xfrm>
-            <a:off x="2082633" y="0"/>
+            <a:off x="530564" y="108278"/>
             <a:ext cx="2189605" cy="2022038"/>
           </a:xfrm>
           <a:prstGeom prst="rect">
@@ -7598,7 +7239,7 @@
         </p:nvCxnSpPr>
         <p:spPr>
           <a:xfrm>
-            <a:off x="2526110" y="1576551"/>
+            <a:off x="975854" y="1684829"/>
             <a:ext cx="9518745" cy="1"/>
           </a:xfrm>
           <a:prstGeom prst="line">
@@ -7625,10 +7266,70 @@
           </a:fontRef>
         </p:style>
       </p:cxnSp>
+      <p:pic>
+        <p:nvPicPr>
+          <p:cNvPr id="4" name="Picture 3" descr="Chart, funnel chart&#10;&#10;Description automatically generated">
+            <a:extLst>
+              <a:ext uri="{FF2B5EF4-FFF2-40B4-BE49-F238E27FC236}">
+                <a16:creationId xmlns:a16="http://schemas.microsoft.com/office/drawing/2014/main" id="{5B4E1BDA-A6E4-4FBD-A0F3-8DCCAB5E65B2}"/>
+              </a:ext>
+            </a:extLst>
+          </p:cNvPr>
+          <p:cNvPicPr>
+            <a:picLocks noChangeAspect="1"/>
+          </p:cNvPicPr>
+          <p:nvPr/>
+        </p:nvPicPr>
+        <p:blipFill>
+          <a:blip r:embed="rId4"/>
+          <a:stretch>
+            <a:fillRect/>
+          </a:stretch>
+        </p:blipFill>
+        <p:spPr>
+          <a:xfrm>
+            <a:off x="6096000" y="1914369"/>
+            <a:ext cx="5158438" cy="2959635"/>
+          </a:xfrm>
+          <a:prstGeom prst="rect">
+            <a:avLst/>
+          </a:prstGeom>
+        </p:spPr>
+      </p:pic>
+      <p:pic>
+        <p:nvPicPr>
+          <p:cNvPr id="8" name="Picture 7" descr="Chart, funnel chart&#10;&#10;Description automatically generated">
+            <a:extLst>
+              <a:ext uri="{FF2B5EF4-FFF2-40B4-BE49-F238E27FC236}">
+                <a16:creationId xmlns:a16="http://schemas.microsoft.com/office/drawing/2014/main" id="{1434DA53-9BF7-4870-A791-EEDA2843BB15}"/>
+              </a:ext>
+            </a:extLst>
+          </p:cNvPr>
+          <p:cNvPicPr>
+            <a:picLocks noChangeAspect="1"/>
+          </p:cNvPicPr>
+          <p:nvPr/>
+        </p:nvPicPr>
+        <p:blipFill>
+          <a:blip r:embed="rId5"/>
+          <a:stretch>
+            <a:fillRect/>
+          </a:stretch>
+        </p:blipFill>
+        <p:spPr>
+          <a:xfrm>
+            <a:off x="773387" y="1952242"/>
+            <a:ext cx="5234522" cy="2959635"/>
+          </a:xfrm>
+          <a:prstGeom prst="rect">
+            <a:avLst/>
+          </a:prstGeom>
+        </p:spPr>
+      </p:pic>
     </p:spTree>
     <p:extLst>
       <p:ext uri="{BB962C8B-B14F-4D97-AF65-F5344CB8AC3E}">
-        <p14:creationId xmlns:p14="http://schemas.microsoft.com/office/powerpoint/2010/main" val="46653007"/>
+        <p14:creationId xmlns:p14="http://schemas.microsoft.com/office/powerpoint/2010/main" val="861530257"/>
       </p:ext>
     </p:extLst>
   </p:cSld>
@@ -7639,477 +7340,6 @@
 </file>
 
 <file path=ppt/slides/slide14.xml><?xml version="1.0" encoding="utf-8"?>
-<p:sld xmlns:a="http://schemas.openxmlformats.org/drawingml/2006/main" xmlns:r="http://schemas.openxmlformats.org/officeDocument/2006/relationships" xmlns:p="http://schemas.openxmlformats.org/presentationml/2006/main">
-  <p:cSld>
-    <p:spTree>
-      <p:nvGrpSpPr>
-        <p:cNvPr id="1" name=""/>
-        <p:cNvGrpSpPr/>
-        <p:nvPr/>
-      </p:nvGrpSpPr>
-      <p:grpSpPr>
-        <a:xfrm>
-          <a:off x="0" y="0"/>
-          <a:ext cx="0" cy="0"/>
-          <a:chOff x="0" y="0"/>
-          <a:chExt cx="0" cy="0"/>
-        </a:xfrm>
-      </p:grpSpPr>
-      <p:sp>
-        <p:nvSpPr>
-          <p:cNvPr id="2" name="Title 1">
-            <a:extLst>
-              <a:ext uri="{FF2B5EF4-FFF2-40B4-BE49-F238E27FC236}">
-                <a16:creationId xmlns:a16="http://schemas.microsoft.com/office/drawing/2014/main" id="{59B8B577-5676-3C4B-A107-E41DB331FD85}"/>
-              </a:ext>
-            </a:extLst>
-          </p:cNvPr>
-          <p:cNvSpPr>
-            <a:spLocks noGrp="1"/>
-          </p:cNvSpPr>
-          <p:nvPr>
-            <p:ph type="title"/>
-          </p:nvPr>
-        </p:nvSpPr>
-        <p:spPr>
-          <a:xfrm>
-            <a:off x="4272238" y="588197"/>
-            <a:ext cx="10515600" cy="1325563"/>
-          </a:xfrm>
-        </p:spPr>
-        <p:txBody>
-          <a:bodyPr/>
-          <a:lstStyle/>
-          <a:p>
-            <a:r>
-              <a:rPr lang="en-US" dirty="0">
-                <a:solidFill>
-                  <a:srgbClr val="EA5E46"/>
-                </a:solidFill>
-              </a:rPr>
-              <a:t>Model Challenges</a:t>
-            </a:r>
-          </a:p>
-        </p:txBody>
-      </p:sp>
-      <p:pic>
-        <p:nvPicPr>
-          <p:cNvPr id="2050" name="Picture 2" descr="Image result for air bnb logo">
-            <a:extLst>
-              <a:ext uri="{FF2B5EF4-FFF2-40B4-BE49-F238E27FC236}">
-                <a16:creationId xmlns:a16="http://schemas.microsoft.com/office/drawing/2014/main" id="{A162C291-208B-BE48-BF44-7D5CD7EF6151}"/>
-              </a:ext>
-            </a:extLst>
-          </p:cNvPr>
-          <p:cNvPicPr>
-            <a:picLocks noChangeAspect="1" noChangeArrowheads="1"/>
-          </p:cNvPicPr>
-          <p:nvPr/>
-        </p:nvPicPr>
-        <p:blipFill>
-          <a:blip r:embed="rId3">
-            <a:extLst>
-              <a:ext uri="{28A0092B-C50C-407E-A947-70E740481C1C}">
-                <a14:useLocalDpi xmlns:a14="http://schemas.microsoft.com/office/drawing/2010/main" val="0"/>
-              </a:ext>
-            </a:extLst>
-          </a:blip>
-          <a:srcRect/>
-          <a:stretch>
-            <a:fillRect/>
-          </a:stretch>
-        </p:blipFill>
-        <p:spPr bwMode="auto">
-          <a:xfrm>
-            <a:off x="2080820" y="0"/>
-            <a:ext cx="2189605" cy="2022038"/>
-          </a:xfrm>
-          <a:prstGeom prst="rect">
-            <a:avLst/>
-          </a:prstGeom>
-          <a:noFill/>
-          <a:extLst>
-            <a:ext uri="{909E8E84-426E-40DD-AFC4-6F175D3DCCD1}">
-              <a14:hiddenFill xmlns:a14="http://schemas.microsoft.com/office/drawing/2010/main">
-                <a:solidFill>
-                  <a:srgbClr val="FFFFFF"/>
-                </a:solidFill>
-              </a14:hiddenFill>
-            </a:ext>
-          </a:extLst>
-        </p:spPr>
-      </p:pic>
-      <p:cxnSp>
-        <p:nvCxnSpPr>
-          <p:cNvPr id="6" name="Straight Connector 5">
-            <a:extLst>
-              <a:ext uri="{FF2B5EF4-FFF2-40B4-BE49-F238E27FC236}">
-                <a16:creationId xmlns:a16="http://schemas.microsoft.com/office/drawing/2014/main" id="{7D0926DC-6298-B648-9DF9-0D78D09F9FC8}"/>
-              </a:ext>
-            </a:extLst>
-          </p:cNvPr>
-          <p:cNvCxnSpPr>
-            <a:cxnSpLocks/>
-          </p:cNvCxnSpPr>
-          <p:nvPr/>
-        </p:nvCxnSpPr>
-        <p:spPr>
-          <a:xfrm>
-            <a:off x="2526110" y="1576551"/>
-            <a:ext cx="9518745" cy="1"/>
-          </a:xfrm>
-          <a:prstGeom prst="line">
-            <a:avLst/>
-          </a:prstGeom>
-          <a:ln w="12700">
-            <a:solidFill>
-              <a:srgbClr val="EA5E46"/>
-            </a:solidFill>
-          </a:ln>
-        </p:spPr>
-        <p:style>
-          <a:lnRef idx="1">
-            <a:schemeClr val="accent2"/>
-          </a:lnRef>
-          <a:fillRef idx="0">
-            <a:schemeClr val="accent2"/>
-          </a:fillRef>
-          <a:effectRef idx="0">
-            <a:schemeClr val="accent2"/>
-          </a:effectRef>
-          <a:fontRef idx="minor">
-            <a:schemeClr val="tx1"/>
-          </a:fontRef>
-        </p:style>
-      </p:cxnSp>
-    </p:spTree>
-    <p:extLst>
-      <p:ext uri="{BB962C8B-B14F-4D97-AF65-F5344CB8AC3E}">
-        <p14:creationId xmlns:p14="http://schemas.microsoft.com/office/powerpoint/2010/main" val="2243286875"/>
-      </p:ext>
-    </p:extLst>
-  </p:cSld>
-  <p:clrMapOvr>
-    <a:masterClrMapping/>
-  </p:clrMapOvr>
-</p:sld>
-</file>
-
-<file path=ppt/slides/slide15.xml><?xml version="1.0" encoding="utf-8"?>
-<p:sld xmlns:a="http://schemas.openxmlformats.org/drawingml/2006/main" xmlns:r="http://schemas.openxmlformats.org/officeDocument/2006/relationships" xmlns:p="http://schemas.openxmlformats.org/presentationml/2006/main">
-  <p:cSld>
-    <p:spTree>
-      <p:nvGrpSpPr>
-        <p:cNvPr id="1" name=""/>
-        <p:cNvGrpSpPr/>
-        <p:nvPr/>
-      </p:nvGrpSpPr>
-      <p:grpSpPr>
-        <a:xfrm>
-          <a:off x="0" y="0"/>
-          <a:ext cx="0" cy="0"/>
-          <a:chOff x="0" y="0"/>
-          <a:chExt cx="0" cy="0"/>
-        </a:xfrm>
-      </p:grpSpPr>
-      <p:sp>
-        <p:nvSpPr>
-          <p:cNvPr id="2" name="Title 1">
-            <a:extLst>
-              <a:ext uri="{FF2B5EF4-FFF2-40B4-BE49-F238E27FC236}">
-                <a16:creationId xmlns:a16="http://schemas.microsoft.com/office/drawing/2014/main" id="{59B8B577-5676-3C4B-A107-E41DB331FD85}"/>
-              </a:ext>
-            </a:extLst>
-          </p:cNvPr>
-          <p:cNvSpPr>
-            <a:spLocks noGrp="1"/>
-          </p:cNvSpPr>
-          <p:nvPr>
-            <p:ph type="title"/>
-          </p:nvPr>
-        </p:nvSpPr>
-        <p:spPr>
-          <a:xfrm>
-            <a:off x="4123382" y="513769"/>
-            <a:ext cx="10515600" cy="1325563"/>
-          </a:xfrm>
-        </p:spPr>
-        <p:txBody>
-          <a:bodyPr/>
-          <a:lstStyle/>
-          <a:p>
-            <a:r>
-              <a:rPr lang="en-US" dirty="0">
-                <a:solidFill>
-                  <a:srgbClr val="EA5E46"/>
-                </a:solidFill>
-              </a:rPr>
-              <a:t>Model Findings – Price Correlation</a:t>
-            </a:r>
-          </a:p>
-        </p:txBody>
-      </p:sp>
-      <p:pic>
-        <p:nvPicPr>
-          <p:cNvPr id="2050" name="Picture 2" descr="Image result for air bnb logo">
-            <a:extLst>
-              <a:ext uri="{FF2B5EF4-FFF2-40B4-BE49-F238E27FC236}">
-                <a16:creationId xmlns:a16="http://schemas.microsoft.com/office/drawing/2014/main" id="{A162C291-208B-BE48-BF44-7D5CD7EF6151}"/>
-              </a:ext>
-            </a:extLst>
-          </p:cNvPr>
-          <p:cNvPicPr>
-            <a:picLocks noChangeAspect="1" noChangeArrowheads="1"/>
-          </p:cNvPicPr>
-          <p:nvPr/>
-        </p:nvPicPr>
-        <p:blipFill>
-          <a:blip r:embed="rId3">
-            <a:extLst>
-              <a:ext uri="{28A0092B-C50C-407E-A947-70E740481C1C}">
-                <a14:useLocalDpi xmlns:a14="http://schemas.microsoft.com/office/drawing/2010/main" val="0"/>
-              </a:ext>
-            </a:extLst>
-          </a:blip>
-          <a:srcRect/>
-          <a:stretch>
-            <a:fillRect/>
-          </a:stretch>
-        </p:blipFill>
-        <p:spPr bwMode="auto">
-          <a:xfrm>
-            <a:off x="2080820" y="0"/>
-            <a:ext cx="2189605" cy="2022038"/>
-          </a:xfrm>
-          <a:prstGeom prst="rect">
-            <a:avLst/>
-          </a:prstGeom>
-          <a:noFill/>
-          <a:extLst>
-            <a:ext uri="{909E8E84-426E-40DD-AFC4-6F175D3DCCD1}">
-              <a14:hiddenFill xmlns:a14="http://schemas.microsoft.com/office/drawing/2010/main">
-                <a:solidFill>
-                  <a:srgbClr val="FFFFFF"/>
-                </a:solidFill>
-              </a14:hiddenFill>
-            </a:ext>
-          </a:extLst>
-        </p:spPr>
-      </p:pic>
-      <p:cxnSp>
-        <p:nvCxnSpPr>
-          <p:cNvPr id="6" name="Straight Connector 5">
-            <a:extLst>
-              <a:ext uri="{FF2B5EF4-FFF2-40B4-BE49-F238E27FC236}">
-                <a16:creationId xmlns:a16="http://schemas.microsoft.com/office/drawing/2014/main" id="{7D0926DC-6298-B648-9DF9-0D78D09F9FC8}"/>
-              </a:ext>
-            </a:extLst>
-          </p:cNvPr>
-          <p:cNvCxnSpPr>
-            <a:cxnSpLocks/>
-          </p:cNvCxnSpPr>
-          <p:nvPr/>
-        </p:nvCxnSpPr>
-        <p:spPr>
-          <a:xfrm>
-            <a:off x="2526110" y="1576551"/>
-            <a:ext cx="9518745" cy="1"/>
-          </a:xfrm>
-          <a:prstGeom prst="line">
-            <a:avLst/>
-          </a:prstGeom>
-          <a:ln w="12700">
-            <a:solidFill>
-              <a:srgbClr val="EA5E46"/>
-            </a:solidFill>
-          </a:ln>
-        </p:spPr>
-        <p:style>
-          <a:lnRef idx="1">
-            <a:schemeClr val="accent2"/>
-          </a:lnRef>
-          <a:fillRef idx="0">
-            <a:schemeClr val="accent2"/>
-          </a:fillRef>
-          <a:effectRef idx="0">
-            <a:schemeClr val="accent2"/>
-          </a:effectRef>
-          <a:fontRef idx="minor">
-            <a:schemeClr val="tx1"/>
-          </a:fontRef>
-        </p:style>
-      </p:cxnSp>
-    </p:spTree>
-    <p:extLst>
-      <p:ext uri="{BB962C8B-B14F-4D97-AF65-F5344CB8AC3E}">
-        <p14:creationId xmlns:p14="http://schemas.microsoft.com/office/powerpoint/2010/main" val="191879790"/>
-      </p:ext>
-    </p:extLst>
-  </p:cSld>
-  <p:clrMapOvr>
-    <a:masterClrMapping/>
-  </p:clrMapOvr>
-</p:sld>
-</file>
-
-<file path=ppt/slides/slide16.xml><?xml version="1.0" encoding="utf-8"?>
-<p:sld xmlns:a="http://schemas.openxmlformats.org/drawingml/2006/main" xmlns:r="http://schemas.openxmlformats.org/officeDocument/2006/relationships" xmlns:p="http://schemas.openxmlformats.org/presentationml/2006/main">
-  <p:cSld>
-    <p:spTree>
-      <p:nvGrpSpPr>
-        <p:cNvPr id="1" name=""/>
-        <p:cNvGrpSpPr/>
-        <p:nvPr/>
-      </p:nvGrpSpPr>
-      <p:grpSpPr>
-        <a:xfrm>
-          <a:off x="0" y="0"/>
-          <a:ext cx="0" cy="0"/>
-          <a:chOff x="0" y="0"/>
-          <a:chExt cx="0" cy="0"/>
-        </a:xfrm>
-      </p:grpSpPr>
-      <p:sp>
-        <p:nvSpPr>
-          <p:cNvPr id="2" name="Title 1">
-            <a:extLst>
-              <a:ext uri="{FF2B5EF4-FFF2-40B4-BE49-F238E27FC236}">
-                <a16:creationId xmlns:a16="http://schemas.microsoft.com/office/drawing/2014/main" id="{59B8B577-5676-3C4B-A107-E41DB331FD85}"/>
-              </a:ext>
-            </a:extLst>
-          </p:cNvPr>
-          <p:cNvSpPr>
-            <a:spLocks noGrp="1"/>
-          </p:cNvSpPr>
-          <p:nvPr>
-            <p:ph type="title"/>
-          </p:nvPr>
-        </p:nvSpPr>
-        <p:spPr>
-          <a:xfrm>
-            <a:off x="4272238" y="588197"/>
-            <a:ext cx="10515600" cy="1325563"/>
-          </a:xfrm>
-        </p:spPr>
-        <p:txBody>
-          <a:bodyPr/>
-          <a:lstStyle/>
-          <a:p>
-            <a:r>
-              <a:rPr lang="en-US" dirty="0">
-                <a:solidFill>
-                  <a:srgbClr val="EA5E46"/>
-                </a:solidFill>
-              </a:rPr>
-              <a:t>Model Findings – Features </a:t>
-            </a:r>
-          </a:p>
-        </p:txBody>
-      </p:sp>
-      <p:pic>
-        <p:nvPicPr>
-          <p:cNvPr id="2050" name="Picture 2" descr="Image result for air bnb logo">
-            <a:extLst>
-              <a:ext uri="{FF2B5EF4-FFF2-40B4-BE49-F238E27FC236}">
-                <a16:creationId xmlns:a16="http://schemas.microsoft.com/office/drawing/2014/main" id="{A162C291-208B-BE48-BF44-7D5CD7EF6151}"/>
-              </a:ext>
-            </a:extLst>
-          </p:cNvPr>
-          <p:cNvPicPr>
-            <a:picLocks noChangeAspect="1" noChangeArrowheads="1"/>
-          </p:cNvPicPr>
-          <p:nvPr/>
-        </p:nvPicPr>
-        <p:blipFill>
-          <a:blip r:embed="rId3">
-            <a:extLst>
-              <a:ext uri="{28A0092B-C50C-407E-A947-70E740481C1C}">
-                <a14:useLocalDpi xmlns:a14="http://schemas.microsoft.com/office/drawing/2010/main" val="0"/>
-              </a:ext>
-            </a:extLst>
-          </a:blip>
-          <a:srcRect/>
-          <a:stretch>
-            <a:fillRect/>
-          </a:stretch>
-        </p:blipFill>
-        <p:spPr bwMode="auto">
-          <a:xfrm>
-            <a:off x="2080820" y="0"/>
-            <a:ext cx="2189605" cy="2022038"/>
-          </a:xfrm>
-          <a:prstGeom prst="rect">
-            <a:avLst/>
-          </a:prstGeom>
-          <a:noFill/>
-          <a:extLst>
-            <a:ext uri="{909E8E84-426E-40DD-AFC4-6F175D3DCCD1}">
-              <a14:hiddenFill xmlns:a14="http://schemas.microsoft.com/office/drawing/2010/main">
-                <a:solidFill>
-                  <a:srgbClr val="FFFFFF"/>
-                </a:solidFill>
-              </a14:hiddenFill>
-            </a:ext>
-          </a:extLst>
-        </p:spPr>
-      </p:pic>
-      <p:cxnSp>
-        <p:nvCxnSpPr>
-          <p:cNvPr id="6" name="Straight Connector 5">
-            <a:extLst>
-              <a:ext uri="{FF2B5EF4-FFF2-40B4-BE49-F238E27FC236}">
-                <a16:creationId xmlns:a16="http://schemas.microsoft.com/office/drawing/2014/main" id="{7D0926DC-6298-B648-9DF9-0D78D09F9FC8}"/>
-              </a:ext>
-            </a:extLst>
-          </p:cNvPr>
-          <p:cNvCxnSpPr>
-            <a:cxnSpLocks/>
-          </p:cNvCxnSpPr>
-          <p:nvPr/>
-        </p:nvCxnSpPr>
-        <p:spPr>
-          <a:xfrm>
-            <a:off x="2526110" y="1576551"/>
-            <a:ext cx="9518745" cy="1"/>
-          </a:xfrm>
-          <a:prstGeom prst="line">
-            <a:avLst/>
-          </a:prstGeom>
-          <a:ln w="12700">
-            <a:solidFill>
-              <a:srgbClr val="EA5E46"/>
-            </a:solidFill>
-          </a:ln>
-        </p:spPr>
-        <p:style>
-          <a:lnRef idx="1">
-            <a:schemeClr val="accent2"/>
-          </a:lnRef>
-          <a:fillRef idx="0">
-            <a:schemeClr val="accent2"/>
-          </a:fillRef>
-          <a:effectRef idx="0">
-            <a:schemeClr val="accent2"/>
-          </a:effectRef>
-          <a:fontRef idx="minor">
-            <a:schemeClr val="tx1"/>
-          </a:fontRef>
-        </p:style>
-      </p:cxnSp>
-    </p:spTree>
-    <p:extLst>
-      <p:ext uri="{BB962C8B-B14F-4D97-AF65-F5344CB8AC3E}">
-        <p14:creationId xmlns:p14="http://schemas.microsoft.com/office/powerpoint/2010/main" val="2072027101"/>
-      </p:ext>
-    </p:extLst>
-  </p:cSld>
-  <p:clrMapOvr>
-    <a:masterClrMapping/>
-  </p:clrMapOvr>
-</p:sld>
-</file>
-
-<file path=ppt/slides/slide17.xml><?xml version="1.0" encoding="utf-8"?>
 <p:sld xmlns:a="http://schemas.openxmlformats.org/drawingml/2006/main" xmlns:r="http://schemas.openxmlformats.org/officeDocument/2006/relationships" xmlns:p="http://schemas.openxmlformats.org/presentationml/2006/main">
   <p:cSld>
     <p:spTree>
@@ -8281,7 +7511,7 @@
 </p:sld>
 </file>
 
-<file path=ppt/slides/slide18.xml><?xml version="1.0" encoding="utf-8"?>
+<file path=ppt/slides/slide15.xml><?xml version="1.0" encoding="utf-8"?>
 <p:sld xmlns:a="http://schemas.openxmlformats.org/drawingml/2006/main" xmlns:r="http://schemas.openxmlformats.org/officeDocument/2006/relationships" xmlns:p="http://schemas.openxmlformats.org/presentationml/2006/main">
   <p:cSld>
     <p:spTree>
@@ -8440,7 +7670,7 @@
 </p:sld>
 </file>
 
-<file path=ppt/slides/slide19.xml><?xml version="1.0" encoding="utf-8"?>
+<file path=ppt/slides/slide16.xml><?xml version="1.0" encoding="utf-8"?>
 <p:sld xmlns:a="http://schemas.openxmlformats.org/drawingml/2006/main" xmlns:r="http://schemas.openxmlformats.org/officeDocument/2006/relationships" xmlns:p="http://schemas.openxmlformats.org/presentationml/2006/main">
   <p:cSld>
     <p:spTree>

</xml_diff>

<commit_message>
add image & update powerpoint
</commit_message>
<xml_diff>
--- a/Airbnb Price Predictions (Model).pptx
+++ b/Airbnb Price Predictions (Model).pptx
@@ -5,7 +5,7 @@
     <p:sldMasterId id="2147483648" r:id="rId1"/>
   </p:sldMasterIdLst>
   <p:notesMasterIdLst>
-    <p:notesMasterId r:id="rId27"/>
+    <p:notesMasterId r:id="rId26"/>
   </p:notesMasterIdLst>
   <p:sldIdLst>
     <p:sldId id="257" r:id="rId2"/>
@@ -16,23 +16,22 @@
     <p:sldId id="308" r:id="rId7"/>
     <p:sldId id="280" r:id="rId8"/>
     <p:sldId id="315" r:id="rId9"/>
-    <p:sldId id="299" r:id="rId10"/>
-    <p:sldId id="296" r:id="rId11"/>
-    <p:sldId id="300" r:id="rId12"/>
-    <p:sldId id="298" r:id="rId13"/>
-    <p:sldId id="307" r:id="rId14"/>
-    <p:sldId id="306" r:id="rId15"/>
-    <p:sldId id="325" r:id="rId16"/>
-    <p:sldId id="304" r:id="rId17"/>
-    <p:sldId id="311" r:id="rId18"/>
-    <p:sldId id="310" r:id="rId19"/>
-    <p:sldId id="312" r:id="rId20"/>
-    <p:sldId id="313" r:id="rId21"/>
-    <p:sldId id="314" r:id="rId22"/>
-    <p:sldId id="319" r:id="rId23"/>
-    <p:sldId id="318" r:id="rId24"/>
-    <p:sldId id="316" r:id="rId25"/>
-    <p:sldId id="317" r:id="rId26"/>
+    <p:sldId id="296" r:id="rId10"/>
+    <p:sldId id="300" r:id="rId11"/>
+    <p:sldId id="298" r:id="rId12"/>
+    <p:sldId id="307" r:id="rId13"/>
+    <p:sldId id="306" r:id="rId14"/>
+    <p:sldId id="325" r:id="rId15"/>
+    <p:sldId id="304" r:id="rId16"/>
+    <p:sldId id="311" r:id="rId17"/>
+    <p:sldId id="310" r:id="rId18"/>
+    <p:sldId id="312" r:id="rId19"/>
+    <p:sldId id="313" r:id="rId20"/>
+    <p:sldId id="314" r:id="rId21"/>
+    <p:sldId id="319" r:id="rId22"/>
+    <p:sldId id="318" r:id="rId23"/>
+    <p:sldId id="316" r:id="rId24"/>
+    <p:sldId id="317" r:id="rId25"/>
   </p:sldIdLst>
   <p:sldSz cx="12192000" cy="6858000"/>
   <p:notesSz cx="6858000" cy="9144000"/>
@@ -233,7 +232,7 @@
           <a:p>
             <a:fld id="{4CCFD3AE-9071-224A-B675-15A76FB69B01}" type="datetimeFigureOut">
               <a:rPr lang="en-US" smtClean="0"/>
-              <a:t>3/21/2021</a:t>
+              <a:t>3/22/2021</a:t>
             </a:fld>
             <a:endParaRPr lang="en-US"/>
           </a:p>
@@ -630,7 +629,27 @@
           <a:p>
             <a:r>
               <a:rPr lang="en-US" dirty="0"/>
-              <a:t>This table provides an overview of what we need to do to try to find the best fit for the model.  The next few slides will provide a breakdown of what we did to transform the data.</a:t>
+              <a:t>First, we needed to replace the blank fields with the averages for that specific column</a:t>
+            </a:r>
+          </a:p>
+          <a:p>
+            <a:r>
+              <a:rPr lang="en-US" dirty="0"/>
+              <a:t>Second, we need to put the data by categorize our data by numerical values which was done from our last project for boroughs, </a:t>
+            </a:r>
+            <a:r>
+              <a:rPr lang="en-US" dirty="0" err="1"/>
+              <a:t>neighbourhoods</a:t>
+            </a:r>
+            <a:r>
+              <a:rPr lang="en-US" dirty="0"/>
+              <a:t> &amp; room type.</a:t>
+            </a:r>
+          </a:p>
+          <a:p>
+            <a:r>
+              <a:rPr lang="en-US" dirty="0"/>
+              <a:t>Then we also, vectorize the most important amenities to get a count for each listing.</a:t>
             </a:r>
           </a:p>
           <a:p>
@@ -664,7 +683,7 @@
     </p:spTree>
     <p:extLst>
       <p:ext uri="{BB962C8B-B14F-4D97-AF65-F5344CB8AC3E}">
-        <p14:creationId xmlns:p14="http://schemas.microsoft.com/office/powerpoint/2010/main" val="582048577"/>
+        <p14:creationId xmlns:p14="http://schemas.microsoft.com/office/powerpoint/2010/main" val="2102900166"/>
       </p:ext>
     </p:extLst>
   </p:cSld>
@@ -720,13 +739,7 @@
           <a:p>
             <a:r>
               <a:rPr lang="en-US" dirty="0"/>
-              <a:t>First, we needed to replace the blank fields with the averages for that specific column</a:t>
-            </a:r>
-          </a:p>
-          <a:p>
-            <a:r>
-              <a:rPr lang="en-US" dirty="0"/>
-              <a:t>Second, we need to put the data by categorize our data by numerical values which was done from our last project for boroughs, </a:t>
+              <a:t>To get the best selection of listings that best represents NYC Airbnb market, 2e filtered out the outliers by only keeping the </a:t>
             </a:r>
             <a:r>
               <a:rPr lang="en-US" dirty="0" err="1"/>
@@ -734,17 +747,8 @@
             </a:r>
             <a:r>
               <a:rPr lang="en-US" dirty="0"/>
-              <a:t> &amp; room type.</a:t>
-            </a:r>
-          </a:p>
-          <a:p>
-            <a:r>
-              <a:rPr lang="en-US" dirty="0"/>
-              <a:t>Then we also, vectorize the most important amenities to get a count for each listing.</a:t>
-            </a:r>
-          </a:p>
-          <a:p>
-            <a:endParaRPr lang="en-US" dirty="0"/>
+              <a:t> that  with over 100 listings &amp; the listing prices under $600 so it is more normally distributed.</a:t>
+            </a:r>
           </a:p>
         </p:txBody>
       </p:sp>
@@ -774,7 +778,7 @@
     </p:spTree>
     <p:extLst>
       <p:ext uri="{BB962C8B-B14F-4D97-AF65-F5344CB8AC3E}">
-        <p14:creationId xmlns:p14="http://schemas.microsoft.com/office/powerpoint/2010/main" val="2102900166"/>
+        <p14:creationId xmlns:p14="http://schemas.microsoft.com/office/powerpoint/2010/main" val="1272532608"/>
       </p:ext>
     </p:extLst>
   </p:cSld>
@@ -830,15 +834,47 @@
           <a:p>
             <a:r>
               <a:rPr lang="en-US" dirty="0"/>
-              <a:t>To get the best selection of listings that best represents NYC Airbnb market, 2e filtered out the outliers by only keeping the </a:t>
+              <a:t>The </a:t>
             </a:r>
             <a:r>
               <a:rPr lang="en-US" dirty="0" err="1"/>
-              <a:t>neighbourhoods</a:t>
+              <a:t>facebook</a:t>
             </a:r>
             <a:r>
               <a:rPr lang="en-US" dirty="0"/>
-              <a:t> that  with over 100 listings &amp; the listing prices under $600 so it is more normally distributed.</a:t>
+              <a:t> prophet runs differently than the other regressor model and another dataset needs to be created.</a:t>
+            </a:r>
+          </a:p>
+          <a:p>
+            <a:r>
+              <a:rPr lang="en-US" dirty="0"/>
+              <a:t>We used our existing data to find the listings masters data to get the borough and room type.  </a:t>
+            </a:r>
+          </a:p>
+          <a:p>
+            <a:r>
+              <a:rPr lang="en-US" dirty="0"/>
+              <a:t>Then we need to created new datasets to find all the </a:t>
+            </a:r>
+            <a:r>
+              <a:rPr lang="en-US" dirty="0" err="1"/>
+              <a:t>historial</a:t>
+            </a:r>
+            <a:r>
+              <a:rPr lang="en-US" dirty="0"/>
+              <a:t> rates &amp; holiday dates from 2017-2021.  All this information is found on the inside Airbnb &amp; us holiday calendar website. </a:t>
+            </a:r>
+          </a:p>
+          <a:p>
+            <a:r>
+              <a:rPr lang="en-US" dirty="0"/>
+              <a:t>Various methods like concatenation, filtering, merging, renaming columns and calculating the mean were used in Pandas to get our Final output</a:t>
+            </a:r>
+          </a:p>
+          <a:p>
+            <a:r>
+              <a:rPr lang="en-US" dirty="0"/>
+              <a:t>We believe that putting all of this together can help us accurately predict prices based on location, size, trends and seasonality.</a:t>
             </a:r>
           </a:p>
         </p:txBody>
@@ -869,7 +905,7 @@
     </p:spTree>
     <p:extLst>
       <p:ext uri="{BB962C8B-B14F-4D97-AF65-F5344CB8AC3E}">
-        <p14:creationId xmlns:p14="http://schemas.microsoft.com/office/powerpoint/2010/main" val="1272532608"/>
+        <p14:creationId xmlns:p14="http://schemas.microsoft.com/office/powerpoint/2010/main" val="3798830468"/>
       </p:ext>
     </p:extLst>
   </p:cSld>
@@ -925,47 +961,48 @@
           <a:p>
             <a:r>
               <a:rPr lang="en-US" dirty="0"/>
-              <a:t>The </a:t>
+              <a:t>The next step is that we need to select the right features that impact the price.  We collectively agreed that features like location, the room type, # of bedrooms/bathrooms, amenities count review scores, # of reviews are some of the major driving force that impacts what the hosts charge for their Airbnb.</a:t>
+            </a:r>
+          </a:p>
+          <a:p>
+            <a:endParaRPr lang="en-US" dirty="0"/>
+          </a:p>
+          <a:p>
+            <a:r>
+              <a:rPr lang="en-US" dirty="0"/>
+              <a:t>Then we increased the dataset size by 10% so that more listing simples can be tested to increase the accuracy of the test scores.</a:t>
+            </a:r>
+          </a:p>
+          <a:p>
+            <a:endParaRPr lang="en-US" dirty="0"/>
+          </a:p>
+          <a:p>
+            <a:r>
+              <a:rPr lang="en-US" dirty="0"/>
+              <a:t>We must ensure that all x-values need to be scaled to the same unit so that it doesn’t give us the wrong </a:t>
             </a:r>
             <a:r>
               <a:rPr lang="en-US" dirty="0" err="1"/>
-              <a:t>facebook</a:t>
+              <a:t>scorres</a:t>
             </a:r>
             <a:r>
               <a:rPr lang="en-US" dirty="0"/>
-              <a:t> prophet runs differently than the other regressor model, so we need to create another dataset for this. </a:t>
-            </a:r>
+              <a:t>.</a:t>
+            </a:r>
+          </a:p>
+          <a:p>
+            <a:endParaRPr lang="en-US" dirty="0"/>
           </a:p>
           <a:p>
             <a:r>
               <a:rPr lang="en-US" dirty="0"/>
-              <a:t>We used our existing data to find the listings masters data to get the borough and room type.  </a:t>
+              <a:t>As for the prophet model, we added the holiday feature, borough and room type info form the original default code we have to </a:t>
             </a:r>
           </a:p>
           <a:p>
             <a:r>
               <a:rPr lang="en-US" dirty="0"/>
-              <a:t>Then we need to created new datasets to find all the </a:t>
-            </a:r>
-            <a:r>
-              <a:rPr lang="en-US" dirty="0" err="1"/>
-              <a:t>historial</a:t>
-            </a:r>
-            <a:r>
-              <a:rPr lang="en-US" dirty="0"/>
-              <a:t> rates &amp; holiday dates from 2017-2021.  All this information is found on the inside Airbnb &amp; us holiday calendar website. </a:t>
-            </a:r>
-          </a:p>
-          <a:p>
-            <a:r>
-              <a:rPr lang="en-US" dirty="0"/>
-              <a:t>Various methods like concatenation, filtering, merging, renaming columns and calculating the mean were used in Pandas to get our Final output</a:t>
-            </a:r>
-          </a:p>
-          <a:p>
-            <a:r>
-              <a:rPr lang="en-US" dirty="0"/>
-              <a:t>We believe that putting all of this together can help us accurately predict prices based on location, size, trends and seasonality.</a:t>
+              <a:t> find the optimal train-test data split and to normalize the X-values so that they are in the same units for the model to produce to correct results.</a:t>
             </a:r>
           </a:p>
         </p:txBody>
@@ -996,7 +1033,7 @@
     </p:spTree>
     <p:extLst>
       <p:ext uri="{BB962C8B-B14F-4D97-AF65-F5344CB8AC3E}">
-        <p14:creationId xmlns:p14="http://schemas.microsoft.com/office/powerpoint/2010/main" val="3798830468"/>
+        <p14:creationId xmlns:p14="http://schemas.microsoft.com/office/powerpoint/2010/main" val="3299870767"/>
       </p:ext>
     </p:extLst>
   </p:cSld>
@@ -1052,48 +1089,13 @@
           <a:p>
             <a:r>
               <a:rPr lang="en-US" dirty="0"/>
-              <a:t>The next step is that we need to select the right features that impact the price.  We collectively agreed that features like location, the room type, # of bedrooms/bathrooms, amenities count review scores, # of reviews are some of the major driving force that impacts what the hosts charge for their Airbnb.</a:t>
-            </a:r>
-          </a:p>
-          <a:p>
-            <a:endParaRPr lang="en-US" dirty="0"/>
+              <a:t>This table shows you the coefficient of correlation (R2) &amp; Mean Squared Error (MSE)</a:t>
+            </a:r>
           </a:p>
           <a:p>
             <a:r>
               <a:rPr lang="en-US" dirty="0"/>
-              <a:t>Then we increased the dataset size by 10% so that more listing simples can be tested to increase the accuracy of the test scores.</a:t>
-            </a:r>
-          </a:p>
-          <a:p>
-            <a:endParaRPr lang="en-US" dirty="0"/>
-          </a:p>
-          <a:p>
-            <a:r>
-              <a:rPr lang="en-US" dirty="0"/>
-              <a:t>We must ensure that all x-values need to be scaled to the same unit so that it doesn’t give us the wrong </a:t>
-            </a:r>
-            <a:r>
-              <a:rPr lang="en-US" dirty="0" err="1"/>
-              <a:t>scorres</a:t>
-            </a:r>
-            <a:r>
-              <a:rPr lang="en-US" dirty="0"/>
-              <a:t>.</a:t>
-            </a:r>
-          </a:p>
-          <a:p>
-            <a:endParaRPr lang="en-US" dirty="0"/>
-          </a:p>
-          <a:p>
-            <a:r>
-              <a:rPr lang="en-US" dirty="0"/>
-              <a:t>As for the prophet model, we added the holiday feature, borough and room type info form the original default code we have to </a:t>
-            </a:r>
-          </a:p>
-          <a:p>
-            <a:r>
-              <a:rPr lang="en-US" dirty="0"/>
-              <a:t> find the optimal train-test data split and to normalize the X-values so that they are in the same units for the model to produce to correct results.</a:t>
+              <a:t>The r2 tells you how close the data fits to the regression line.  MSE is the squared average difference between the actual &amp; predicted values.</a:t>
             </a:r>
           </a:p>
         </p:txBody>
@@ -1124,7 +1126,7 @@
     </p:spTree>
     <p:extLst>
       <p:ext uri="{BB962C8B-B14F-4D97-AF65-F5344CB8AC3E}">
-        <p14:creationId xmlns:p14="http://schemas.microsoft.com/office/powerpoint/2010/main" val="3299870767"/>
+        <p14:creationId xmlns:p14="http://schemas.microsoft.com/office/powerpoint/2010/main" val="2903025816"/>
       </p:ext>
     </p:extLst>
   </p:cSld>
@@ -1180,13 +1182,42 @@
           <a:p>
             <a:r>
               <a:rPr lang="en-US" dirty="0"/>
-              <a:t>This table shows you the coefficient of correlation (R2) &amp; Mean Squared Error (MSE)</a:t>
-            </a:r>
-          </a:p>
-          <a:p>
+              <a:t>This table displays the model r2 &amp; </a:t>
+            </a:r>
+            <a:r>
+              <a:rPr lang="en-US" dirty="0" err="1"/>
+              <a:t>mse</a:t>
+            </a:r>
             <a:r>
               <a:rPr lang="en-US" dirty="0"/>
-              <a:t>The r2 tells you how close the data fits to the regression line.  MSE is the squared average difference between the actual &amp; predicted values.</a:t>
+              <a:t> scores.  I have also listed the factors that the model takes in when predicting prices for the units.  </a:t>
+            </a:r>
+          </a:p>
+          <a:p>
+            <a:r>
+              <a:rPr lang="en-US" dirty="0"/>
+              <a:t>Looking at the results, we cannot solely price your unit based on the average rates of the area as the KNN Regressor Model shows the lowest accuracy scores.</a:t>
+            </a:r>
+          </a:p>
+          <a:p>
+            <a:r>
+              <a:rPr lang="en-US" dirty="0"/>
+              <a:t>The hosts will need to look deeper into factors like room type, amenities, and other features to scale their rates accordingly.</a:t>
+            </a:r>
+          </a:p>
+          <a:p>
+            <a:r>
+              <a:rPr lang="en-US" dirty="0"/>
+              <a:t>Finally, the hosts maximize their revenue by looking at the traveling demands during different times of the year.  For example, rates can be priced higher during the weekends, summer months, and on major holidays like Christmas.</a:t>
+            </a:r>
+          </a:p>
+          <a:p>
+            <a:endParaRPr lang="en-US" dirty="0"/>
+          </a:p>
+          <a:p>
+            <a:r>
+              <a:rPr lang="en-US" dirty="0"/>
+              <a:t>The next slide will show the result breakdown of the Airbnb pricing model.</a:t>
             </a:r>
           </a:p>
         </p:txBody>
@@ -1217,7 +1248,7 @@
     </p:spTree>
     <p:extLst>
       <p:ext uri="{BB962C8B-B14F-4D97-AF65-F5344CB8AC3E}">
-        <p14:creationId xmlns:p14="http://schemas.microsoft.com/office/powerpoint/2010/main" val="2903025816"/>
+        <p14:creationId xmlns:p14="http://schemas.microsoft.com/office/powerpoint/2010/main" val="4084500735"/>
       </p:ext>
     </p:extLst>
   </p:cSld>
@@ -1273,54 +1304,26 @@
           <a:p>
             <a:r>
               <a:rPr lang="en-US" dirty="0"/>
-              <a:t>Based on the results, it tells us 3 things:</a:t>
-            </a:r>
-          </a:p>
-          <a:p>
-            <a:pPr marL="228600" indent="-228600">
-              <a:buAutoNum type="arabicParenR"/>
-            </a:pPr>
+              <a:t>In this slide we look at the price correlation versus the accommodations and amenities in the yellow box.  </a:t>
+            </a:r>
+          </a:p>
+          <a:p>
             <a:r>
               <a:rPr lang="en-US" dirty="0"/>
-              <a:t>FB Prophet has the highest R-squared  score and  lowest MSE.  This </a:t>
-            </a:r>
-            <a:r>
-              <a:rPr lang="en-US" dirty="0" err="1"/>
-              <a:t>indicatesthat</a:t>
-            </a:r>
-            <a:r>
-              <a:rPr lang="en-US" dirty="0"/>
-              <a:t> timing has a strong impact to the price.  The host can consider pricing them differently on the day of the week, month, seasons &amp; holidays.</a:t>
-            </a:r>
-          </a:p>
-          <a:p>
-            <a:pPr marL="228600" indent="-228600">
-              <a:buAutoNum type="arabicParenR"/>
-            </a:pPr>
-            <a:r>
-              <a:rPr lang="en-US" dirty="0"/>
-              <a:t>Having more features/amenities can help you increase the price too with the correlation being over 50%.  However, another factor to consider is that </a:t>
-            </a:r>
-          </a:p>
-          <a:p>
-            <a:pPr marL="228600" indent="-228600">
-              <a:buAutoNum type="arabicParenR"/>
-            </a:pPr>
-            <a:r>
-              <a:rPr lang="en-US" dirty="0"/>
-              <a:t>Surprisingly, the KNN score is quite low, </a:t>
-            </a:r>
-          </a:p>
-          <a:p>
-            <a:endParaRPr lang="en-US" dirty="0"/>
-          </a:p>
-          <a:p>
-            <a:endParaRPr lang="en-US" dirty="0"/>
-          </a:p>
-          <a:p>
-            <a:endParaRPr lang="en-US" dirty="0"/>
-          </a:p>
-          <a:p>
+              <a:t>Just by looking at the correlation figures, the heatmap implies that size and basic accommodations have a moderate impact on the prices.  Having more amenities like washer and air conditioning are nice to have features that can help increase the rates.</a:t>
+            </a:r>
+          </a:p>
+          <a:p>
+            <a:r>
+              <a:rPr lang="en-US" b="0" i="0" dirty="0">
+                <a:solidFill>
+                  <a:srgbClr val="292929"/>
+                </a:solidFill>
+                <a:effectLst/>
+                <a:latin typeface="charter"/>
+              </a:rPr>
+              <a:t>  </a:t>
+            </a:r>
             <a:endParaRPr lang="en-US" dirty="0"/>
           </a:p>
         </p:txBody>
@@ -1351,7 +1354,7 @@
     </p:spTree>
     <p:extLst>
       <p:ext uri="{BB962C8B-B14F-4D97-AF65-F5344CB8AC3E}">
-        <p14:creationId xmlns:p14="http://schemas.microsoft.com/office/powerpoint/2010/main" val="4084500735"/>
+        <p14:creationId xmlns:p14="http://schemas.microsoft.com/office/powerpoint/2010/main" val="771449764"/>
       </p:ext>
     </p:extLst>
   </p:cSld>
@@ -1405,22 +1408,7 @@
           <a:bodyPr/>
           <a:lstStyle/>
           <a:p>
-            <a:r>
-              <a:rPr lang="en-US" dirty="0"/>
-              <a:t>This table shows you the coefficient of correlation (R2) &amp; Mean Squared Error (MSE)</a:t>
-            </a:r>
-          </a:p>
-          <a:p>
-            <a:r>
-              <a:rPr lang="en-US" dirty="0"/>
-              <a:t>The r2 tells you how close the data fits to the regression line.  MSE is the squared average difference between the actual &amp; predicted values.</a:t>
-            </a:r>
-          </a:p>
-          <a:p>
-            <a:r>
-              <a:rPr lang="en-US" dirty="0"/>
-              <a:t>Based on the model,  it tells us that the time trends have the strong impact on the price.  The features have a moderate correlation to the price and the clustering have a fairly weak correlation</a:t>
-            </a:r>
+            <a:endParaRPr lang="en-US" dirty="0"/>
           </a:p>
           <a:p>
             <a:endParaRPr lang="en-US" dirty="0"/>
@@ -1465,7 +1453,7 @@
     </p:spTree>
     <p:extLst>
       <p:ext uri="{BB962C8B-B14F-4D97-AF65-F5344CB8AC3E}">
-        <p14:creationId xmlns:p14="http://schemas.microsoft.com/office/powerpoint/2010/main" val="771449764"/>
+        <p14:creationId xmlns:p14="http://schemas.microsoft.com/office/powerpoint/2010/main" val="1755046140"/>
       </p:ext>
     </p:extLst>
   </p:cSld>
@@ -1579,7 +1567,7 @@
     </p:spTree>
     <p:extLst>
       <p:ext uri="{BB962C8B-B14F-4D97-AF65-F5344CB8AC3E}">
-        <p14:creationId xmlns:p14="http://schemas.microsoft.com/office/powerpoint/2010/main" val="1755046140"/>
+        <p14:creationId xmlns:p14="http://schemas.microsoft.com/office/powerpoint/2010/main" val="733089083"/>
       </p:ext>
     </p:extLst>
   </p:cSld>
@@ -1693,7 +1681,7 @@
     </p:spTree>
     <p:extLst>
       <p:ext uri="{BB962C8B-B14F-4D97-AF65-F5344CB8AC3E}">
-        <p14:creationId xmlns:p14="http://schemas.microsoft.com/office/powerpoint/2010/main" val="733089083"/>
+        <p14:creationId xmlns:p14="http://schemas.microsoft.com/office/powerpoint/2010/main" val="4017738238"/>
       </p:ext>
     </p:extLst>
   </p:cSld>
@@ -1921,7 +1909,7 @@
     </p:spTree>
     <p:extLst>
       <p:ext uri="{BB962C8B-B14F-4D97-AF65-F5344CB8AC3E}">
-        <p14:creationId xmlns:p14="http://schemas.microsoft.com/office/powerpoint/2010/main" val="4017738238"/>
+        <p14:creationId xmlns:p14="http://schemas.microsoft.com/office/powerpoint/2010/main" val="3672969067"/>
       </p:ext>
     </p:extLst>
   </p:cSld>
@@ -2035,7 +2023,7 @@
     </p:spTree>
     <p:extLst>
       <p:ext uri="{BB962C8B-B14F-4D97-AF65-F5344CB8AC3E}">
-        <p14:creationId xmlns:p14="http://schemas.microsoft.com/office/powerpoint/2010/main" val="3672969067"/>
+        <p14:creationId xmlns:p14="http://schemas.microsoft.com/office/powerpoint/2010/main" val="2401572066"/>
       </p:ext>
     </p:extLst>
   </p:cSld>
@@ -2149,7 +2137,7 @@
     </p:spTree>
     <p:extLst>
       <p:ext uri="{BB962C8B-B14F-4D97-AF65-F5344CB8AC3E}">
-        <p14:creationId xmlns:p14="http://schemas.microsoft.com/office/powerpoint/2010/main" val="2401572066"/>
+        <p14:creationId xmlns:p14="http://schemas.microsoft.com/office/powerpoint/2010/main" val="544332648"/>
       </p:ext>
     </p:extLst>
   </p:cSld>
@@ -2263,7 +2251,7 @@
     </p:spTree>
     <p:extLst>
       <p:ext uri="{BB962C8B-B14F-4D97-AF65-F5344CB8AC3E}">
-        <p14:creationId xmlns:p14="http://schemas.microsoft.com/office/powerpoint/2010/main" val="544332648"/>
+        <p14:creationId xmlns:p14="http://schemas.microsoft.com/office/powerpoint/2010/main" val="318162139"/>
       </p:ext>
     </p:extLst>
   </p:cSld>
@@ -2319,23 +2307,8 @@
           <a:p>
             <a:r>
               <a:rPr lang="en-US" dirty="0"/>
-              <a:t>This table shows you the coefficient of correlation (R2) &amp; Mean Squared Error (MSE)</a:t>
-            </a:r>
-          </a:p>
-          <a:p>
-            <a:r>
-              <a:rPr lang="en-US" dirty="0"/>
-              <a:t>The r2 tells you how close the data fits to the regression line.  MSE is the squared average difference between the actual &amp; predicted values.</a:t>
-            </a:r>
-          </a:p>
-          <a:p>
-            <a:r>
-              <a:rPr lang="en-US" dirty="0"/>
-              <a:t>Based on the model,  it tells us that the time trends have the strong impact on the price.  The features have a moderate correlation to the price and the clustering have a fairly weak correlation</a:t>
-            </a:r>
-          </a:p>
-          <a:p>
-            <a:endParaRPr lang="en-US" dirty="0"/>
+              <a:t>So &amp; so we demo the dashboard</a:t>
+            </a:r>
           </a:p>
           <a:p>
             <a:endParaRPr lang="en-US" dirty="0"/>
@@ -2369,120 +2342,6 @@
             <a:fld id="{DF2352D6-35AF-0544-A99E-554CC41E76C4}" type="slidenum">
               <a:rPr lang="en-US" smtClean="0"/>
               <a:t>24</a:t>
-            </a:fld>
-            <a:endParaRPr lang="en-US"/>
-          </a:p>
-        </p:txBody>
-      </p:sp>
-    </p:spTree>
-    <p:extLst>
-      <p:ext uri="{BB962C8B-B14F-4D97-AF65-F5344CB8AC3E}">
-        <p14:creationId xmlns:p14="http://schemas.microsoft.com/office/powerpoint/2010/main" val="318162139"/>
-      </p:ext>
-    </p:extLst>
-  </p:cSld>
-  <p:clrMapOvr>
-    <a:masterClrMapping/>
-  </p:clrMapOvr>
-</p:notes>
-</file>
-
-<file path=ppt/notesSlides/notesSlide25.xml><?xml version="1.0" encoding="utf-8"?>
-<p:notes xmlns:a="http://schemas.openxmlformats.org/drawingml/2006/main" xmlns:r="http://schemas.openxmlformats.org/officeDocument/2006/relationships" xmlns:p="http://schemas.openxmlformats.org/presentationml/2006/main">
-  <p:cSld>
-    <p:spTree>
-      <p:nvGrpSpPr>
-        <p:cNvPr id="1" name=""/>
-        <p:cNvGrpSpPr/>
-        <p:nvPr/>
-      </p:nvGrpSpPr>
-      <p:grpSpPr>
-        <a:xfrm>
-          <a:off x="0" y="0"/>
-          <a:ext cx="0" cy="0"/>
-          <a:chOff x="0" y="0"/>
-          <a:chExt cx="0" cy="0"/>
-        </a:xfrm>
-      </p:grpSpPr>
-      <p:sp>
-        <p:nvSpPr>
-          <p:cNvPr id="2" name="Slide Image Placeholder 1"/>
-          <p:cNvSpPr>
-            <a:spLocks noGrp="1" noRot="1" noChangeAspect="1"/>
-          </p:cNvSpPr>
-          <p:nvPr>
-            <p:ph type="sldImg"/>
-          </p:nvPr>
-        </p:nvSpPr>
-        <p:spPr/>
-      </p:sp>
-      <p:sp>
-        <p:nvSpPr>
-          <p:cNvPr id="3" name="Notes Placeholder 2"/>
-          <p:cNvSpPr>
-            <a:spLocks noGrp="1"/>
-          </p:cNvSpPr>
-          <p:nvPr>
-            <p:ph type="body" idx="1"/>
-          </p:nvPr>
-        </p:nvSpPr>
-        <p:spPr/>
-        <p:txBody>
-          <a:bodyPr/>
-          <a:lstStyle/>
-          <a:p>
-            <a:r>
-              <a:rPr lang="en-US" dirty="0"/>
-              <a:t>This table shows you the coefficient of correlation (R2) &amp; Mean Squared Error (MSE)</a:t>
-            </a:r>
-          </a:p>
-          <a:p>
-            <a:r>
-              <a:rPr lang="en-US" dirty="0"/>
-              <a:t>The r2 tells you how close the data fits to the regression line.  MSE is the squared average difference between the actual &amp; predicted values.</a:t>
-            </a:r>
-          </a:p>
-          <a:p>
-            <a:r>
-              <a:rPr lang="en-US" dirty="0"/>
-              <a:t>Based on the model,  it tells us that the time trends have the strong impact on the price.  The features have a moderate correlation to the price and the clustering have a fairly weak correlation</a:t>
-            </a:r>
-          </a:p>
-          <a:p>
-            <a:endParaRPr lang="en-US" dirty="0"/>
-          </a:p>
-          <a:p>
-            <a:endParaRPr lang="en-US" dirty="0"/>
-          </a:p>
-          <a:p>
-            <a:endParaRPr lang="en-US" dirty="0"/>
-          </a:p>
-          <a:p>
-            <a:endParaRPr lang="en-US" dirty="0"/>
-          </a:p>
-          <a:p>
-            <a:endParaRPr lang="en-US" dirty="0"/>
-          </a:p>
-        </p:txBody>
-      </p:sp>
-      <p:sp>
-        <p:nvSpPr>
-          <p:cNvPr id="4" name="Slide Number Placeholder 3"/>
-          <p:cNvSpPr>
-            <a:spLocks noGrp="1"/>
-          </p:cNvSpPr>
-          <p:nvPr>
-            <p:ph type="sldNum" sz="quarter" idx="5"/>
-          </p:nvPr>
-        </p:nvSpPr>
-        <p:spPr/>
-        <p:txBody>
-          <a:bodyPr/>
-          <a:lstStyle/>
-          <a:p>
-            <a:fld id="{DF2352D6-35AF-0544-A99E-554CC41E76C4}" type="slidenum">
-              <a:rPr lang="en-US" smtClean="0"/>
-              <a:t>25</a:t>
             </a:fld>
             <a:endParaRPr lang="en-US"/>
           </a:p>
@@ -2750,21 +2609,12 @@
           <a:lstStyle/>
           <a:p>
             <a:r>
-              <a:rPr lang="en-US" dirty="0"/>
-              <a:t>There is never the perfect dataset for the project… requires lots of cleaning, transformation &amp; formatting to make it useful for our project. </a:t>
-            </a:r>
-          </a:p>
-          <a:p>
-            <a:r>
-              <a:rPr lang="en-US" dirty="0"/>
-              <a:t>Large datasets slows down the process as it has lots of memory which will slow down the system.  It will take longer for you to get the desired output.</a:t>
-            </a:r>
-          </a:p>
-          <a:p>
-            <a:r>
-              <a:rPr lang="en-US" dirty="0"/>
-              <a:t>The database have limited connection pr</a:t>
-            </a:r>
+              <a:rPr lang="en-US" dirty="0">
+                <a:sym typeface="Wingdings" panose="05000000000000000000" pitchFamily="2" charset="2"/>
+              </a:rPr>
+              <a:t> Rest of the team to add inputs</a:t>
+            </a:r>
+            <a:endParaRPr lang="en-US" dirty="0"/>
           </a:p>
           <a:p>
             <a:endParaRPr lang="en-US" dirty="0"/>
@@ -2943,7 +2793,7 @@
           <a:p>
             <a:r>
               <a:rPr lang="en-US" dirty="0"/>
-              <a:t>To predict prices, we decided to use the Random Forest &amp; LGBM Regressor methods to determine which features are the most important to price an </a:t>
+              <a:t>To cover majority of the factors in pricing a unit, we used the Random Forest &amp; LGBM Regressor methods to determine which features are the most important to price an </a:t>
             </a:r>
             <a:r>
               <a:rPr lang="en-US" dirty="0" err="1"/>
@@ -3053,32 +2903,8 @@
           <a:p>
             <a:r>
               <a:rPr lang="en-US" dirty="0"/>
-              <a:t>This table shows you the coefficient of correlation (R2) &amp; Mean Squared Error (MSE)</a:t>
-            </a:r>
-          </a:p>
-          <a:p>
-            <a:r>
-              <a:rPr lang="en-US" dirty="0"/>
-              <a:t>The r2 tells you how close the data fits to the regression line.  MSE is the squared average difference between the actual &amp; predicted values.</a:t>
-            </a:r>
-          </a:p>
-          <a:p>
-            <a:r>
-              <a:rPr lang="en-US" dirty="0"/>
-              <a:t>Based on the model,  it tells us that the time trends have the strong impact on the price.  The features have a moderate correlation to the price and the clustering have a fairly weak correlation</a:t>
-            </a:r>
-          </a:p>
-          <a:p>
-            <a:endParaRPr lang="en-US" dirty="0"/>
-          </a:p>
-          <a:p>
-            <a:endParaRPr lang="en-US" dirty="0"/>
-          </a:p>
-          <a:p>
-            <a:endParaRPr lang="en-US" dirty="0"/>
-          </a:p>
-          <a:p>
-            <a:endParaRPr lang="en-US" dirty="0"/>
+              <a:t>Before I go into explaining the modeling process, here are some of our key findings</a:t>
+            </a:r>
           </a:p>
           <a:p>
             <a:endParaRPr lang="en-US" dirty="0"/>
@@ -3167,13 +2993,7 @@
           <a:p>
             <a:r>
               <a:rPr lang="en-US" dirty="0"/>
-              <a:t>Before we actually run the model, we have to clean the database by adding certain information that may add value to our findings.</a:t>
-            </a:r>
-          </a:p>
-          <a:p>
-            <a:r>
-              <a:rPr lang="en-US" dirty="0"/>
-              <a:t>So we added the amenities count column because we believe that it has a positive correlation to the listing price.</a:t>
+              <a:t>This table provides an overview of what we need to do to try to find the best fit for the model.  The next few slides will provide a breakdown of what we did to transform the data.</a:t>
             </a:r>
           </a:p>
           <a:p>
@@ -3207,7 +3027,7 @@
     </p:spTree>
     <p:extLst>
       <p:ext uri="{BB962C8B-B14F-4D97-AF65-F5344CB8AC3E}">
-        <p14:creationId xmlns:p14="http://schemas.microsoft.com/office/powerpoint/2010/main" val="1699898441"/>
+        <p14:creationId xmlns:p14="http://schemas.microsoft.com/office/powerpoint/2010/main" val="582048577"/>
       </p:ext>
     </p:extLst>
   </p:cSld>
@@ -3364,7 +3184,7 @@
           <a:p>
             <a:fld id="{F7EC48CD-57E2-ED46-8391-F2D890161E05}" type="datetimeFigureOut">
               <a:rPr lang="en-US" smtClean="0"/>
-              <a:t>3/21/2021</a:t>
+              <a:t>3/22/2021</a:t>
             </a:fld>
             <a:endParaRPr lang="en-US"/>
           </a:p>
@@ -3562,7 +3382,7 @@
           <a:p>
             <a:fld id="{F7EC48CD-57E2-ED46-8391-F2D890161E05}" type="datetimeFigureOut">
               <a:rPr lang="en-US" smtClean="0"/>
-              <a:t>3/21/2021</a:t>
+              <a:t>3/22/2021</a:t>
             </a:fld>
             <a:endParaRPr lang="en-US"/>
           </a:p>
@@ -3770,7 +3590,7 @@
           <a:p>
             <a:fld id="{F7EC48CD-57E2-ED46-8391-F2D890161E05}" type="datetimeFigureOut">
               <a:rPr lang="en-US" smtClean="0"/>
-              <a:t>3/21/2021</a:t>
+              <a:t>3/22/2021</a:t>
             </a:fld>
             <a:endParaRPr lang="en-US"/>
           </a:p>
@@ -3968,7 +3788,7 @@
           <a:p>
             <a:fld id="{F7EC48CD-57E2-ED46-8391-F2D890161E05}" type="datetimeFigureOut">
               <a:rPr lang="en-US" smtClean="0"/>
-              <a:t>3/21/2021</a:t>
+              <a:t>3/22/2021</a:t>
             </a:fld>
             <a:endParaRPr lang="en-US"/>
           </a:p>
@@ -4243,7 +4063,7 @@
           <a:p>
             <a:fld id="{F7EC48CD-57E2-ED46-8391-F2D890161E05}" type="datetimeFigureOut">
               <a:rPr lang="en-US" smtClean="0"/>
-              <a:t>3/21/2021</a:t>
+              <a:t>3/22/2021</a:t>
             </a:fld>
             <a:endParaRPr lang="en-US"/>
           </a:p>
@@ -4508,7 +4328,7 @@
           <a:p>
             <a:fld id="{F7EC48CD-57E2-ED46-8391-F2D890161E05}" type="datetimeFigureOut">
               <a:rPr lang="en-US" smtClean="0"/>
-              <a:t>3/21/2021</a:t>
+              <a:t>3/22/2021</a:t>
             </a:fld>
             <a:endParaRPr lang="en-US"/>
           </a:p>
@@ -4920,7 +4740,7 @@
           <a:p>
             <a:fld id="{F7EC48CD-57E2-ED46-8391-F2D890161E05}" type="datetimeFigureOut">
               <a:rPr lang="en-US" smtClean="0"/>
-              <a:t>3/21/2021</a:t>
+              <a:t>3/22/2021</a:t>
             </a:fld>
             <a:endParaRPr lang="en-US"/>
           </a:p>
@@ -5061,7 +4881,7 @@
           <a:p>
             <a:fld id="{F7EC48CD-57E2-ED46-8391-F2D890161E05}" type="datetimeFigureOut">
               <a:rPr lang="en-US" smtClean="0"/>
-              <a:t>3/21/2021</a:t>
+              <a:t>3/22/2021</a:t>
             </a:fld>
             <a:endParaRPr lang="en-US"/>
           </a:p>
@@ -5174,7 +4994,7 @@
           <a:p>
             <a:fld id="{F7EC48CD-57E2-ED46-8391-F2D890161E05}" type="datetimeFigureOut">
               <a:rPr lang="en-US" smtClean="0"/>
-              <a:t>3/21/2021</a:t>
+              <a:t>3/22/2021</a:t>
             </a:fld>
             <a:endParaRPr lang="en-US"/>
           </a:p>
@@ -5485,7 +5305,7 @@
           <a:p>
             <a:fld id="{F7EC48CD-57E2-ED46-8391-F2D890161E05}" type="datetimeFigureOut">
               <a:rPr lang="en-US" smtClean="0"/>
-              <a:t>3/21/2021</a:t>
+              <a:t>3/22/2021</a:t>
             </a:fld>
             <a:endParaRPr lang="en-US"/>
           </a:p>
@@ -5773,7 +5593,7 @@
           <a:p>
             <a:fld id="{F7EC48CD-57E2-ED46-8391-F2D890161E05}" type="datetimeFigureOut">
               <a:rPr lang="en-US" smtClean="0"/>
-              <a:t>3/21/2021</a:t>
+              <a:t>3/22/2021</a:t>
             </a:fld>
             <a:endParaRPr lang="en-US"/>
           </a:p>
@@ -6014,7 +5834,7 @@
           <a:p>
             <a:fld id="{F7EC48CD-57E2-ED46-8391-F2D890161E05}" type="datetimeFigureOut">
               <a:rPr lang="en-US" smtClean="0"/>
-              <a:t>3/21/2021</a:t>
+              <a:t>3/22/2021</a:t>
             </a:fld>
             <a:endParaRPr lang="en-US"/>
           </a:p>
@@ -6636,314 +6456,6 @@
                   <a:srgbClr val="EA5E46"/>
                 </a:solidFill>
               </a:rPr>
-              <a:t>Model Data Transformation – RF, LGBM, KNN</a:t>
-            </a:r>
-          </a:p>
-        </p:txBody>
-      </p:sp>
-      <p:pic>
-        <p:nvPicPr>
-          <p:cNvPr id="2050" name="Picture 2" descr="Image result for air bnb logo">
-            <a:extLst>
-              <a:ext uri="{FF2B5EF4-FFF2-40B4-BE49-F238E27FC236}">
-                <a16:creationId xmlns:a16="http://schemas.microsoft.com/office/drawing/2014/main" id="{A162C291-208B-BE48-BF44-7D5CD7EF6151}"/>
-              </a:ext>
-            </a:extLst>
-          </p:cNvPr>
-          <p:cNvPicPr>
-            <a:picLocks noChangeAspect="1" noChangeArrowheads="1"/>
-          </p:cNvPicPr>
-          <p:nvPr/>
-        </p:nvPicPr>
-        <p:blipFill>
-          <a:blip r:embed="rId3">
-            <a:extLst>
-              <a:ext uri="{28A0092B-C50C-407E-A947-70E740481C1C}">
-                <a14:useLocalDpi xmlns:a14="http://schemas.microsoft.com/office/drawing/2010/main" val="0"/>
-              </a:ext>
-            </a:extLst>
-          </a:blip>
-          <a:srcRect/>
-          <a:stretch>
-            <a:fillRect/>
-          </a:stretch>
-        </p:blipFill>
-        <p:spPr bwMode="auto">
-          <a:xfrm>
-            <a:off x="530564" y="108278"/>
-            <a:ext cx="2189605" cy="2022038"/>
-          </a:xfrm>
-          <a:prstGeom prst="rect">
-            <a:avLst/>
-          </a:prstGeom>
-          <a:noFill/>
-          <a:extLst>
-            <a:ext uri="{909E8E84-426E-40DD-AFC4-6F175D3DCCD1}">
-              <a14:hiddenFill xmlns:a14="http://schemas.microsoft.com/office/drawing/2010/main">
-                <a:solidFill>
-                  <a:srgbClr val="FFFFFF"/>
-                </a:solidFill>
-              </a14:hiddenFill>
-            </a:ext>
-          </a:extLst>
-        </p:spPr>
-      </p:pic>
-      <p:cxnSp>
-        <p:nvCxnSpPr>
-          <p:cNvPr id="6" name="Straight Connector 5">
-            <a:extLst>
-              <a:ext uri="{FF2B5EF4-FFF2-40B4-BE49-F238E27FC236}">
-                <a16:creationId xmlns:a16="http://schemas.microsoft.com/office/drawing/2014/main" id="{7D0926DC-6298-B648-9DF9-0D78D09F9FC8}"/>
-              </a:ext>
-            </a:extLst>
-          </p:cNvPr>
-          <p:cNvCxnSpPr>
-            <a:cxnSpLocks/>
-          </p:cNvCxnSpPr>
-          <p:nvPr/>
-        </p:nvCxnSpPr>
-        <p:spPr>
-          <a:xfrm>
-            <a:off x="975854" y="1684829"/>
-            <a:ext cx="9518745" cy="1"/>
-          </a:xfrm>
-          <a:prstGeom prst="line">
-            <a:avLst/>
-          </a:prstGeom>
-          <a:ln w="12700">
-            <a:solidFill>
-              <a:srgbClr val="EA5E46"/>
-            </a:solidFill>
-          </a:ln>
-        </p:spPr>
-        <p:style>
-          <a:lnRef idx="1">
-            <a:schemeClr val="accent2"/>
-          </a:lnRef>
-          <a:fillRef idx="0">
-            <a:schemeClr val="accent2"/>
-          </a:fillRef>
-          <a:effectRef idx="0">
-            <a:schemeClr val="accent2"/>
-          </a:effectRef>
-          <a:fontRef idx="minor">
-            <a:schemeClr val="tx1"/>
-          </a:fontRef>
-        </p:style>
-      </p:cxnSp>
-      <p:pic>
-        <p:nvPicPr>
-          <p:cNvPr id="14" name="Picture 13">
-            <a:extLst>
-              <a:ext uri="{FF2B5EF4-FFF2-40B4-BE49-F238E27FC236}">
-                <a16:creationId xmlns:a16="http://schemas.microsoft.com/office/drawing/2014/main" id="{81C25E9C-AEF8-48C0-80CE-C88B373B1AE8}"/>
-              </a:ext>
-            </a:extLst>
-          </p:cNvPr>
-          <p:cNvPicPr>
-            <a:picLocks noChangeAspect="1"/>
-          </p:cNvPicPr>
-          <p:nvPr/>
-        </p:nvPicPr>
-        <p:blipFill>
-          <a:blip r:embed="rId4"/>
-          <a:stretch>
-            <a:fillRect/>
-          </a:stretch>
-        </p:blipFill>
-        <p:spPr>
-          <a:xfrm>
-            <a:off x="2083682" y="1767443"/>
-            <a:ext cx="7806003" cy="4108894"/>
-          </a:xfrm>
-          <a:prstGeom prst="rect">
-            <a:avLst/>
-          </a:prstGeom>
-        </p:spPr>
-      </p:pic>
-      <p:sp>
-        <p:nvSpPr>
-          <p:cNvPr id="3" name="TextBox 2">
-            <a:extLst>
-              <a:ext uri="{FF2B5EF4-FFF2-40B4-BE49-F238E27FC236}">
-                <a16:creationId xmlns:a16="http://schemas.microsoft.com/office/drawing/2014/main" id="{60518D2B-5A6E-4114-AF9D-C5BF6A84A679}"/>
-              </a:ext>
-            </a:extLst>
-          </p:cNvPr>
-          <p:cNvSpPr txBox="1"/>
-          <p:nvPr/>
-        </p:nvSpPr>
-        <p:spPr>
-          <a:xfrm>
-            <a:off x="1136491" y="6028879"/>
-            <a:ext cx="9700384" cy="369332"/>
-          </a:xfrm>
-          <a:prstGeom prst="rect">
-            <a:avLst/>
-          </a:prstGeom>
-          <a:noFill/>
-        </p:spPr>
-        <p:txBody>
-          <a:bodyPr wrap="square" rtlCol="0">
-            <a:spAutoFit/>
-          </a:bodyPr>
-          <a:lstStyle/>
-          <a:p>
-            <a:r>
-              <a:rPr lang="en-US" dirty="0"/>
-              <a:t>Note: Used for Random Forest, LGBM and KNN Regressor Models only</a:t>
-            </a:r>
-            <a:endParaRPr lang="en-CA" dirty="0"/>
-          </a:p>
-        </p:txBody>
-      </p:sp>
-    </p:spTree>
-    <p:extLst>
-      <p:ext uri="{BB962C8B-B14F-4D97-AF65-F5344CB8AC3E}">
-        <p14:creationId xmlns:p14="http://schemas.microsoft.com/office/powerpoint/2010/main" val="641962917"/>
-      </p:ext>
-    </p:extLst>
-  </p:cSld>
-  <p:clrMapOvr>
-    <a:masterClrMapping/>
-  </p:clrMapOvr>
-  <p:timing>
-    <p:tnLst>
-      <p:par>
-        <p:cTn id="1" dur="indefinite" restart="never" nodeType="tmRoot">
-          <p:childTnLst>
-            <p:seq concurrent="1" nextAc="seek">
-              <p:cTn id="2" dur="indefinite" nodeType="mainSeq">
-                <p:childTnLst>
-                  <p:par>
-                    <p:cTn id="3" fill="hold">
-                      <p:stCondLst>
-                        <p:cond delay="indefinite"/>
-                      </p:stCondLst>
-                      <p:childTnLst>
-                        <p:par>
-                          <p:cTn id="4" fill="hold">
-                            <p:stCondLst>
-                              <p:cond delay="0"/>
-                            </p:stCondLst>
-                            <p:childTnLst>
-                              <p:par>
-                                <p:cTn id="5" presetID="16" presetClass="entr" presetSubtype="21" fill="hold" nodeType="clickEffect">
-                                  <p:stCondLst>
-                                    <p:cond delay="0"/>
-                                  </p:stCondLst>
-                                  <p:childTnLst>
-                                    <p:set>
-                                      <p:cBhvr>
-                                        <p:cTn id="6" dur="1" fill="hold">
-                                          <p:stCondLst>
-                                            <p:cond delay="0"/>
-                                          </p:stCondLst>
-                                        </p:cTn>
-                                        <p:tgtEl>
-                                          <p:spTgt spid="14"/>
-                                        </p:tgtEl>
-                                        <p:attrNameLst>
-                                          <p:attrName>style.visibility</p:attrName>
-                                        </p:attrNameLst>
-                                      </p:cBhvr>
-                                      <p:to>
-                                        <p:strVal val="visible"/>
-                                      </p:to>
-                                    </p:set>
-                                    <p:animEffect transition="in" filter="barn(inVertical)">
-                                      <p:cBhvr>
-                                        <p:cTn id="7" dur="500"/>
-                                        <p:tgtEl>
-                                          <p:spTgt spid="14"/>
-                                        </p:tgtEl>
-                                      </p:cBhvr>
-                                    </p:animEffect>
-                                  </p:childTnLst>
-                                </p:cTn>
-                              </p:par>
-                            </p:childTnLst>
-                          </p:cTn>
-                        </p:par>
-                      </p:childTnLst>
-                    </p:cTn>
-                  </p:par>
-                </p:childTnLst>
-              </p:cTn>
-              <p:prevCondLst>
-                <p:cond evt="onPrev" delay="0">
-                  <p:tgtEl>
-                    <p:sldTgt/>
-                  </p:tgtEl>
-                </p:cond>
-              </p:prevCondLst>
-              <p:nextCondLst>
-                <p:cond evt="onNext" delay="0">
-                  <p:tgtEl>
-                    <p:sldTgt/>
-                  </p:tgtEl>
-                </p:cond>
-              </p:nextCondLst>
-            </p:seq>
-          </p:childTnLst>
-        </p:cTn>
-      </p:par>
-    </p:tnLst>
-  </p:timing>
-</p:sld>
-</file>
-
-<file path=ppt/slides/slide11.xml><?xml version="1.0" encoding="utf-8"?>
-<p:sld xmlns:a="http://schemas.openxmlformats.org/drawingml/2006/main" xmlns:r="http://schemas.openxmlformats.org/officeDocument/2006/relationships" xmlns:p="http://schemas.openxmlformats.org/presentationml/2006/main">
-  <p:cSld>
-    <p:spTree>
-      <p:nvGrpSpPr>
-        <p:cNvPr id="1" name=""/>
-        <p:cNvGrpSpPr/>
-        <p:nvPr/>
-      </p:nvGrpSpPr>
-      <p:grpSpPr>
-        <a:xfrm>
-          <a:off x="0" y="0"/>
-          <a:ext cx="0" cy="0"/>
-          <a:chOff x="0" y="0"/>
-          <a:chExt cx="0" cy="0"/>
-        </a:xfrm>
-      </p:grpSpPr>
-      <p:sp>
-        <p:nvSpPr>
-          <p:cNvPr id="2" name="Title 1">
-            <a:extLst>
-              <a:ext uri="{FF2B5EF4-FFF2-40B4-BE49-F238E27FC236}">
-                <a16:creationId xmlns:a16="http://schemas.microsoft.com/office/drawing/2014/main" id="{59B8B577-5676-3C4B-A107-E41DB331FD85}"/>
-              </a:ext>
-            </a:extLst>
-          </p:cNvPr>
-          <p:cNvSpPr>
-            <a:spLocks noGrp="1"/>
-          </p:cNvSpPr>
-          <p:nvPr>
-            <p:ph type="title"/>
-          </p:nvPr>
-        </p:nvSpPr>
-        <p:spPr>
-          <a:xfrm>
-            <a:off x="2721982" y="696475"/>
-            <a:ext cx="10515600" cy="1325563"/>
-          </a:xfrm>
-        </p:spPr>
-        <p:txBody>
-          <a:bodyPr>
-            <a:normAutofit/>
-          </a:bodyPr>
-          <a:lstStyle/>
-          <a:p>
-            <a:r>
-              <a:rPr lang="en-US" sz="4000" dirty="0">
-                <a:solidFill>
-                  <a:srgbClr val="EA5E46"/>
-                </a:solidFill>
-              </a:rPr>
               <a:t>Model Data Transformation - RF, LGBM, KNN</a:t>
             </a:r>
           </a:p>
@@ -7706,7 +7218,7 @@
 </p:sld>
 </file>
 
-<file path=ppt/slides/slide12.xml><?xml version="1.0" encoding="utf-8"?>
+<file path=ppt/slides/slide11.xml><?xml version="1.0" encoding="utf-8"?>
 <p:sld xmlns:a="http://schemas.openxmlformats.org/drawingml/2006/main" xmlns:r="http://schemas.openxmlformats.org/officeDocument/2006/relationships" xmlns:p="http://schemas.openxmlformats.org/presentationml/2006/main">
   <p:cSld>
     <p:spTree>
@@ -8599,7 +8111,7 @@
 </p:sld>
 </file>
 
-<file path=ppt/slides/slide13.xml><?xml version="1.0" encoding="utf-8"?>
+<file path=ppt/slides/slide12.xml><?xml version="1.0" encoding="utf-8"?>
 <p:sld xmlns:a="http://schemas.openxmlformats.org/drawingml/2006/main" xmlns:r="http://schemas.openxmlformats.org/officeDocument/2006/relationships" xmlns:p="http://schemas.openxmlformats.org/presentationml/2006/main">
   <p:cSld>
     <p:spTree>
@@ -9788,7 +9300,7 @@
 </p:sld>
 </file>
 
-<file path=ppt/slides/slide14.xml><?xml version="1.0" encoding="utf-8"?>
+<file path=ppt/slides/slide13.xml><?xml version="1.0" encoding="utf-8"?>
 <p:sld xmlns:a="http://schemas.openxmlformats.org/drawingml/2006/main" xmlns:r="http://schemas.openxmlformats.org/officeDocument/2006/relationships" xmlns:p="http://schemas.openxmlformats.org/presentationml/2006/main">
   <p:cSld>
     <p:spTree>
@@ -10341,7 +9853,7 @@
 </p:sld>
 </file>
 
-<file path=ppt/slides/slide15.xml><?xml version="1.0" encoding="utf-8"?>
+<file path=ppt/slides/slide14.xml><?xml version="1.0" encoding="utf-8"?>
 <p:sld xmlns:a="http://schemas.openxmlformats.org/drawingml/2006/main" xmlns:r="http://schemas.openxmlformats.org/officeDocument/2006/relationships" xmlns:p="http://schemas.openxmlformats.org/presentationml/2006/main">
   <p:cSld>
     <p:spTree>
@@ -10521,7 +10033,7 @@
             </a:pPr>
             <a:r>
               <a:rPr lang="en-US" sz="2400" dirty="0"/>
-              <a:t>Run the model by fitting the X &amp; y training data</a:t>
+              <a:t>Run the model by fitting the X and y data</a:t>
             </a:r>
           </a:p>
           <a:p>
@@ -10590,7 +10102,7 @@
 </p:sld>
 </file>
 
-<file path=ppt/slides/slide16.xml><?xml version="1.0" encoding="utf-8"?>
+<file path=ppt/slides/slide15.xml><?xml version="1.0" encoding="utf-8"?>
 <p:sld xmlns:a="http://schemas.openxmlformats.org/drawingml/2006/main" xmlns:r="http://schemas.openxmlformats.org/officeDocument/2006/relationships" xmlns:p="http://schemas.openxmlformats.org/presentationml/2006/main">
   <p:cSld>
     <p:spTree>
@@ -11215,7 +10727,7 @@
 </p:sld>
 </file>
 
-<file path=ppt/slides/slide17.xml><?xml version="1.0" encoding="utf-8"?>
+<file path=ppt/slides/slide16.xml><?xml version="1.0" encoding="utf-8"?>
 <p:sld xmlns:a="http://schemas.openxmlformats.org/drawingml/2006/main" xmlns:r="http://schemas.openxmlformats.org/officeDocument/2006/relationships" xmlns:p="http://schemas.openxmlformats.org/presentationml/2006/main">
   <p:cSld>
     <p:spTree>
@@ -11535,7 +11047,7 @@
 </p:sld>
 </file>
 
-<file path=ppt/slides/slide18.xml><?xml version="1.0" encoding="utf-8"?>
+<file path=ppt/slides/slide17.xml><?xml version="1.0" encoding="utf-8"?>
 <p:sld xmlns:a="http://schemas.openxmlformats.org/drawingml/2006/main" xmlns:r="http://schemas.openxmlformats.org/officeDocument/2006/relationships" xmlns:p="http://schemas.openxmlformats.org/presentationml/2006/main">
   <p:cSld>
     <p:spTree>
@@ -11754,7 +11266,7 @@
 </p:sld>
 </file>
 
-<file path=ppt/slides/slide19.xml><?xml version="1.0" encoding="utf-8"?>
+<file path=ppt/slides/slide18.xml><?xml version="1.0" encoding="utf-8"?>
 <p:sld xmlns:a="http://schemas.openxmlformats.org/drawingml/2006/main" xmlns:r="http://schemas.openxmlformats.org/officeDocument/2006/relationships" xmlns:p="http://schemas.openxmlformats.org/presentationml/2006/main">
   <p:cSld>
     <p:spTree>
@@ -11947,6 +11459,195 @@
     <p:extLst>
       <p:ext uri="{BB962C8B-B14F-4D97-AF65-F5344CB8AC3E}">
         <p14:creationId xmlns:p14="http://schemas.microsoft.com/office/powerpoint/2010/main" val="861530257"/>
+      </p:ext>
+    </p:extLst>
+  </p:cSld>
+  <p:clrMapOvr>
+    <a:masterClrMapping/>
+  </p:clrMapOvr>
+</p:sld>
+</file>
+
+<file path=ppt/slides/slide19.xml><?xml version="1.0" encoding="utf-8"?>
+<p:sld xmlns:a="http://schemas.openxmlformats.org/drawingml/2006/main" xmlns:r="http://schemas.openxmlformats.org/officeDocument/2006/relationships" xmlns:p="http://schemas.openxmlformats.org/presentationml/2006/main">
+  <p:cSld>
+    <p:spTree>
+      <p:nvGrpSpPr>
+        <p:cNvPr id="1" name=""/>
+        <p:cNvGrpSpPr/>
+        <p:nvPr/>
+      </p:nvGrpSpPr>
+      <p:grpSpPr>
+        <a:xfrm>
+          <a:off x="0" y="0"/>
+          <a:ext cx="0" cy="0"/>
+          <a:chOff x="0" y="0"/>
+          <a:chExt cx="0" cy="0"/>
+        </a:xfrm>
+      </p:grpSpPr>
+      <p:sp>
+        <p:nvSpPr>
+          <p:cNvPr id="2" name="Title 1">
+            <a:extLst>
+              <a:ext uri="{FF2B5EF4-FFF2-40B4-BE49-F238E27FC236}">
+                <a16:creationId xmlns:a16="http://schemas.microsoft.com/office/drawing/2014/main" id="{59B8B577-5676-3C4B-A107-E41DB331FD85}"/>
+              </a:ext>
+            </a:extLst>
+          </p:cNvPr>
+          <p:cNvSpPr>
+            <a:spLocks noGrp="1"/>
+          </p:cNvSpPr>
+          <p:nvPr>
+            <p:ph type="title"/>
+          </p:nvPr>
+        </p:nvSpPr>
+        <p:spPr>
+          <a:xfrm>
+            <a:off x="2721982" y="696475"/>
+            <a:ext cx="10515600" cy="1325563"/>
+          </a:xfrm>
+        </p:spPr>
+        <p:txBody>
+          <a:bodyPr>
+            <a:normAutofit/>
+          </a:bodyPr>
+          <a:lstStyle/>
+          <a:p>
+            <a:r>
+              <a:rPr lang="en-US" sz="4000" dirty="0">
+                <a:solidFill>
+                  <a:srgbClr val="EA5E46"/>
+                </a:solidFill>
+              </a:rPr>
+              <a:t>Model Results – Trends &amp; Seasonality</a:t>
+            </a:r>
+          </a:p>
+        </p:txBody>
+      </p:sp>
+      <p:pic>
+        <p:nvPicPr>
+          <p:cNvPr id="2050" name="Picture 2" descr="Image result for air bnb logo">
+            <a:extLst>
+              <a:ext uri="{FF2B5EF4-FFF2-40B4-BE49-F238E27FC236}">
+                <a16:creationId xmlns:a16="http://schemas.microsoft.com/office/drawing/2014/main" id="{A162C291-208B-BE48-BF44-7D5CD7EF6151}"/>
+              </a:ext>
+            </a:extLst>
+          </p:cNvPr>
+          <p:cNvPicPr>
+            <a:picLocks noChangeAspect="1" noChangeArrowheads="1"/>
+          </p:cNvPicPr>
+          <p:nvPr/>
+        </p:nvPicPr>
+        <p:blipFill>
+          <a:blip r:embed="rId3">
+            <a:extLst>
+              <a:ext uri="{28A0092B-C50C-407E-A947-70E740481C1C}">
+                <a14:useLocalDpi xmlns:a14="http://schemas.microsoft.com/office/drawing/2010/main" val="0"/>
+              </a:ext>
+            </a:extLst>
+          </a:blip>
+          <a:srcRect/>
+          <a:stretch>
+            <a:fillRect/>
+          </a:stretch>
+        </p:blipFill>
+        <p:spPr bwMode="auto">
+          <a:xfrm>
+            <a:off x="530564" y="108278"/>
+            <a:ext cx="2189605" cy="2022038"/>
+          </a:xfrm>
+          <a:prstGeom prst="rect">
+            <a:avLst/>
+          </a:prstGeom>
+          <a:noFill/>
+          <a:extLst>
+            <a:ext uri="{909E8E84-426E-40DD-AFC4-6F175D3DCCD1}">
+              <a14:hiddenFill xmlns:a14="http://schemas.microsoft.com/office/drawing/2010/main">
+                <a:solidFill>
+                  <a:srgbClr val="FFFFFF"/>
+                </a:solidFill>
+              </a14:hiddenFill>
+            </a:ext>
+          </a:extLst>
+        </p:spPr>
+      </p:pic>
+      <p:cxnSp>
+        <p:nvCxnSpPr>
+          <p:cNvPr id="6" name="Straight Connector 5">
+            <a:extLst>
+              <a:ext uri="{FF2B5EF4-FFF2-40B4-BE49-F238E27FC236}">
+                <a16:creationId xmlns:a16="http://schemas.microsoft.com/office/drawing/2014/main" id="{7D0926DC-6298-B648-9DF9-0D78D09F9FC8}"/>
+              </a:ext>
+            </a:extLst>
+          </p:cNvPr>
+          <p:cNvCxnSpPr>
+            <a:cxnSpLocks/>
+          </p:cNvCxnSpPr>
+          <p:nvPr/>
+        </p:nvCxnSpPr>
+        <p:spPr>
+          <a:xfrm>
+            <a:off x="975854" y="1684829"/>
+            <a:ext cx="9518745" cy="1"/>
+          </a:xfrm>
+          <a:prstGeom prst="line">
+            <a:avLst/>
+          </a:prstGeom>
+          <a:ln w="12700">
+            <a:solidFill>
+              <a:srgbClr val="EA5E46"/>
+            </a:solidFill>
+          </a:ln>
+        </p:spPr>
+        <p:style>
+          <a:lnRef idx="1">
+            <a:schemeClr val="accent2"/>
+          </a:lnRef>
+          <a:fillRef idx="0">
+            <a:schemeClr val="accent2"/>
+          </a:fillRef>
+          <a:effectRef idx="0">
+            <a:schemeClr val="accent2"/>
+          </a:effectRef>
+          <a:fontRef idx="minor">
+            <a:schemeClr val="tx1"/>
+          </a:fontRef>
+        </p:style>
+      </p:cxnSp>
+      <p:pic>
+        <p:nvPicPr>
+          <p:cNvPr id="4" name="Picture 3" descr="Chart&#10;&#10;Description automatically generated">
+            <a:extLst>
+              <a:ext uri="{FF2B5EF4-FFF2-40B4-BE49-F238E27FC236}">
+                <a16:creationId xmlns:a16="http://schemas.microsoft.com/office/drawing/2014/main" id="{7121DC31-8812-4B0A-B617-0282A4548A46}"/>
+              </a:ext>
+            </a:extLst>
+          </p:cNvPr>
+          <p:cNvPicPr>
+            <a:picLocks noChangeAspect="1"/>
+          </p:cNvPicPr>
+          <p:nvPr/>
+        </p:nvPicPr>
+        <p:blipFill>
+          <a:blip r:embed="rId4"/>
+          <a:stretch>
+            <a:fillRect/>
+          </a:stretch>
+        </p:blipFill>
+        <p:spPr>
+          <a:xfrm>
+            <a:off x="975854" y="1858468"/>
+            <a:ext cx="3523671" cy="4727684"/>
+          </a:xfrm>
+          <a:prstGeom prst="rect">
+            <a:avLst/>
+          </a:prstGeom>
+        </p:spPr>
+      </p:pic>
+    </p:spTree>
+    <p:extLst>
+      <p:ext uri="{BB962C8B-B14F-4D97-AF65-F5344CB8AC3E}">
+        <p14:creationId xmlns:p14="http://schemas.microsoft.com/office/powerpoint/2010/main" val="2252165630"/>
       </p:ext>
     </p:extLst>
   </p:cSld>
@@ -12166,7 +11867,7 @@
                   <a:srgbClr val="EA5E46"/>
                 </a:solidFill>
               </a:rPr>
-              <a:t>Model Results – Trends &amp; Seasonality</a:t>
+              <a:t>Model Results – Predict the Future</a:t>
             </a:r>
           </a:p>
         </p:txBody>
@@ -12266,7 +11967,7 @@
           <p:cNvPr id="4" name="Picture 3" descr="Chart&#10;&#10;Description automatically generated">
             <a:extLst>
               <a:ext uri="{FF2B5EF4-FFF2-40B4-BE49-F238E27FC236}">
-                <a16:creationId xmlns:a16="http://schemas.microsoft.com/office/drawing/2014/main" id="{7121DC31-8812-4B0A-B617-0282A4548A46}"/>
+                <a16:creationId xmlns:a16="http://schemas.microsoft.com/office/drawing/2014/main" id="{EFD90DCF-FFB1-4890-97D3-C58A8610BA8C}"/>
               </a:ext>
             </a:extLst>
           </p:cNvPr>
@@ -12283,8 +11984,8 @@
         </p:blipFill>
         <p:spPr>
           <a:xfrm>
-            <a:off x="975854" y="1858468"/>
-            <a:ext cx="3523671" cy="4727684"/>
+            <a:off x="2166241" y="2043452"/>
+            <a:ext cx="7137969" cy="4250700"/>
           </a:xfrm>
           <a:prstGeom prst="rect">
             <a:avLst/>
@@ -12294,7 +11995,7 @@
     </p:spTree>
     <p:extLst>
       <p:ext uri="{BB962C8B-B14F-4D97-AF65-F5344CB8AC3E}">
-        <p14:creationId xmlns:p14="http://schemas.microsoft.com/office/powerpoint/2010/main" val="2252165630"/>
+        <p14:creationId xmlns:p14="http://schemas.microsoft.com/office/powerpoint/2010/main" val="745515619"/>
       </p:ext>
     </p:extLst>
   </p:cSld>
@@ -12355,7 +12056,534 @@
                   <a:srgbClr val="EA5E46"/>
                 </a:solidFill>
               </a:rPr>
-              <a:t>Model Results – Predict the Future</a:t>
+              <a:t>Pricing Considerations</a:t>
+            </a:r>
+          </a:p>
+        </p:txBody>
+      </p:sp>
+      <p:pic>
+        <p:nvPicPr>
+          <p:cNvPr id="2050" name="Picture 2" descr="Image result for air bnb logo">
+            <a:extLst>
+              <a:ext uri="{FF2B5EF4-FFF2-40B4-BE49-F238E27FC236}">
+                <a16:creationId xmlns:a16="http://schemas.microsoft.com/office/drawing/2014/main" id="{A162C291-208B-BE48-BF44-7D5CD7EF6151}"/>
+              </a:ext>
+            </a:extLst>
+          </p:cNvPr>
+          <p:cNvPicPr>
+            <a:picLocks noChangeAspect="1" noChangeArrowheads="1"/>
+          </p:cNvPicPr>
+          <p:nvPr/>
+        </p:nvPicPr>
+        <p:blipFill>
+          <a:blip r:embed="rId3">
+            <a:extLst>
+              <a:ext uri="{28A0092B-C50C-407E-A947-70E740481C1C}">
+                <a14:useLocalDpi xmlns:a14="http://schemas.microsoft.com/office/drawing/2010/main" val="0"/>
+              </a:ext>
+            </a:extLst>
+          </a:blip>
+          <a:srcRect/>
+          <a:stretch>
+            <a:fillRect/>
+          </a:stretch>
+        </p:blipFill>
+        <p:spPr bwMode="auto">
+          <a:xfrm>
+            <a:off x="530564" y="108278"/>
+            <a:ext cx="2189605" cy="2022038"/>
+          </a:xfrm>
+          <a:prstGeom prst="rect">
+            <a:avLst/>
+          </a:prstGeom>
+          <a:noFill/>
+          <a:extLst>
+            <a:ext uri="{909E8E84-426E-40DD-AFC4-6F175D3DCCD1}">
+              <a14:hiddenFill xmlns:a14="http://schemas.microsoft.com/office/drawing/2010/main">
+                <a:solidFill>
+                  <a:srgbClr val="FFFFFF"/>
+                </a:solidFill>
+              </a14:hiddenFill>
+            </a:ext>
+          </a:extLst>
+        </p:spPr>
+      </p:pic>
+      <p:cxnSp>
+        <p:nvCxnSpPr>
+          <p:cNvPr id="6" name="Straight Connector 5">
+            <a:extLst>
+              <a:ext uri="{FF2B5EF4-FFF2-40B4-BE49-F238E27FC236}">
+                <a16:creationId xmlns:a16="http://schemas.microsoft.com/office/drawing/2014/main" id="{7D0926DC-6298-B648-9DF9-0D78D09F9FC8}"/>
+              </a:ext>
+            </a:extLst>
+          </p:cNvPr>
+          <p:cNvCxnSpPr>
+            <a:cxnSpLocks/>
+          </p:cNvCxnSpPr>
+          <p:nvPr/>
+        </p:nvCxnSpPr>
+        <p:spPr>
+          <a:xfrm>
+            <a:off x="975854" y="1684830"/>
+            <a:ext cx="9518745" cy="1"/>
+          </a:xfrm>
+          <a:prstGeom prst="line">
+            <a:avLst/>
+          </a:prstGeom>
+          <a:ln w="12700">
+            <a:solidFill>
+              <a:srgbClr val="EA5E46"/>
+            </a:solidFill>
+          </a:ln>
+        </p:spPr>
+        <p:style>
+          <a:lnRef idx="1">
+            <a:schemeClr val="accent2"/>
+          </a:lnRef>
+          <a:fillRef idx="0">
+            <a:schemeClr val="accent2"/>
+          </a:fillRef>
+          <a:effectRef idx="0">
+            <a:schemeClr val="accent2"/>
+          </a:effectRef>
+          <a:fontRef idx="minor">
+            <a:schemeClr val="tx1"/>
+          </a:fontRef>
+        </p:style>
+      </p:cxnSp>
+      <p:sp>
+        <p:nvSpPr>
+          <p:cNvPr id="5" name="TextBox 4">
+            <a:extLst>
+              <a:ext uri="{FF2B5EF4-FFF2-40B4-BE49-F238E27FC236}">
+                <a16:creationId xmlns:a16="http://schemas.microsoft.com/office/drawing/2014/main" id="{88997E98-9845-407E-BB5E-5C9DA5A601C7}"/>
+              </a:ext>
+            </a:extLst>
+          </p:cNvPr>
+          <p:cNvSpPr txBox="1"/>
+          <p:nvPr/>
+        </p:nvSpPr>
+        <p:spPr>
+          <a:xfrm>
+            <a:off x="1055716" y="2073264"/>
+            <a:ext cx="8537171" cy="3693319"/>
+          </a:xfrm>
+          <a:prstGeom prst="rect">
+            <a:avLst/>
+          </a:prstGeom>
+          <a:noFill/>
+        </p:spPr>
+        <p:txBody>
+          <a:bodyPr wrap="square" rtlCol="0">
+            <a:spAutoFit/>
+          </a:bodyPr>
+          <a:lstStyle/>
+          <a:p>
+            <a:r>
+              <a:rPr lang="en-CA" b="1" dirty="0"/>
+              <a:t>In Order of Importance</a:t>
+            </a:r>
+          </a:p>
+          <a:p>
+            <a:pPr marL="285750" indent="-285750">
+              <a:buFont typeface="Arial" panose="020B0604020202020204" pitchFamily="34" charset="0"/>
+              <a:buChar char="•"/>
+            </a:pPr>
+            <a:endParaRPr lang="en-CA" dirty="0"/>
+          </a:p>
+          <a:p>
+            <a:pPr marL="285750" indent="-285750">
+              <a:buFont typeface="Arial" panose="020B0604020202020204" pitchFamily="34" charset="0"/>
+              <a:buChar char="•"/>
+            </a:pPr>
+            <a:r>
+              <a:rPr lang="en-CA" dirty="0"/>
+              <a:t>Price the units at different rates during different times of the year.</a:t>
+            </a:r>
+          </a:p>
+          <a:p>
+            <a:pPr marL="285750" indent="-285750">
+              <a:buFont typeface="Arial" panose="020B0604020202020204" pitchFamily="34" charset="0"/>
+              <a:buChar char="•"/>
+            </a:pPr>
+            <a:endParaRPr lang="en-CA" dirty="0"/>
+          </a:p>
+          <a:p>
+            <a:pPr marL="285750" indent="-285750">
+              <a:buFont typeface="Arial" panose="020B0604020202020204" pitchFamily="34" charset="0"/>
+              <a:buChar char="•"/>
+            </a:pPr>
+            <a:r>
+              <a:rPr lang="en-CA" dirty="0"/>
+              <a:t>Hosts can determine the pricing range based on the location and the size of their unit.</a:t>
+            </a:r>
+          </a:p>
+          <a:p>
+            <a:pPr marL="285750" indent="-285750">
+              <a:buFont typeface="Arial" panose="020B0604020202020204" pitchFamily="34" charset="0"/>
+              <a:buChar char="•"/>
+            </a:pPr>
+            <a:endParaRPr lang="en-CA" dirty="0"/>
+          </a:p>
+          <a:p>
+            <a:pPr marL="285750" indent="-285750">
+              <a:buFont typeface="Arial" panose="020B0604020202020204" pitchFamily="34" charset="0"/>
+              <a:buChar char="•"/>
+            </a:pPr>
+            <a:r>
+              <a:rPr lang="en-CA" dirty="0"/>
+              <a:t>Prices can increase with more bedrooms &amp; bathrooms.</a:t>
+            </a:r>
+          </a:p>
+          <a:p>
+            <a:pPr marL="285750" indent="-285750">
+              <a:buFont typeface="Arial" panose="020B0604020202020204" pitchFamily="34" charset="0"/>
+              <a:buChar char="•"/>
+            </a:pPr>
+            <a:endParaRPr lang="en-CA" dirty="0"/>
+          </a:p>
+          <a:p>
+            <a:pPr marL="285750" indent="-285750">
+              <a:buFont typeface="Arial" panose="020B0604020202020204" pitchFamily="34" charset="0"/>
+              <a:buChar char="•"/>
+            </a:pPr>
+            <a:r>
+              <a:rPr lang="en-CA" dirty="0"/>
+              <a:t>Hosts can charge a bit more by providing more amenities.</a:t>
+            </a:r>
+          </a:p>
+          <a:p>
+            <a:pPr marL="285750" indent="-285750">
+              <a:buFont typeface="Arial" panose="020B0604020202020204" pitchFamily="34" charset="0"/>
+              <a:buChar char="•"/>
+            </a:pPr>
+            <a:endParaRPr lang="en-CA" dirty="0"/>
+          </a:p>
+          <a:p>
+            <a:pPr marL="285750" indent="-285750">
+              <a:buFont typeface="Arial" panose="020B0604020202020204" pitchFamily="34" charset="0"/>
+              <a:buChar char="•"/>
+            </a:pPr>
+            <a:r>
+              <a:rPr lang="en-CA" dirty="0"/>
+              <a:t>Do extensive research on how neighbours price their units considering the room type they have.</a:t>
+            </a:r>
+          </a:p>
+          <a:p>
+            <a:endParaRPr lang="en-CA" dirty="0"/>
+          </a:p>
+        </p:txBody>
+      </p:sp>
+    </p:spTree>
+    <p:extLst>
+      <p:ext uri="{BB962C8B-B14F-4D97-AF65-F5344CB8AC3E}">
+        <p14:creationId xmlns:p14="http://schemas.microsoft.com/office/powerpoint/2010/main" val="1843293363"/>
+      </p:ext>
+    </p:extLst>
+  </p:cSld>
+  <p:clrMapOvr>
+    <a:masterClrMapping/>
+  </p:clrMapOvr>
+</p:sld>
+</file>
+
+<file path=ppt/slides/slide22.xml><?xml version="1.0" encoding="utf-8"?>
+<p:sld xmlns:a="http://schemas.openxmlformats.org/drawingml/2006/main" xmlns:r="http://schemas.openxmlformats.org/officeDocument/2006/relationships" xmlns:p="http://schemas.openxmlformats.org/presentationml/2006/main">
+  <p:cSld>
+    <p:spTree>
+      <p:nvGrpSpPr>
+        <p:cNvPr id="1" name=""/>
+        <p:cNvGrpSpPr/>
+        <p:nvPr/>
+      </p:nvGrpSpPr>
+      <p:grpSpPr>
+        <a:xfrm>
+          <a:off x="0" y="0"/>
+          <a:ext cx="0" cy="0"/>
+          <a:chOff x="0" y="0"/>
+          <a:chExt cx="0" cy="0"/>
+        </a:xfrm>
+      </p:grpSpPr>
+      <p:sp>
+        <p:nvSpPr>
+          <p:cNvPr id="2" name="Title 1">
+            <a:extLst>
+              <a:ext uri="{FF2B5EF4-FFF2-40B4-BE49-F238E27FC236}">
+                <a16:creationId xmlns:a16="http://schemas.microsoft.com/office/drawing/2014/main" id="{59B8B577-5676-3C4B-A107-E41DB331FD85}"/>
+              </a:ext>
+            </a:extLst>
+          </p:cNvPr>
+          <p:cNvSpPr>
+            <a:spLocks noGrp="1"/>
+          </p:cNvSpPr>
+          <p:nvPr>
+            <p:ph type="title"/>
+          </p:nvPr>
+        </p:nvSpPr>
+        <p:spPr>
+          <a:xfrm>
+            <a:off x="2721982" y="696475"/>
+            <a:ext cx="10515600" cy="1325563"/>
+          </a:xfrm>
+        </p:spPr>
+        <p:txBody>
+          <a:bodyPr>
+            <a:normAutofit/>
+          </a:bodyPr>
+          <a:lstStyle/>
+          <a:p>
+            <a:r>
+              <a:rPr lang="en-US" sz="4000" dirty="0">
+                <a:solidFill>
+                  <a:srgbClr val="EA5E46"/>
+                </a:solidFill>
+              </a:rPr>
+              <a:t>Final Price Predictor Model</a:t>
+            </a:r>
+          </a:p>
+        </p:txBody>
+      </p:sp>
+      <p:pic>
+        <p:nvPicPr>
+          <p:cNvPr id="2050" name="Picture 2" descr="Image result for air bnb logo">
+            <a:extLst>
+              <a:ext uri="{FF2B5EF4-FFF2-40B4-BE49-F238E27FC236}">
+                <a16:creationId xmlns:a16="http://schemas.microsoft.com/office/drawing/2014/main" id="{A162C291-208B-BE48-BF44-7D5CD7EF6151}"/>
+              </a:ext>
+            </a:extLst>
+          </p:cNvPr>
+          <p:cNvPicPr>
+            <a:picLocks noChangeAspect="1" noChangeArrowheads="1"/>
+          </p:cNvPicPr>
+          <p:nvPr/>
+        </p:nvPicPr>
+        <p:blipFill>
+          <a:blip r:embed="rId3">
+            <a:extLst>
+              <a:ext uri="{28A0092B-C50C-407E-A947-70E740481C1C}">
+                <a14:useLocalDpi xmlns:a14="http://schemas.microsoft.com/office/drawing/2010/main" val="0"/>
+              </a:ext>
+            </a:extLst>
+          </a:blip>
+          <a:srcRect/>
+          <a:stretch>
+            <a:fillRect/>
+          </a:stretch>
+        </p:blipFill>
+        <p:spPr bwMode="auto">
+          <a:xfrm>
+            <a:off x="530564" y="108278"/>
+            <a:ext cx="2189605" cy="2022038"/>
+          </a:xfrm>
+          <a:prstGeom prst="rect">
+            <a:avLst/>
+          </a:prstGeom>
+          <a:noFill/>
+          <a:extLst>
+            <a:ext uri="{909E8E84-426E-40DD-AFC4-6F175D3DCCD1}">
+              <a14:hiddenFill xmlns:a14="http://schemas.microsoft.com/office/drawing/2010/main">
+                <a:solidFill>
+                  <a:srgbClr val="FFFFFF"/>
+                </a:solidFill>
+              </a14:hiddenFill>
+            </a:ext>
+          </a:extLst>
+        </p:spPr>
+      </p:pic>
+      <p:cxnSp>
+        <p:nvCxnSpPr>
+          <p:cNvPr id="6" name="Straight Connector 5">
+            <a:extLst>
+              <a:ext uri="{FF2B5EF4-FFF2-40B4-BE49-F238E27FC236}">
+                <a16:creationId xmlns:a16="http://schemas.microsoft.com/office/drawing/2014/main" id="{7D0926DC-6298-B648-9DF9-0D78D09F9FC8}"/>
+              </a:ext>
+            </a:extLst>
+          </p:cNvPr>
+          <p:cNvCxnSpPr>
+            <a:cxnSpLocks/>
+          </p:cNvCxnSpPr>
+          <p:nvPr/>
+        </p:nvCxnSpPr>
+        <p:spPr>
+          <a:xfrm>
+            <a:off x="975854" y="1684830"/>
+            <a:ext cx="9518745" cy="1"/>
+          </a:xfrm>
+          <a:prstGeom prst="line">
+            <a:avLst/>
+          </a:prstGeom>
+          <a:ln w="12700">
+            <a:solidFill>
+              <a:srgbClr val="EA5E46"/>
+            </a:solidFill>
+          </a:ln>
+        </p:spPr>
+        <p:style>
+          <a:lnRef idx="1">
+            <a:schemeClr val="accent2"/>
+          </a:lnRef>
+          <a:fillRef idx="0">
+            <a:schemeClr val="accent2"/>
+          </a:fillRef>
+          <a:effectRef idx="0">
+            <a:schemeClr val="accent2"/>
+          </a:effectRef>
+          <a:fontRef idx="minor">
+            <a:schemeClr val="tx1"/>
+          </a:fontRef>
+        </p:style>
+      </p:cxnSp>
+      <p:sp>
+        <p:nvSpPr>
+          <p:cNvPr id="5" name="TextBox 4">
+            <a:extLst>
+              <a:ext uri="{FF2B5EF4-FFF2-40B4-BE49-F238E27FC236}">
+                <a16:creationId xmlns:a16="http://schemas.microsoft.com/office/drawing/2014/main" id="{88997E98-9845-407E-BB5E-5C9DA5A601C7}"/>
+              </a:ext>
+            </a:extLst>
+          </p:cNvPr>
+          <p:cNvSpPr txBox="1"/>
+          <p:nvPr/>
+        </p:nvSpPr>
+        <p:spPr>
+          <a:xfrm>
+            <a:off x="872836" y="2228671"/>
+            <a:ext cx="8537171" cy="1754326"/>
+          </a:xfrm>
+          <a:prstGeom prst="rect">
+            <a:avLst/>
+          </a:prstGeom>
+          <a:noFill/>
+        </p:spPr>
+        <p:txBody>
+          <a:bodyPr wrap="square" rtlCol="0">
+            <a:spAutoFit/>
+          </a:bodyPr>
+          <a:lstStyle/>
+          <a:p>
+            <a:pPr marL="285750" indent="-285750">
+              <a:buFont typeface="Arial" panose="020B0604020202020204" pitchFamily="34" charset="0"/>
+              <a:buChar char="•"/>
+            </a:pPr>
+            <a:r>
+              <a:rPr lang="en-US" dirty="0"/>
+              <a:t>Modified Facebook Prophet Model that predict prices :</a:t>
+            </a:r>
+          </a:p>
+          <a:p>
+            <a:pPr marL="742950" lvl="1" indent="-285750">
+              <a:buFont typeface="Arial" panose="020B0604020202020204" pitchFamily="34" charset="0"/>
+              <a:buChar char="•"/>
+            </a:pPr>
+            <a:r>
+              <a:rPr lang="en-US" dirty="0"/>
+              <a:t>From 2017 - 2023</a:t>
+            </a:r>
+          </a:p>
+          <a:p>
+            <a:pPr marL="742950" lvl="1" indent="-285750">
+              <a:buFont typeface="Arial" panose="020B0604020202020204" pitchFamily="34" charset="0"/>
+              <a:buChar char="•"/>
+            </a:pPr>
+            <a:r>
+              <a:rPr lang="en-US" dirty="0"/>
+              <a:t>By Boroughs</a:t>
+            </a:r>
+          </a:p>
+          <a:p>
+            <a:pPr marL="742950" lvl="1" indent="-285750">
+              <a:buFont typeface="Arial" panose="020B0604020202020204" pitchFamily="34" charset="0"/>
+              <a:buChar char="•"/>
+            </a:pPr>
+            <a:r>
+              <a:rPr lang="en-US" dirty="0"/>
+              <a:t>By Room Type</a:t>
+            </a:r>
+          </a:p>
+          <a:p>
+            <a:pPr marL="742950" lvl="1" indent="-285750">
+              <a:buFont typeface="Arial" panose="020B0604020202020204" pitchFamily="34" charset="0"/>
+              <a:buChar char="•"/>
+            </a:pPr>
+            <a:endParaRPr lang="en-US" dirty="0"/>
+          </a:p>
+          <a:p>
+            <a:pPr marL="742950" lvl="1" indent="-285750">
+              <a:buFont typeface="Arial" panose="020B0604020202020204" pitchFamily="34" charset="0"/>
+              <a:buChar char="•"/>
+            </a:pPr>
+            <a:r>
+              <a:rPr lang="en-US" dirty="0"/>
+              <a:t>Show Dashboard Image</a:t>
+            </a:r>
+          </a:p>
+        </p:txBody>
+      </p:sp>
+    </p:spTree>
+    <p:extLst>
+      <p:ext uri="{BB962C8B-B14F-4D97-AF65-F5344CB8AC3E}">
+        <p14:creationId xmlns:p14="http://schemas.microsoft.com/office/powerpoint/2010/main" val="3921467598"/>
+      </p:ext>
+    </p:extLst>
+  </p:cSld>
+  <p:clrMapOvr>
+    <a:masterClrMapping/>
+  </p:clrMapOvr>
+</p:sld>
+</file>
+
+<file path=ppt/slides/slide23.xml><?xml version="1.0" encoding="utf-8"?>
+<p:sld xmlns:a="http://schemas.openxmlformats.org/drawingml/2006/main" xmlns:r="http://schemas.openxmlformats.org/officeDocument/2006/relationships" xmlns:p="http://schemas.openxmlformats.org/presentationml/2006/main">
+  <p:cSld>
+    <p:spTree>
+      <p:nvGrpSpPr>
+        <p:cNvPr id="1" name=""/>
+        <p:cNvGrpSpPr/>
+        <p:nvPr/>
+      </p:nvGrpSpPr>
+      <p:grpSpPr>
+        <a:xfrm>
+          <a:off x="0" y="0"/>
+          <a:ext cx="0" cy="0"/>
+          <a:chOff x="0" y="0"/>
+          <a:chExt cx="0" cy="0"/>
+        </a:xfrm>
+      </p:grpSpPr>
+      <p:sp>
+        <p:nvSpPr>
+          <p:cNvPr id="2" name="Title 1">
+            <a:extLst>
+              <a:ext uri="{FF2B5EF4-FFF2-40B4-BE49-F238E27FC236}">
+                <a16:creationId xmlns:a16="http://schemas.microsoft.com/office/drawing/2014/main" id="{59B8B577-5676-3C4B-A107-E41DB331FD85}"/>
+              </a:ext>
+            </a:extLst>
+          </p:cNvPr>
+          <p:cNvSpPr>
+            <a:spLocks noGrp="1"/>
+          </p:cNvSpPr>
+          <p:nvPr>
+            <p:ph type="title"/>
+          </p:nvPr>
+        </p:nvSpPr>
+        <p:spPr>
+          <a:xfrm>
+            <a:off x="2721982" y="696475"/>
+            <a:ext cx="10515600" cy="1325563"/>
+          </a:xfrm>
+        </p:spPr>
+        <p:txBody>
+          <a:bodyPr>
+            <a:normAutofit/>
+          </a:bodyPr>
+          <a:lstStyle/>
+          <a:p>
+            <a:r>
+              <a:rPr lang="en-US" sz="4000" dirty="0">
+                <a:solidFill>
+                  <a:srgbClr val="EA5E46"/>
+                </a:solidFill>
+              </a:rPr>
+              <a:t>Next Steps</a:t>
             </a:r>
           </a:p>
         </p:txBody>
@@ -12450,722 +12678,6 @@
           </a:fontRef>
         </p:style>
       </p:cxnSp>
-      <p:pic>
-        <p:nvPicPr>
-          <p:cNvPr id="4" name="Picture 3" descr="Chart&#10;&#10;Description automatically generated">
-            <a:extLst>
-              <a:ext uri="{FF2B5EF4-FFF2-40B4-BE49-F238E27FC236}">
-                <a16:creationId xmlns:a16="http://schemas.microsoft.com/office/drawing/2014/main" id="{EFD90DCF-FFB1-4890-97D3-C58A8610BA8C}"/>
-              </a:ext>
-            </a:extLst>
-          </p:cNvPr>
-          <p:cNvPicPr>
-            <a:picLocks noChangeAspect="1"/>
-          </p:cNvPicPr>
-          <p:nvPr/>
-        </p:nvPicPr>
-        <p:blipFill>
-          <a:blip r:embed="rId4"/>
-          <a:stretch>
-            <a:fillRect/>
-          </a:stretch>
-        </p:blipFill>
-        <p:spPr>
-          <a:xfrm>
-            <a:off x="2166241" y="2043452"/>
-            <a:ext cx="7137969" cy="4250700"/>
-          </a:xfrm>
-          <a:prstGeom prst="rect">
-            <a:avLst/>
-          </a:prstGeom>
-        </p:spPr>
-      </p:pic>
-    </p:spTree>
-    <p:extLst>
-      <p:ext uri="{BB962C8B-B14F-4D97-AF65-F5344CB8AC3E}">
-        <p14:creationId xmlns:p14="http://schemas.microsoft.com/office/powerpoint/2010/main" val="745515619"/>
-      </p:ext>
-    </p:extLst>
-  </p:cSld>
-  <p:clrMapOvr>
-    <a:masterClrMapping/>
-  </p:clrMapOvr>
-</p:sld>
-</file>
-
-<file path=ppt/slides/slide22.xml><?xml version="1.0" encoding="utf-8"?>
-<p:sld xmlns:a="http://schemas.openxmlformats.org/drawingml/2006/main" xmlns:r="http://schemas.openxmlformats.org/officeDocument/2006/relationships" xmlns:p="http://schemas.openxmlformats.org/presentationml/2006/main">
-  <p:cSld>
-    <p:spTree>
-      <p:nvGrpSpPr>
-        <p:cNvPr id="1" name=""/>
-        <p:cNvGrpSpPr/>
-        <p:nvPr/>
-      </p:nvGrpSpPr>
-      <p:grpSpPr>
-        <a:xfrm>
-          <a:off x="0" y="0"/>
-          <a:ext cx="0" cy="0"/>
-          <a:chOff x="0" y="0"/>
-          <a:chExt cx="0" cy="0"/>
-        </a:xfrm>
-      </p:grpSpPr>
-      <p:sp>
-        <p:nvSpPr>
-          <p:cNvPr id="2" name="Title 1">
-            <a:extLst>
-              <a:ext uri="{FF2B5EF4-FFF2-40B4-BE49-F238E27FC236}">
-                <a16:creationId xmlns:a16="http://schemas.microsoft.com/office/drawing/2014/main" id="{59B8B577-5676-3C4B-A107-E41DB331FD85}"/>
-              </a:ext>
-            </a:extLst>
-          </p:cNvPr>
-          <p:cNvSpPr>
-            <a:spLocks noGrp="1"/>
-          </p:cNvSpPr>
-          <p:nvPr>
-            <p:ph type="title"/>
-          </p:nvPr>
-        </p:nvSpPr>
-        <p:spPr>
-          <a:xfrm>
-            <a:off x="2721982" y="696475"/>
-            <a:ext cx="10515600" cy="1325563"/>
-          </a:xfrm>
-        </p:spPr>
-        <p:txBody>
-          <a:bodyPr>
-            <a:normAutofit/>
-          </a:bodyPr>
-          <a:lstStyle/>
-          <a:p>
-            <a:r>
-              <a:rPr lang="en-US" sz="4000" dirty="0">
-                <a:solidFill>
-                  <a:srgbClr val="EA5E46"/>
-                </a:solidFill>
-              </a:rPr>
-              <a:t>Pricing Considerations</a:t>
-            </a:r>
-          </a:p>
-        </p:txBody>
-      </p:sp>
-      <p:pic>
-        <p:nvPicPr>
-          <p:cNvPr id="2050" name="Picture 2" descr="Image result for air bnb logo">
-            <a:extLst>
-              <a:ext uri="{FF2B5EF4-FFF2-40B4-BE49-F238E27FC236}">
-                <a16:creationId xmlns:a16="http://schemas.microsoft.com/office/drawing/2014/main" id="{A162C291-208B-BE48-BF44-7D5CD7EF6151}"/>
-              </a:ext>
-            </a:extLst>
-          </p:cNvPr>
-          <p:cNvPicPr>
-            <a:picLocks noChangeAspect="1" noChangeArrowheads="1"/>
-          </p:cNvPicPr>
-          <p:nvPr/>
-        </p:nvPicPr>
-        <p:blipFill>
-          <a:blip r:embed="rId3">
-            <a:extLst>
-              <a:ext uri="{28A0092B-C50C-407E-A947-70E740481C1C}">
-                <a14:useLocalDpi xmlns:a14="http://schemas.microsoft.com/office/drawing/2010/main" val="0"/>
-              </a:ext>
-            </a:extLst>
-          </a:blip>
-          <a:srcRect/>
-          <a:stretch>
-            <a:fillRect/>
-          </a:stretch>
-        </p:blipFill>
-        <p:spPr bwMode="auto">
-          <a:xfrm>
-            <a:off x="530564" y="108278"/>
-            <a:ext cx="2189605" cy="2022038"/>
-          </a:xfrm>
-          <a:prstGeom prst="rect">
-            <a:avLst/>
-          </a:prstGeom>
-          <a:noFill/>
-          <a:extLst>
-            <a:ext uri="{909E8E84-426E-40DD-AFC4-6F175D3DCCD1}">
-              <a14:hiddenFill xmlns:a14="http://schemas.microsoft.com/office/drawing/2010/main">
-                <a:solidFill>
-                  <a:srgbClr val="FFFFFF"/>
-                </a:solidFill>
-              </a14:hiddenFill>
-            </a:ext>
-          </a:extLst>
-        </p:spPr>
-      </p:pic>
-      <p:cxnSp>
-        <p:nvCxnSpPr>
-          <p:cNvPr id="6" name="Straight Connector 5">
-            <a:extLst>
-              <a:ext uri="{FF2B5EF4-FFF2-40B4-BE49-F238E27FC236}">
-                <a16:creationId xmlns:a16="http://schemas.microsoft.com/office/drawing/2014/main" id="{7D0926DC-6298-B648-9DF9-0D78D09F9FC8}"/>
-              </a:ext>
-            </a:extLst>
-          </p:cNvPr>
-          <p:cNvCxnSpPr>
-            <a:cxnSpLocks/>
-          </p:cNvCxnSpPr>
-          <p:nvPr/>
-        </p:nvCxnSpPr>
-        <p:spPr>
-          <a:xfrm>
-            <a:off x="975854" y="1684830"/>
-            <a:ext cx="9518745" cy="1"/>
-          </a:xfrm>
-          <a:prstGeom prst="line">
-            <a:avLst/>
-          </a:prstGeom>
-          <a:ln w="12700">
-            <a:solidFill>
-              <a:srgbClr val="EA5E46"/>
-            </a:solidFill>
-          </a:ln>
-        </p:spPr>
-        <p:style>
-          <a:lnRef idx="1">
-            <a:schemeClr val="accent2"/>
-          </a:lnRef>
-          <a:fillRef idx="0">
-            <a:schemeClr val="accent2"/>
-          </a:fillRef>
-          <a:effectRef idx="0">
-            <a:schemeClr val="accent2"/>
-          </a:effectRef>
-          <a:fontRef idx="minor">
-            <a:schemeClr val="tx1"/>
-          </a:fontRef>
-        </p:style>
-      </p:cxnSp>
-      <p:sp>
-        <p:nvSpPr>
-          <p:cNvPr id="5" name="TextBox 4">
-            <a:extLst>
-              <a:ext uri="{FF2B5EF4-FFF2-40B4-BE49-F238E27FC236}">
-                <a16:creationId xmlns:a16="http://schemas.microsoft.com/office/drawing/2014/main" id="{88997E98-9845-407E-BB5E-5C9DA5A601C7}"/>
-              </a:ext>
-            </a:extLst>
-          </p:cNvPr>
-          <p:cNvSpPr txBox="1"/>
-          <p:nvPr/>
-        </p:nvSpPr>
-        <p:spPr>
-          <a:xfrm>
-            <a:off x="1055716" y="2073264"/>
-            <a:ext cx="8537171" cy="3693319"/>
-          </a:xfrm>
-          <a:prstGeom prst="rect">
-            <a:avLst/>
-          </a:prstGeom>
-          <a:noFill/>
-        </p:spPr>
-        <p:txBody>
-          <a:bodyPr wrap="square" rtlCol="0">
-            <a:spAutoFit/>
-          </a:bodyPr>
-          <a:lstStyle/>
-          <a:p>
-            <a:r>
-              <a:rPr lang="en-CA" b="1" dirty="0"/>
-              <a:t>In Order of Importance</a:t>
-            </a:r>
-          </a:p>
-          <a:p>
-            <a:pPr marL="285750" indent="-285750">
-              <a:buFont typeface="Arial" panose="020B0604020202020204" pitchFamily="34" charset="0"/>
-              <a:buChar char="•"/>
-            </a:pPr>
-            <a:endParaRPr lang="en-CA" dirty="0"/>
-          </a:p>
-          <a:p>
-            <a:pPr marL="285750" indent="-285750">
-              <a:buFont typeface="Arial" panose="020B0604020202020204" pitchFamily="34" charset="0"/>
-              <a:buChar char="•"/>
-            </a:pPr>
-            <a:r>
-              <a:rPr lang="en-CA" dirty="0"/>
-              <a:t>Price the units at different rates during different times of the year.</a:t>
-            </a:r>
-          </a:p>
-          <a:p>
-            <a:pPr marL="285750" indent="-285750">
-              <a:buFont typeface="Arial" panose="020B0604020202020204" pitchFamily="34" charset="0"/>
-              <a:buChar char="•"/>
-            </a:pPr>
-            <a:endParaRPr lang="en-CA" dirty="0"/>
-          </a:p>
-          <a:p>
-            <a:pPr marL="285750" indent="-285750">
-              <a:buFont typeface="Arial" panose="020B0604020202020204" pitchFamily="34" charset="0"/>
-              <a:buChar char="•"/>
-            </a:pPr>
-            <a:r>
-              <a:rPr lang="en-CA" dirty="0"/>
-              <a:t>Hosts can determine the pricing range based on the location and the size of their unit.</a:t>
-            </a:r>
-          </a:p>
-          <a:p>
-            <a:pPr marL="285750" indent="-285750">
-              <a:buFont typeface="Arial" panose="020B0604020202020204" pitchFamily="34" charset="0"/>
-              <a:buChar char="•"/>
-            </a:pPr>
-            <a:endParaRPr lang="en-CA" dirty="0"/>
-          </a:p>
-          <a:p>
-            <a:pPr marL="285750" indent="-285750">
-              <a:buFont typeface="Arial" panose="020B0604020202020204" pitchFamily="34" charset="0"/>
-              <a:buChar char="•"/>
-            </a:pPr>
-            <a:r>
-              <a:rPr lang="en-CA" dirty="0"/>
-              <a:t>Prices can increase with more bedrooms &amp; bathrooms.</a:t>
-            </a:r>
-          </a:p>
-          <a:p>
-            <a:pPr marL="285750" indent="-285750">
-              <a:buFont typeface="Arial" panose="020B0604020202020204" pitchFamily="34" charset="0"/>
-              <a:buChar char="•"/>
-            </a:pPr>
-            <a:endParaRPr lang="en-CA" dirty="0"/>
-          </a:p>
-          <a:p>
-            <a:pPr marL="285750" indent="-285750">
-              <a:buFont typeface="Arial" panose="020B0604020202020204" pitchFamily="34" charset="0"/>
-              <a:buChar char="•"/>
-            </a:pPr>
-            <a:r>
-              <a:rPr lang="en-CA" dirty="0"/>
-              <a:t>Hosts can charge a bit more by providing more amenities.</a:t>
-            </a:r>
-          </a:p>
-          <a:p>
-            <a:pPr marL="285750" indent="-285750">
-              <a:buFont typeface="Arial" panose="020B0604020202020204" pitchFamily="34" charset="0"/>
-              <a:buChar char="•"/>
-            </a:pPr>
-            <a:endParaRPr lang="en-CA" dirty="0"/>
-          </a:p>
-          <a:p>
-            <a:pPr marL="285750" indent="-285750">
-              <a:buFont typeface="Arial" panose="020B0604020202020204" pitchFamily="34" charset="0"/>
-              <a:buChar char="•"/>
-            </a:pPr>
-            <a:r>
-              <a:rPr lang="en-CA" dirty="0"/>
-              <a:t>Do extensive research on how neighbours price their units considering the room type they have.</a:t>
-            </a:r>
-          </a:p>
-          <a:p>
-            <a:endParaRPr lang="en-CA" dirty="0"/>
-          </a:p>
-        </p:txBody>
-      </p:sp>
-    </p:spTree>
-    <p:extLst>
-      <p:ext uri="{BB962C8B-B14F-4D97-AF65-F5344CB8AC3E}">
-        <p14:creationId xmlns:p14="http://schemas.microsoft.com/office/powerpoint/2010/main" val="1843293363"/>
-      </p:ext>
-    </p:extLst>
-  </p:cSld>
-  <p:clrMapOvr>
-    <a:masterClrMapping/>
-  </p:clrMapOvr>
-</p:sld>
-</file>
-
-<file path=ppt/slides/slide23.xml><?xml version="1.0" encoding="utf-8"?>
-<p:sld xmlns:a="http://schemas.openxmlformats.org/drawingml/2006/main" xmlns:r="http://schemas.openxmlformats.org/officeDocument/2006/relationships" xmlns:p="http://schemas.openxmlformats.org/presentationml/2006/main">
-  <p:cSld>
-    <p:spTree>
-      <p:nvGrpSpPr>
-        <p:cNvPr id="1" name=""/>
-        <p:cNvGrpSpPr/>
-        <p:nvPr/>
-      </p:nvGrpSpPr>
-      <p:grpSpPr>
-        <a:xfrm>
-          <a:off x="0" y="0"/>
-          <a:ext cx="0" cy="0"/>
-          <a:chOff x="0" y="0"/>
-          <a:chExt cx="0" cy="0"/>
-        </a:xfrm>
-      </p:grpSpPr>
-      <p:sp>
-        <p:nvSpPr>
-          <p:cNvPr id="2" name="Title 1">
-            <a:extLst>
-              <a:ext uri="{FF2B5EF4-FFF2-40B4-BE49-F238E27FC236}">
-                <a16:creationId xmlns:a16="http://schemas.microsoft.com/office/drawing/2014/main" id="{59B8B577-5676-3C4B-A107-E41DB331FD85}"/>
-              </a:ext>
-            </a:extLst>
-          </p:cNvPr>
-          <p:cNvSpPr>
-            <a:spLocks noGrp="1"/>
-          </p:cNvSpPr>
-          <p:nvPr>
-            <p:ph type="title"/>
-          </p:nvPr>
-        </p:nvSpPr>
-        <p:spPr>
-          <a:xfrm>
-            <a:off x="2721982" y="696475"/>
-            <a:ext cx="10515600" cy="1325563"/>
-          </a:xfrm>
-        </p:spPr>
-        <p:txBody>
-          <a:bodyPr>
-            <a:normAutofit/>
-          </a:bodyPr>
-          <a:lstStyle/>
-          <a:p>
-            <a:r>
-              <a:rPr lang="en-US" sz="4000" dirty="0">
-                <a:solidFill>
-                  <a:srgbClr val="EA5E46"/>
-                </a:solidFill>
-              </a:rPr>
-              <a:t>Final Price Predictor Model</a:t>
-            </a:r>
-          </a:p>
-        </p:txBody>
-      </p:sp>
-      <p:pic>
-        <p:nvPicPr>
-          <p:cNvPr id="2050" name="Picture 2" descr="Image result for air bnb logo">
-            <a:extLst>
-              <a:ext uri="{FF2B5EF4-FFF2-40B4-BE49-F238E27FC236}">
-                <a16:creationId xmlns:a16="http://schemas.microsoft.com/office/drawing/2014/main" id="{A162C291-208B-BE48-BF44-7D5CD7EF6151}"/>
-              </a:ext>
-            </a:extLst>
-          </p:cNvPr>
-          <p:cNvPicPr>
-            <a:picLocks noChangeAspect="1" noChangeArrowheads="1"/>
-          </p:cNvPicPr>
-          <p:nvPr/>
-        </p:nvPicPr>
-        <p:blipFill>
-          <a:blip r:embed="rId3">
-            <a:extLst>
-              <a:ext uri="{28A0092B-C50C-407E-A947-70E740481C1C}">
-                <a14:useLocalDpi xmlns:a14="http://schemas.microsoft.com/office/drawing/2010/main" val="0"/>
-              </a:ext>
-            </a:extLst>
-          </a:blip>
-          <a:srcRect/>
-          <a:stretch>
-            <a:fillRect/>
-          </a:stretch>
-        </p:blipFill>
-        <p:spPr bwMode="auto">
-          <a:xfrm>
-            <a:off x="530564" y="108278"/>
-            <a:ext cx="2189605" cy="2022038"/>
-          </a:xfrm>
-          <a:prstGeom prst="rect">
-            <a:avLst/>
-          </a:prstGeom>
-          <a:noFill/>
-          <a:extLst>
-            <a:ext uri="{909E8E84-426E-40DD-AFC4-6F175D3DCCD1}">
-              <a14:hiddenFill xmlns:a14="http://schemas.microsoft.com/office/drawing/2010/main">
-                <a:solidFill>
-                  <a:srgbClr val="FFFFFF"/>
-                </a:solidFill>
-              </a14:hiddenFill>
-            </a:ext>
-          </a:extLst>
-        </p:spPr>
-      </p:pic>
-      <p:cxnSp>
-        <p:nvCxnSpPr>
-          <p:cNvPr id="6" name="Straight Connector 5">
-            <a:extLst>
-              <a:ext uri="{FF2B5EF4-FFF2-40B4-BE49-F238E27FC236}">
-                <a16:creationId xmlns:a16="http://schemas.microsoft.com/office/drawing/2014/main" id="{7D0926DC-6298-B648-9DF9-0D78D09F9FC8}"/>
-              </a:ext>
-            </a:extLst>
-          </p:cNvPr>
-          <p:cNvCxnSpPr>
-            <a:cxnSpLocks/>
-          </p:cNvCxnSpPr>
-          <p:nvPr/>
-        </p:nvCxnSpPr>
-        <p:spPr>
-          <a:xfrm>
-            <a:off x="975854" y="1684830"/>
-            <a:ext cx="9518745" cy="1"/>
-          </a:xfrm>
-          <a:prstGeom prst="line">
-            <a:avLst/>
-          </a:prstGeom>
-          <a:ln w="12700">
-            <a:solidFill>
-              <a:srgbClr val="EA5E46"/>
-            </a:solidFill>
-          </a:ln>
-        </p:spPr>
-        <p:style>
-          <a:lnRef idx="1">
-            <a:schemeClr val="accent2"/>
-          </a:lnRef>
-          <a:fillRef idx="0">
-            <a:schemeClr val="accent2"/>
-          </a:fillRef>
-          <a:effectRef idx="0">
-            <a:schemeClr val="accent2"/>
-          </a:effectRef>
-          <a:fontRef idx="minor">
-            <a:schemeClr val="tx1"/>
-          </a:fontRef>
-        </p:style>
-      </p:cxnSp>
-      <p:sp>
-        <p:nvSpPr>
-          <p:cNvPr id="5" name="TextBox 4">
-            <a:extLst>
-              <a:ext uri="{FF2B5EF4-FFF2-40B4-BE49-F238E27FC236}">
-                <a16:creationId xmlns:a16="http://schemas.microsoft.com/office/drawing/2014/main" id="{88997E98-9845-407E-BB5E-5C9DA5A601C7}"/>
-              </a:ext>
-            </a:extLst>
-          </p:cNvPr>
-          <p:cNvSpPr txBox="1"/>
-          <p:nvPr/>
-        </p:nvSpPr>
-        <p:spPr>
-          <a:xfrm>
-            <a:off x="872836" y="2228671"/>
-            <a:ext cx="8537171" cy="1754326"/>
-          </a:xfrm>
-          <a:prstGeom prst="rect">
-            <a:avLst/>
-          </a:prstGeom>
-          <a:noFill/>
-        </p:spPr>
-        <p:txBody>
-          <a:bodyPr wrap="square" rtlCol="0">
-            <a:spAutoFit/>
-          </a:bodyPr>
-          <a:lstStyle/>
-          <a:p>
-            <a:pPr marL="285750" indent="-285750">
-              <a:buFont typeface="Arial" panose="020B0604020202020204" pitchFamily="34" charset="0"/>
-              <a:buChar char="•"/>
-            </a:pPr>
-            <a:r>
-              <a:rPr lang="en-US" dirty="0"/>
-              <a:t>Modified Facebook Prophet Model that predict prices :</a:t>
-            </a:r>
-          </a:p>
-          <a:p>
-            <a:pPr marL="742950" lvl="1" indent="-285750">
-              <a:buFont typeface="Arial" panose="020B0604020202020204" pitchFamily="34" charset="0"/>
-              <a:buChar char="•"/>
-            </a:pPr>
-            <a:r>
-              <a:rPr lang="en-US" dirty="0"/>
-              <a:t>From 2017 - 2023</a:t>
-            </a:r>
-          </a:p>
-          <a:p>
-            <a:pPr marL="742950" lvl="1" indent="-285750">
-              <a:buFont typeface="Arial" panose="020B0604020202020204" pitchFamily="34" charset="0"/>
-              <a:buChar char="•"/>
-            </a:pPr>
-            <a:r>
-              <a:rPr lang="en-US" dirty="0"/>
-              <a:t>By Boroughs</a:t>
-            </a:r>
-          </a:p>
-          <a:p>
-            <a:pPr marL="742950" lvl="1" indent="-285750">
-              <a:buFont typeface="Arial" panose="020B0604020202020204" pitchFamily="34" charset="0"/>
-              <a:buChar char="•"/>
-            </a:pPr>
-            <a:r>
-              <a:rPr lang="en-US" dirty="0"/>
-              <a:t>By Room Type</a:t>
-            </a:r>
-          </a:p>
-          <a:p>
-            <a:pPr marL="742950" lvl="1" indent="-285750">
-              <a:buFont typeface="Arial" panose="020B0604020202020204" pitchFamily="34" charset="0"/>
-              <a:buChar char="•"/>
-            </a:pPr>
-            <a:endParaRPr lang="en-US" dirty="0"/>
-          </a:p>
-          <a:p>
-            <a:pPr marL="742950" lvl="1" indent="-285750">
-              <a:buFont typeface="Arial" panose="020B0604020202020204" pitchFamily="34" charset="0"/>
-              <a:buChar char="•"/>
-            </a:pPr>
-            <a:r>
-              <a:rPr lang="en-US" dirty="0"/>
-              <a:t>Show Dashboard Image</a:t>
-            </a:r>
-          </a:p>
-        </p:txBody>
-      </p:sp>
-    </p:spTree>
-    <p:extLst>
-      <p:ext uri="{BB962C8B-B14F-4D97-AF65-F5344CB8AC3E}">
-        <p14:creationId xmlns:p14="http://schemas.microsoft.com/office/powerpoint/2010/main" val="3921467598"/>
-      </p:ext>
-    </p:extLst>
-  </p:cSld>
-  <p:clrMapOvr>
-    <a:masterClrMapping/>
-  </p:clrMapOvr>
-</p:sld>
-</file>
-
-<file path=ppt/slides/slide24.xml><?xml version="1.0" encoding="utf-8"?>
-<p:sld xmlns:a="http://schemas.openxmlformats.org/drawingml/2006/main" xmlns:r="http://schemas.openxmlformats.org/officeDocument/2006/relationships" xmlns:p="http://schemas.openxmlformats.org/presentationml/2006/main">
-  <p:cSld>
-    <p:spTree>
-      <p:nvGrpSpPr>
-        <p:cNvPr id="1" name=""/>
-        <p:cNvGrpSpPr/>
-        <p:nvPr/>
-      </p:nvGrpSpPr>
-      <p:grpSpPr>
-        <a:xfrm>
-          <a:off x="0" y="0"/>
-          <a:ext cx="0" cy="0"/>
-          <a:chOff x="0" y="0"/>
-          <a:chExt cx="0" cy="0"/>
-        </a:xfrm>
-      </p:grpSpPr>
-      <p:sp>
-        <p:nvSpPr>
-          <p:cNvPr id="2" name="Title 1">
-            <a:extLst>
-              <a:ext uri="{FF2B5EF4-FFF2-40B4-BE49-F238E27FC236}">
-                <a16:creationId xmlns:a16="http://schemas.microsoft.com/office/drawing/2014/main" id="{59B8B577-5676-3C4B-A107-E41DB331FD85}"/>
-              </a:ext>
-            </a:extLst>
-          </p:cNvPr>
-          <p:cNvSpPr>
-            <a:spLocks noGrp="1"/>
-          </p:cNvSpPr>
-          <p:nvPr>
-            <p:ph type="title"/>
-          </p:nvPr>
-        </p:nvSpPr>
-        <p:spPr>
-          <a:xfrm>
-            <a:off x="2721982" y="696475"/>
-            <a:ext cx="10515600" cy="1325563"/>
-          </a:xfrm>
-        </p:spPr>
-        <p:txBody>
-          <a:bodyPr>
-            <a:normAutofit/>
-          </a:bodyPr>
-          <a:lstStyle/>
-          <a:p>
-            <a:r>
-              <a:rPr lang="en-US" sz="4000" dirty="0">
-                <a:solidFill>
-                  <a:srgbClr val="EA5E46"/>
-                </a:solidFill>
-              </a:rPr>
-              <a:t>Next Steps</a:t>
-            </a:r>
-          </a:p>
-        </p:txBody>
-      </p:sp>
-      <p:pic>
-        <p:nvPicPr>
-          <p:cNvPr id="2050" name="Picture 2" descr="Image result for air bnb logo">
-            <a:extLst>
-              <a:ext uri="{FF2B5EF4-FFF2-40B4-BE49-F238E27FC236}">
-                <a16:creationId xmlns:a16="http://schemas.microsoft.com/office/drawing/2014/main" id="{A162C291-208B-BE48-BF44-7D5CD7EF6151}"/>
-              </a:ext>
-            </a:extLst>
-          </p:cNvPr>
-          <p:cNvPicPr>
-            <a:picLocks noChangeAspect="1" noChangeArrowheads="1"/>
-          </p:cNvPicPr>
-          <p:nvPr/>
-        </p:nvPicPr>
-        <p:blipFill>
-          <a:blip r:embed="rId3">
-            <a:extLst>
-              <a:ext uri="{28A0092B-C50C-407E-A947-70E740481C1C}">
-                <a14:useLocalDpi xmlns:a14="http://schemas.microsoft.com/office/drawing/2010/main" val="0"/>
-              </a:ext>
-            </a:extLst>
-          </a:blip>
-          <a:srcRect/>
-          <a:stretch>
-            <a:fillRect/>
-          </a:stretch>
-        </p:blipFill>
-        <p:spPr bwMode="auto">
-          <a:xfrm>
-            <a:off x="530564" y="108278"/>
-            <a:ext cx="2189605" cy="2022038"/>
-          </a:xfrm>
-          <a:prstGeom prst="rect">
-            <a:avLst/>
-          </a:prstGeom>
-          <a:noFill/>
-          <a:extLst>
-            <a:ext uri="{909E8E84-426E-40DD-AFC4-6F175D3DCCD1}">
-              <a14:hiddenFill xmlns:a14="http://schemas.microsoft.com/office/drawing/2010/main">
-                <a:solidFill>
-                  <a:srgbClr val="FFFFFF"/>
-                </a:solidFill>
-              </a14:hiddenFill>
-            </a:ext>
-          </a:extLst>
-        </p:spPr>
-      </p:pic>
-      <p:cxnSp>
-        <p:nvCxnSpPr>
-          <p:cNvPr id="6" name="Straight Connector 5">
-            <a:extLst>
-              <a:ext uri="{FF2B5EF4-FFF2-40B4-BE49-F238E27FC236}">
-                <a16:creationId xmlns:a16="http://schemas.microsoft.com/office/drawing/2014/main" id="{7D0926DC-6298-B648-9DF9-0D78D09F9FC8}"/>
-              </a:ext>
-            </a:extLst>
-          </p:cNvPr>
-          <p:cNvCxnSpPr>
-            <a:cxnSpLocks/>
-          </p:cNvCxnSpPr>
-          <p:nvPr/>
-        </p:nvCxnSpPr>
-        <p:spPr>
-          <a:xfrm>
-            <a:off x="975854" y="1684829"/>
-            <a:ext cx="9518745" cy="1"/>
-          </a:xfrm>
-          <a:prstGeom prst="line">
-            <a:avLst/>
-          </a:prstGeom>
-          <a:ln w="12700">
-            <a:solidFill>
-              <a:srgbClr val="EA5E46"/>
-            </a:solidFill>
-          </a:ln>
-        </p:spPr>
-        <p:style>
-          <a:lnRef idx="1">
-            <a:schemeClr val="accent2"/>
-          </a:lnRef>
-          <a:fillRef idx="0">
-            <a:schemeClr val="accent2"/>
-          </a:fillRef>
-          <a:effectRef idx="0">
-            <a:schemeClr val="accent2"/>
-          </a:effectRef>
-          <a:fontRef idx="minor">
-            <a:schemeClr val="tx1"/>
-          </a:fontRef>
-        </p:style>
-      </p:cxnSp>
       <p:sp>
         <p:nvSpPr>
           <p:cNvPr id="3" name="TextBox 2">
@@ -13325,7 +12837,7 @@
 </p:sld>
 </file>
 
-<file path=ppt/slides/slide25.xml><?xml version="1.0" encoding="utf-8"?>
+<file path=ppt/slides/slide24.xml><?xml version="1.0" encoding="utf-8"?>
 <p:sld xmlns:a="http://schemas.openxmlformats.org/drawingml/2006/main" xmlns:r="http://schemas.openxmlformats.org/officeDocument/2006/relationships" xmlns:p="http://schemas.openxmlformats.org/presentationml/2006/main">
   <p:cSld>
     <p:spTree>
@@ -13962,8 +13474,8 @@
         </p:nvSpPr>
         <p:spPr>
           <a:xfrm>
-            <a:off x="1192261" y="2130316"/>
-            <a:ext cx="9085929" cy="5970865"/>
+            <a:off x="4927054" y="1850531"/>
+            <a:ext cx="6069810" cy="6894195"/>
           </a:xfrm>
           <a:prstGeom prst="rect">
             <a:avLst/>
@@ -13986,7 +13498,7 @@
                 <a:ea typeface="Calibri" panose="020F0502020204030204" pitchFamily="34" charset="0"/>
                 <a:cs typeface="Times New Roman" panose="02020603050405020304" pitchFamily="18" charset="0"/>
               </a:rPr>
-              <a:t>There is no such thing as a perfect dataset  for the project.</a:t>
+              <a:t>Consolidating new datasets to the existing database.</a:t>
             </a:r>
           </a:p>
           <a:p>
@@ -14010,7 +13522,7 @@
                 <a:ea typeface="Calibri" panose="020F0502020204030204" pitchFamily="34" charset="0"/>
                 <a:cs typeface="Times New Roman" panose="02020603050405020304" pitchFamily="18" charset="0"/>
               </a:rPr>
-              <a:t>Large datasets slows down the process.</a:t>
+              <a:t>Large datasets slows down the process during the data transformation process.</a:t>
             </a:r>
           </a:p>
           <a:p>
@@ -14169,6 +13681,36 @@
           </a:p>
         </p:txBody>
       </p:sp>
+      <p:pic>
+        <p:nvPicPr>
+          <p:cNvPr id="5" name="Picture 4">
+            <a:extLst>
+              <a:ext uri="{FF2B5EF4-FFF2-40B4-BE49-F238E27FC236}">
+                <a16:creationId xmlns:a16="http://schemas.microsoft.com/office/drawing/2014/main" id="{7889FAE2-2351-4D30-9962-91B6866B6122}"/>
+              </a:ext>
+            </a:extLst>
+          </p:cNvPr>
+          <p:cNvPicPr>
+            <a:picLocks noChangeAspect="1"/>
+          </p:cNvPicPr>
+          <p:nvPr/>
+        </p:nvPicPr>
+        <p:blipFill>
+          <a:blip r:embed="rId4"/>
+          <a:stretch>
+            <a:fillRect/>
+          </a:stretch>
+        </p:blipFill>
+        <p:spPr>
+          <a:xfrm>
+            <a:off x="975854" y="1835264"/>
+            <a:ext cx="3791292" cy="4326260"/>
+          </a:xfrm>
+          <a:prstGeom prst="rect">
+            <a:avLst/>
+          </a:prstGeom>
+        </p:spPr>
+      </p:pic>
     </p:spTree>
     <p:extLst>
       <p:ext uri="{BB962C8B-B14F-4D97-AF65-F5344CB8AC3E}">
@@ -14313,7 +13855,7 @@
                                         <p:tgtEl>
                                           <p:spTgt spid="4">
                                             <p:txEl>
-                                              <p:pRg st="0" end="0"/>
+                                              <p:pRg st="1" end="1"/>
                                             </p:txEl>
                                           </p:spTgt>
                                         </p:tgtEl>
@@ -14362,7 +13904,7 @@
                                         <p:tgtEl>
                                           <p:spTgt spid="4">
                                             <p:txEl>
-                                              <p:pRg st="1" end="1"/>
+                                              <p:pRg st="0" end="0"/>
                                             </p:txEl>
                                           </p:spTgt>
                                         </p:tgtEl>
@@ -16264,8 +15806,8 @@
         </p:nvSpPr>
         <p:spPr>
           <a:xfrm>
-            <a:off x="1055716" y="1899026"/>
-            <a:ext cx="8537171" cy="4247317"/>
+            <a:off x="1055716" y="1899025"/>
+            <a:ext cx="5259115" cy="3693319"/>
           </a:xfrm>
           <a:prstGeom prst="rect">
             <a:avLst/>
@@ -16284,38 +15826,7 @@
             </a:pPr>
             <a:r>
               <a:rPr lang="en-US" dirty="0"/>
-              <a:t>Important Features for pricing includes </a:t>
-            </a:r>
-          </a:p>
-          <a:p>
-            <a:pPr marL="742950" lvl="1" indent="-285750">
-              <a:buFont typeface="Arial" panose="020B0604020202020204" pitchFamily="34" charset="0"/>
-              <a:buChar char="•"/>
-            </a:pPr>
-            <a:r>
-              <a:rPr lang="en-US" dirty="0" err="1"/>
-              <a:t>Neighbourhood</a:t>
-            </a:r>
-            <a:endParaRPr lang="en-US" dirty="0"/>
-          </a:p>
-          <a:p>
-            <a:pPr marL="742950" lvl="1" indent="-285750">
-              <a:buFont typeface="Arial" panose="020B0604020202020204" pitchFamily="34" charset="0"/>
-              <a:buChar char="•"/>
-            </a:pPr>
-            <a:r>
-              <a:rPr lang="en-US" dirty="0"/>
-              <a:t>Room Type</a:t>
-            </a:r>
-          </a:p>
-          <a:p>
-            <a:pPr marL="742950" lvl="1" indent="-285750">
-              <a:buFont typeface="Arial" panose="020B0604020202020204" pitchFamily="34" charset="0"/>
-              <a:buChar char="•"/>
-            </a:pPr>
-            <a:r>
-              <a:rPr lang="en-US" dirty="0"/>
-              <a:t>Bathrooms</a:t>
+              <a:t>Location, room types, and number of bathrooms of a listing are important features to price a listing.</a:t>
             </a:r>
           </a:p>
           <a:p>
@@ -16332,27 +15843,7 @@
             </a:pPr>
             <a:r>
               <a:rPr lang="en-US" dirty="0"/>
-              <a:t>Highest Price Correlation</a:t>
-            </a:r>
-          </a:p>
-          <a:p>
-            <a:pPr marL="800100" lvl="1" indent="-342900">
-              <a:buFont typeface="Arial" panose="020B0604020202020204" pitchFamily="34" charset="0"/>
-              <a:buChar char="•"/>
-            </a:pPr>
-            <a:r>
-              <a:rPr lang="en-US" dirty="0"/>
-              <a:t>Number of People Listings can Accommodate</a:t>
-            </a:r>
-          </a:p>
-          <a:p>
-            <a:pPr marL="800100" lvl="1" indent="-342900">
-              <a:buFont typeface="Arial" panose="020B0604020202020204" pitchFamily="34" charset="0"/>
-              <a:buChar char="•"/>
-            </a:pPr>
-            <a:r>
-              <a:rPr lang="en-US" dirty="0"/>
-              <a:t>Number of Bedrooms</a:t>
+              <a:t>Moderate increase in price as the listing size increases.</a:t>
             </a:r>
           </a:p>
           <a:p>
@@ -16368,7 +15859,7 @@
             </a:pPr>
             <a:r>
               <a:rPr lang="en-US" dirty="0"/>
-              <a:t>Low-Moderate Correlation on Clustering</a:t>
+              <a:t>Low-Moderate impact in predicting outcome based on local average of a specific area.</a:t>
             </a:r>
           </a:p>
           <a:p>
@@ -16409,6 +15900,36 @@
           </a:p>
         </p:txBody>
       </p:sp>
+      <p:pic>
+        <p:nvPicPr>
+          <p:cNvPr id="4" name="Picture 3" descr="A picture containing text, person, hand, suit&#10;&#10;Description automatically generated">
+            <a:extLst>
+              <a:ext uri="{FF2B5EF4-FFF2-40B4-BE49-F238E27FC236}">
+                <a16:creationId xmlns:a16="http://schemas.microsoft.com/office/drawing/2014/main" id="{42C23BBE-6798-4B82-8237-6370C56FE51A}"/>
+              </a:ext>
+            </a:extLst>
+          </p:cNvPr>
+          <p:cNvPicPr>
+            <a:picLocks noChangeAspect="1"/>
+          </p:cNvPicPr>
+          <p:nvPr/>
+        </p:nvPicPr>
+        <p:blipFill>
+          <a:blip r:embed="rId4"/>
+          <a:stretch>
+            <a:fillRect/>
+          </a:stretch>
+        </p:blipFill>
+        <p:spPr>
+          <a:xfrm>
+            <a:off x="6893705" y="1831027"/>
+            <a:ext cx="3505688" cy="4315313"/>
+          </a:xfrm>
+          <a:prstGeom prst="rect">
+            <a:avLst/>
+          </a:prstGeom>
+        </p:spPr>
+      </p:pic>
     </p:spTree>
     <p:extLst>
       <p:ext uri="{BB962C8B-B14F-4D97-AF65-F5344CB8AC3E}">
@@ -16473,7 +15994,7 @@
                   <a:srgbClr val="EA5E46"/>
                 </a:solidFill>
               </a:rPr>
-              <a:t>Model Data Cleaning – Adding Columns</a:t>
+              <a:t>Model Data Transformation – RF, LGBM, KNN</a:t>
             </a:r>
           </a:p>
         </p:txBody>
@@ -16568,248 +16089,42 @@
           </a:fontRef>
         </p:style>
       </p:cxnSp>
-      <p:sp>
-        <p:nvSpPr>
-          <p:cNvPr id="13" name="Arrow: Right 12">
-            <a:extLst>
-              <a:ext uri="{FF2B5EF4-FFF2-40B4-BE49-F238E27FC236}">
-                <a16:creationId xmlns:a16="http://schemas.microsoft.com/office/drawing/2014/main" id="{4909AE15-9CFE-4BEA-8959-FC97CF762308}"/>
-              </a:ext>
-            </a:extLst>
-          </p:cNvPr>
-          <p:cNvSpPr/>
+      <p:pic>
+        <p:nvPicPr>
+          <p:cNvPr id="14" name="Picture 13">
+            <a:extLst>
+              <a:ext uri="{FF2B5EF4-FFF2-40B4-BE49-F238E27FC236}">
+                <a16:creationId xmlns:a16="http://schemas.microsoft.com/office/drawing/2014/main" id="{81C25E9C-AEF8-48C0-80CE-C88B373B1AE8}"/>
+              </a:ext>
+            </a:extLst>
+          </p:cNvPr>
+          <p:cNvPicPr>
+            <a:picLocks noChangeAspect="1"/>
+          </p:cNvPicPr>
           <p:nvPr/>
-        </p:nvSpPr>
+        </p:nvPicPr>
+        <p:blipFill>
+          <a:blip r:embed="rId4"/>
+          <a:stretch>
+            <a:fillRect/>
+          </a:stretch>
+        </p:blipFill>
         <p:spPr>
           <a:xfrm>
-            <a:off x="5980172" y="3777154"/>
-            <a:ext cx="552893" cy="352089"/>
+            <a:off x="2083682" y="1767443"/>
+            <a:ext cx="7806003" cy="4108894"/>
           </a:xfrm>
-          <a:prstGeom prst="rightArrow">
+          <a:prstGeom prst="rect">
             <a:avLst/>
           </a:prstGeom>
-          <a:solidFill>
-            <a:schemeClr val="bg2">
-              <a:lumMod val="75000"/>
-            </a:schemeClr>
-          </a:solidFill>
-          <a:ln>
-            <a:solidFill>
-              <a:schemeClr val="bg2">
-                <a:lumMod val="75000"/>
-              </a:schemeClr>
-            </a:solidFill>
-          </a:ln>
         </p:spPr>
-        <p:style>
-          <a:lnRef idx="2">
-            <a:schemeClr val="accent1">
-              <a:shade val="50000"/>
-            </a:schemeClr>
-          </a:lnRef>
-          <a:fillRef idx="1">
-            <a:schemeClr val="accent1"/>
-          </a:fillRef>
-          <a:effectRef idx="0">
-            <a:schemeClr val="accent1"/>
-          </a:effectRef>
-          <a:fontRef idx="minor">
-            <a:schemeClr val="lt1"/>
-          </a:fontRef>
-        </p:style>
-        <p:txBody>
-          <a:bodyPr rtlCol="0" anchor="ctr"/>
-          <a:lstStyle/>
-          <a:p>
-            <a:pPr algn="ctr"/>
-            <a:endParaRPr lang="en-CA"/>
-          </a:p>
-        </p:txBody>
-      </p:sp>
-      <p:graphicFrame>
-        <p:nvGraphicFramePr>
-          <p:cNvPr id="4" name="Table 4">
-            <a:extLst>
-              <a:ext uri="{FF2B5EF4-FFF2-40B4-BE49-F238E27FC236}">
-                <a16:creationId xmlns:a16="http://schemas.microsoft.com/office/drawing/2014/main" id="{21B26308-D3E0-4424-8F97-2E7634C3FA7A}"/>
-              </a:ext>
-            </a:extLst>
-          </p:cNvPr>
-          <p:cNvGraphicFramePr>
-            <a:graphicFrameLocks noGrp="1"/>
-          </p:cNvGraphicFramePr>
-          <p:nvPr>
-            <p:extLst>
-              <p:ext uri="{D42A27DB-BD31-4B8C-83A1-F6EECF244321}">
-                <p14:modId xmlns:p14="http://schemas.microsoft.com/office/powerpoint/2010/main" val="147169135"/>
-              </p:ext>
-            </p:extLst>
-          </p:nvPr>
-        </p:nvGraphicFramePr>
-        <p:xfrm>
-          <a:off x="1061616" y="3261381"/>
-          <a:ext cx="4611395" cy="1089728"/>
-        </p:xfrm>
-        <a:graphic>
-          <a:graphicData uri="http://schemas.openxmlformats.org/drawingml/2006/table">
-            <a:tbl>
-              <a:tblPr firstRow="1" bandRow="1">
-                <a:tableStyleId>{073A0DAA-6AF3-43AB-8588-CEC1D06C72B9}</a:tableStyleId>
-              </a:tblPr>
-              <a:tblGrid>
-                <a:gridCol w="4611395">
-                  <a:extLst>
-                    <a:ext uri="{9D8B030D-6E8A-4147-A177-3AD203B41FA5}">
-                      <a16:colId xmlns:a16="http://schemas.microsoft.com/office/drawing/2014/main" val="2478899434"/>
-                    </a:ext>
-                  </a:extLst>
-                </a:gridCol>
-              </a:tblGrid>
-              <a:tr h="511685">
-                <a:tc>
-                  <a:txBody>
-                    <a:bodyPr/>
-                    <a:lstStyle/>
-                    <a:p>
-                      <a:r>
-                        <a:rPr lang="en-US" dirty="0"/>
-                        <a:t>amenities</a:t>
-                      </a:r>
-                      <a:endParaRPr lang="en-CA" dirty="0"/>
-                    </a:p>
-                  </a:txBody>
-                  <a:tcPr/>
-                </a:tc>
-                <a:extLst>
-                  <a:ext uri="{0D108BD9-81ED-4DB2-BD59-A6C34878D82A}">
-                    <a16:rowId xmlns:a16="http://schemas.microsoft.com/office/drawing/2014/main" val="2665256824"/>
-                  </a:ext>
-                </a:extLst>
-              </a:tr>
-              <a:tr h="578043">
-                <a:tc>
-                  <a:txBody>
-                    <a:bodyPr/>
-                    <a:lstStyle/>
-                    <a:p>
-                      <a:r>
-                        <a:rPr lang="en-US" dirty="0"/>
-                        <a:t>[“</a:t>
-                      </a:r>
-                      <a:r>
-                        <a:rPr lang="en-US" dirty="0" err="1"/>
-                        <a:t>Wifi</a:t>
-                      </a:r>
-                      <a:r>
-                        <a:rPr lang="en-US" dirty="0"/>
-                        <a:t>”, “Kitchen”, “Heating”, “Air Conditioning]</a:t>
-                      </a:r>
-                      <a:endParaRPr lang="en-CA" dirty="0"/>
-                    </a:p>
-                  </a:txBody>
-                  <a:tcPr/>
-                </a:tc>
-                <a:extLst>
-                  <a:ext uri="{0D108BD9-81ED-4DB2-BD59-A6C34878D82A}">
-                    <a16:rowId xmlns:a16="http://schemas.microsoft.com/office/drawing/2014/main" val="1667322077"/>
-                  </a:ext>
-                </a:extLst>
-              </a:tr>
-            </a:tbl>
-          </a:graphicData>
-        </a:graphic>
-      </p:graphicFrame>
-      <p:graphicFrame>
-        <p:nvGraphicFramePr>
-          <p:cNvPr id="11" name="Table 4">
-            <a:extLst>
-              <a:ext uri="{FF2B5EF4-FFF2-40B4-BE49-F238E27FC236}">
-                <a16:creationId xmlns:a16="http://schemas.microsoft.com/office/drawing/2014/main" id="{08D2C7D8-9F85-4228-B2F2-8B108D86BB77}"/>
-              </a:ext>
-            </a:extLst>
-          </p:cNvPr>
-          <p:cNvGraphicFramePr>
-            <a:graphicFrameLocks noGrp="1"/>
-          </p:cNvGraphicFramePr>
-          <p:nvPr>
-            <p:extLst>
-              <p:ext uri="{D42A27DB-BD31-4B8C-83A1-F6EECF244321}">
-                <p14:modId xmlns:p14="http://schemas.microsoft.com/office/powerpoint/2010/main" val="1012773955"/>
-              </p:ext>
-            </p:extLst>
-          </p:nvPr>
-        </p:nvGraphicFramePr>
-        <p:xfrm>
-          <a:off x="6840226" y="3261381"/>
-          <a:ext cx="4611395" cy="1089728"/>
-        </p:xfrm>
-        <a:graphic>
-          <a:graphicData uri="http://schemas.openxmlformats.org/drawingml/2006/table">
-            <a:tbl>
-              <a:tblPr firstRow="1" bandRow="1">
-                <a:tableStyleId>{073A0DAA-6AF3-43AB-8588-CEC1D06C72B9}</a:tableStyleId>
-              </a:tblPr>
-              <a:tblGrid>
-                <a:gridCol w="4611395">
-                  <a:extLst>
-                    <a:ext uri="{9D8B030D-6E8A-4147-A177-3AD203B41FA5}">
-                      <a16:colId xmlns:a16="http://schemas.microsoft.com/office/drawing/2014/main" val="2478899434"/>
-                    </a:ext>
-                  </a:extLst>
-                </a:gridCol>
-              </a:tblGrid>
-              <a:tr h="511685">
-                <a:tc>
-                  <a:txBody>
-                    <a:bodyPr/>
-                    <a:lstStyle/>
-                    <a:p>
-                      <a:r>
-                        <a:rPr lang="en-US" dirty="0" err="1"/>
-                        <a:t>amenities_count</a:t>
-                      </a:r>
-                      <a:endParaRPr lang="en-CA" dirty="0"/>
-                    </a:p>
-                  </a:txBody>
-                  <a:tcPr/>
-                </a:tc>
-                <a:extLst>
-                  <a:ext uri="{0D108BD9-81ED-4DB2-BD59-A6C34878D82A}">
-                    <a16:rowId xmlns:a16="http://schemas.microsoft.com/office/drawing/2014/main" val="2665256824"/>
-                  </a:ext>
-                </a:extLst>
-              </a:tr>
-              <a:tr h="578043">
-                <a:tc>
-                  <a:txBody>
-                    <a:bodyPr/>
-                    <a:lstStyle/>
-                    <a:p>
-                      <a:r>
-                        <a:rPr lang="en-US" dirty="0"/>
-                        <a:t>4</a:t>
-                      </a:r>
-                      <a:endParaRPr lang="en-CA" dirty="0"/>
-                    </a:p>
-                  </a:txBody>
-                  <a:tcPr/>
-                </a:tc>
-                <a:extLst>
-                  <a:ext uri="{0D108BD9-81ED-4DB2-BD59-A6C34878D82A}">
-                    <a16:rowId xmlns:a16="http://schemas.microsoft.com/office/drawing/2014/main" val="1667322077"/>
-                  </a:ext>
-                </a:extLst>
-              </a:tr>
-            </a:tbl>
-          </a:graphicData>
-        </a:graphic>
-      </p:graphicFrame>
-      <p:sp>
-        <p:nvSpPr>
-          <p:cNvPr id="5" name="TextBox 4">
-            <a:extLst>
-              <a:ext uri="{FF2B5EF4-FFF2-40B4-BE49-F238E27FC236}">
-                <a16:creationId xmlns:a16="http://schemas.microsoft.com/office/drawing/2014/main" id="{0B1F14FF-D320-49A9-9FFD-98A5063749C8}"/>
+      </p:pic>
+      <p:sp>
+        <p:nvSpPr>
+          <p:cNvPr id="3" name="TextBox 2">
+            <a:extLst>
+              <a:ext uri="{FF2B5EF4-FFF2-40B4-BE49-F238E27FC236}">
+                <a16:creationId xmlns:a16="http://schemas.microsoft.com/office/drawing/2014/main" id="{60518D2B-5A6E-4114-AF9D-C5BF6A84A679}"/>
               </a:ext>
             </a:extLst>
           </p:cNvPr>
@@ -16818,8 +16133,8 @@
         </p:nvSpPr>
         <p:spPr>
           <a:xfrm>
-            <a:off x="975853" y="2130318"/>
-            <a:ext cx="7179605" cy="461665"/>
+            <a:off x="1136491" y="6028879"/>
+            <a:ext cx="9700384" cy="369332"/>
           </a:xfrm>
           <a:prstGeom prst="rect">
             <a:avLst/>
@@ -16833,17 +16148,17 @@
           <a:lstStyle/>
           <a:p>
             <a:r>
-              <a:rPr lang="en-US" sz="2400" b="1" dirty="0"/>
-              <a:t>How will this new feature will impact the price?</a:t>
-            </a:r>
-            <a:endParaRPr lang="en-CA" sz="2400" b="1" dirty="0"/>
+              <a:rPr lang="en-US" dirty="0"/>
+              <a:t>Note: Used for Random Forest, LGBM and KNN Regressor Models only</a:t>
+            </a:r>
+            <a:endParaRPr lang="en-CA" dirty="0"/>
           </a:p>
         </p:txBody>
       </p:sp>
     </p:spTree>
     <p:extLst>
       <p:ext uri="{BB962C8B-B14F-4D97-AF65-F5344CB8AC3E}">
-        <p14:creationId xmlns:p14="http://schemas.microsoft.com/office/powerpoint/2010/main" val="513184334"/>
+        <p14:creationId xmlns:p14="http://schemas.microsoft.com/office/powerpoint/2010/main" val="641962917"/>
       </p:ext>
     </p:extLst>
   </p:cSld>
@@ -16871,7 +16186,7 @@
                             </p:stCondLst>
                             <p:childTnLst>
                               <p:par>
-                                <p:cTn id="5" presetID="2" presetClass="entr" presetSubtype="1" fill="hold" grpId="0" nodeType="clickEffect">
+                                <p:cTn id="5" presetID="16" presetClass="entr" presetSubtype="21" fill="hold" nodeType="clickEffect">
                                   <p:stCondLst>
                                     <p:cond delay="0"/>
                                   </p:stCondLst>
@@ -16884,7 +16199,7 @@
                                           </p:stCondLst>
                                         </p:cTn>
                                         <p:tgtEl>
-                                          <p:spTgt spid="5"/>
+                                          <p:spTgt spid="14"/>
                                         </p:tgtEl>
                                         <p:attrNameLst>
                                           <p:attrName>style.visibility</p:attrName>
@@ -16894,325 +16209,14 @@
                                         <p:strVal val="visible"/>
                                       </p:to>
                                     </p:set>
-                                    <p:anim calcmode="lin" valueType="num">
-                                      <p:cBhvr additive="base">
-                                        <p:cTn id="7" dur="500" fill="hold"/>
+                                    <p:animEffect transition="in" filter="barn(inVertical)">
+                                      <p:cBhvr>
+                                        <p:cTn id="7" dur="500"/>
                                         <p:tgtEl>
-                                          <p:spTgt spid="5"/>
+                                          <p:spTgt spid="14"/>
                                         </p:tgtEl>
-                                        <p:attrNameLst>
-                                          <p:attrName>ppt_x</p:attrName>
-                                        </p:attrNameLst>
                                       </p:cBhvr>
-                                      <p:tavLst>
-                                        <p:tav tm="0">
-                                          <p:val>
-                                            <p:strVal val="#ppt_x"/>
-                                          </p:val>
-                                        </p:tav>
-                                        <p:tav tm="100000">
-                                          <p:val>
-                                            <p:strVal val="#ppt_x"/>
-                                          </p:val>
-                                        </p:tav>
-                                      </p:tavLst>
-                                    </p:anim>
-                                    <p:anim calcmode="lin" valueType="num">
-                                      <p:cBhvr additive="base">
-                                        <p:cTn id="8" dur="500" fill="hold"/>
-                                        <p:tgtEl>
-                                          <p:spTgt spid="5"/>
-                                        </p:tgtEl>
-                                        <p:attrNameLst>
-                                          <p:attrName>ppt_y</p:attrName>
-                                        </p:attrNameLst>
-                                      </p:cBhvr>
-                                      <p:tavLst>
-                                        <p:tav tm="0">
-                                          <p:val>
-                                            <p:strVal val="0-#ppt_h/2"/>
-                                          </p:val>
-                                        </p:tav>
-                                        <p:tav tm="100000">
-                                          <p:val>
-                                            <p:strVal val="#ppt_y"/>
-                                          </p:val>
-                                        </p:tav>
-                                      </p:tavLst>
-                                    </p:anim>
-                                  </p:childTnLst>
-                                </p:cTn>
-                              </p:par>
-                            </p:childTnLst>
-                          </p:cTn>
-                        </p:par>
-                      </p:childTnLst>
-                    </p:cTn>
-                  </p:par>
-                  <p:par>
-                    <p:cTn id="9" fill="hold">
-                      <p:stCondLst>
-                        <p:cond delay="indefinite"/>
-                      </p:stCondLst>
-                      <p:childTnLst>
-                        <p:par>
-                          <p:cTn id="10" fill="hold">
-                            <p:stCondLst>
-                              <p:cond delay="0"/>
-                            </p:stCondLst>
-                            <p:childTnLst>
-                              <p:par>
-                                <p:cTn id="11" presetID="2" presetClass="entr" presetSubtype="8" fill="hold" nodeType="clickEffect">
-                                  <p:stCondLst>
-                                    <p:cond delay="0"/>
-                                  </p:stCondLst>
-                                  <p:childTnLst>
-                                    <p:set>
-                                      <p:cBhvr>
-                                        <p:cTn id="12" dur="1" fill="hold">
-                                          <p:stCondLst>
-                                            <p:cond delay="0"/>
-                                          </p:stCondLst>
-                                        </p:cTn>
-                                        <p:tgtEl>
-                                          <p:spTgt spid="4"/>
-                                        </p:tgtEl>
-                                        <p:attrNameLst>
-                                          <p:attrName>style.visibility</p:attrName>
-                                        </p:attrNameLst>
-                                      </p:cBhvr>
-                                      <p:to>
-                                        <p:strVal val="visible"/>
-                                      </p:to>
-                                    </p:set>
-                                    <p:anim calcmode="lin" valueType="num">
-                                      <p:cBhvr additive="base">
-                                        <p:cTn id="13" dur="500" fill="hold"/>
-                                        <p:tgtEl>
-                                          <p:spTgt spid="4"/>
-                                        </p:tgtEl>
-                                        <p:attrNameLst>
-                                          <p:attrName>ppt_x</p:attrName>
-                                        </p:attrNameLst>
-                                      </p:cBhvr>
-                                      <p:tavLst>
-                                        <p:tav tm="0">
-                                          <p:val>
-                                            <p:strVal val="0-#ppt_w/2"/>
-                                          </p:val>
-                                        </p:tav>
-                                        <p:tav tm="100000">
-                                          <p:val>
-                                            <p:strVal val="#ppt_x"/>
-                                          </p:val>
-                                        </p:tav>
-                                      </p:tavLst>
-                                    </p:anim>
-                                    <p:anim calcmode="lin" valueType="num">
-                                      <p:cBhvr additive="base">
-                                        <p:cTn id="14" dur="500" fill="hold"/>
-                                        <p:tgtEl>
-                                          <p:spTgt spid="4"/>
-                                        </p:tgtEl>
-                                        <p:attrNameLst>
-                                          <p:attrName>ppt_y</p:attrName>
-                                        </p:attrNameLst>
-                                      </p:cBhvr>
-                                      <p:tavLst>
-                                        <p:tav tm="0">
-                                          <p:val>
-                                            <p:strVal val="#ppt_y"/>
-                                          </p:val>
-                                        </p:tav>
-                                        <p:tav tm="100000">
-                                          <p:val>
-                                            <p:strVal val="#ppt_y"/>
-                                          </p:val>
-                                        </p:tav>
-                                      </p:tavLst>
-                                    </p:anim>
-                                  </p:childTnLst>
-                                </p:cTn>
-                              </p:par>
-                            </p:childTnLst>
-                          </p:cTn>
-                        </p:par>
-                      </p:childTnLst>
-                    </p:cTn>
-                  </p:par>
-                  <p:par>
-                    <p:cTn id="15" fill="hold">
-                      <p:stCondLst>
-                        <p:cond delay="indefinite"/>
-                      </p:stCondLst>
-                      <p:childTnLst>
-                        <p:par>
-                          <p:cTn id="16" fill="hold">
-                            <p:stCondLst>
-                              <p:cond delay="0"/>
-                            </p:stCondLst>
-                            <p:childTnLst>
-                              <p:par>
-                                <p:cTn id="17" presetID="2" presetClass="entr" presetSubtype="8" fill="hold" grpId="0" nodeType="clickEffect">
-                                  <p:stCondLst>
-                                    <p:cond delay="0"/>
-                                  </p:stCondLst>
-                                  <p:childTnLst>
-                                    <p:set>
-                                      <p:cBhvr>
-                                        <p:cTn id="18" dur="1" fill="hold">
-                                          <p:stCondLst>
-                                            <p:cond delay="0"/>
-                                          </p:stCondLst>
-                                        </p:cTn>
-                                        <p:tgtEl>
-                                          <p:spTgt spid="13"/>
-                                        </p:tgtEl>
-                                        <p:attrNameLst>
-                                          <p:attrName>style.visibility</p:attrName>
-                                        </p:attrNameLst>
-                                      </p:cBhvr>
-                                      <p:to>
-                                        <p:strVal val="visible"/>
-                                      </p:to>
-                                    </p:set>
-                                    <p:anim calcmode="lin" valueType="num">
-                                      <p:cBhvr additive="base">
-                                        <p:cTn id="19" dur="500" fill="hold"/>
-                                        <p:tgtEl>
-                                          <p:spTgt spid="13"/>
-                                        </p:tgtEl>
-                                        <p:attrNameLst>
-                                          <p:attrName>ppt_x</p:attrName>
-                                        </p:attrNameLst>
-                                      </p:cBhvr>
-                                      <p:tavLst>
-                                        <p:tav tm="0">
-                                          <p:val>
-                                            <p:strVal val="0-#ppt_w/2"/>
-                                          </p:val>
-                                        </p:tav>
-                                        <p:tav tm="100000">
-                                          <p:val>
-                                            <p:strVal val="#ppt_x"/>
-                                          </p:val>
-                                        </p:tav>
-                                      </p:tavLst>
-                                    </p:anim>
-                                    <p:anim calcmode="lin" valueType="num">
-                                      <p:cBhvr additive="base">
-                                        <p:cTn id="20" dur="500" fill="hold"/>
-                                        <p:tgtEl>
-                                          <p:spTgt spid="13"/>
-                                        </p:tgtEl>
-                                        <p:attrNameLst>
-                                          <p:attrName>ppt_y</p:attrName>
-                                        </p:attrNameLst>
-                                      </p:cBhvr>
-                                      <p:tavLst>
-                                        <p:tav tm="0">
-                                          <p:val>
-                                            <p:strVal val="#ppt_y"/>
-                                          </p:val>
-                                        </p:tav>
-                                        <p:tav tm="100000">
-                                          <p:val>
-                                            <p:strVal val="#ppt_y"/>
-                                          </p:val>
-                                        </p:tav>
-                                      </p:tavLst>
-                                    </p:anim>
-                                  </p:childTnLst>
-                                </p:cTn>
-                              </p:par>
-                            </p:childTnLst>
-                          </p:cTn>
-                        </p:par>
-                      </p:childTnLst>
-                    </p:cTn>
-                  </p:par>
-                  <p:par>
-                    <p:cTn id="21" fill="hold">
-                      <p:stCondLst>
-                        <p:cond delay="indefinite"/>
-                      </p:stCondLst>
-                      <p:childTnLst>
-                        <p:par>
-                          <p:cTn id="22" fill="hold">
-                            <p:stCondLst>
-                              <p:cond delay="0"/>
-                            </p:stCondLst>
-                            <p:childTnLst>
-                              <p:par>
-                                <p:cTn id="23" presetID="2" presetClass="entr" presetSubtype="8" fill="hold" nodeType="clickEffect">
-                                  <p:stCondLst>
-                                    <p:cond delay="0"/>
-                                  </p:stCondLst>
-                                  <p:childTnLst>
-                                    <p:set>
-                                      <p:cBhvr>
-                                        <p:cTn id="24" dur="1" fill="hold">
-                                          <p:stCondLst>
-                                            <p:cond delay="0"/>
-                                          </p:stCondLst>
-                                        </p:cTn>
-                                        <p:tgtEl>
-                                          <p:spTgt spid="11"/>
-                                        </p:tgtEl>
-                                        <p:attrNameLst>
-                                          <p:attrName>style.visibility</p:attrName>
-                                        </p:attrNameLst>
-                                      </p:cBhvr>
-                                      <p:to>
-                                        <p:strVal val="visible"/>
-                                      </p:to>
-                                    </p:set>
-                                    <p:anim calcmode="lin" valueType="num">
-                                      <p:cBhvr additive="base">
-                                        <p:cTn id="25" dur="500" fill="hold"/>
-                                        <p:tgtEl>
-                                          <p:spTgt spid="11"/>
-                                        </p:tgtEl>
-                                        <p:attrNameLst>
-                                          <p:attrName>ppt_x</p:attrName>
-                                        </p:attrNameLst>
-                                      </p:cBhvr>
-                                      <p:tavLst>
-                                        <p:tav tm="0">
-                                          <p:val>
-                                            <p:strVal val="0-#ppt_w/2"/>
-                                          </p:val>
-                                        </p:tav>
-                                        <p:tav tm="100000">
-                                          <p:val>
-                                            <p:strVal val="#ppt_x"/>
-                                          </p:val>
-                                        </p:tav>
-                                      </p:tavLst>
-                                    </p:anim>
-                                    <p:anim calcmode="lin" valueType="num">
-                                      <p:cBhvr additive="base">
-                                        <p:cTn id="26" dur="500" fill="hold"/>
-                                        <p:tgtEl>
-                                          <p:spTgt spid="11"/>
-                                        </p:tgtEl>
-                                        <p:attrNameLst>
-                                          <p:attrName>ppt_y</p:attrName>
-                                        </p:attrNameLst>
-                                      </p:cBhvr>
-                                      <p:tavLst>
-                                        <p:tav tm="0">
-                                          <p:val>
-                                            <p:strVal val="#ppt_y"/>
-                                          </p:val>
-                                        </p:tav>
-                                        <p:tav tm="100000">
-                                          <p:val>
-                                            <p:strVal val="#ppt_y"/>
-                                          </p:val>
-                                        </p:tav>
-                                      </p:tavLst>
-                                    </p:anim>
+                                    </p:animEffect>
                                   </p:childTnLst>
                                 </p:cTn>
                               </p:par>
@@ -17243,10 +16247,6 @@
         </p:cTn>
       </p:par>
     </p:tnLst>
-    <p:bldLst>
-      <p:bldP spid="13" grpId="0" animBg="1"/>
-      <p:bldP spid="5" grpId="0"/>
-    </p:bldLst>
   </p:timing>
 </p:sld>
 </file>

</xml_diff>

<commit_message>
test prophet with holidays for 1 year & update power point
</commit_message>
<xml_diff>
--- a/Airbnb Price Predictions (Model).pptx
+++ b/Airbnb Price Predictions (Model).pptx
@@ -868,7 +868,7 @@
           <a:p>
             <a:r>
               <a:rPr lang="en-US" dirty="0"/>
-              <a:t>Various methods like concatenation, filtering, merging, renaming columns and calculating the mean were used in Pandas to get our Final output</a:t>
+              <a:t>Various methods like concatenation, filtering, merging, renaming columns and calculating the mean prices were used in Pandas to get our Final output</a:t>
             </a:r>
           </a:p>
           <a:p>
@@ -1648,7 +1648,7 @@
             </a:pPr>
             <a:r>
               <a:rPr lang="en-US" sz="1200" dirty="0"/>
-              <a:t>Graph shows the overall actual trends &amp; predictions.  The black dots are the actual average daily prices from our datasets. The dark blue lines are the predicted prices and the light blue area are the upper &amp; lower limits of the predicted prices.</a:t>
+              <a:t>Graph shows the overall actual trends &amp; predictions.  The black dots are the actual average daily prices from our datasets. The dark blue lines are the predicted prices, and the light blue area are the upper &amp; lower limits of the predicted prices.</a:t>
             </a:r>
           </a:p>
           <a:p>
@@ -1916,20 +1916,35 @@
           <a:p>
             <a:r>
               <a:rPr lang="en-US" dirty="0"/>
-              <a:t>The prophet here breaks down the rates by various components with the overall pricing trends, how prices are affected by the holidays, day of week and in different times of the moths.</a:t>
-            </a:r>
+              <a:t>The prophet model here breaks down the rates in different time components by holidays, months and day of week.  </a:t>
+            </a:r>
+          </a:p>
+          <a:p>
+            <a:endParaRPr lang="en-US" dirty="0"/>
           </a:p>
           <a:p>
             <a:r>
               <a:rPr lang="en-US" dirty="0"/>
-              <a:t>If you look at the first graph, there is an upward trend in prices up to the first part of 2020.  After that there is a slight dip potentially due to Covid-19 as travel demand has decreased significantly due to social distancing.  So after 1 year of the pandemic crisis, the prices slowly goes back up.  </a:t>
+              <a:t>On the first chart, it shows that the Christmas breaks and long weekends have the highest impact on rates as people likely take vacations during longer breaks from work and school.</a:t>
             </a:r>
           </a:p>
           <a:p>
             <a:endParaRPr lang="en-US" dirty="0"/>
           </a:p>
           <a:p>
+            <a:r>
+              <a:rPr lang="en-US" dirty="0"/>
+              <a:t>With that being said, the weekly chart indicates the highest rates are on Friday &amp; Saturday which falls into the weekend.</a:t>
+            </a:r>
+          </a:p>
+          <a:p>
             <a:endParaRPr lang="en-US" dirty="0"/>
+          </a:p>
+          <a:p>
+            <a:r>
+              <a:rPr lang="en-US" dirty="0"/>
+              <a:t>Finally, it shows that the different months of the year have a big impact on the rates.  The summer months are predominantly higher likely because the weather is nicer and most families travel when their kids do not have schools for the summer.</a:t>
+            </a:r>
           </a:p>
         </p:txBody>
       </p:sp>
@@ -10313,13 +10328,13 @@
           <p:nvPr>
             <p:extLst>
               <p:ext uri="{D42A27DB-BD31-4B8C-83A1-F6EECF244321}">
-                <p14:modId xmlns:p14="http://schemas.microsoft.com/office/powerpoint/2010/main" val="3898527597"/>
+                <p14:modId xmlns:p14="http://schemas.microsoft.com/office/powerpoint/2010/main" val="4265020489"/>
               </p:ext>
             </p:extLst>
           </p:nvPr>
         </p:nvGraphicFramePr>
         <p:xfrm>
-          <a:off x="1080530" y="2330047"/>
+          <a:off x="1571850" y="2569366"/>
           <a:ext cx="8755450" cy="2275002"/>
         </p:xfrm>
         <a:graphic>
@@ -10712,7 +10727,7 @@
         </p:nvSpPr>
         <p:spPr>
           <a:xfrm>
-            <a:off x="1080530" y="4591253"/>
+            <a:off x="1571850" y="4830572"/>
             <a:ext cx="6508515" cy="523220"/>
           </a:xfrm>
           <a:prstGeom prst="rect">
@@ -10774,6 +10789,613 @@
   <p:clrMapOvr>
     <a:masterClrMapping/>
   </p:clrMapOvr>
+  <p:timing>
+    <p:tnLst>
+      <p:par>
+        <p:cTn id="1" dur="indefinite" restart="never" nodeType="tmRoot">
+          <p:childTnLst>
+            <p:seq concurrent="1" nextAc="seek">
+              <p:cTn id="2" dur="indefinite" nodeType="mainSeq">
+                <p:childTnLst>
+                  <p:par>
+                    <p:cTn id="3" fill="hold">
+                      <p:stCondLst>
+                        <p:cond delay="indefinite"/>
+                      </p:stCondLst>
+                      <p:childTnLst>
+                        <p:par>
+                          <p:cTn id="4" fill="hold">
+                            <p:stCondLst>
+                              <p:cond delay="0"/>
+                            </p:stCondLst>
+                            <p:childTnLst>
+                              <p:par>
+                                <p:cTn id="5" presetID="26" presetClass="entr" presetSubtype="0" fill="hold" grpId="0" nodeType="clickEffect">
+                                  <p:stCondLst>
+                                    <p:cond delay="0"/>
+                                  </p:stCondLst>
+                                  <p:childTnLst>
+                                    <p:set>
+                                      <p:cBhvr>
+                                        <p:cTn id="6" dur="1" fill="hold">
+                                          <p:stCondLst>
+                                            <p:cond delay="0"/>
+                                          </p:stCondLst>
+                                        </p:cTn>
+                                        <p:tgtEl>
+                                          <p:spTgt spid="9"/>
+                                        </p:tgtEl>
+                                        <p:attrNameLst>
+                                          <p:attrName>style.visibility</p:attrName>
+                                        </p:attrNameLst>
+                                      </p:cBhvr>
+                                      <p:to>
+                                        <p:strVal val="visible"/>
+                                      </p:to>
+                                    </p:set>
+                                    <p:animEffect transition="in" filter="wipe(down)">
+                                      <p:cBhvr>
+                                        <p:cTn id="7" dur="580">
+                                          <p:stCondLst>
+                                            <p:cond delay="0"/>
+                                          </p:stCondLst>
+                                        </p:cTn>
+                                        <p:tgtEl>
+                                          <p:spTgt spid="9"/>
+                                        </p:tgtEl>
+                                      </p:cBhvr>
+                                    </p:animEffect>
+                                    <p:anim calcmode="lin" valueType="num">
+                                      <p:cBhvr>
+                                        <p:cTn id="8" dur="1822" tmFilter="0,0; 0.14,0.36; 0.43,0.73; 0.71,0.91; 1.0,1.0">
+                                          <p:stCondLst>
+                                            <p:cond delay="0"/>
+                                          </p:stCondLst>
+                                        </p:cTn>
+                                        <p:tgtEl>
+                                          <p:spTgt spid="9"/>
+                                        </p:tgtEl>
+                                        <p:attrNameLst>
+                                          <p:attrName>ppt_x</p:attrName>
+                                        </p:attrNameLst>
+                                      </p:cBhvr>
+                                      <p:tavLst>
+                                        <p:tav tm="0">
+                                          <p:val>
+                                            <p:strVal val="#ppt_x-0.25"/>
+                                          </p:val>
+                                        </p:tav>
+                                        <p:tav tm="100000">
+                                          <p:val>
+                                            <p:strVal val="#ppt_x"/>
+                                          </p:val>
+                                        </p:tav>
+                                      </p:tavLst>
+                                    </p:anim>
+                                    <p:anim calcmode="lin" valueType="num">
+                                      <p:cBhvr>
+                                        <p:cTn id="9" dur="664" tmFilter="0.0,0.0; 0.25,0.07; 0.50,0.2; 0.75,0.467; 1.0,1.0">
+                                          <p:stCondLst>
+                                            <p:cond delay="0"/>
+                                          </p:stCondLst>
+                                        </p:cTn>
+                                        <p:tgtEl>
+                                          <p:spTgt spid="9"/>
+                                        </p:tgtEl>
+                                        <p:attrNameLst>
+                                          <p:attrName>ppt_y</p:attrName>
+                                        </p:attrNameLst>
+                                      </p:cBhvr>
+                                      <p:tavLst>
+                                        <p:tav tm="0" fmla="#ppt_y-sin(pi*$)/3">
+                                          <p:val>
+                                            <p:fltVal val="0.5"/>
+                                          </p:val>
+                                        </p:tav>
+                                        <p:tav tm="100000">
+                                          <p:val>
+                                            <p:fltVal val="1"/>
+                                          </p:val>
+                                        </p:tav>
+                                      </p:tavLst>
+                                    </p:anim>
+                                    <p:anim calcmode="lin" valueType="num">
+                                      <p:cBhvr>
+                                        <p:cTn id="10" dur="664" tmFilter="0, 0; 0.125,0.2665; 0.25,0.4; 0.375,0.465; 0.5,0.5;  0.625,0.535; 0.75,0.6; 0.875,0.7335; 1,1">
+                                          <p:stCondLst>
+                                            <p:cond delay="664"/>
+                                          </p:stCondLst>
+                                        </p:cTn>
+                                        <p:tgtEl>
+                                          <p:spTgt spid="9"/>
+                                        </p:tgtEl>
+                                        <p:attrNameLst>
+                                          <p:attrName>ppt_y</p:attrName>
+                                        </p:attrNameLst>
+                                      </p:cBhvr>
+                                      <p:tavLst>
+                                        <p:tav tm="0" fmla="#ppt_y-sin(pi*$)/9">
+                                          <p:val>
+                                            <p:fltVal val="0"/>
+                                          </p:val>
+                                        </p:tav>
+                                        <p:tav tm="100000">
+                                          <p:val>
+                                            <p:fltVal val="1"/>
+                                          </p:val>
+                                        </p:tav>
+                                      </p:tavLst>
+                                    </p:anim>
+                                    <p:anim calcmode="lin" valueType="num">
+                                      <p:cBhvr>
+                                        <p:cTn id="11" dur="332" tmFilter="0, 0; 0.125,0.2665; 0.25,0.4; 0.375,0.465; 0.5,0.5;  0.625,0.535; 0.75,0.6; 0.875,0.7335; 1,1">
+                                          <p:stCondLst>
+                                            <p:cond delay="1324"/>
+                                          </p:stCondLst>
+                                        </p:cTn>
+                                        <p:tgtEl>
+                                          <p:spTgt spid="9"/>
+                                        </p:tgtEl>
+                                        <p:attrNameLst>
+                                          <p:attrName>ppt_y</p:attrName>
+                                        </p:attrNameLst>
+                                      </p:cBhvr>
+                                      <p:tavLst>
+                                        <p:tav tm="0" fmla="#ppt_y-sin(pi*$)/27">
+                                          <p:val>
+                                            <p:fltVal val="0"/>
+                                          </p:val>
+                                        </p:tav>
+                                        <p:tav tm="100000">
+                                          <p:val>
+                                            <p:fltVal val="1"/>
+                                          </p:val>
+                                        </p:tav>
+                                      </p:tavLst>
+                                    </p:anim>
+                                    <p:anim calcmode="lin" valueType="num">
+                                      <p:cBhvr>
+                                        <p:cTn id="12" dur="164" tmFilter="0, 0; 0.125,0.2665; 0.25,0.4; 0.375,0.465; 0.5,0.5;  0.625,0.535; 0.75,0.6; 0.875,0.7335; 1,1">
+                                          <p:stCondLst>
+                                            <p:cond delay="1656"/>
+                                          </p:stCondLst>
+                                        </p:cTn>
+                                        <p:tgtEl>
+                                          <p:spTgt spid="9"/>
+                                        </p:tgtEl>
+                                        <p:attrNameLst>
+                                          <p:attrName>ppt_y</p:attrName>
+                                        </p:attrNameLst>
+                                      </p:cBhvr>
+                                      <p:tavLst>
+                                        <p:tav tm="0" fmla="#ppt_y-sin(pi*$)/81">
+                                          <p:val>
+                                            <p:fltVal val="0"/>
+                                          </p:val>
+                                        </p:tav>
+                                        <p:tav tm="100000">
+                                          <p:val>
+                                            <p:fltVal val="1"/>
+                                          </p:val>
+                                        </p:tav>
+                                      </p:tavLst>
+                                    </p:anim>
+                                    <p:animScale>
+                                      <p:cBhvr>
+                                        <p:cTn id="13" dur="26">
+                                          <p:stCondLst>
+                                            <p:cond delay="650"/>
+                                          </p:stCondLst>
+                                        </p:cTn>
+                                        <p:tgtEl>
+                                          <p:spTgt spid="9"/>
+                                        </p:tgtEl>
+                                      </p:cBhvr>
+                                      <p:to x="100000" y="60000"/>
+                                    </p:animScale>
+                                    <p:animScale>
+                                      <p:cBhvr>
+                                        <p:cTn id="14" dur="166" decel="50000">
+                                          <p:stCondLst>
+                                            <p:cond delay="676"/>
+                                          </p:stCondLst>
+                                        </p:cTn>
+                                        <p:tgtEl>
+                                          <p:spTgt spid="9"/>
+                                        </p:tgtEl>
+                                      </p:cBhvr>
+                                      <p:to x="100000" y="100000"/>
+                                    </p:animScale>
+                                    <p:animScale>
+                                      <p:cBhvr>
+                                        <p:cTn id="15" dur="26">
+                                          <p:stCondLst>
+                                            <p:cond delay="1312"/>
+                                          </p:stCondLst>
+                                        </p:cTn>
+                                        <p:tgtEl>
+                                          <p:spTgt spid="9"/>
+                                        </p:tgtEl>
+                                      </p:cBhvr>
+                                      <p:to x="100000" y="80000"/>
+                                    </p:animScale>
+                                    <p:animScale>
+                                      <p:cBhvr>
+                                        <p:cTn id="16" dur="166" decel="50000">
+                                          <p:stCondLst>
+                                            <p:cond delay="1338"/>
+                                          </p:stCondLst>
+                                        </p:cTn>
+                                        <p:tgtEl>
+                                          <p:spTgt spid="9"/>
+                                        </p:tgtEl>
+                                      </p:cBhvr>
+                                      <p:to x="100000" y="100000"/>
+                                    </p:animScale>
+                                    <p:animScale>
+                                      <p:cBhvr>
+                                        <p:cTn id="17" dur="26">
+                                          <p:stCondLst>
+                                            <p:cond delay="1642"/>
+                                          </p:stCondLst>
+                                        </p:cTn>
+                                        <p:tgtEl>
+                                          <p:spTgt spid="9"/>
+                                        </p:tgtEl>
+                                      </p:cBhvr>
+                                      <p:to x="100000" y="90000"/>
+                                    </p:animScale>
+                                    <p:animScale>
+                                      <p:cBhvr>
+                                        <p:cTn id="18" dur="166" decel="50000">
+                                          <p:stCondLst>
+                                            <p:cond delay="1668"/>
+                                          </p:stCondLst>
+                                        </p:cTn>
+                                        <p:tgtEl>
+                                          <p:spTgt spid="9"/>
+                                        </p:tgtEl>
+                                      </p:cBhvr>
+                                      <p:to x="100000" y="100000"/>
+                                    </p:animScale>
+                                    <p:animScale>
+                                      <p:cBhvr>
+                                        <p:cTn id="19" dur="26">
+                                          <p:stCondLst>
+                                            <p:cond delay="1808"/>
+                                          </p:stCondLst>
+                                        </p:cTn>
+                                        <p:tgtEl>
+                                          <p:spTgt spid="9"/>
+                                        </p:tgtEl>
+                                      </p:cBhvr>
+                                      <p:to x="100000" y="95000"/>
+                                    </p:animScale>
+                                    <p:animScale>
+                                      <p:cBhvr>
+                                        <p:cTn id="20" dur="166" decel="50000">
+                                          <p:stCondLst>
+                                            <p:cond delay="1834"/>
+                                          </p:stCondLst>
+                                        </p:cTn>
+                                        <p:tgtEl>
+                                          <p:spTgt spid="9"/>
+                                        </p:tgtEl>
+                                      </p:cBhvr>
+                                      <p:to x="100000" y="100000"/>
+                                    </p:animScale>
+                                  </p:childTnLst>
+                                </p:cTn>
+                              </p:par>
+                              <p:par>
+                                <p:cTn id="21" presetID="26" presetClass="entr" presetSubtype="0" fill="hold" nodeType="withEffect">
+                                  <p:stCondLst>
+                                    <p:cond delay="0"/>
+                                  </p:stCondLst>
+                                  <p:childTnLst>
+                                    <p:set>
+                                      <p:cBhvr>
+                                        <p:cTn id="22" dur="1" fill="hold">
+                                          <p:stCondLst>
+                                            <p:cond delay="0"/>
+                                          </p:stCondLst>
+                                        </p:cTn>
+                                        <p:tgtEl>
+                                          <p:spTgt spid="5"/>
+                                        </p:tgtEl>
+                                        <p:attrNameLst>
+                                          <p:attrName>style.visibility</p:attrName>
+                                        </p:attrNameLst>
+                                      </p:cBhvr>
+                                      <p:to>
+                                        <p:strVal val="visible"/>
+                                      </p:to>
+                                    </p:set>
+                                    <p:animEffect transition="in" filter="wipe(down)">
+                                      <p:cBhvr>
+                                        <p:cTn id="23" dur="580">
+                                          <p:stCondLst>
+                                            <p:cond delay="0"/>
+                                          </p:stCondLst>
+                                        </p:cTn>
+                                        <p:tgtEl>
+                                          <p:spTgt spid="5"/>
+                                        </p:tgtEl>
+                                      </p:cBhvr>
+                                    </p:animEffect>
+                                    <p:anim calcmode="lin" valueType="num">
+                                      <p:cBhvr>
+                                        <p:cTn id="24" dur="1822" tmFilter="0,0; 0.14,0.36; 0.43,0.73; 0.71,0.91; 1.0,1.0">
+                                          <p:stCondLst>
+                                            <p:cond delay="0"/>
+                                          </p:stCondLst>
+                                        </p:cTn>
+                                        <p:tgtEl>
+                                          <p:spTgt spid="5"/>
+                                        </p:tgtEl>
+                                        <p:attrNameLst>
+                                          <p:attrName>ppt_x</p:attrName>
+                                        </p:attrNameLst>
+                                      </p:cBhvr>
+                                      <p:tavLst>
+                                        <p:tav tm="0">
+                                          <p:val>
+                                            <p:strVal val="#ppt_x-0.25"/>
+                                          </p:val>
+                                        </p:tav>
+                                        <p:tav tm="100000">
+                                          <p:val>
+                                            <p:strVal val="#ppt_x"/>
+                                          </p:val>
+                                        </p:tav>
+                                      </p:tavLst>
+                                    </p:anim>
+                                    <p:anim calcmode="lin" valueType="num">
+                                      <p:cBhvr>
+                                        <p:cTn id="25" dur="664" tmFilter="0.0,0.0; 0.25,0.07; 0.50,0.2; 0.75,0.467; 1.0,1.0">
+                                          <p:stCondLst>
+                                            <p:cond delay="0"/>
+                                          </p:stCondLst>
+                                        </p:cTn>
+                                        <p:tgtEl>
+                                          <p:spTgt spid="5"/>
+                                        </p:tgtEl>
+                                        <p:attrNameLst>
+                                          <p:attrName>ppt_y</p:attrName>
+                                        </p:attrNameLst>
+                                      </p:cBhvr>
+                                      <p:tavLst>
+                                        <p:tav tm="0" fmla="#ppt_y-sin(pi*$)/3">
+                                          <p:val>
+                                            <p:fltVal val="0.5"/>
+                                          </p:val>
+                                        </p:tav>
+                                        <p:tav tm="100000">
+                                          <p:val>
+                                            <p:fltVal val="1"/>
+                                          </p:val>
+                                        </p:tav>
+                                      </p:tavLst>
+                                    </p:anim>
+                                    <p:anim calcmode="lin" valueType="num">
+                                      <p:cBhvr>
+                                        <p:cTn id="26" dur="664" tmFilter="0, 0; 0.125,0.2665; 0.25,0.4; 0.375,0.465; 0.5,0.5;  0.625,0.535; 0.75,0.6; 0.875,0.7335; 1,1">
+                                          <p:stCondLst>
+                                            <p:cond delay="664"/>
+                                          </p:stCondLst>
+                                        </p:cTn>
+                                        <p:tgtEl>
+                                          <p:spTgt spid="5"/>
+                                        </p:tgtEl>
+                                        <p:attrNameLst>
+                                          <p:attrName>ppt_y</p:attrName>
+                                        </p:attrNameLst>
+                                      </p:cBhvr>
+                                      <p:tavLst>
+                                        <p:tav tm="0" fmla="#ppt_y-sin(pi*$)/9">
+                                          <p:val>
+                                            <p:fltVal val="0"/>
+                                          </p:val>
+                                        </p:tav>
+                                        <p:tav tm="100000">
+                                          <p:val>
+                                            <p:fltVal val="1"/>
+                                          </p:val>
+                                        </p:tav>
+                                      </p:tavLst>
+                                    </p:anim>
+                                    <p:anim calcmode="lin" valueType="num">
+                                      <p:cBhvr>
+                                        <p:cTn id="27" dur="332" tmFilter="0, 0; 0.125,0.2665; 0.25,0.4; 0.375,0.465; 0.5,0.5;  0.625,0.535; 0.75,0.6; 0.875,0.7335; 1,1">
+                                          <p:stCondLst>
+                                            <p:cond delay="1324"/>
+                                          </p:stCondLst>
+                                        </p:cTn>
+                                        <p:tgtEl>
+                                          <p:spTgt spid="5"/>
+                                        </p:tgtEl>
+                                        <p:attrNameLst>
+                                          <p:attrName>ppt_y</p:attrName>
+                                        </p:attrNameLst>
+                                      </p:cBhvr>
+                                      <p:tavLst>
+                                        <p:tav tm="0" fmla="#ppt_y-sin(pi*$)/27">
+                                          <p:val>
+                                            <p:fltVal val="0"/>
+                                          </p:val>
+                                        </p:tav>
+                                        <p:tav tm="100000">
+                                          <p:val>
+                                            <p:fltVal val="1"/>
+                                          </p:val>
+                                        </p:tav>
+                                      </p:tavLst>
+                                    </p:anim>
+                                    <p:anim calcmode="lin" valueType="num">
+                                      <p:cBhvr>
+                                        <p:cTn id="28" dur="164" tmFilter="0, 0; 0.125,0.2665; 0.25,0.4; 0.375,0.465; 0.5,0.5;  0.625,0.535; 0.75,0.6; 0.875,0.7335; 1,1">
+                                          <p:stCondLst>
+                                            <p:cond delay="1656"/>
+                                          </p:stCondLst>
+                                        </p:cTn>
+                                        <p:tgtEl>
+                                          <p:spTgt spid="5"/>
+                                        </p:tgtEl>
+                                        <p:attrNameLst>
+                                          <p:attrName>ppt_y</p:attrName>
+                                        </p:attrNameLst>
+                                      </p:cBhvr>
+                                      <p:tavLst>
+                                        <p:tav tm="0" fmla="#ppt_y-sin(pi*$)/81">
+                                          <p:val>
+                                            <p:fltVal val="0"/>
+                                          </p:val>
+                                        </p:tav>
+                                        <p:tav tm="100000">
+                                          <p:val>
+                                            <p:fltVal val="1"/>
+                                          </p:val>
+                                        </p:tav>
+                                      </p:tavLst>
+                                    </p:anim>
+                                    <p:animScale>
+                                      <p:cBhvr>
+                                        <p:cTn id="29" dur="26">
+                                          <p:stCondLst>
+                                            <p:cond delay="650"/>
+                                          </p:stCondLst>
+                                        </p:cTn>
+                                        <p:tgtEl>
+                                          <p:spTgt spid="5"/>
+                                        </p:tgtEl>
+                                      </p:cBhvr>
+                                      <p:to x="100000" y="60000"/>
+                                    </p:animScale>
+                                    <p:animScale>
+                                      <p:cBhvr>
+                                        <p:cTn id="30" dur="166" decel="50000">
+                                          <p:stCondLst>
+                                            <p:cond delay="676"/>
+                                          </p:stCondLst>
+                                        </p:cTn>
+                                        <p:tgtEl>
+                                          <p:spTgt spid="5"/>
+                                        </p:tgtEl>
+                                      </p:cBhvr>
+                                      <p:to x="100000" y="100000"/>
+                                    </p:animScale>
+                                    <p:animScale>
+                                      <p:cBhvr>
+                                        <p:cTn id="31" dur="26">
+                                          <p:stCondLst>
+                                            <p:cond delay="1312"/>
+                                          </p:stCondLst>
+                                        </p:cTn>
+                                        <p:tgtEl>
+                                          <p:spTgt spid="5"/>
+                                        </p:tgtEl>
+                                      </p:cBhvr>
+                                      <p:to x="100000" y="80000"/>
+                                    </p:animScale>
+                                    <p:animScale>
+                                      <p:cBhvr>
+                                        <p:cTn id="32" dur="166" decel="50000">
+                                          <p:stCondLst>
+                                            <p:cond delay="1338"/>
+                                          </p:stCondLst>
+                                        </p:cTn>
+                                        <p:tgtEl>
+                                          <p:spTgt spid="5"/>
+                                        </p:tgtEl>
+                                      </p:cBhvr>
+                                      <p:to x="100000" y="100000"/>
+                                    </p:animScale>
+                                    <p:animScale>
+                                      <p:cBhvr>
+                                        <p:cTn id="33" dur="26">
+                                          <p:stCondLst>
+                                            <p:cond delay="1642"/>
+                                          </p:stCondLst>
+                                        </p:cTn>
+                                        <p:tgtEl>
+                                          <p:spTgt spid="5"/>
+                                        </p:tgtEl>
+                                      </p:cBhvr>
+                                      <p:to x="100000" y="90000"/>
+                                    </p:animScale>
+                                    <p:animScale>
+                                      <p:cBhvr>
+                                        <p:cTn id="34" dur="166" decel="50000">
+                                          <p:stCondLst>
+                                            <p:cond delay="1668"/>
+                                          </p:stCondLst>
+                                        </p:cTn>
+                                        <p:tgtEl>
+                                          <p:spTgt spid="5"/>
+                                        </p:tgtEl>
+                                      </p:cBhvr>
+                                      <p:to x="100000" y="100000"/>
+                                    </p:animScale>
+                                    <p:animScale>
+                                      <p:cBhvr>
+                                        <p:cTn id="35" dur="26">
+                                          <p:stCondLst>
+                                            <p:cond delay="1808"/>
+                                          </p:stCondLst>
+                                        </p:cTn>
+                                        <p:tgtEl>
+                                          <p:spTgt spid="5"/>
+                                        </p:tgtEl>
+                                      </p:cBhvr>
+                                      <p:to x="100000" y="95000"/>
+                                    </p:animScale>
+                                    <p:animScale>
+                                      <p:cBhvr>
+                                        <p:cTn id="36" dur="166" decel="50000">
+                                          <p:stCondLst>
+                                            <p:cond delay="1834"/>
+                                          </p:stCondLst>
+                                        </p:cTn>
+                                        <p:tgtEl>
+                                          <p:spTgt spid="5"/>
+                                        </p:tgtEl>
+                                      </p:cBhvr>
+                                      <p:to x="100000" y="100000"/>
+                                    </p:animScale>
+                                  </p:childTnLst>
+                                </p:cTn>
+                              </p:par>
+                            </p:childTnLst>
+                          </p:cTn>
+                        </p:par>
+                      </p:childTnLst>
+                    </p:cTn>
+                  </p:par>
+                </p:childTnLst>
+              </p:cTn>
+              <p:prevCondLst>
+                <p:cond evt="onPrev" delay="0">
+                  <p:tgtEl>
+                    <p:sldTgt/>
+                  </p:tgtEl>
+                </p:cond>
+              </p:prevCondLst>
+              <p:nextCondLst>
+                <p:cond evt="onNext" delay="0">
+                  <p:tgtEl>
+                    <p:sldTgt/>
+                  </p:tgtEl>
+                </p:cond>
+              </p:nextCondLst>
+            </p:seq>
+          </p:childTnLst>
+        </p:cTn>
+      </p:par>
+    </p:tnLst>
+    <p:bldLst>
+      <p:bldP spid="9" grpId="0"/>
+    </p:bldLst>
+  </p:timing>
 </p:sld>
 </file>
 
@@ -10945,7 +11567,7 @@
         </p:blipFill>
         <p:spPr>
           <a:xfrm>
-            <a:off x="1231535" y="2022038"/>
+            <a:off x="1407603" y="2133829"/>
             <a:ext cx="6196589" cy="4125435"/>
           </a:xfrm>
           <a:prstGeom prst="rect">
@@ -10967,7 +11589,7 @@
         </p:nvSpPr>
         <p:spPr>
           <a:xfrm>
-            <a:off x="6247464" y="2114091"/>
+            <a:off x="6423532" y="2225882"/>
             <a:ext cx="437321" cy="3369503"/>
           </a:xfrm>
           <a:prstGeom prst="rect">
@@ -11019,7 +11641,7 @@
         </p:nvSpPr>
         <p:spPr>
           <a:xfrm>
-            <a:off x="8129095" y="2610235"/>
+            <a:off x="8305163" y="2722026"/>
             <a:ext cx="3356273" cy="2585323"/>
           </a:xfrm>
           <a:prstGeom prst="rect">
@@ -11531,6 +12153,128 @@
   <p:clrMapOvr>
     <a:masterClrMapping/>
   </p:clrMapOvr>
+  <p:timing>
+    <p:tnLst>
+      <p:par>
+        <p:cTn id="1" dur="indefinite" restart="never" nodeType="tmRoot">
+          <p:childTnLst>
+            <p:seq concurrent="1" nextAc="seek">
+              <p:cTn id="2" dur="indefinite" nodeType="mainSeq">
+                <p:childTnLst>
+                  <p:par>
+                    <p:cTn id="3" fill="hold">
+                      <p:stCondLst>
+                        <p:cond delay="indefinite"/>
+                      </p:stCondLst>
+                      <p:childTnLst>
+                        <p:par>
+                          <p:cTn id="4" fill="hold">
+                            <p:stCondLst>
+                              <p:cond delay="0"/>
+                            </p:stCondLst>
+                            <p:childTnLst>
+                              <p:par>
+                                <p:cTn id="5" presetID="7" presetClass="emph" presetSubtype="2" fill="hold" nodeType="clickEffect">
+                                  <p:stCondLst>
+                                    <p:cond delay="0"/>
+                                  </p:stCondLst>
+                                  <p:childTnLst>
+                                    <p:animClr clrSpc="rgb" dir="cw">
+                                      <p:cBhvr>
+                                        <p:cTn id="6" dur="2000" fill="hold"/>
+                                        <p:tgtEl>
+                                          <p:spTgt spid="8"/>
+                                        </p:tgtEl>
+                                        <p:attrNameLst>
+                                          <p:attrName>stroke.color</p:attrName>
+                                        </p:attrNameLst>
+                                      </p:cBhvr>
+                                      <p:to>
+                                        <a:schemeClr val="accent2"/>
+                                      </p:to>
+                                    </p:animClr>
+                                    <p:set>
+                                      <p:cBhvr>
+                                        <p:cTn id="7" dur="2000" fill="hold"/>
+                                        <p:tgtEl>
+                                          <p:spTgt spid="8"/>
+                                        </p:tgtEl>
+                                        <p:attrNameLst>
+                                          <p:attrName>stroke.on</p:attrName>
+                                        </p:attrNameLst>
+                                      </p:cBhvr>
+                                      <p:to>
+                                        <p:strVal val="true"/>
+                                      </p:to>
+                                    </p:set>
+                                  </p:childTnLst>
+                                </p:cTn>
+                              </p:par>
+                              <p:par>
+                                <p:cTn id="8" presetID="7" presetClass="emph" presetSubtype="2" fill="hold" nodeType="withEffect">
+                                  <p:stCondLst>
+                                    <p:cond delay="0"/>
+                                  </p:stCondLst>
+                                  <p:childTnLst>
+                                    <p:animClr clrSpc="rgb" dir="cw">
+                                      <p:cBhvr>
+                                        <p:cTn id="9" dur="2000" fill="hold"/>
+                                        <p:tgtEl>
+                                          <p:spTgt spid="4"/>
+                                        </p:tgtEl>
+                                        <p:attrNameLst>
+                                          <p:attrName>stroke.color</p:attrName>
+                                        </p:attrNameLst>
+                                      </p:cBhvr>
+                                      <p:to>
+                                        <a:schemeClr val="accent2"/>
+                                      </p:to>
+                                    </p:animClr>
+                                    <p:set>
+                                      <p:cBhvr>
+                                        <p:cTn id="10" dur="2000" fill="hold"/>
+                                        <p:tgtEl>
+                                          <p:spTgt spid="4"/>
+                                        </p:tgtEl>
+                                        <p:attrNameLst>
+                                          <p:attrName>stroke.on</p:attrName>
+                                        </p:attrNameLst>
+                                      </p:cBhvr>
+                                      <p:to>
+                                        <p:strVal val="true"/>
+                                      </p:to>
+                                    </p:set>
+                                  </p:childTnLst>
+                                </p:cTn>
+                              </p:par>
+                            </p:childTnLst>
+                          </p:cTn>
+                        </p:par>
+                      </p:childTnLst>
+                    </p:cTn>
+                  </p:par>
+                </p:childTnLst>
+              </p:cTn>
+              <p:prevCondLst>
+                <p:cond evt="onPrev" delay="0">
+                  <p:tgtEl>
+                    <p:sldTgt/>
+                  </p:tgtEl>
+                </p:cond>
+              </p:prevCondLst>
+              <p:nextCondLst>
+                <p:cond evt="onNext" delay="0">
+                  <p:tgtEl>
+                    <p:sldTgt/>
+                  </p:tgtEl>
+                </p:cond>
+              </p:nextCondLst>
+            </p:seq>
+          </p:childTnLst>
+        </p:cTn>
+      </p:par>
+    </p:tnLst>
+  </p:timing>
 </p:sld>
 </file>
 
@@ -11823,7 +12567,7 @@
                   <a:srgbClr val="EA5E46"/>
                 </a:solidFill>
               </a:rPr>
-              <a:t>Model Results – Predict the Future</a:t>
+              <a:t>Model Results – Trends</a:t>
             </a:r>
           </a:p>
         </p:txBody>
@@ -12033,6 +12777,9 @@
             <a:avLst/>
           </a:prstGeom>
           <a:ln>
+            <a:solidFill>
+              <a:srgbClr val="E9766F"/>
+            </a:solidFill>
             <a:tailEnd type="triangle"/>
           </a:ln>
         </p:spPr>
@@ -12074,6 +12821,9 @@
             <a:avLst/>
           </a:prstGeom>
           <a:ln>
+            <a:solidFill>
+              <a:srgbClr val="E9766F"/>
+            </a:solidFill>
             <a:tailEnd type="triangle"/>
           </a:ln>
         </p:spPr>
@@ -12113,6 +12863,9 @@
             <a:avLst/>
           </a:prstGeom>
           <a:ln>
+            <a:solidFill>
+              <a:srgbClr val="E9766F"/>
+            </a:solidFill>
             <a:tailEnd type="triangle"/>
           </a:ln>
         </p:spPr>
@@ -12265,6 +13018,350 @@
   <p:clrMapOvr>
     <a:masterClrMapping/>
   </p:clrMapOvr>
+  <p:timing>
+    <p:tnLst>
+      <p:par>
+        <p:cTn id="1" dur="indefinite" restart="never" nodeType="tmRoot">
+          <p:childTnLst>
+            <p:seq concurrent="1" nextAc="seek">
+              <p:cTn id="2" dur="indefinite" nodeType="mainSeq">
+                <p:childTnLst>
+                  <p:par>
+                    <p:cTn id="3" fill="hold">
+                      <p:stCondLst>
+                        <p:cond delay="indefinite"/>
+                      </p:stCondLst>
+                      <p:childTnLst>
+                        <p:par>
+                          <p:cTn id="4" fill="hold">
+                            <p:stCondLst>
+                              <p:cond delay="0"/>
+                            </p:stCondLst>
+                            <p:childTnLst>
+                              <p:par>
+                                <p:cTn id="5" presetID="1" presetClass="entr" presetSubtype="0" fill="hold" nodeType="clickEffect">
+                                  <p:stCondLst>
+                                    <p:cond delay="0"/>
+                                  </p:stCondLst>
+                                  <p:childTnLst>
+                                    <p:set>
+                                      <p:cBhvr>
+                                        <p:cTn id="6" dur="1" fill="hold">
+                                          <p:stCondLst>
+                                            <p:cond delay="0"/>
+                                          </p:stCondLst>
+                                        </p:cTn>
+                                        <p:tgtEl>
+                                          <p:spTgt spid="4"/>
+                                        </p:tgtEl>
+                                        <p:attrNameLst>
+                                          <p:attrName>style.visibility</p:attrName>
+                                        </p:attrNameLst>
+                                      </p:cBhvr>
+                                      <p:to>
+                                        <p:strVal val="visible"/>
+                                      </p:to>
+                                    </p:set>
+                                  </p:childTnLst>
+                                </p:cTn>
+                              </p:par>
+                            </p:childTnLst>
+                          </p:cTn>
+                        </p:par>
+                      </p:childTnLst>
+                    </p:cTn>
+                  </p:par>
+                  <p:par>
+                    <p:cTn id="7" fill="hold">
+                      <p:stCondLst>
+                        <p:cond delay="indefinite"/>
+                      </p:stCondLst>
+                      <p:childTnLst>
+                        <p:par>
+                          <p:cTn id="8" fill="hold">
+                            <p:stCondLst>
+                              <p:cond delay="0"/>
+                            </p:stCondLst>
+                            <p:childTnLst>
+                              <p:par>
+                                <p:cTn id="9" presetID="14" presetClass="entr" presetSubtype="10" fill="hold" nodeType="clickEffect">
+                                  <p:stCondLst>
+                                    <p:cond delay="0"/>
+                                  </p:stCondLst>
+                                  <p:childTnLst>
+                                    <p:set>
+                                      <p:cBhvr>
+                                        <p:cTn id="10" dur="1" fill="hold">
+                                          <p:stCondLst>
+                                            <p:cond delay="0"/>
+                                          </p:stCondLst>
+                                        </p:cTn>
+                                        <p:tgtEl>
+                                          <p:spTgt spid="10"/>
+                                        </p:tgtEl>
+                                        <p:attrNameLst>
+                                          <p:attrName>style.visibility</p:attrName>
+                                        </p:attrNameLst>
+                                      </p:cBhvr>
+                                      <p:to>
+                                        <p:strVal val="visible"/>
+                                      </p:to>
+                                    </p:set>
+                                    <p:animEffect transition="in" filter="randombar(horizontal)">
+                                      <p:cBhvr>
+                                        <p:cTn id="11" dur="500"/>
+                                        <p:tgtEl>
+                                          <p:spTgt spid="10"/>
+                                        </p:tgtEl>
+                                      </p:cBhvr>
+                                    </p:animEffect>
+                                  </p:childTnLst>
+                                </p:cTn>
+                              </p:par>
+                              <p:par>
+                                <p:cTn id="12" presetID="14" presetClass="entr" presetSubtype="10" fill="hold" grpId="0" nodeType="withEffect">
+                                  <p:stCondLst>
+                                    <p:cond delay="0"/>
+                                  </p:stCondLst>
+                                  <p:childTnLst>
+                                    <p:set>
+                                      <p:cBhvr>
+                                        <p:cTn id="13" dur="1" fill="hold">
+                                          <p:stCondLst>
+                                            <p:cond delay="0"/>
+                                          </p:stCondLst>
+                                        </p:cTn>
+                                        <p:tgtEl>
+                                          <p:spTgt spid="21"/>
+                                        </p:tgtEl>
+                                        <p:attrNameLst>
+                                          <p:attrName>style.visibility</p:attrName>
+                                        </p:attrNameLst>
+                                      </p:cBhvr>
+                                      <p:to>
+                                        <p:strVal val="visible"/>
+                                      </p:to>
+                                    </p:set>
+                                    <p:animEffect transition="in" filter="randombar(horizontal)">
+                                      <p:cBhvr>
+                                        <p:cTn id="14" dur="500"/>
+                                        <p:tgtEl>
+                                          <p:spTgt spid="21"/>
+                                        </p:tgtEl>
+                                      </p:cBhvr>
+                                    </p:animEffect>
+                                  </p:childTnLst>
+                                </p:cTn>
+                              </p:par>
+                            </p:childTnLst>
+                          </p:cTn>
+                        </p:par>
+                      </p:childTnLst>
+                    </p:cTn>
+                  </p:par>
+                  <p:par>
+                    <p:cTn id="15" fill="hold">
+                      <p:stCondLst>
+                        <p:cond delay="indefinite"/>
+                      </p:stCondLst>
+                      <p:childTnLst>
+                        <p:par>
+                          <p:cTn id="16" fill="hold">
+                            <p:stCondLst>
+                              <p:cond delay="0"/>
+                            </p:stCondLst>
+                            <p:childTnLst>
+                              <p:par>
+                                <p:cTn id="17" presetID="14" presetClass="entr" presetSubtype="10" fill="hold" nodeType="clickEffect">
+                                  <p:stCondLst>
+                                    <p:cond delay="0"/>
+                                  </p:stCondLst>
+                                  <p:childTnLst>
+                                    <p:set>
+                                      <p:cBhvr>
+                                        <p:cTn id="18" dur="1" fill="hold">
+                                          <p:stCondLst>
+                                            <p:cond delay="0"/>
+                                          </p:stCondLst>
+                                        </p:cTn>
+                                        <p:tgtEl>
+                                          <p:spTgt spid="13"/>
+                                        </p:tgtEl>
+                                        <p:attrNameLst>
+                                          <p:attrName>style.visibility</p:attrName>
+                                        </p:attrNameLst>
+                                      </p:cBhvr>
+                                      <p:to>
+                                        <p:strVal val="visible"/>
+                                      </p:to>
+                                    </p:set>
+                                    <p:animEffect transition="in" filter="randombar(horizontal)">
+                                      <p:cBhvr>
+                                        <p:cTn id="19" dur="500"/>
+                                        <p:tgtEl>
+                                          <p:spTgt spid="13"/>
+                                        </p:tgtEl>
+                                      </p:cBhvr>
+                                    </p:animEffect>
+                                  </p:childTnLst>
+                                </p:cTn>
+                              </p:par>
+                              <p:par>
+                                <p:cTn id="20" presetID="14" presetClass="entr" presetSubtype="10" fill="hold" grpId="0" nodeType="withEffect">
+                                  <p:stCondLst>
+                                    <p:cond delay="0"/>
+                                  </p:stCondLst>
+                                  <p:childTnLst>
+                                    <p:set>
+                                      <p:cBhvr>
+                                        <p:cTn id="21" dur="1" fill="hold">
+                                          <p:stCondLst>
+                                            <p:cond delay="0"/>
+                                          </p:stCondLst>
+                                        </p:cTn>
+                                        <p:tgtEl>
+                                          <p:spTgt spid="5"/>
+                                        </p:tgtEl>
+                                        <p:attrNameLst>
+                                          <p:attrName>style.visibility</p:attrName>
+                                        </p:attrNameLst>
+                                      </p:cBhvr>
+                                      <p:to>
+                                        <p:strVal val="visible"/>
+                                      </p:to>
+                                    </p:set>
+                                    <p:animEffect transition="in" filter="randombar(horizontal)">
+                                      <p:cBhvr>
+                                        <p:cTn id="22" dur="500"/>
+                                        <p:tgtEl>
+                                          <p:spTgt spid="5"/>
+                                        </p:tgtEl>
+                                      </p:cBhvr>
+                                    </p:animEffect>
+                                  </p:childTnLst>
+                                </p:cTn>
+                              </p:par>
+                            </p:childTnLst>
+                          </p:cTn>
+                        </p:par>
+                      </p:childTnLst>
+                    </p:cTn>
+                  </p:par>
+                  <p:par>
+                    <p:cTn id="23" fill="hold">
+                      <p:stCondLst>
+                        <p:cond delay="indefinite"/>
+                      </p:stCondLst>
+                      <p:childTnLst>
+                        <p:par>
+                          <p:cTn id="24" fill="hold">
+                            <p:stCondLst>
+                              <p:cond delay="0"/>
+                            </p:stCondLst>
+                            <p:childTnLst>
+                              <p:par>
+                                <p:cTn id="25" presetID="14" presetClass="entr" presetSubtype="10" fill="hold" nodeType="clickEffect">
+                                  <p:stCondLst>
+                                    <p:cond delay="0"/>
+                                  </p:stCondLst>
+                                  <p:childTnLst>
+                                    <p:set>
+                                      <p:cBhvr>
+                                        <p:cTn id="26" dur="1" fill="hold">
+                                          <p:stCondLst>
+                                            <p:cond delay="0"/>
+                                          </p:stCondLst>
+                                        </p:cTn>
+                                        <p:tgtEl>
+                                          <p:spTgt spid="19"/>
+                                        </p:tgtEl>
+                                        <p:attrNameLst>
+                                          <p:attrName>style.visibility</p:attrName>
+                                        </p:attrNameLst>
+                                      </p:cBhvr>
+                                      <p:to>
+                                        <p:strVal val="visible"/>
+                                      </p:to>
+                                    </p:set>
+                                    <p:animEffect transition="in" filter="randombar(horizontal)">
+                                      <p:cBhvr>
+                                        <p:cTn id="27" dur="500"/>
+                                        <p:tgtEl>
+                                          <p:spTgt spid="19"/>
+                                        </p:tgtEl>
+                                      </p:cBhvr>
+                                    </p:animEffect>
+                                  </p:childTnLst>
+                                </p:cTn>
+                              </p:par>
+                              <p:par>
+                                <p:cTn id="28" presetID="14" presetClass="entr" presetSubtype="10" fill="hold" grpId="0" nodeType="withEffect">
+                                  <p:stCondLst>
+                                    <p:cond delay="0"/>
+                                  </p:stCondLst>
+                                  <p:childTnLst>
+                                    <p:set>
+                                      <p:cBhvr>
+                                        <p:cTn id="29" dur="1" fill="hold">
+                                          <p:stCondLst>
+                                            <p:cond delay="0"/>
+                                          </p:stCondLst>
+                                        </p:cTn>
+                                        <p:tgtEl>
+                                          <p:spTgt spid="22"/>
+                                        </p:tgtEl>
+                                        <p:attrNameLst>
+                                          <p:attrName>style.visibility</p:attrName>
+                                        </p:attrNameLst>
+                                      </p:cBhvr>
+                                      <p:to>
+                                        <p:strVal val="visible"/>
+                                      </p:to>
+                                    </p:set>
+                                    <p:animEffect transition="in" filter="randombar(horizontal)">
+                                      <p:cBhvr>
+                                        <p:cTn id="30" dur="500"/>
+                                        <p:tgtEl>
+                                          <p:spTgt spid="22"/>
+                                        </p:tgtEl>
+                                      </p:cBhvr>
+                                    </p:animEffect>
+                                  </p:childTnLst>
+                                </p:cTn>
+                              </p:par>
+                            </p:childTnLst>
+                          </p:cTn>
+                        </p:par>
+                      </p:childTnLst>
+                    </p:cTn>
+                  </p:par>
+                </p:childTnLst>
+              </p:cTn>
+              <p:prevCondLst>
+                <p:cond evt="onPrev" delay="0">
+                  <p:tgtEl>
+                    <p:sldTgt/>
+                  </p:tgtEl>
+                </p:cond>
+              </p:prevCondLst>
+              <p:nextCondLst>
+                <p:cond evt="onNext" delay="0">
+                  <p:tgtEl>
+                    <p:sldTgt/>
+                  </p:tgtEl>
+                </p:cond>
+              </p:nextCondLst>
+            </p:seq>
+          </p:childTnLst>
+        </p:cTn>
+      </p:par>
+    </p:tnLst>
+    <p:bldLst>
+      <p:bldP spid="5" grpId="0"/>
+      <p:bldP spid="21" grpId="0"/>
+      <p:bldP spid="22" grpId="0"/>
+    </p:bldLst>
+  </p:timing>
 </p:sld>
 </file>
 
@@ -12589,13 +13686,13 @@
         </p:nvPicPr>
         <p:blipFill rotWithShape="1">
           <a:blip r:embed="rId4"/>
-          <a:srcRect t="24365"/>
+          <a:srcRect t="24365" b="51703"/>
           <a:stretch/>
         </p:blipFill>
         <p:spPr>
           <a:xfrm>
-            <a:off x="975854" y="1918986"/>
-            <a:ext cx="4180733" cy="4242535"/>
+            <a:off x="1036814" y="1891177"/>
+            <a:ext cx="4180733" cy="1342394"/>
           </a:xfrm>
           <a:prstGeom prst="rect">
             <a:avLst/>
@@ -12616,8 +13713,8 @@
         </p:nvSpPr>
         <p:spPr>
           <a:xfrm>
-            <a:off x="5735226" y="1891177"/>
-            <a:ext cx="6127844" cy="4401205"/>
+            <a:off x="5735226" y="1966134"/>
+            <a:ext cx="5926210" cy="954107"/>
           </a:xfrm>
           <a:prstGeom prst="rect">
             <a:avLst/>
@@ -12636,47 +13733,145 @@
             </a:pPr>
             <a:r>
               <a:rPr lang="en-CA" sz="2800" dirty="0"/>
-              <a:t>Peak seasons are summer and Christmas.</a:t>
-            </a:r>
-          </a:p>
+              <a:t>Peak holiday seasons are Christmas, New Years and Long Weekends.</a:t>
+            </a:r>
+          </a:p>
+        </p:txBody>
+      </p:sp>
+      <p:pic>
+        <p:nvPicPr>
+          <p:cNvPr id="7" name="Picture 6" descr="Chart&#10;&#10;Description automatically generated">
+            <a:extLst>
+              <a:ext uri="{FF2B5EF4-FFF2-40B4-BE49-F238E27FC236}">
+                <a16:creationId xmlns:a16="http://schemas.microsoft.com/office/drawing/2014/main" id="{9A155F25-7EEC-43D0-8475-7A9DE14D6C64}"/>
+              </a:ext>
+            </a:extLst>
+          </p:cNvPr>
+          <p:cNvPicPr>
+            <a:picLocks noChangeAspect="1"/>
+          </p:cNvPicPr>
+          <p:nvPr/>
+        </p:nvPicPr>
+        <p:blipFill rotWithShape="1">
+          <a:blip r:embed="rId4"/>
+          <a:srcRect t="74159"/>
+          <a:stretch/>
+        </p:blipFill>
+        <p:spPr>
+          <a:xfrm>
+            <a:off x="1036814" y="4888499"/>
+            <a:ext cx="4180733" cy="1449457"/>
+          </a:xfrm>
+          <a:prstGeom prst="rect">
+            <a:avLst/>
+          </a:prstGeom>
+        </p:spPr>
+      </p:pic>
+      <p:pic>
+        <p:nvPicPr>
+          <p:cNvPr id="8" name="Picture 7" descr="Chart&#10;&#10;Description automatically generated">
+            <a:extLst>
+              <a:ext uri="{FF2B5EF4-FFF2-40B4-BE49-F238E27FC236}">
+                <a16:creationId xmlns:a16="http://schemas.microsoft.com/office/drawing/2014/main" id="{726A2FF7-2CDE-465F-977F-ED51A3DBC346}"/>
+              </a:ext>
+            </a:extLst>
+          </p:cNvPr>
+          <p:cNvPicPr>
+            <a:picLocks noChangeAspect="1"/>
+          </p:cNvPicPr>
+          <p:nvPr/>
+        </p:nvPicPr>
+        <p:blipFill rotWithShape="1">
+          <a:blip r:embed="rId4"/>
+          <a:srcRect t="49936" r="-3123" b="24599"/>
+          <a:stretch/>
+        </p:blipFill>
+        <p:spPr>
+          <a:xfrm>
+            <a:off x="1036814" y="3407577"/>
+            <a:ext cx="4311293" cy="1428386"/>
+          </a:xfrm>
+          <a:prstGeom prst="rect">
+            <a:avLst/>
+          </a:prstGeom>
+        </p:spPr>
+      </p:pic>
+      <p:sp>
+        <p:nvSpPr>
+          <p:cNvPr id="11" name="TextBox 10">
+            <a:extLst>
+              <a:ext uri="{FF2B5EF4-FFF2-40B4-BE49-F238E27FC236}">
+                <a16:creationId xmlns:a16="http://schemas.microsoft.com/office/drawing/2014/main" id="{95CFB186-DB91-4B5E-A058-BEFB522BB9FE}"/>
+              </a:ext>
+            </a:extLst>
+          </p:cNvPr>
+          <p:cNvSpPr txBox="1"/>
+          <p:nvPr/>
+        </p:nvSpPr>
+        <p:spPr>
+          <a:xfrm>
+            <a:off x="5735226" y="3513242"/>
+            <a:ext cx="5926210" cy="954107"/>
+          </a:xfrm>
+          <a:prstGeom prst="rect">
+            <a:avLst/>
+          </a:prstGeom>
+          <a:noFill/>
+        </p:spPr>
+        <p:txBody>
+          <a:bodyPr wrap="square" rtlCol="0">
+            <a:spAutoFit/>
+          </a:bodyPr>
+          <a:lstStyle/>
           <a:p>
             <a:pPr marL="457200" indent="-457200">
               <a:buFont typeface="Arial" panose="020B0604020202020204" pitchFamily="34" charset="0"/>
               <a:buChar char="•"/>
             </a:pPr>
             <a:r>
-              <a:rPr lang="en-CA" sz="2800" dirty="0"/>
-              <a:t>Having a public holiday close to the weekend increase the rates too.</a:t>
-            </a:r>
-          </a:p>
+              <a:rPr lang="en-US" sz="2800" dirty="0"/>
+              <a:t>High Demands for Airbnb Rentals on the Weekends.</a:t>
+            </a:r>
+            <a:endParaRPr lang="en-CA" sz="2800" dirty="0"/>
+          </a:p>
+        </p:txBody>
+      </p:sp>
+      <p:sp>
+        <p:nvSpPr>
+          <p:cNvPr id="12" name="TextBox 11">
+            <a:extLst>
+              <a:ext uri="{FF2B5EF4-FFF2-40B4-BE49-F238E27FC236}">
+                <a16:creationId xmlns:a16="http://schemas.microsoft.com/office/drawing/2014/main" id="{454E4FEA-C506-49C2-B178-BFE061D854C3}"/>
+              </a:ext>
+            </a:extLst>
+          </p:cNvPr>
+          <p:cNvSpPr txBox="1"/>
+          <p:nvPr/>
+        </p:nvSpPr>
+        <p:spPr>
+          <a:xfrm>
+            <a:off x="5735226" y="5028506"/>
+            <a:ext cx="5926210" cy="954107"/>
+          </a:xfrm>
+          <a:prstGeom prst="rect">
+            <a:avLst/>
+          </a:prstGeom>
+          <a:noFill/>
+        </p:spPr>
+        <p:txBody>
+          <a:bodyPr wrap="square" rtlCol="0">
+            <a:spAutoFit/>
+          </a:bodyPr>
+          <a:lstStyle/>
           <a:p>
             <a:pPr marL="457200" indent="-457200">
               <a:buFont typeface="Arial" panose="020B0604020202020204" pitchFamily="34" charset="0"/>
               <a:buChar char="•"/>
             </a:pPr>
             <a:r>
-              <a:rPr lang="en-CA" sz="2800" dirty="0"/>
-              <a:t>Weekends have the highest rates during the week.</a:t>
-            </a:r>
-          </a:p>
-          <a:p>
-            <a:pPr marL="457200" indent="-457200">
-              <a:buFont typeface="Arial" panose="020B0604020202020204" pitchFamily="34" charset="0"/>
-              <a:buChar char="•"/>
-            </a:pPr>
-            <a:r>
-              <a:rPr lang="en-CA" sz="2800" dirty="0"/>
-              <a:t>Rates drop significantly during the coldest months of the year.</a:t>
-            </a:r>
-          </a:p>
-          <a:p>
-            <a:pPr marL="457200" indent="-457200">
-              <a:buFont typeface="Arial" panose="020B0604020202020204" pitchFamily="34" charset="0"/>
-              <a:buChar char="•"/>
-            </a:pPr>
-            <a:endParaRPr lang="en-CA" sz="2800" dirty="0"/>
-          </a:p>
-          <a:p>
+              <a:rPr lang="en-US" sz="2800" dirty="0"/>
+              <a:t>Summer months tend to have higher rates than winter months.</a:t>
+            </a:r>
             <a:endParaRPr lang="en-CA" sz="2800" dirty="0"/>
           </a:p>
         </p:txBody>
@@ -12691,6 +13886,305 @@
   <p:clrMapOvr>
     <a:masterClrMapping/>
   </p:clrMapOvr>
+  <p:timing>
+    <p:tnLst>
+      <p:par>
+        <p:cTn id="1" dur="indefinite" restart="never" nodeType="tmRoot">
+          <p:childTnLst>
+            <p:seq concurrent="1" nextAc="seek">
+              <p:cTn id="2" dur="indefinite" nodeType="mainSeq">
+                <p:childTnLst>
+                  <p:par>
+                    <p:cTn id="3" fill="hold">
+                      <p:stCondLst>
+                        <p:cond delay="indefinite"/>
+                      </p:stCondLst>
+                      <p:childTnLst>
+                        <p:par>
+                          <p:cTn id="4" fill="hold">
+                            <p:stCondLst>
+                              <p:cond delay="0"/>
+                            </p:stCondLst>
+                            <p:childTnLst>
+                              <p:par>
+                                <p:cTn id="5" presetID="16" presetClass="entr" presetSubtype="21" fill="hold" nodeType="clickEffect">
+                                  <p:stCondLst>
+                                    <p:cond delay="0"/>
+                                  </p:stCondLst>
+                                  <p:childTnLst>
+                                    <p:set>
+                                      <p:cBhvr>
+                                        <p:cTn id="6" dur="1" fill="hold">
+                                          <p:stCondLst>
+                                            <p:cond delay="0"/>
+                                          </p:stCondLst>
+                                        </p:cTn>
+                                        <p:tgtEl>
+                                          <p:spTgt spid="4"/>
+                                        </p:tgtEl>
+                                        <p:attrNameLst>
+                                          <p:attrName>style.visibility</p:attrName>
+                                        </p:attrNameLst>
+                                      </p:cBhvr>
+                                      <p:to>
+                                        <p:strVal val="visible"/>
+                                      </p:to>
+                                    </p:set>
+                                    <p:animEffect transition="in" filter="barn(inVertical)">
+                                      <p:cBhvr>
+                                        <p:cTn id="7" dur="500"/>
+                                        <p:tgtEl>
+                                          <p:spTgt spid="4"/>
+                                        </p:tgtEl>
+                                      </p:cBhvr>
+                                    </p:animEffect>
+                                  </p:childTnLst>
+                                </p:cTn>
+                              </p:par>
+                              <p:par>
+                                <p:cTn id="8" presetID="16" presetClass="entr" presetSubtype="21" fill="hold" grpId="0" nodeType="withEffect">
+                                  <p:stCondLst>
+                                    <p:cond delay="0"/>
+                                  </p:stCondLst>
+                                  <p:childTnLst>
+                                    <p:set>
+                                      <p:cBhvr>
+                                        <p:cTn id="9" dur="1" fill="hold">
+                                          <p:stCondLst>
+                                            <p:cond delay="0"/>
+                                          </p:stCondLst>
+                                        </p:cTn>
+                                        <p:tgtEl>
+                                          <p:spTgt spid="3"/>
+                                        </p:tgtEl>
+                                        <p:attrNameLst>
+                                          <p:attrName>style.visibility</p:attrName>
+                                        </p:attrNameLst>
+                                      </p:cBhvr>
+                                      <p:to>
+                                        <p:strVal val="visible"/>
+                                      </p:to>
+                                    </p:set>
+                                    <p:animEffect transition="in" filter="barn(inVertical)">
+                                      <p:cBhvr>
+                                        <p:cTn id="10" dur="500"/>
+                                        <p:tgtEl>
+                                          <p:spTgt spid="3"/>
+                                        </p:tgtEl>
+                                      </p:cBhvr>
+                                    </p:animEffect>
+                                  </p:childTnLst>
+                                </p:cTn>
+                              </p:par>
+                            </p:childTnLst>
+                          </p:cTn>
+                        </p:par>
+                      </p:childTnLst>
+                    </p:cTn>
+                  </p:par>
+                  <p:par>
+                    <p:cTn id="11" fill="hold">
+                      <p:stCondLst>
+                        <p:cond delay="indefinite"/>
+                      </p:stCondLst>
+                      <p:childTnLst>
+                        <p:par>
+                          <p:cTn id="12" fill="hold">
+                            <p:stCondLst>
+                              <p:cond delay="0"/>
+                            </p:stCondLst>
+                            <p:childTnLst>
+                              <p:par>
+                                <p:cTn id="13" presetID="16" presetClass="entr" presetSubtype="21" fill="hold" nodeType="clickEffect">
+                                  <p:stCondLst>
+                                    <p:cond delay="0"/>
+                                  </p:stCondLst>
+                                  <p:childTnLst>
+                                    <p:set>
+                                      <p:cBhvr>
+                                        <p:cTn id="14" dur="1" fill="hold">
+                                          <p:stCondLst>
+                                            <p:cond delay="0"/>
+                                          </p:stCondLst>
+                                        </p:cTn>
+                                        <p:tgtEl>
+                                          <p:spTgt spid="8"/>
+                                        </p:tgtEl>
+                                        <p:attrNameLst>
+                                          <p:attrName>style.visibility</p:attrName>
+                                        </p:attrNameLst>
+                                      </p:cBhvr>
+                                      <p:to>
+                                        <p:strVal val="visible"/>
+                                      </p:to>
+                                    </p:set>
+                                    <p:animEffect transition="in" filter="barn(inVertical)">
+                                      <p:cBhvr>
+                                        <p:cTn id="15" dur="500"/>
+                                        <p:tgtEl>
+                                          <p:spTgt spid="8"/>
+                                        </p:tgtEl>
+                                      </p:cBhvr>
+                                    </p:animEffect>
+                                  </p:childTnLst>
+                                </p:cTn>
+                              </p:par>
+                              <p:par>
+                                <p:cTn id="16" presetID="16" presetClass="entr" presetSubtype="21" fill="hold" grpId="0" nodeType="withEffect">
+                                  <p:stCondLst>
+                                    <p:cond delay="0"/>
+                                  </p:stCondLst>
+                                  <p:childTnLst>
+                                    <p:set>
+                                      <p:cBhvr>
+                                        <p:cTn id="17" dur="1" fill="hold">
+                                          <p:stCondLst>
+                                            <p:cond delay="0"/>
+                                          </p:stCondLst>
+                                        </p:cTn>
+                                        <p:tgtEl>
+                                          <p:spTgt spid="11"/>
+                                        </p:tgtEl>
+                                        <p:attrNameLst>
+                                          <p:attrName>style.visibility</p:attrName>
+                                        </p:attrNameLst>
+                                      </p:cBhvr>
+                                      <p:to>
+                                        <p:strVal val="visible"/>
+                                      </p:to>
+                                    </p:set>
+                                    <p:animEffect transition="in" filter="barn(inVertical)">
+                                      <p:cBhvr>
+                                        <p:cTn id="18" dur="500"/>
+                                        <p:tgtEl>
+                                          <p:spTgt spid="11"/>
+                                        </p:tgtEl>
+                                      </p:cBhvr>
+                                    </p:animEffect>
+                                  </p:childTnLst>
+                                </p:cTn>
+                              </p:par>
+                            </p:childTnLst>
+                          </p:cTn>
+                        </p:par>
+                      </p:childTnLst>
+                    </p:cTn>
+                  </p:par>
+                  <p:par>
+                    <p:cTn id="19" fill="hold">
+                      <p:stCondLst>
+                        <p:cond delay="indefinite"/>
+                      </p:stCondLst>
+                      <p:childTnLst>
+                        <p:par>
+                          <p:cTn id="20" fill="hold">
+                            <p:stCondLst>
+                              <p:cond delay="0"/>
+                            </p:stCondLst>
+                            <p:childTnLst>
+                              <p:par>
+                                <p:cTn id="21" presetID="16" presetClass="entr" presetSubtype="21" fill="hold" nodeType="clickEffect">
+                                  <p:stCondLst>
+                                    <p:cond delay="0"/>
+                                  </p:stCondLst>
+                                  <p:childTnLst>
+                                    <p:set>
+                                      <p:cBhvr>
+                                        <p:cTn id="22" dur="1" fill="hold">
+                                          <p:stCondLst>
+                                            <p:cond delay="0"/>
+                                          </p:stCondLst>
+                                        </p:cTn>
+                                        <p:tgtEl>
+                                          <p:spTgt spid="7"/>
+                                        </p:tgtEl>
+                                        <p:attrNameLst>
+                                          <p:attrName>style.visibility</p:attrName>
+                                        </p:attrNameLst>
+                                      </p:cBhvr>
+                                      <p:to>
+                                        <p:strVal val="visible"/>
+                                      </p:to>
+                                    </p:set>
+                                    <p:animEffect transition="in" filter="barn(inVertical)">
+                                      <p:cBhvr>
+                                        <p:cTn id="23" dur="500"/>
+                                        <p:tgtEl>
+                                          <p:spTgt spid="7"/>
+                                        </p:tgtEl>
+                                      </p:cBhvr>
+                                    </p:animEffect>
+                                  </p:childTnLst>
+                                </p:cTn>
+                              </p:par>
+                              <p:par>
+                                <p:cTn id="24" presetID="16" presetClass="entr" presetSubtype="21" fill="hold" grpId="0" nodeType="withEffect">
+                                  <p:stCondLst>
+                                    <p:cond delay="0"/>
+                                  </p:stCondLst>
+                                  <p:childTnLst>
+                                    <p:set>
+                                      <p:cBhvr>
+                                        <p:cTn id="25" dur="1" fill="hold">
+                                          <p:stCondLst>
+                                            <p:cond delay="0"/>
+                                          </p:stCondLst>
+                                        </p:cTn>
+                                        <p:tgtEl>
+                                          <p:spTgt spid="12"/>
+                                        </p:tgtEl>
+                                        <p:attrNameLst>
+                                          <p:attrName>style.visibility</p:attrName>
+                                        </p:attrNameLst>
+                                      </p:cBhvr>
+                                      <p:to>
+                                        <p:strVal val="visible"/>
+                                      </p:to>
+                                    </p:set>
+                                    <p:animEffect transition="in" filter="barn(inVertical)">
+                                      <p:cBhvr>
+                                        <p:cTn id="26" dur="500"/>
+                                        <p:tgtEl>
+                                          <p:spTgt spid="12"/>
+                                        </p:tgtEl>
+                                      </p:cBhvr>
+                                    </p:animEffect>
+                                  </p:childTnLst>
+                                </p:cTn>
+                              </p:par>
+                            </p:childTnLst>
+                          </p:cTn>
+                        </p:par>
+                      </p:childTnLst>
+                    </p:cTn>
+                  </p:par>
+                </p:childTnLst>
+              </p:cTn>
+              <p:prevCondLst>
+                <p:cond evt="onPrev" delay="0">
+                  <p:tgtEl>
+                    <p:sldTgt/>
+                  </p:tgtEl>
+                </p:cond>
+              </p:prevCondLst>
+              <p:nextCondLst>
+                <p:cond evt="onNext" delay="0">
+                  <p:tgtEl>
+                    <p:sldTgt/>
+                  </p:tgtEl>
+                </p:cond>
+              </p:nextCondLst>
+            </p:seq>
+          </p:childTnLst>
+        </p:cTn>
+      </p:par>
+    </p:tnLst>
+    <p:bldLst>
+      <p:bldP spid="3" grpId="0"/>
+      <p:bldP spid="11" grpId="0"/>
+      <p:bldP spid="12" grpId="0"/>
+    </p:bldLst>
+  </p:timing>
 </p:sld>
 </file>
 
@@ -13365,7 +14859,7 @@
         <p:spPr>
           <a:xfrm>
             <a:off x="1263535" y="1837113"/>
-            <a:ext cx="8761614" cy="3693319"/>
+            <a:ext cx="8761614" cy="4247317"/>
           </a:xfrm>
           <a:prstGeom prst="rect">
             <a:avLst/>
@@ -13440,6 +14934,23 @@
             <a:r>
               <a:rPr lang="en-US" dirty="0"/>
               <a:t> New York City news info and include in Dashboard</a:t>
+            </a:r>
+          </a:p>
+          <a:p>
+            <a:pPr marL="285750" indent="-285750">
+              <a:buFont typeface="Arial" panose="020B0604020202020204" pitchFamily="34" charset="0"/>
+              <a:buChar char="•"/>
+            </a:pPr>
+            <a:endParaRPr lang="en-US" dirty="0"/>
+          </a:p>
+          <a:p>
+            <a:pPr marL="285750" indent="-285750">
+              <a:buFont typeface="Arial" panose="020B0604020202020204" pitchFamily="34" charset="0"/>
+              <a:buChar char="•"/>
+            </a:pPr>
+            <a:r>
+              <a:rPr lang="en-US" dirty="0"/>
+              <a:t>Look into customer demographics to see types of units they book.</a:t>
             </a:r>
           </a:p>
           <a:p>

</xml_diff>

<commit_message>
update powerpoint and added images for powerpoint
</commit_message>
<xml_diff>
--- a/Airbnb Price Predictions (Model).pptx
+++ b/Airbnb Price Predictions (Model).pptx
@@ -12,8 +12,8 @@
     <p:sldId id="320" r:id="rId3"/>
     <p:sldId id="321" r:id="rId4"/>
     <p:sldId id="324" r:id="rId5"/>
-    <p:sldId id="309" r:id="rId6"/>
-    <p:sldId id="308" r:id="rId7"/>
+    <p:sldId id="308" r:id="rId6"/>
+    <p:sldId id="309" r:id="rId7"/>
     <p:sldId id="280" r:id="rId8"/>
     <p:sldId id="315" r:id="rId9"/>
     <p:sldId id="296" r:id="rId10"/>
@@ -140,7 +140,7 @@
 
 <file path=ppt/commentAuthors.xml><?xml version="1.0" encoding="utf-8"?>
 <p:cmAuthorLst xmlns:a="http://schemas.openxmlformats.org/drawingml/2006/main" xmlns:r="http://schemas.openxmlformats.org/officeDocument/2006/relationships" xmlns:p="http://schemas.openxmlformats.org/presentationml/2006/main">
-  <p:cmAuthor id="1" name="Cecilia Leung" initials="CL" lastIdx="1" clrIdx="0">
+  <p:cmAuthor id="1" name="Cecilia Leung" initials="CL" lastIdx="2" clrIdx="0">
     <p:extLst>
       <p:ext uri="{19B8F6BF-5375-455C-9EA6-DF929625EA0E}">
         <p15:presenceInfo xmlns:p15="http://schemas.microsoft.com/office/powerpoint/2012/main" userId="57f69c778fdfed97" providerId="Windows Live"/>
@@ -148,6 +148,20 @@
     </p:extLst>
   </p:cmAuthor>
 </p:cmAuthorLst>
+</file>
+
+<file path=ppt/comments/comment1.xml><?xml version="1.0" encoding="utf-8"?>
+<p:cmLst xmlns:a="http://schemas.openxmlformats.org/drawingml/2006/main" xmlns:r="http://schemas.openxmlformats.org/officeDocument/2006/relationships" xmlns:p="http://schemas.openxmlformats.org/presentationml/2006/main">
+  <p:cm authorId="1" dt="2021-03-22T18:22:16.491" idx="2">
+    <p:pos x="10" y="10"/>
+    <p:text/>
+    <p:extLst>
+      <p:ext uri="{C676402C-5697-4E1C-873F-D02D1690AC5C}">
+        <p15:threadingInfo xmlns:p15="http://schemas.microsoft.com/office/powerpoint/2012/main" timeZoneBias="240"/>
+      </p:ext>
+    </p:extLst>
+  </p:cm>
+</p:cmLst>
 </file>
 
 <file path=ppt/notesMasters/notesMaster1.xml><?xml version="1.0" encoding="utf-8"?>
@@ -629,27 +643,19 @@
           <a:p>
             <a:r>
               <a:rPr lang="en-US" dirty="0"/>
-              <a:t>First, we needed to replace the blank fields with the averages for that specific column</a:t>
+              <a:t>For the RF, LGBM, and KNN we first, replaced  the blank fields with the averages for that specific column</a:t>
             </a:r>
           </a:p>
           <a:p>
             <a:r>
               <a:rPr lang="en-US" dirty="0"/>
-              <a:t>Second, we need to put the data by categorize our data by numerical values which was done from our last project for boroughs, </a:t>
-            </a:r>
-            <a:r>
-              <a:rPr lang="en-US" dirty="0" err="1"/>
-              <a:t>neighbourhoods</a:t>
-            </a:r>
+              <a:t>In the next step, we need to put the data and categorize them in numerical values  and majority of this was done from our last project.</a:t>
+            </a:r>
+          </a:p>
+          <a:p>
             <a:r>
               <a:rPr lang="en-US" dirty="0"/>
-              <a:t> &amp; room type.</a:t>
-            </a:r>
-          </a:p>
-          <a:p>
-            <a:r>
-              <a:rPr lang="en-US" dirty="0"/>
-              <a:t>Then we also, vectorize the most important amenities to get a count for each listing.</a:t>
+              <a:t>Finally, for the amenities column, we made a vector array counting the amenities features for each listing.</a:t>
             </a:r>
           </a:p>
           <a:p>
@@ -739,7 +745,7 @@
           <a:p>
             <a:r>
               <a:rPr lang="en-US" dirty="0"/>
-              <a:t>To get the best selection of listings that best represents NYC Airbnb market, 2e filtered out the outliers by only keeping the </a:t>
+              <a:t>To get the best selection of listings that best represents NYC’s Airbnb market, outliers are filtered out by only keeping the </a:t>
             </a:r>
             <a:r>
               <a:rPr lang="en-US" dirty="0" err="1"/>
@@ -747,7 +753,16 @@
             </a:r>
             <a:r>
               <a:rPr lang="en-US" dirty="0"/>
-              <a:t> that  with over 100 listings &amp; the listing prices under $600 so it is more normally distributed.</a:t>
+              <a:t> with over 100 listings &amp; the listing prices that are under $600.</a:t>
+            </a:r>
+          </a:p>
+          <a:p>
+            <a:endParaRPr lang="en-US" dirty="0"/>
+          </a:p>
+          <a:p>
+            <a:r>
+              <a:rPr lang="en-US" dirty="0"/>
+              <a:t>From the right side of the slide, you can tell the data is less skewed.</a:t>
             </a:r>
           </a:p>
         </p:txBody>
@@ -834,7 +849,7 @@
           <a:p>
             <a:r>
               <a:rPr lang="en-US" dirty="0"/>
-              <a:t>The </a:t>
+              <a:t>For the </a:t>
             </a:r>
             <a:r>
               <a:rPr lang="en-US" dirty="0" err="1"/>
@@ -842,7 +857,7 @@
             </a:r>
             <a:r>
               <a:rPr lang="en-US" dirty="0"/>
-              <a:t> prophet runs differently than the other regressor model and another dataset needs to be created.</a:t>
+              <a:t> prophet model, another dataset needs to be created because the model has a different methodology than the previous models/</a:t>
             </a:r>
           </a:p>
           <a:p>
@@ -874,7 +889,7 @@
           <a:p>
             <a:r>
               <a:rPr lang="en-US" dirty="0"/>
-              <a:t>We believe that putting all of this together can help us accurately predict prices based on location, size, trends and seasonality.</a:t>
+              <a:t>We believe that putting all f this together can help us accurately predict prices based on location, size, accommodation features,  trends and seasonality.</a:t>
             </a:r>
           </a:p>
         </p:txBody>
@@ -961,7 +976,7 @@
           <a:p>
             <a:r>
               <a:rPr lang="en-US" dirty="0"/>
-              <a:t>The next step is that we need to select the right features that impact the price.  We collectively agreed that features like location, the room type, # of bedrooms/bathrooms, amenities count review scores, # of reviews are some of the major driving force that impacts what the hosts charge for their Airbnb.</a:t>
+              <a:t>The next step is that we need to select the features that are related to price.  We collectively agreed that features like location, the room type, # of bedrooms/bathrooms, amenities count review scores, # of reviews are some of the major driving force that impacts what the hosts charge for their Airbnb.  Columns like Airbnb listings id are taken out because they do not have any correlation to the price.</a:t>
             </a:r>
           </a:p>
           <a:p>
@@ -979,30 +994,16 @@
           <a:p>
             <a:r>
               <a:rPr lang="en-US" dirty="0"/>
-              <a:t>We must ensure that all x-values need to be scaled to the same unit so that it doesn’t give us the wrong </a:t>
-            </a:r>
-            <a:r>
-              <a:rPr lang="en-US" dirty="0" err="1"/>
-              <a:t>scorres</a:t>
-            </a:r>
+              <a:t>We must ensure that all x-values are scaled to the same unit so that the model won’t produce the wrong scores.</a:t>
+            </a:r>
+          </a:p>
+          <a:p>
+            <a:endParaRPr lang="en-US" dirty="0"/>
+          </a:p>
+          <a:p>
             <a:r>
               <a:rPr lang="en-US" dirty="0"/>
-              <a:t>.</a:t>
-            </a:r>
-          </a:p>
-          <a:p>
-            <a:endParaRPr lang="en-US" dirty="0"/>
-          </a:p>
-          <a:p>
-            <a:r>
-              <a:rPr lang="en-US" dirty="0"/>
-              <a:t>As for the prophet model, we added the holiday feature, borough and room type info form the original default code we have to </a:t>
-            </a:r>
-          </a:p>
-          <a:p>
-            <a:r>
-              <a:rPr lang="en-US" dirty="0"/>
-              <a:t> find the optimal train-test data split and to normalize the X-values so that they are in the same units for the model to produce to correct results.</a:t>
+              <a:t>As for the prophet model, we added the holiday feature, borough and room type info form the original code  so that the model can predict the prices based on these criteria.</a:t>
             </a:r>
           </a:p>
         </p:txBody>
@@ -2674,12 +2675,9 @@
           <a:lstStyle/>
           <a:p>
             <a:r>
-              <a:rPr lang="en-US" dirty="0">
-                <a:sym typeface="Wingdings" panose="05000000000000000000" pitchFamily="2" charset="2"/>
-              </a:rPr>
-              <a:t> Rest of the team to add inputs</a:t>
-            </a:r>
-            <a:endParaRPr lang="en-US" dirty="0"/>
+              <a:rPr lang="en-US" dirty="0"/>
+              <a:t>We already have information on the listings details with the yearly rates in our existing database.  To understand more about rates, we added 3 new tables to see how different factors like monthly, day of week &amp; futures prices can help hosts price their Airbnb units</a:t>
+            </a:r>
           </a:p>
           <a:p>
             <a:endParaRPr lang="en-US" dirty="0"/>
@@ -2712,7 +2710,7 @@
     </p:spTree>
     <p:extLst>
       <p:ext uri="{BB962C8B-B14F-4D97-AF65-F5344CB8AC3E}">
-        <p14:creationId xmlns:p14="http://schemas.microsoft.com/office/powerpoint/2010/main" val="3157092588"/>
+        <p14:creationId xmlns:p14="http://schemas.microsoft.com/office/powerpoint/2010/main" val="74110409"/>
       </p:ext>
     </p:extLst>
   </p:cSld>
@@ -2767,11 +2765,26 @@
           <a:lstStyle/>
           <a:p>
             <a:r>
+              <a:rPr lang="en-US" dirty="0">
+                <a:sym typeface="Wingdings" panose="05000000000000000000" pitchFamily="2" charset="2"/>
+              </a:rPr>
+              <a:t> Rest of the team to add inputs</a:t>
+            </a:r>
+            <a:endParaRPr lang="en-US" dirty="0"/>
+          </a:p>
+          <a:p>
+            <a:pPr marL="228600" indent="-228600">
+              <a:buAutoNum type="arabicParenR"/>
+            </a:pPr>
+            <a:r>
               <a:rPr lang="en-US" dirty="0"/>
-              <a:t>We have the following tables in our existing database.  To strengthen our price model, we added 3 new tables to see how different factors like monthly, day of week &amp; predicted prices can help hosts price their Airbnb units</a:t>
-            </a:r>
-          </a:p>
-          <a:p>
+              <a:t>Adding new information to our database requires extensive research to get the right dataset related </a:t>
+            </a:r>
+          </a:p>
+          <a:p>
+            <a:pPr marL="228600" indent="-228600">
+              <a:buAutoNum type="arabicParenR"/>
+            </a:pPr>
             <a:endParaRPr lang="en-US" dirty="0"/>
           </a:p>
         </p:txBody>
@@ -2802,7 +2815,7 @@
     </p:spTree>
     <p:extLst>
       <p:ext uri="{BB962C8B-B14F-4D97-AF65-F5344CB8AC3E}">
-        <p14:creationId xmlns:p14="http://schemas.microsoft.com/office/powerpoint/2010/main" val="74110409"/>
+        <p14:creationId xmlns:p14="http://schemas.microsoft.com/office/powerpoint/2010/main" val="3157092588"/>
       </p:ext>
     </p:extLst>
   </p:cSld>
@@ -2858,21 +2871,13 @@
           <a:p>
             <a:r>
               <a:rPr lang="en-US" dirty="0"/>
-              <a:t>To cover majority of the factors in pricing a unit, we used the Random Forest &amp; LGBM Regressor methods to determine which features are the most important to price an </a:t>
-            </a:r>
-            <a:r>
-              <a:rPr lang="en-US" dirty="0" err="1"/>
-              <a:t>AirBNB</a:t>
-            </a:r>
+              <a:t>To build an Airbnb Price Predictor application, we used the Random Forest &amp; LGBM Regressor methods to determine which feature is important when price an Airbnb unit.</a:t>
+            </a:r>
+          </a:p>
+          <a:p>
             <a:r>
               <a:rPr lang="en-US" dirty="0"/>
-              <a:t>.</a:t>
-            </a:r>
-          </a:p>
-          <a:p>
-            <a:r>
-              <a:rPr lang="en-US" dirty="0"/>
-              <a:t>We then use the KNN Regressor to see how the price is affected with having listings close to your area.</a:t>
+              <a:t>Then we use the KNN Regressor to see how the price is affected with having listings close to your area.</a:t>
             </a:r>
           </a:p>
           <a:p>
@@ -2968,7 +2973,7 @@
           <a:p>
             <a:r>
               <a:rPr lang="en-US" dirty="0"/>
-              <a:t>Before I go into explaining the modeling process, I will explain on some of our key findings.  </a:t>
+              <a:t>Here are some of the key findings after running all the models.</a:t>
             </a:r>
           </a:p>
           <a:p>
@@ -2980,7 +2985,7 @@
             </a:pPr>
             <a:r>
               <a:rPr lang="en-US" dirty="0"/>
-              <a:t>First, it is critical to price depending on the time of the year.  Different seasons, holidays, long weekends and day of the week can help the host price their units to maximize revenue.</a:t>
+              <a:t>The predictor model shows there will be a slight increase in prices for 2022 to 2023.</a:t>
             </a:r>
           </a:p>
           <a:p>
@@ -2990,17 +2995,194 @@
             <a:endParaRPr lang="en-US" dirty="0"/>
           </a:p>
           <a:p>
+            <a:pPr marL="228600" marR="0" lvl="0" indent="-228600" algn="l" defTabSz="914400" rtl="0" eaLnBrk="1" fontAlgn="auto" latinLnBrk="0" hangingPunct="1">
+              <a:lnSpc>
+                <a:spcPct val="100000"/>
+              </a:lnSpc>
+              <a:spcBef>
+                <a:spcPts val="0"/>
+              </a:spcBef>
+              <a:spcAft>
+                <a:spcPts val="0"/>
+              </a:spcAft>
+              <a:buClrTx/>
+              <a:buSzTx/>
+              <a:buFontTx/>
+              <a:buAutoNum type="arabicParenR"/>
+              <a:tabLst/>
+              <a:defRPr/>
+            </a:pPr>
+            <a:r>
+              <a:rPr lang="en-US" dirty="0"/>
+              <a:t>Centrally located listings and reputable </a:t>
+            </a:r>
+            <a:r>
+              <a:rPr lang="en-US" dirty="0" err="1"/>
+              <a:t>neighbourhoods</a:t>
+            </a:r>
+            <a:r>
+              <a:rPr lang="en-US" dirty="0"/>
+              <a:t> usually sets the tone of your listings.</a:t>
+            </a:r>
+          </a:p>
+          <a:p>
+            <a:pPr marL="228600" marR="0" lvl="0" indent="-228600" algn="l" defTabSz="914400" rtl="0" eaLnBrk="1" fontAlgn="auto" latinLnBrk="0" hangingPunct="1">
+              <a:lnSpc>
+                <a:spcPct val="100000"/>
+              </a:lnSpc>
+              <a:spcBef>
+                <a:spcPts val="0"/>
+              </a:spcBef>
+              <a:spcAft>
+                <a:spcPts val="0"/>
+              </a:spcAft>
+              <a:buClrTx/>
+              <a:buSzTx/>
+              <a:buFontTx/>
+              <a:buAutoNum type="arabicParenR"/>
+              <a:tabLst/>
+              <a:defRPr/>
+            </a:pPr>
+            <a:endParaRPr lang="en-US" dirty="0"/>
+          </a:p>
+          <a:p>
+            <a:pPr marL="228600" marR="0" lvl="0" indent="-228600" algn="l" defTabSz="914400" rtl="0" eaLnBrk="1" fontAlgn="auto" latinLnBrk="0" hangingPunct="1">
+              <a:lnSpc>
+                <a:spcPct val="100000"/>
+              </a:lnSpc>
+              <a:spcBef>
+                <a:spcPts val="0"/>
+              </a:spcBef>
+              <a:spcAft>
+                <a:spcPts val="0"/>
+              </a:spcAft>
+              <a:buClrTx/>
+              <a:buSzTx/>
+              <a:buFontTx/>
+              <a:buAutoNum type="arabicParenR"/>
+              <a:tabLst/>
+              <a:defRPr/>
+            </a:pPr>
+            <a:r>
+              <a:rPr lang="en-US" dirty="0"/>
+              <a:t>However, the host shouldn’t just look at the location and set the average price for the specific area.  There are other important factors that the host should look at.</a:t>
+            </a:r>
+          </a:p>
+          <a:p>
+            <a:pPr marL="0" indent="0">
+              <a:buNone/>
+            </a:pPr>
+            <a:endParaRPr lang="en-US" dirty="0"/>
+          </a:p>
+          <a:p>
+            <a:pPr marL="0" indent="0">
+              <a:buNone/>
+            </a:pPr>
+            <a:r>
+              <a:rPr lang="en-US" dirty="0"/>
+              <a:t>4)  This includes the size of the unit where the bigger the unit and more accommodation features like bedrooms and bathrooms can increase the rates</a:t>
+            </a:r>
+          </a:p>
+          <a:p>
+            <a:pPr marL="0" marR="0" lvl="0" indent="0" algn="l" defTabSz="914400" rtl="0" eaLnBrk="1" fontAlgn="auto" latinLnBrk="0" hangingPunct="1">
+              <a:lnSpc>
+                <a:spcPct val="100000"/>
+              </a:lnSpc>
+              <a:spcBef>
+                <a:spcPts val="0"/>
+              </a:spcBef>
+              <a:spcAft>
+                <a:spcPts val="0"/>
+              </a:spcAft>
+              <a:buClrTx/>
+              <a:buSzTx/>
+              <a:buFontTx/>
+              <a:buNone/>
+              <a:tabLst/>
+              <a:defRPr/>
+            </a:pPr>
+            <a:endParaRPr lang="en-US" dirty="0"/>
+          </a:p>
+          <a:p>
+            <a:pPr marL="228600" marR="0" lvl="0" indent="-228600" algn="l" defTabSz="914400" rtl="0" eaLnBrk="1" fontAlgn="auto" latinLnBrk="0" hangingPunct="1">
+              <a:lnSpc>
+                <a:spcPct val="100000"/>
+              </a:lnSpc>
+              <a:spcBef>
+                <a:spcPts val="0"/>
+              </a:spcBef>
+              <a:spcAft>
+                <a:spcPts val="0"/>
+              </a:spcAft>
+              <a:buClrTx/>
+              <a:buSzTx/>
+              <a:buFontTx/>
+              <a:buAutoNum type="arabicParenR" startAt="5"/>
+              <a:tabLst/>
+              <a:defRPr/>
+            </a:pPr>
+            <a:r>
+              <a:rPr lang="en-US" dirty="0"/>
+              <a:t>Timing is important as the rates can fluctuate at different times of the year.  Different seasons, holidays, long weekends and regular weekends can help the hosts maximize profits.  </a:t>
+            </a:r>
+          </a:p>
+          <a:p>
+            <a:pPr marL="228600" marR="0" lvl="0" indent="-228600" algn="l" defTabSz="914400" rtl="0" eaLnBrk="1" fontAlgn="auto" latinLnBrk="0" hangingPunct="1">
+              <a:lnSpc>
+                <a:spcPct val="100000"/>
+              </a:lnSpc>
+              <a:spcBef>
+                <a:spcPts val="0"/>
+              </a:spcBef>
+              <a:spcAft>
+                <a:spcPts val="0"/>
+              </a:spcAft>
+              <a:buClrTx/>
+              <a:buSzTx/>
+              <a:buFontTx/>
+              <a:buAutoNum type="arabicParenR" startAt="5"/>
+              <a:tabLst/>
+              <a:defRPr/>
+            </a:pPr>
+            <a:endParaRPr lang="en-US" dirty="0"/>
+          </a:p>
+          <a:p>
+            <a:pPr marL="0" indent="0">
+              <a:buNone/>
+            </a:pPr>
+            <a:r>
+              <a:rPr lang="en-US" dirty="0"/>
+              <a:t>6)  Having more amenities in your units may add a bit value in your unit.  But it is not the first thing customers look into when booking an Airbnb </a:t>
+            </a:r>
+          </a:p>
+          <a:p>
+            <a:pPr marL="0" indent="0">
+              <a:buNone/>
+            </a:pPr>
+            <a:endParaRPr lang="en-US" dirty="0"/>
+          </a:p>
+          <a:p>
             <a:pPr marL="228600" indent="-228600">
               <a:buAutoNum type="arabicParenR"/>
             </a:pPr>
-            <a:r>
-              <a:rPr lang="en-US" dirty="0"/>
-              <a:t>Size of the units and location does matter</a:t>
-            </a:r>
-            <a:r>
-              <a:rPr lang="en-US"/>
-              <a:t>.  </a:t>
-            </a:r>
+            <a:endParaRPr lang="en-US" dirty="0"/>
+          </a:p>
+          <a:p>
+            <a:pPr marL="0" indent="0">
+              <a:buNone/>
+            </a:pPr>
+            <a:endParaRPr lang="en-US" dirty="0"/>
+          </a:p>
+          <a:p>
+            <a:pPr marL="228600" indent="-228600">
+              <a:buAutoNum type="arabicParenR"/>
+            </a:pPr>
+            <a:endParaRPr lang="en-US" dirty="0"/>
+          </a:p>
+          <a:p>
+            <a:pPr marL="228600" indent="-228600">
+              <a:buAutoNum type="arabicParenR"/>
+            </a:pPr>
             <a:endParaRPr lang="en-US" dirty="0"/>
           </a:p>
           <a:p>
@@ -3093,7 +3275,7 @@
           <a:p>
             <a:r>
               <a:rPr lang="en-US" dirty="0"/>
-              <a:t>This table provides an overview of what we need to do to try to find the best fit for the model.  The next few slides will provide a breakdown of what we did to transform the data.</a:t>
+              <a:t>This table provides an overview of what we need to do to try to find the best fit for the model.  As you can see on the grey boxes, we need to work with different types of data and find ways to engineer the data to run the models.  The next few slides will provide a breakdown how we get to the final data to run the model.</a:t>
             </a:r>
           </a:p>
           <a:p>
@@ -6556,7 +6738,7 @@
                   <a:srgbClr val="EA5E46"/>
                 </a:solidFill>
               </a:rPr>
-              <a:t>Model Data Transformation - RF, LGBM, KNN</a:t>
+              <a:t>Model Data Transformation - Regressor</a:t>
             </a:r>
           </a:p>
         </p:txBody>
@@ -7438,7 +7620,7 @@
         <p:spPr>
           <a:xfrm>
             <a:off x="975854" y="1684829"/>
-            <a:ext cx="9518745" cy="1"/>
+            <a:ext cx="10885220" cy="1"/>
           </a:xfrm>
           <a:prstGeom prst="line">
             <a:avLst/>
@@ -8331,7 +8513,7 @@
         <p:spPr>
           <a:xfrm>
             <a:off x="975854" y="1684829"/>
-            <a:ext cx="9518745" cy="1"/>
+            <a:ext cx="10232077" cy="1"/>
           </a:xfrm>
           <a:prstGeom prst="line">
             <a:avLst/>
@@ -8371,7 +8553,7 @@
         </p:nvSpPr>
         <p:spPr>
           <a:xfrm>
-            <a:off x="5124697" y="3525217"/>
+            <a:off x="5015219" y="3855409"/>
             <a:ext cx="2161561" cy="2161561"/>
           </a:xfrm>
           <a:custGeom>
@@ -8504,7 +8686,7 @@
         </p:nvGrpSpPr>
         <p:grpSpPr>
           <a:xfrm>
-            <a:off x="6939798" y="2200873"/>
+            <a:off x="6830320" y="2531065"/>
             <a:ext cx="3019322" cy="1642786"/>
             <a:chOff x="6939798" y="2200873"/>
             <a:chExt cx="3019322" cy="1642786"/>
@@ -8805,7 +8987,7 @@
         </p:nvGrpSpPr>
         <p:grpSpPr>
           <a:xfrm>
-            <a:off x="2523110" y="2200874"/>
+            <a:off x="2413632" y="2531066"/>
             <a:ext cx="3212116" cy="1656041"/>
             <a:chOff x="2523110" y="2200874"/>
             <a:chExt cx="3212116" cy="1656041"/>
@@ -9030,7 +9212,25 @@
               </a:pPr>
               <a:r>
                 <a:rPr lang="en-US" sz="2400" b="1" kern="1200" dirty="0"/>
-                <a:t>Listings Masters</a:t>
+                <a:t>Borough</a:t>
+              </a:r>
+            </a:p>
+            <a:p>
+              <a:pPr marL="0" lvl="0" indent="0" algn="ctr" defTabSz="1066800">
+                <a:lnSpc>
+                  <a:spcPct val="90000"/>
+                </a:lnSpc>
+                <a:spcBef>
+                  <a:spcPct val="0"/>
+                </a:spcBef>
+                <a:spcAft>
+                  <a:spcPct val="35000"/>
+                </a:spcAft>
+                <a:buNone/>
+              </a:pPr>
+              <a:r>
+                <a:rPr lang="en-US" sz="2400" b="1" dirty="0"/>
+                <a:t>Room Type</a:t>
               </a:r>
               <a:endParaRPr lang="en-CA" sz="2400" b="1" kern="1200" dirty="0"/>
             </a:p>
@@ -9560,8 +9760,8 @@
         </p:nvSpPr>
         <p:spPr>
           <a:xfrm>
-            <a:off x="1192261" y="2130316"/>
-            <a:ext cx="9085929" cy="4154984"/>
+            <a:off x="5189140" y="2023108"/>
+            <a:ext cx="6027006" cy="4924425"/>
           </a:xfrm>
           <a:prstGeom prst="rect">
             <a:avLst/>
@@ -9575,7 +9775,7 @@
           <a:lstStyle/>
           <a:p>
             <a:r>
-              <a:rPr lang="en-US" sz="2400" dirty="0"/>
+              <a:rPr lang="en-US" sz="2200" b="1" dirty="0"/>
               <a:t>RF, LGBM, KNN Regressors</a:t>
             </a:r>
           </a:p>
@@ -9619,11 +9819,11 @@
             </a:r>
           </a:p>
           <a:p>
-            <a:endParaRPr lang="en-CA" sz="2800" dirty="0"/>
-          </a:p>
-          <a:p>
-            <a:r>
-              <a:rPr lang="en-US" sz="2400" dirty="0"/>
+            <a:endParaRPr lang="en-CA" sz="2200" b="1" dirty="0"/>
+          </a:p>
+          <a:p>
+            <a:r>
+              <a:rPr lang="en-US" sz="2200" b="1" dirty="0"/>
               <a:t>FB Prophet</a:t>
             </a:r>
           </a:p>
@@ -9637,7 +9837,7 @@
             </a:pPr>
             <a:r>
               <a:rPr lang="en-US" sz="2000" dirty="0"/>
-              <a:t>Add the holiday features, borough and room type information to predict prices.</a:t>
+              <a:t>Group the prices based on borough and room type for the predict future prices.</a:t>
             </a:r>
           </a:p>
           <a:p>
@@ -9652,6 +9852,36 @@
           </a:p>
         </p:txBody>
       </p:sp>
+      <p:pic>
+        <p:nvPicPr>
+          <p:cNvPr id="5" name="Picture 4" descr="A picture containing text, electronics, circuit&#10;&#10;Description automatically generated">
+            <a:extLst>
+              <a:ext uri="{FF2B5EF4-FFF2-40B4-BE49-F238E27FC236}">
+                <a16:creationId xmlns:a16="http://schemas.microsoft.com/office/drawing/2014/main" id="{8A91DF74-149D-4136-B237-C20BD1C174BC}"/>
+              </a:ext>
+            </a:extLst>
+          </p:cNvPr>
+          <p:cNvPicPr>
+            <a:picLocks noChangeAspect="1"/>
+          </p:cNvPicPr>
+          <p:nvPr/>
+        </p:nvPicPr>
+        <p:blipFill>
+          <a:blip r:embed="rId4"/>
+          <a:stretch>
+            <a:fillRect/>
+          </a:stretch>
+        </p:blipFill>
+        <p:spPr>
+          <a:xfrm>
+            <a:off x="975854" y="2111542"/>
+            <a:ext cx="3831276" cy="3714491"/>
+          </a:xfrm>
+          <a:prstGeom prst="rect">
+            <a:avLst/>
+          </a:prstGeom>
+        </p:spPr>
+      </p:pic>
     </p:spTree>
     <p:extLst>
       <p:ext uri="{BB962C8B-B14F-4D97-AF65-F5344CB8AC3E}">
@@ -9891,15 +10121,33 @@
                                   </p:childTnLst>
                                 </p:cTn>
                               </p:par>
+                            </p:childTnLst>
+                          </p:cTn>
+                        </p:par>
+                      </p:childTnLst>
+                    </p:cTn>
+                  </p:par>
+                  <p:par>
+                    <p:cTn id="21" fill="hold">
+                      <p:stCondLst>
+                        <p:cond delay="indefinite"/>
+                      </p:stCondLst>
+                      <p:childTnLst>
+                        <p:par>
+                          <p:cTn id="22" fill="hold">
+                            <p:stCondLst>
+                              <p:cond delay="0"/>
+                            </p:stCondLst>
+                            <p:childTnLst>
                               <p:par>
-                                <p:cTn id="21" presetID="1" presetClass="entr" presetSubtype="0" fill="hold" nodeType="withEffect">
+                                <p:cTn id="23" presetID="1" presetClass="entr" presetSubtype="0" fill="hold" nodeType="clickEffect">
                                   <p:stCondLst>
                                     <p:cond delay="0"/>
                                   </p:stCondLst>
                                   <p:childTnLst>
                                     <p:set>
                                       <p:cBhvr>
-                                        <p:cTn id="22" dur="1" fill="hold">
+                                        <p:cTn id="24" dur="1" fill="hold">
                                           <p:stCondLst>
                                             <p:cond delay="0"/>
                                           </p:stCondLst>
@@ -10004,7 +10252,7 @@
                   <a:srgbClr val="EA5E46"/>
                 </a:solidFill>
               </a:rPr>
-              <a:t>Running the Preprocessing</a:t>
+              <a:t>Running the Model</a:t>
             </a:r>
           </a:p>
         </p:txBody>
@@ -10113,8 +10361,8 @@
         </p:nvSpPr>
         <p:spPr>
           <a:xfrm>
-            <a:off x="1192261" y="2130316"/>
-            <a:ext cx="9085929" cy="2954655"/>
+            <a:off x="846719" y="2022038"/>
+            <a:ext cx="5012596" cy="4062651"/>
           </a:xfrm>
           <a:prstGeom prst="rect">
             <a:avLst/>
@@ -10133,7 +10381,20 @@
             </a:pPr>
             <a:r>
               <a:rPr lang="en-US" sz="2400" dirty="0"/>
-              <a:t>Run the model by fitting the X and y data</a:t>
+              <a:t>Fit X and y data in the model.</a:t>
+            </a:r>
+          </a:p>
+          <a:p>
+            <a:endParaRPr lang="en-US" sz="2400" dirty="0"/>
+          </a:p>
+          <a:p>
+            <a:pPr marL="285750" indent="-285750">
+              <a:buFont typeface="Arial" panose="020B0604020202020204" pitchFamily="34" charset="0"/>
+              <a:buChar char="•"/>
+            </a:pPr>
+            <a:r>
+              <a:rPr lang="en-US" sz="2400" dirty="0"/>
+              <a:t>Hyperparameter Tune the Model </a:t>
             </a:r>
           </a:p>
           <a:p>
@@ -10174,21 +10435,40 @@
             <a:endParaRPr lang="en-US" sz="2400" dirty="0"/>
           </a:p>
           <a:p>
-            <a:pPr marL="285750" indent="-285750">
-              <a:buFont typeface="Arial" panose="020B0604020202020204" pitchFamily="34" charset="0"/>
-              <a:buChar char="•"/>
-            </a:pPr>
-            <a:r>
-              <a:rPr lang="en-US" sz="2400" dirty="0"/>
-              <a:t>Hyperparameter Tune the Model </a:t>
-            </a:r>
-            <a:endParaRPr lang="en-US" dirty="0"/>
-          </a:p>
-          <a:p>
             <a:endParaRPr lang="en-US" dirty="0"/>
           </a:p>
         </p:txBody>
       </p:sp>
+      <p:pic>
+        <p:nvPicPr>
+          <p:cNvPr id="8" name="Picture 7" descr="A picture containing stage, blue&#10;&#10;Description automatically generated">
+            <a:extLst>
+              <a:ext uri="{FF2B5EF4-FFF2-40B4-BE49-F238E27FC236}">
+                <a16:creationId xmlns:a16="http://schemas.microsoft.com/office/drawing/2014/main" id="{D1FE0439-8135-497B-A50E-FECFD154EBC9}"/>
+              </a:ext>
+            </a:extLst>
+          </p:cNvPr>
+          <p:cNvPicPr>
+            <a:picLocks noChangeAspect="1"/>
+          </p:cNvPicPr>
+          <p:nvPr/>
+        </p:nvPicPr>
+        <p:blipFill>
+          <a:blip r:embed="rId4"/>
+          <a:stretch>
+            <a:fillRect/>
+          </a:stretch>
+        </p:blipFill>
+        <p:spPr>
+          <a:xfrm>
+            <a:off x="6096000" y="2022038"/>
+            <a:ext cx="4398599" cy="3621116"/>
+          </a:xfrm>
+          <a:prstGeom prst="rect">
+            <a:avLst/>
+          </a:prstGeom>
+        </p:spPr>
+      </p:pic>
     </p:spTree>
     <p:extLst>
       <p:ext uri="{BB962C8B-B14F-4D97-AF65-F5344CB8AC3E}">
@@ -12209,76 +12489,166 @@
                             </p:stCondLst>
                             <p:childTnLst>
                               <p:par>
-                                <p:cTn id="5" presetID="7" presetClass="emph" presetSubtype="2" fill="hold" nodeType="clickEffect">
+                                <p:cTn id="5" presetID="2" presetClass="entr" presetSubtype="8" fill="hold" nodeType="clickEffect">
                                   <p:stCondLst>
                                     <p:cond delay="0"/>
                                   </p:stCondLst>
                                   <p:childTnLst>
-                                    <p:animClr clrSpc="rgb" dir="cw">
+                                    <p:set>
                                       <p:cBhvr>
-                                        <p:cTn id="6" dur="2000" fill="hold"/>
+                                        <p:cTn id="6" dur="1" fill="hold">
+                                          <p:stCondLst>
+                                            <p:cond delay="0"/>
+                                          </p:stCondLst>
+                                        </p:cTn>
                                         <p:tgtEl>
                                           <p:spTgt spid="8"/>
                                         </p:tgtEl>
                                         <p:attrNameLst>
-                                          <p:attrName>stroke.color</p:attrName>
+                                          <p:attrName>style.visibility</p:attrName>
                                         </p:attrNameLst>
                                       </p:cBhvr>
                                       <p:to>
-                                        <a:schemeClr val="accent2"/>
+                                        <p:strVal val="visible"/>
                                       </p:to>
-                                    </p:animClr>
-                                    <p:set>
-                                      <p:cBhvr>
-                                        <p:cTn id="7" dur="2000" fill="hold"/>
+                                    </p:set>
+                                    <p:anim calcmode="lin" valueType="num">
+                                      <p:cBhvr additive="base">
+                                        <p:cTn id="7" dur="500" fill="hold"/>
                                         <p:tgtEl>
                                           <p:spTgt spid="8"/>
                                         </p:tgtEl>
                                         <p:attrNameLst>
-                                          <p:attrName>stroke.on</p:attrName>
+                                          <p:attrName>ppt_x</p:attrName>
                                         </p:attrNameLst>
                                       </p:cBhvr>
-                                      <p:to>
-                                        <p:strVal val="true"/>
-                                      </p:to>
-                                    </p:set>
+                                      <p:tavLst>
+                                        <p:tav tm="0">
+                                          <p:val>
+                                            <p:strVal val="0-#ppt_w/2"/>
+                                          </p:val>
+                                        </p:tav>
+                                        <p:tav tm="100000">
+                                          <p:val>
+                                            <p:strVal val="#ppt_x"/>
+                                          </p:val>
+                                        </p:tav>
+                                      </p:tavLst>
+                                    </p:anim>
+                                    <p:anim calcmode="lin" valueType="num">
+                                      <p:cBhvr additive="base">
+                                        <p:cTn id="8" dur="500" fill="hold"/>
+                                        <p:tgtEl>
+                                          <p:spTgt spid="8"/>
+                                        </p:tgtEl>
+                                        <p:attrNameLst>
+                                          <p:attrName>ppt_y</p:attrName>
+                                        </p:attrNameLst>
+                                      </p:cBhvr>
+                                      <p:tavLst>
+                                        <p:tav tm="0">
+                                          <p:val>
+                                            <p:strVal val="#ppt_y"/>
+                                          </p:val>
+                                        </p:tav>
+                                        <p:tav tm="100000">
+                                          <p:val>
+                                            <p:strVal val="#ppt_y"/>
+                                          </p:val>
+                                        </p:tav>
+                                      </p:tavLst>
+                                    </p:anim>
                                   </p:childTnLst>
                                 </p:cTn>
                               </p:par>
+                            </p:childTnLst>
+                          </p:cTn>
+                        </p:par>
+                      </p:childTnLst>
+                    </p:cTn>
+                  </p:par>
+                  <p:par>
+                    <p:cTn id="9" fill="hold">
+                      <p:stCondLst>
+                        <p:cond delay="indefinite"/>
+                      </p:stCondLst>
+                      <p:childTnLst>
+                        <p:par>
+                          <p:cTn id="10" fill="hold">
+                            <p:stCondLst>
+                              <p:cond delay="0"/>
+                            </p:stCondLst>
+                            <p:childTnLst>
                               <p:par>
-                                <p:cTn id="8" presetID="7" presetClass="emph" presetSubtype="2" fill="hold" nodeType="withEffect">
+                                <p:cTn id="11" presetID="2" presetClass="entr" presetSubtype="2" fill="hold" nodeType="clickEffect">
                                   <p:stCondLst>
                                     <p:cond delay="0"/>
                                   </p:stCondLst>
                                   <p:childTnLst>
-                                    <p:animClr clrSpc="rgb" dir="cw">
+                                    <p:set>
                                       <p:cBhvr>
-                                        <p:cTn id="9" dur="2000" fill="hold"/>
+                                        <p:cTn id="12" dur="1" fill="hold">
+                                          <p:stCondLst>
+                                            <p:cond delay="0"/>
+                                          </p:stCondLst>
+                                        </p:cTn>
                                         <p:tgtEl>
                                           <p:spTgt spid="4"/>
                                         </p:tgtEl>
                                         <p:attrNameLst>
-                                          <p:attrName>stroke.color</p:attrName>
+                                          <p:attrName>style.visibility</p:attrName>
                                         </p:attrNameLst>
                                       </p:cBhvr>
                                       <p:to>
-                                        <a:schemeClr val="accent2"/>
+                                        <p:strVal val="visible"/>
                                       </p:to>
-                                    </p:animClr>
-                                    <p:set>
-                                      <p:cBhvr>
-                                        <p:cTn id="10" dur="2000" fill="hold"/>
+                                    </p:set>
+                                    <p:anim calcmode="lin" valueType="num">
+                                      <p:cBhvr additive="base">
+                                        <p:cTn id="13" dur="500" fill="hold"/>
                                         <p:tgtEl>
                                           <p:spTgt spid="4"/>
                                         </p:tgtEl>
                                         <p:attrNameLst>
-                                          <p:attrName>stroke.on</p:attrName>
+                                          <p:attrName>ppt_x</p:attrName>
                                         </p:attrNameLst>
                                       </p:cBhvr>
-                                      <p:to>
-                                        <p:strVal val="true"/>
-                                      </p:to>
-                                    </p:set>
+                                      <p:tavLst>
+                                        <p:tav tm="0">
+                                          <p:val>
+                                            <p:strVal val="1+#ppt_w/2"/>
+                                          </p:val>
+                                        </p:tav>
+                                        <p:tav tm="100000">
+                                          <p:val>
+                                            <p:strVal val="#ppt_x"/>
+                                          </p:val>
+                                        </p:tav>
+                                      </p:tavLst>
+                                    </p:anim>
+                                    <p:anim calcmode="lin" valueType="num">
+                                      <p:cBhvr additive="base">
+                                        <p:cTn id="14" dur="500" fill="hold"/>
+                                        <p:tgtEl>
+                                          <p:spTgt spid="4"/>
+                                        </p:tgtEl>
+                                        <p:attrNameLst>
+                                          <p:attrName>ppt_y</p:attrName>
+                                        </p:attrNameLst>
+                                      </p:cBhvr>
+                                      <p:tavLst>
+                                        <p:tav tm="0">
+                                          <p:val>
+                                            <p:strVal val="#ppt_y"/>
+                                          </p:val>
+                                        </p:tav>
+                                        <p:tav tm="100000">
+                                          <p:val>
+                                            <p:strVal val="#ppt_y"/>
+                                          </p:val>
+                                        </p:tav>
+                                      </p:tavLst>
+                                    </p:anim>
                                   </p:childTnLst>
                                 </p:cTn>
                               </p:par>
@@ -12502,42 +12872,6 @@
           </a:prstGeom>
         </p:spPr>
       </p:pic>
-      <p:sp>
-        <p:nvSpPr>
-          <p:cNvPr id="3" name="TextBox 2">
-            <a:extLst>
-              <a:ext uri="{FF2B5EF4-FFF2-40B4-BE49-F238E27FC236}">
-                <a16:creationId xmlns:a16="http://schemas.microsoft.com/office/drawing/2014/main" id="{5CF3346D-03F6-4289-AAAF-32CF6964219B}"/>
-              </a:ext>
-            </a:extLst>
-          </p:cNvPr>
-          <p:cNvSpPr txBox="1"/>
-          <p:nvPr/>
-        </p:nvSpPr>
-        <p:spPr>
-          <a:xfrm>
-            <a:off x="6496334" y="3152633"/>
-            <a:ext cx="3084394" cy="646331"/>
-          </a:xfrm>
-          <a:prstGeom prst="rect">
-            <a:avLst/>
-          </a:prstGeom>
-          <a:noFill/>
-        </p:spPr>
-        <p:txBody>
-          <a:bodyPr wrap="square" rtlCol="0">
-            <a:spAutoFit/>
-          </a:bodyPr>
-          <a:lstStyle/>
-          <a:p>
-            <a:r>
-              <a:rPr lang="en-US" dirty="0"/>
-              <a:t>Fix this slide with legends &amp; description</a:t>
-            </a:r>
-            <a:endParaRPr lang="en-CA" dirty="0"/>
-          </a:p>
-        </p:txBody>
-      </p:sp>
     </p:spTree>
     <p:extLst>
       <p:ext uri="{BB962C8B-B14F-4D97-AF65-F5344CB8AC3E}">
@@ -12719,7 +13053,7 @@
         </p:blipFill>
         <p:spPr>
           <a:xfrm>
-            <a:off x="2166447" y="1947483"/>
+            <a:off x="2210492" y="1947483"/>
             <a:ext cx="7716313" cy="4595107"/>
           </a:xfrm>
           <a:prstGeom prst="rect">
@@ -12789,136 +13123,6 @@
           </a:p>
         </p:txBody>
       </p:sp>
-      <p:cxnSp>
-        <p:nvCxnSpPr>
-          <p:cNvPr id="10" name="Straight Arrow Connector 9">
-            <a:extLst>
-              <a:ext uri="{FF2B5EF4-FFF2-40B4-BE49-F238E27FC236}">
-                <a16:creationId xmlns:a16="http://schemas.microsoft.com/office/drawing/2014/main" id="{02B51C1E-AFB6-4F36-9667-D4D4FC9DFBD4}"/>
-              </a:ext>
-            </a:extLst>
-          </p:cNvPr>
-          <p:cNvCxnSpPr>
-            <a:cxnSpLocks/>
-          </p:cNvCxnSpPr>
-          <p:nvPr/>
-        </p:nvCxnSpPr>
-        <p:spPr>
-          <a:xfrm flipV="1">
-            <a:off x="2898241" y="4512281"/>
-            <a:ext cx="3432221" cy="909734"/>
-          </a:xfrm>
-          <a:prstGeom prst="straightConnector1">
-            <a:avLst/>
-          </a:prstGeom>
-          <a:ln>
-            <a:solidFill>
-              <a:srgbClr val="E9766F"/>
-            </a:solidFill>
-            <a:tailEnd type="triangle"/>
-          </a:ln>
-        </p:spPr>
-        <p:style>
-          <a:lnRef idx="1">
-            <a:schemeClr val="accent1"/>
-          </a:lnRef>
-          <a:fillRef idx="0">
-            <a:schemeClr val="accent1"/>
-          </a:fillRef>
-          <a:effectRef idx="0">
-            <a:schemeClr val="accent1"/>
-          </a:effectRef>
-          <a:fontRef idx="minor">
-            <a:schemeClr val="tx1"/>
-          </a:fontRef>
-        </p:style>
-      </p:cxnSp>
-      <p:cxnSp>
-        <p:nvCxnSpPr>
-          <p:cNvPr id="13" name="Straight Arrow Connector 12">
-            <a:extLst>
-              <a:ext uri="{FF2B5EF4-FFF2-40B4-BE49-F238E27FC236}">
-                <a16:creationId xmlns:a16="http://schemas.microsoft.com/office/drawing/2014/main" id="{32C4B5B3-31F4-4CB1-9C09-402CEC3528A5}"/>
-              </a:ext>
-            </a:extLst>
-          </p:cNvPr>
-          <p:cNvCxnSpPr>
-            <a:cxnSpLocks/>
-          </p:cNvCxnSpPr>
-          <p:nvPr/>
-        </p:nvCxnSpPr>
-        <p:spPr>
-          <a:xfrm>
-            <a:off x="6459415" y="4516871"/>
-            <a:ext cx="1148862" cy="694458"/>
-          </a:xfrm>
-          <a:prstGeom prst="straightConnector1">
-            <a:avLst/>
-          </a:prstGeom>
-          <a:ln>
-            <a:solidFill>
-              <a:srgbClr val="E9766F"/>
-            </a:solidFill>
-            <a:tailEnd type="triangle"/>
-          </a:ln>
-        </p:spPr>
-        <p:style>
-          <a:lnRef idx="1">
-            <a:schemeClr val="accent1"/>
-          </a:lnRef>
-          <a:fillRef idx="0">
-            <a:schemeClr val="accent1"/>
-          </a:fillRef>
-          <a:effectRef idx="0">
-            <a:schemeClr val="accent1"/>
-          </a:effectRef>
-          <a:fontRef idx="minor">
-            <a:schemeClr val="tx1"/>
-          </a:fontRef>
-        </p:style>
-      </p:cxnSp>
-      <p:cxnSp>
-        <p:nvCxnSpPr>
-          <p:cNvPr id="19" name="Straight Arrow Connector 18">
-            <a:extLst>
-              <a:ext uri="{FF2B5EF4-FFF2-40B4-BE49-F238E27FC236}">
-                <a16:creationId xmlns:a16="http://schemas.microsoft.com/office/drawing/2014/main" id="{FB50FF0B-BB31-4DFF-A8F8-D9B8D6934C60}"/>
-              </a:ext>
-            </a:extLst>
-          </p:cNvPr>
-          <p:cNvCxnSpPr/>
-          <p:nvPr/>
-        </p:nvCxnSpPr>
-        <p:spPr>
-          <a:xfrm flipV="1">
-            <a:off x="7819292" y="5027199"/>
-            <a:ext cx="1688123" cy="99778"/>
-          </a:xfrm>
-          <a:prstGeom prst="straightConnector1">
-            <a:avLst/>
-          </a:prstGeom>
-          <a:ln>
-            <a:solidFill>
-              <a:srgbClr val="E9766F"/>
-            </a:solidFill>
-            <a:tailEnd type="triangle"/>
-          </a:ln>
-        </p:spPr>
-        <p:style>
-          <a:lnRef idx="1">
-            <a:schemeClr val="accent1"/>
-          </a:lnRef>
-          <a:fillRef idx="0">
-            <a:schemeClr val="accent1"/>
-          </a:fillRef>
-          <a:effectRef idx="0">
-            <a:schemeClr val="accent1"/>
-          </a:effectRef>
-          <a:fontRef idx="minor">
-            <a:schemeClr val="tx1"/>
-          </a:fontRef>
-        </p:style>
-      </p:cxnSp>
       <p:sp>
         <p:nvSpPr>
           <p:cNvPr id="21" name="Rectangle 20">
@@ -12932,9 +13136,9 @@
           <p:nvPr/>
         </p:nvSpPr>
         <p:spPr>
-          <a:xfrm>
-            <a:off x="2802231" y="5582070"/>
-            <a:ext cx="2107513" cy="436680"/>
+          <a:xfrm rot="20408569">
+            <a:off x="3602804" y="5123976"/>
+            <a:ext cx="2148592" cy="467036"/>
           </a:xfrm>
           <a:prstGeom prst="rect">
             <a:avLst/>
@@ -13043,6 +13247,135 @@
           </a:p>
         </p:txBody>
       </p:sp>
+      <p:cxnSp>
+        <p:nvCxnSpPr>
+          <p:cNvPr id="9" name="Straight Connector 8">
+            <a:extLst>
+              <a:ext uri="{FF2B5EF4-FFF2-40B4-BE49-F238E27FC236}">
+                <a16:creationId xmlns:a16="http://schemas.microsoft.com/office/drawing/2014/main" id="{0172F6F4-FECA-429C-99CA-86FF72CF4DDF}"/>
+              </a:ext>
+            </a:extLst>
+          </p:cNvPr>
+          <p:cNvCxnSpPr>
+            <a:cxnSpLocks/>
+          </p:cNvCxnSpPr>
+          <p:nvPr/>
+        </p:nvCxnSpPr>
+        <p:spPr>
+          <a:xfrm flipV="1">
+            <a:off x="3213463" y="4598126"/>
+            <a:ext cx="3252651" cy="862148"/>
+          </a:xfrm>
+          <a:prstGeom prst="line">
+            <a:avLst/>
+          </a:prstGeom>
+          <a:ln>
+            <a:solidFill>
+              <a:srgbClr val="E87572"/>
+            </a:solidFill>
+          </a:ln>
+        </p:spPr>
+        <p:style>
+          <a:lnRef idx="1">
+            <a:schemeClr val="accent1"/>
+          </a:lnRef>
+          <a:fillRef idx="0">
+            <a:schemeClr val="accent1"/>
+          </a:fillRef>
+          <a:effectRef idx="0">
+            <a:schemeClr val="accent1"/>
+          </a:effectRef>
+          <a:fontRef idx="minor">
+            <a:schemeClr val="tx1"/>
+          </a:fontRef>
+        </p:style>
+      </p:cxnSp>
+      <p:cxnSp>
+        <p:nvCxnSpPr>
+          <p:cNvPr id="14" name="Straight Connector 13">
+            <a:extLst>
+              <a:ext uri="{FF2B5EF4-FFF2-40B4-BE49-F238E27FC236}">
+                <a16:creationId xmlns:a16="http://schemas.microsoft.com/office/drawing/2014/main" id="{27FEABED-0D4F-4EDF-9844-022968BC9BE5}"/>
+              </a:ext>
+            </a:extLst>
+          </p:cNvPr>
+          <p:cNvCxnSpPr>
+            <a:cxnSpLocks/>
+          </p:cNvCxnSpPr>
+          <p:nvPr/>
+        </p:nvCxnSpPr>
+        <p:spPr>
+          <a:xfrm>
+            <a:off x="6466114" y="4598126"/>
+            <a:ext cx="1240972" cy="431074"/>
+          </a:xfrm>
+          <a:prstGeom prst="line">
+            <a:avLst/>
+          </a:prstGeom>
+          <a:ln>
+            <a:solidFill>
+              <a:srgbClr val="E87572"/>
+            </a:solidFill>
+          </a:ln>
+        </p:spPr>
+        <p:style>
+          <a:lnRef idx="1">
+            <a:schemeClr val="accent1"/>
+          </a:lnRef>
+          <a:fillRef idx="0">
+            <a:schemeClr val="accent1"/>
+          </a:fillRef>
+          <a:effectRef idx="0">
+            <a:schemeClr val="accent1"/>
+          </a:effectRef>
+          <a:fontRef idx="minor">
+            <a:schemeClr val="tx1"/>
+          </a:fontRef>
+        </p:style>
+      </p:cxnSp>
+      <p:cxnSp>
+        <p:nvCxnSpPr>
+          <p:cNvPr id="18" name="Straight Connector 17">
+            <a:extLst>
+              <a:ext uri="{FF2B5EF4-FFF2-40B4-BE49-F238E27FC236}">
+                <a16:creationId xmlns:a16="http://schemas.microsoft.com/office/drawing/2014/main" id="{BC280AAD-A953-4CA5-9C58-EF28D7976935}"/>
+              </a:ext>
+            </a:extLst>
+          </p:cNvPr>
+          <p:cNvCxnSpPr>
+            <a:cxnSpLocks/>
+          </p:cNvCxnSpPr>
+          <p:nvPr/>
+        </p:nvCxnSpPr>
+        <p:spPr>
+          <a:xfrm flipV="1">
+            <a:off x="7696546" y="4908730"/>
+            <a:ext cx="1813214" cy="120470"/>
+          </a:xfrm>
+          <a:prstGeom prst="line">
+            <a:avLst/>
+          </a:prstGeom>
+          <a:ln>
+            <a:solidFill>
+              <a:srgbClr val="E87572"/>
+            </a:solidFill>
+          </a:ln>
+        </p:spPr>
+        <p:style>
+          <a:lnRef idx="1">
+            <a:schemeClr val="accent1"/>
+          </a:lnRef>
+          <a:fillRef idx="0">
+            <a:schemeClr val="accent1"/>
+          </a:fillRef>
+          <a:effectRef idx="0">
+            <a:schemeClr val="accent1"/>
+          </a:effectRef>
+          <a:fontRef idx="minor">
+            <a:schemeClr val="tx1"/>
+          </a:fontRef>
+        </p:style>
+      </p:cxnSp>
     </p:spTree>
     <p:extLst>
       <p:ext uri="{BB962C8B-B14F-4D97-AF65-F5344CB8AC3E}">
@@ -13100,68 +13433,15 @@
                                   </p:childTnLst>
                                 </p:cTn>
                               </p:par>
-                            </p:childTnLst>
-                          </p:cTn>
-                        </p:par>
-                      </p:childTnLst>
-                    </p:cTn>
-                  </p:par>
-                  <p:par>
-                    <p:cTn id="7" fill="hold">
-                      <p:stCondLst>
-                        <p:cond delay="indefinite"/>
-                      </p:stCondLst>
-                      <p:childTnLst>
-                        <p:par>
-                          <p:cTn id="8" fill="hold">
-                            <p:stCondLst>
-                              <p:cond delay="0"/>
-                            </p:stCondLst>
-                            <p:childTnLst>
                               <p:par>
-                                <p:cTn id="9" presetID="14" presetClass="entr" presetSubtype="10" fill="hold" nodeType="clickEffect">
+                                <p:cTn id="7" presetID="14" presetClass="entr" presetSubtype="10" fill="hold" grpId="0" nodeType="withEffect">
                                   <p:stCondLst>
                                     <p:cond delay="0"/>
                                   </p:stCondLst>
                                   <p:childTnLst>
                                     <p:set>
                                       <p:cBhvr>
-                                        <p:cTn id="10" dur="1" fill="hold">
-                                          <p:stCondLst>
-                                            <p:cond delay="0"/>
-                                          </p:stCondLst>
-                                        </p:cTn>
-                                        <p:tgtEl>
-                                          <p:spTgt spid="10"/>
-                                        </p:tgtEl>
-                                        <p:attrNameLst>
-                                          <p:attrName>style.visibility</p:attrName>
-                                        </p:attrNameLst>
-                                      </p:cBhvr>
-                                      <p:to>
-                                        <p:strVal val="visible"/>
-                                      </p:to>
-                                    </p:set>
-                                    <p:animEffect transition="in" filter="randombar(horizontal)">
-                                      <p:cBhvr>
-                                        <p:cTn id="11" dur="500"/>
-                                        <p:tgtEl>
-                                          <p:spTgt spid="10"/>
-                                        </p:tgtEl>
-                                      </p:cBhvr>
-                                    </p:animEffect>
-                                  </p:childTnLst>
-                                </p:cTn>
-                              </p:par>
-                              <p:par>
-                                <p:cTn id="12" presetID="14" presetClass="entr" presetSubtype="10" fill="hold" grpId="0" nodeType="withEffect">
-                                  <p:stCondLst>
-                                    <p:cond delay="0"/>
-                                  </p:stCondLst>
-                                  <p:childTnLst>
-                                    <p:set>
-                                      <p:cBhvr>
-                                        <p:cTn id="13" dur="1" fill="hold">
+                                        <p:cTn id="8" dur="1" fill="hold">
                                           <p:stCondLst>
                                             <p:cond delay="0"/>
                                           </p:stCondLst>
@@ -13179,7 +13459,7 @@
                                     </p:set>
                                     <p:animEffect transition="in" filter="randombar(horizontal)">
                                       <p:cBhvr>
-                                        <p:cTn id="14" dur="500"/>
+                                        <p:cTn id="9" dur="500"/>
                                         <p:tgtEl>
                                           <p:spTgt spid="21"/>
                                         </p:tgtEl>
@@ -13188,68 +13468,15 @@
                                   </p:childTnLst>
                                 </p:cTn>
                               </p:par>
-                            </p:childTnLst>
-                          </p:cTn>
-                        </p:par>
-                      </p:childTnLst>
-                    </p:cTn>
-                  </p:par>
-                  <p:par>
-                    <p:cTn id="15" fill="hold">
-                      <p:stCondLst>
-                        <p:cond delay="indefinite"/>
-                      </p:stCondLst>
-                      <p:childTnLst>
-                        <p:par>
-                          <p:cTn id="16" fill="hold">
-                            <p:stCondLst>
-                              <p:cond delay="0"/>
-                            </p:stCondLst>
-                            <p:childTnLst>
                               <p:par>
-                                <p:cTn id="17" presetID="14" presetClass="entr" presetSubtype="10" fill="hold" nodeType="clickEffect">
+                                <p:cTn id="10" presetID="14" presetClass="entr" presetSubtype="10" fill="hold" grpId="0" nodeType="withEffect">
                                   <p:stCondLst>
                                     <p:cond delay="0"/>
                                   </p:stCondLst>
                                   <p:childTnLst>
                                     <p:set>
                                       <p:cBhvr>
-                                        <p:cTn id="18" dur="1" fill="hold">
-                                          <p:stCondLst>
-                                            <p:cond delay="0"/>
-                                          </p:stCondLst>
-                                        </p:cTn>
-                                        <p:tgtEl>
-                                          <p:spTgt spid="13"/>
-                                        </p:tgtEl>
-                                        <p:attrNameLst>
-                                          <p:attrName>style.visibility</p:attrName>
-                                        </p:attrNameLst>
-                                      </p:cBhvr>
-                                      <p:to>
-                                        <p:strVal val="visible"/>
-                                      </p:to>
-                                    </p:set>
-                                    <p:animEffect transition="in" filter="randombar(horizontal)">
-                                      <p:cBhvr>
-                                        <p:cTn id="19" dur="500"/>
-                                        <p:tgtEl>
-                                          <p:spTgt spid="13"/>
-                                        </p:tgtEl>
-                                      </p:cBhvr>
-                                    </p:animEffect>
-                                  </p:childTnLst>
-                                </p:cTn>
-                              </p:par>
-                              <p:par>
-                                <p:cTn id="20" presetID="14" presetClass="entr" presetSubtype="10" fill="hold" grpId="0" nodeType="withEffect">
-                                  <p:stCondLst>
-                                    <p:cond delay="0"/>
-                                  </p:stCondLst>
-                                  <p:childTnLst>
-                                    <p:set>
-                                      <p:cBhvr>
-                                        <p:cTn id="21" dur="1" fill="hold">
+                                        <p:cTn id="11" dur="1" fill="hold">
                                           <p:stCondLst>
                                             <p:cond delay="0"/>
                                           </p:stCondLst>
@@ -13267,7 +13494,7 @@
                                     </p:set>
                                     <p:animEffect transition="in" filter="randombar(horizontal)">
                                       <p:cBhvr>
-                                        <p:cTn id="22" dur="500"/>
+                                        <p:cTn id="12" dur="500"/>
                                         <p:tgtEl>
                                           <p:spTgt spid="5"/>
                                         </p:tgtEl>
@@ -13276,68 +13503,15 @@
                                   </p:childTnLst>
                                 </p:cTn>
                               </p:par>
-                            </p:childTnLst>
-                          </p:cTn>
-                        </p:par>
-                      </p:childTnLst>
-                    </p:cTn>
-                  </p:par>
-                  <p:par>
-                    <p:cTn id="23" fill="hold">
-                      <p:stCondLst>
-                        <p:cond delay="indefinite"/>
-                      </p:stCondLst>
-                      <p:childTnLst>
-                        <p:par>
-                          <p:cTn id="24" fill="hold">
-                            <p:stCondLst>
-                              <p:cond delay="0"/>
-                            </p:stCondLst>
-                            <p:childTnLst>
                               <p:par>
-                                <p:cTn id="25" presetID="14" presetClass="entr" presetSubtype="10" fill="hold" nodeType="clickEffect">
+                                <p:cTn id="13" presetID="14" presetClass="entr" presetSubtype="10" fill="hold" grpId="0" nodeType="withEffect">
                                   <p:stCondLst>
                                     <p:cond delay="0"/>
                                   </p:stCondLst>
                                   <p:childTnLst>
                                     <p:set>
                                       <p:cBhvr>
-                                        <p:cTn id="26" dur="1" fill="hold">
-                                          <p:stCondLst>
-                                            <p:cond delay="0"/>
-                                          </p:stCondLst>
-                                        </p:cTn>
-                                        <p:tgtEl>
-                                          <p:spTgt spid="19"/>
-                                        </p:tgtEl>
-                                        <p:attrNameLst>
-                                          <p:attrName>style.visibility</p:attrName>
-                                        </p:attrNameLst>
-                                      </p:cBhvr>
-                                      <p:to>
-                                        <p:strVal val="visible"/>
-                                      </p:to>
-                                    </p:set>
-                                    <p:animEffect transition="in" filter="randombar(horizontal)">
-                                      <p:cBhvr>
-                                        <p:cTn id="27" dur="500"/>
-                                        <p:tgtEl>
-                                          <p:spTgt spid="19"/>
-                                        </p:tgtEl>
-                                      </p:cBhvr>
-                                    </p:animEffect>
-                                  </p:childTnLst>
-                                </p:cTn>
-                              </p:par>
-                              <p:par>
-                                <p:cTn id="28" presetID="14" presetClass="entr" presetSubtype="10" fill="hold" grpId="0" nodeType="withEffect">
-                                  <p:stCondLst>
-                                    <p:cond delay="0"/>
-                                  </p:stCondLst>
-                                  <p:childTnLst>
-                                    <p:set>
-                                      <p:cBhvr>
-                                        <p:cTn id="29" dur="1" fill="hold">
+                                        <p:cTn id="14" dur="1" fill="hold">
                                           <p:stCondLst>
                                             <p:cond delay="0"/>
                                           </p:stCondLst>
@@ -13355,7 +13529,7 @@
                                     </p:set>
                                     <p:animEffect transition="in" filter="randombar(horizontal)">
                                       <p:cBhvr>
-                                        <p:cTn id="30" dur="500"/>
+                                        <p:cTn id="15" dur="500"/>
                                         <p:tgtEl>
                                           <p:spTgt spid="22"/>
                                         </p:tgtEl>
@@ -14628,8 +14802,8 @@
         </p:nvSpPr>
         <p:spPr>
           <a:xfrm>
-            <a:off x="1055716" y="2073264"/>
-            <a:ext cx="8537171" cy="3970318"/>
+            <a:off x="4863103" y="2023108"/>
+            <a:ext cx="6233358" cy="4801314"/>
           </a:xfrm>
           <a:prstGeom prst="rect">
             <a:avLst/>
@@ -14678,7 +14852,7 @@
             </a:pPr>
             <a:r>
               <a:rPr lang="en-CA" dirty="0"/>
-              <a:t>Do extensive research on how neighbours price their units considering the room type they have.</a:t>
+              <a:t>Do extensive research on how neighbours price their units based on the size of the unit.</a:t>
             </a:r>
           </a:p>
           <a:p>
@@ -14716,10 +14890,57 @@
             </a:r>
           </a:p>
           <a:p>
+            <a:pPr marL="285750" indent="-285750">
+              <a:buFont typeface="Arial" panose="020B0604020202020204" pitchFamily="34" charset="0"/>
+              <a:buChar char="•"/>
+            </a:pPr>
+            <a:endParaRPr lang="en-CA" dirty="0"/>
+          </a:p>
+          <a:p>
+            <a:pPr marL="285750" indent="-285750">
+              <a:buFont typeface="Arial" panose="020B0604020202020204" pitchFamily="34" charset="0"/>
+              <a:buChar char="•"/>
+            </a:pPr>
+            <a:r>
+              <a:rPr lang="en-CA" dirty="0"/>
+              <a:t>Beware of major news events or pandemic crisis that may decrease occupancy rates dramatically.</a:t>
+            </a:r>
+          </a:p>
+          <a:p>
             <a:endParaRPr lang="en-CA" dirty="0"/>
           </a:p>
         </p:txBody>
       </p:sp>
+      <p:pic>
+        <p:nvPicPr>
+          <p:cNvPr id="4" name="Picture 3" descr="Icon&#10;&#10;Description automatically generated">
+            <a:extLst>
+              <a:ext uri="{FF2B5EF4-FFF2-40B4-BE49-F238E27FC236}">
+                <a16:creationId xmlns:a16="http://schemas.microsoft.com/office/drawing/2014/main" id="{E911EBA5-101D-4B4B-8A77-A373C2701F41}"/>
+              </a:ext>
+            </a:extLst>
+          </p:cNvPr>
+          <p:cNvPicPr>
+            <a:picLocks noChangeAspect="1"/>
+          </p:cNvPicPr>
+          <p:nvPr/>
+        </p:nvPicPr>
+        <p:blipFill>
+          <a:blip r:embed="rId4"/>
+          <a:stretch>
+            <a:fillRect/>
+          </a:stretch>
+        </p:blipFill>
+        <p:spPr>
+          <a:xfrm>
+            <a:off x="991472" y="2097432"/>
+            <a:ext cx="3578153" cy="3578153"/>
+          </a:xfrm>
+          <a:prstGeom prst="rect">
+            <a:avLst/>
+          </a:prstGeom>
+        </p:spPr>
+      </p:pic>
     </p:spTree>
     <p:extLst>
       <p:ext uri="{BB962C8B-B14F-4D97-AF65-F5344CB8AC3E}">
@@ -14784,7 +15005,7 @@
                   <a:srgbClr val="EA5E46"/>
                 </a:solidFill>
               </a:rPr>
-              <a:t>Next Steps</a:t>
+              <a:t>Looking into the Future</a:t>
             </a:r>
           </a:p>
         </p:txBody>
@@ -14893,8 +15114,8 @@
         </p:nvSpPr>
         <p:spPr>
           <a:xfrm>
-            <a:off x="1263535" y="1837113"/>
-            <a:ext cx="8761614" cy="4247317"/>
+            <a:off x="975854" y="1971224"/>
+            <a:ext cx="5399079" cy="5078313"/>
           </a:xfrm>
           <a:prstGeom prst="rect">
             <a:avLst/>
@@ -15042,6 +15263,36 @@
           </a:p>
         </p:txBody>
       </p:sp>
+      <p:pic>
+        <p:nvPicPr>
+          <p:cNvPr id="8" name="Picture 7" descr="A picture containing silhouette, sunset, clouds&#10;&#10;Description automatically generated">
+            <a:extLst>
+              <a:ext uri="{FF2B5EF4-FFF2-40B4-BE49-F238E27FC236}">
+                <a16:creationId xmlns:a16="http://schemas.microsoft.com/office/drawing/2014/main" id="{26FFD1AC-4CCD-4302-BAE5-C390F3E50703}"/>
+              </a:ext>
+            </a:extLst>
+          </p:cNvPr>
+          <p:cNvPicPr>
+            <a:picLocks noChangeAspect="1"/>
+          </p:cNvPicPr>
+          <p:nvPr/>
+        </p:nvPicPr>
+        <p:blipFill>
+          <a:blip r:embed="rId4"/>
+          <a:stretch>
+            <a:fillRect/>
+          </a:stretch>
+        </p:blipFill>
+        <p:spPr>
+          <a:xfrm>
+            <a:off x="6820223" y="2022038"/>
+            <a:ext cx="4582565" cy="4235060"/>
+          </a:xfrm>
+          <a:prstGeom prst="rect">
+            <a:avLst/>
+          </a:prstGeom>
+        </p:spPr>
+      </p:pic>
     </p:spTree>
     <p:extLst>
       <p:ext uri="{BB962C8B-B14F-4D97-AF65-F5344CB8AC3E}">
@@ -15583,6 +15834,1013 @@
                   <a:srgbClr val="EA5E46"/>
                 </a:solidFill>
               </a:rPr>
+              <a:t>Database Change</a:t>
+            </a:r>
+          </a:p>
+        </p:txBody>
+      </p:sp>
+      <p:pic>
+        <p:nvPicPr>
+          <p:cNvPr id="2050" name="Picture 2" descr="Image result for air bnb logo">
+            <a:extLst>
+              <a:ext uri="{FF2B5EF4-FFF2-40B4-BE49-F238E27FC236}">
+                <a16:creationId xmlns:a16="http://schemas.microsoft.com/office/drawing/2014/main" id="{A162C291-208B-BE48-BF44-7D5CD7EF6151}"/>
+              </a:ext>
+            </a:extLst>
+          </p:cNvPr>
+          <p:cNvPicPr>
+            <a:picLocks noChangeAspect="1" noChangeArrowheads="1"/>
+          </p:cNvPicPr>
+          <p:nvPr/>
+        </p:nvPicPr>
+        <p:blipFill>
+          <a:blip r:embed="rId3">
+            <a:extLst>
+              <a:ext uri="{28A0092B-C50C-407E-A947-70E740481C1C}">
+                <a14:useLocalDpi xmlns:a14="http://schemas.microsoft.com/office/drawing/2010/main" val="0"/>
+              </a:ext>
+            </a:extLst>
+          </a:blip>
+          <a:srcRect/>
+          <a:stretch>
+            <a:fillRect/>
+          </a:stretch>
+        </p:blipFill>
+        <p:spPr bwMode="auto">
+          <a:xfrm>
+            <a:off x="469817" y="108280"/>
+            <a:ext cx="2189605" cy="2022038"/>
+          </a:xfrm>
+          <a:prstGeom prst="rect">
+            <a:avLst/>
+          </a:prstGeom>
+          <a:noFill/>
+          <a:extLst>
+            <a:ext uri="{909E8E84-426E-40DD-AFC4-6F175D3DCCD1}">
+              <a14:hiddenFill xmlns:a14="http://schemas.microsoft.com/office/drawing/2010/main">
+                <a:solidFill>
+                  <a:srgbClr val="FFFFFF"/>
+                </a:solidFill>
+              </a14:hiddenFill>
+            </a:ext>
+          </a:extLst>
+        </p:spPr>
+      </p:pic>
+      <p:cxnSp>
+        <p:nvCxnSpPr>
+          <p:cNvPr id="6" name="Straight Connector 5">
+            <a:extLst>
+              <a:ext uri="{FF2B5EF4-FFF2-40B4-BE49-F238E27FC236}">
+                <a16:creationId xmlns:a16="http://schemas.microsoft.com/office/drawing/2014/main" id="{7D0926DC-6298-B648-9DF9-0D78D09F9FC8}"/>
+              </a:ext>
+            </a:extLst>
+          </p:cNvPr>
+          <p:cNvCxnSpPr>
+            <a:cxnSpLocks/>
+          </p:cNvCxnSpPr>
+          <p:nvPr/>
+        </p:nvCxnSpPr>
+        <p:spPr>
+          <a:xfrm>
+            <a:off x="975854" y="1822090"/>
+            <a:ext cx="9518745" cy="1"/>
+          </a:xfrm>
+          <a:prstGeom prst="line">
+            <a:avLst/>
+          </a:prstGeom>
+          <a:ln w="12700">
+            <a:solidFill>
+              <a:srgbClr val="EA5E46"/>
+            </a:solidFill>
+          </a:ln>
+        </p:spPr>
+        <p:style>
+          <a:lnRef idx="1">
+            <a:schemeClr val="accent2"/>
+          </a:lnRef>
+          <a:fillRef idx="0">
+            <a:schemeClr val="accent2"/>
+          </a:fillRef>
+          <a:effectRef idx="0">
+            <a:schemeClr val="accent2"/>
+          </a:effectRef>
+          <a:fontRef idx="minor">
+            <a:schemeClr val="tx1"/>
+          </a:fontRef>
+        </p:style>
+      </p:cxnSp>
+      <p:sp>
+        <p:nvSpPr>
+          <p:cNvPr id="5" name="Freeform: Shape 4">
+            <a:extLst>
+              <a:ext uri="{FF2B5EF4-FFF2-40B4-BE49-F238E27FC236}">
+                <a16:creationId xmlns:a16="http://schemas.microsoft.com/office/drawing/2014/main" id="{0F5E79D5-6DE8-4064-8485-34A459D016F8}"/>
+              </a:ext>
+            </a:extLst>
+          </p:cNvPr>
+          <p:cNvSpPr/>
+          <p:nvPr/>
+        </p:nvSpPr>
+        <p:spPr>
+          <a:xfrm>
+            <a:off x="2032447" y="2594267"/>
+            <a:ext cx="3936999" cy="3936999"/>
+          </a:xfrm>
+          <a:custGeom>
+            <a:avLst/>
+            <a:gdLst>
+              <a:gd name="connsiteX0" fmla="*/ 0 w 3936999"/>
+              <a:gd name="connsiteY0" fmla="*/ 2559049 h 3936999"/>
+              <a:gd name="connsiteX1" fmla="*/ 984250 w 3936999"/>
+              <a:gd name="connsiteY1" fmla="*/ 2559049 h 3936999"/>
+              <a:gd name="connsiteX2" fmla="*/ 984250 w 3936999"/>
+              <a:gd name="connsiteY2" fmla="*/ 0 h 3936999"/>
+              <a:gd name="connsiteX3" fmla="*/ 2952749 w 3936999"/>
+              <a:gd name="connsiteY3" fmla="*/ 0 h 3936999"/>
+              <a:gd name="connsiteX4" fmla="*/ 2952749 w 3936999"/>
+              <a:gd name="connsiteY4" fmla="*/ 2559049 h 3936999"/>
+              <a:gd name="connsiteX5" fmla="*/ 3936999 w 3936999"/>
+              <a:gd name="connsiteY5" fmla="*/ 2559049 h 3936999"/>
+              <a:gd name="connsiteX6" fmla="*/ 1968500 w 3936999"/>
+              <a:gd name="connsiteY6" fmla="*/ 3936999 h 3936999"/>
+              <a:gd name="connsiteX7" fmla="*/ 0 w 3936999"/>
+              <a:gd name="connsiteY7" fmla="*/ 2559049 h 3936999"/>
+            </a:gdLst>
+            <a:ahLst/>
+            <a:cxnLst>
+              <a:cxn ang="0">
+                <a:pos x="connsiteX0" y="connsiteY0"/>
+              </a:cxn>
+              <a:cxn ang="0">
+                <a:pos x="connsiteX1" y="connsiteY1"/>
+              </a:cxn>
+              <a:cxn ang="0">
+                <a:pos x="connsiteX2" y="connsiteY2"/>
+              </a:cxn>
+              <a:cxn ang="0">
+                <a:pos x="connsiteX3" y="connsiteY3"/>
+              </a:cxn>
+              <a:cxn ang="0">
+                <a:pos x="connsiteX4" y="connsiteY4"/>
+              </a:cxn>
+              <a:cxn ang="0">
+                <a:pos x="connsiteX5" y="connsiteY5"/>
+              </a:cxn>
+              <a:cxn ang="0">
+                <a:pos x="connsiteX6" y="connsiteY6"/>
+              </a:cxn>
+              <a:cxn ang="0">
+                <a:pos x="connsiteX7" y="connsiteY7"/>
+              </a:cxn>
+            </a:cxnLst>
+            <a:rect l="l" t="t" r="r" b="b"/>
+            <a:pathLst>
+              <a:path w="3936999" h="3936999">
+                <a:moveTo>
+                  <a:pt x="2559049" y="3936999"/>
+                </a:moveTo>
+                <a:lnTo>
+                  <a:pt x="2559049" y="2952749"/>
+                </a:lnTo>
+                <a:lnTo>
+                  <a:pt x="0" y="2952749"/>
+                </a:lnTo>
+                <a:lnTo>
+                  <a:pt x="0" y="984250"/>
+                </a:lnTo>
+                <a:lnTo>
+                  <a:pt x="2559049" y="984250"/>
+                </a:lnTo>
+                <a:lnTo>
+                  <a:pt x="2559049" y="0"/>
+                </a:lnTo>
+                <a:lnTo>
+                  <a:pt x="3936999" y="1968499"/>
+                </a:lnTo>
+                <a:lnTo>
+                  <a:pt x="2559049" y="3936999"/>
+                </a:lnTo>
+                <a:close/>
+              </a:path>
+            </a:pathLst>
+          </a:custGeom>
+          <a:solidFill>
+            <a:schemeClr val="bg2">
+              <a:lumMod val="75000"/>
+            </a:schemeClr>
+          </a:solidFill>
+        </p:spPr>
+        <p:style>
+          <a:lnRef idx="2">
+            <a:schemeClr val="lt1">
+              <a:hueOff val="0"/>
+              <a:satOff val="0"/>
+              <a:lumOff val="0"/>
+              <a:alphaOff val="0"/>
+            </a:schemeClr>
+          </a:lnRef>
+          <a:fillRef idx="1">
+            <a:scrgbClr r="0" g="0" b="0"/>
+          </a:fillRef>
+          <a:effectRef idx="0">
+            <a:schemeClr val="accent1">
+              <a:hueOff val="0"/>
+              <a:satOff val="0"/>
+              <a:lumOff val="0"/>
+              <a:alphaOff val="0"/>
+            </a:schemeClr>
+          </a:effectRef>
+          <a:fontRef idx="minor">
+            <a:schemeClr val="lt1"/>
+          </a:fontRef>
+        </p:style>
+        <p:txBody>
+          <a:bodyPr spcFirstLastPara="0" vert="horz" wrap="square" lIns="128017" tIns="1112266" rIns="816990" bIns="1112266" numCol="1" spcCol="1270" anchor="ctr" anchorCtr="0">
+            <a:noAutofit/>
+          </a:bodyPr>
+          <a:lstStyle/>
+          <a:p>
+            <a:pPr marL="0" lvl="0" indent="0" algn="l" defTabSz="800100">
+              <a:lnSpc>
+                <a:spcPct val="90000"/>
+              </a:lnSpc>
+              <a:spcBef>
+                <a:spcPct val="0"/>
+              </a:spcBef>
+              <a:spcAft>
+                <a:spcPct val="35000"/>
+              </a:spcAft>
+              <a:buNone/>
+            </a:pPr>
+            <a:r>
+              <a:rPr lang="en-US" sz="1800" kern="1200" dirty="0"/>
+              <a:t>Listings Masters</a:t>
+            </a:r>
+          </a:p>
+          <a:p>
+            <a:pPr marL="0" lvl="0" indent="0" algn="l" defTabSz="800100">
+              <a:lnSpc>
+                <a:spcPct val="90000"/>
+              </a:lnSpc>
+              <a:spcBef>
+                <a:spcPct val="0"/>
+              </a:spcBef>
+              <a:spcAft>
+                <a:spcPct val="35000"/>
+              </a:spcAft>
+              <a:buNone/>
+            </a:pPr>
+            <a:r>
+              <a:rPr lang="en-US" sz="1800" kern="1200" dirty="0"/>
+              <a:t>Borough ID</a:t>
+            </a:r>
+          </a:p>
+          <a:p>
+            <a:pPr marL="0" lvl="0" indent="0" algn="l" defTabSz="800100">
+              <a:lnSpc>
+                <a:spcPct val="90000"/>
+              </a:lnSpc>
+              <a:spcBef>
+                <a:spcPct val="0"/>
+              </a:spcBef>
+              <a:spcAft>
+                <a:spcPct val="35000"/>
+              </a:spcAft>
+              <a:buNone/>
+            </a:pPr>
+            <a:r>
+              <a:rPr lang="en-US" sz="1800" kern="1200" dirty="0" err="1"/>
+              <a:t>Neighbourhood</a:t>
+            </a:r>
+            <a:r>
+              <a:rPr lang="en-US" sz="1800" kern="1200" dirty="0"/>
+              <a:t> ID</a:t>
+            </a:r>
+          </a:p>
+          <a:p>
+            <a:pPr marL="0" lvl="0" indent="0" algn="l" defTabSz="800100">
+              <a:lnSpc>
+                <a:spcPct val="90000"/>
+              </a:lnSpc>
+              <a:spcBef>
+                <a:spcPct val="0"/>
+              </a:spcBef>
+              <a:spcAft>
+                <a:spcPct val="35000"/>
+              </a:spcAft>
+              <a:buNone/>
+            </a:pPr>
+            <a:r>
+              <a:rPr lang="en-US" sz="1800" kern="1200" dirty="0"/>
+              <a:t>Room Type ID</a:t>
+            </a:r>
+          </a:p>
+          <a:p>
+            <a:pPr marL="0" lvl="0" indent="0" algn="l" defTabSz="800100">
+              <a:lnSpc>
+                <a:spcPct val="90000"/>
+              </a:lnSpc>
+              <a:spcBef>
+                <a:spcPct val="0"/>
+              </a:spcBef>
+              <a:spcAft>
+                <a:spcPct val="35000"/>
+              </a:spcAft>
+              <a:buNone/>
+            </a:pPr>
+            <a:r>
+              <a:rPr lang="en-US" sz="1800" kern="1200" dirty="0"/>
+              <a:t>Yearly Rates</a:t>
+            </a:r>
+            <a:endParaRPr lang="en-CA" sz="1800" kern="1200" dirty="0"/>
+          </a:p>
+        </p:txBody>
+      </p:sp>
+      <p:sp>
+        <p:nvSpPr>
+          <p:cNvPr id="8" name="Freeform: Shape 7">
+            <a:extLst>
+              <a:ext uri="{FF2B5EF4-FFF2-40B4-BE49-F238E27FC236}">
+                <a16:creationId xmlns:a16="http://schemas.microsoft.com/office/drawing/2014/main" id="{8DCB0047-6DA4-4D47-AF82-016DE52DB9EC}"/>
+              </a:ext>
+            </a:extLst>
+          </p:cNvPr>
+          <p:cNvSpPr/>
+          <p:nvPr/>
+        </p:nvSpPr>
+        <p:spPr>
+          <a:xfrm>
+            <a:off x="6222996" y="2623564"/>
+            <a:ext cx="3936999" cy="3936999"/>
+          </a:xfrm>
+          <a:custGeom>
+            <a:avLst/>
+            <a:gdLst>
+              <a:gd name="connsiteX0" fmla="*/ 0 w 3936999"/>
+              <a:gd name="connsiteY0" fmla="*/ 2559049 h 3936999"/>
+              <a:gd name="connsiteX1" fmla="*/ 984250 w 3936999"/>
+              <a:gd name="connsiteY1" fmla="*/ 2559049 h 3936999"/>
+              <a:gd name="connsiteX2" fmla="*/ 984250 w 3936999"/>
+              <a:gd name="connsiteY2" fmla="*/ 0 h 3936999"/>
+              <a:gd name="connsiteX3" fmla="*/ 2952749 w 3936999"/>
+              <a:gd name="connsiteY3" fmla="*/ 0 h 3936999"/>
+              <a:gd name="connsiteX4" fmla="*/ 2952749 w 3936999"/>
+              <a:gd name="connsiteY4" fmla="*/ 2559049 h 3936999"/>
+              <a:gd name="connsiteX5" fmla="*/ 3936999 w 3936999"/>
+              <a:gd name="connsiteY5" fmla="*/ 2559049 h 3936999"/>
+              <a:gd name="connsiteX6" fmla="*/ 1968500 w 3936999"/>
+              <a:gd name="connsiteY6" fmla="*/ 3936999 h 3936999"/>
+              <a:gd name="connsiteX7" fmla="*/ 0 w 3936999"/>
+              <a:gd name="connsiteY7" fmla="*/ 2559049 h 3936999"/>
+            </a:gdLst>
+            <a:ahLst/>
+            <a:cxnLst>
+              <a:cxn ang="0">
+                <a:pos x="connsiteX0" y="connsiteY0"/>
+              </a:cxn>
+              <a:cxn ang="0">
+                <a:pos x="connsiteX1" y="connsiteY1"/>
+              </a:cxn>
+              <a:cxn ang="0">
+                <a:pos x="connsiteX2" y="connsiteY2"/>
+              </a:cxn>
+              <a:cxn ang="0">
+                <a:pos x="connsiteX3" y="connsiteY3"/>
+              </a:cxn>
+              <a:cxn ang="0">
+                <a:pos x="connsiteX4" y="connsiteY4"/>
+              </a:cxn>
+              <a:cxn ang="0">
+                <a:pos x="connsiteX5" y="connsiteY5"/>
+              </a:cxn>
+              <a:cxn ang="0">
+                <a:pos x="connsiteX6" y="connsiteY6"/>
+              </a:cxn>
+              <a:cxn ang="0">
+                <a:pos x="connsiteX7" y="connsiteY7"/>
+              </a:cxn>
+            </a:cxnLst>
+            <a:rect l="l" t="t" r="r" b="b"/>
+            <a:pathLst>
+              <a:path w="3936999" h="3936999">
+                <a:moveTo>
+                  <a:pt x="1377950" y="0"/>
+                </a:moveTo>
+                <a:lnTo>
+                  <a:pt x="1377950" y="984250"/>
+                </a:lnTo>
+                <a:lnTo>
+                  <a:pt x="3936999" y="984250"/>
+                </a:lnTo>
+                <a:lnTo>
+                  <a:pt x="3936999" y="2952749"/>
+                </a:lnTo>
+                <a:lnTo>
+                  <a:pt x="1377950" y="2952749"/>
+                </a:lnTo>
+                <a:lnTo>
+                  <a:pt x="1377950" y="3936999"/>
+                </a:lnTo>
+                <a:lnTo>
+                  <a:pt x="0" y="1968500"/>
+                </a:lnTo>
+                <a:lnTo>
+                  <a:pt x="1377950" y="0"/>
+                </a:lnTo>
+                <a:close/>
+              </a:path>
+            </a:pathLst>
+          </a:custGeom>
+          <a:solidFill>
+            <a:srgbClr val="E87572"/>
+          </a:solidFill>
+          <a:ln>
+            <a:solidFill>
+              <a:srgbClr val="E9766F"/>
+            </a:solidFill>
+          </a:ln>
+        </p:spPr>
+        <p:style>
+          <a:lnRef idx="2">
+            <a:scrgbClr r="0" g="0" b="0"/>
+          </a:lnRef>
+          <a:fillRef idx="1">
+            <a:scrgbClr r="0" g="0" b="0"/>
+          </a:fillRef>
+          <a:effectRef idx="0">
+            <a:schemeClr val="accent1">
+              <a:hueOff val="0"/>
+              <a:satOff val="0"/>
+              <a:lumOff val="0"/>
+              <a:alphaOff val="0"/>
+            </a:schemeClr>
+          </a:effectRef>
+          <a:fontRef idx="minor">
+            <a:schemeClr val="lt1"/>
+          </a:fontRef>
+        </p:style>
+        <p:txBody>
+          <a:bodyPr spcFirstLastPara="0" vert="horz" wrap="square" lIns="816992" tIns="1112266" rIns="128015" bIns="1112266" numCol="1" spcCol="1270" anchor="ctr" anchorCtr="0">
+            <a:noAutofit/>
+          </a:bodyPr>
+          <a:lstStyle/>
+          <a:p>
+            <a:pPr marL="0" lvl="0" indent="0" algn="r" defTabSz="800100">
+              <a:lnSpc>
+                <a:spcPct val="90000"/>
+              </a:lnSpc>
+              <a:spcBef>
+                <a:spcPct val="0"/>
+              </a:spcBef>
+              <a:spcAft>
+                <a:spcPct val="35000"/>
+              </a:spcAft>
+              <a:buNone/>
+            </a:pPr>
+            <a:r>
+              <a:rPr lang="en-US" sz="1800" b="1" kern="1200" dirty="0"/>
+              <a:t>Monthly Rates</a:t>
+            </a:r>
+          </a:p>
+          <a:p>
+            <a:pPr marL="0" lvl="0" indent="0" algn="r" defTabSz="800100">
+              <a:lnSpc>
+                <a:spcPct val="90000"/>
+              </a:lnSpc>
+              <a:spcBef>
+                <a:spcPct val="0"/>
+              </a:spcBef>
+              <a:spcAft>
+                <a:spcPct val="35000"/>
+              </a:spcAft>
+              <a:buNone/>
+            </a:pPr>
+            <a:r>
+              <a:rPr lang="en-US" sz="1800" b="1" kern="1200" dirty="0"/>
+              <a:t>Day of Week Rates</a:t>
+            </a:r>
+          </a:p>
+          <a:p>
+            <a:pPr marL="0" lvl="0" indent="0" algn="r" defTabSz="800100">
+              <a:lnSpc>
+                <a:spcPct val="90000"/>
+              </a:lnSpc>
+              <a:spcBef>
+                <a:spcPct val="0"/>
+              </a:spcBef>
+              <a:spcAft>
+                <a:spcPct val="35000"/>
+              </a:spcAft>
+              <a:buNone/>
+            </a:pPr>
+            <a:r>
+              <a:rPr lang="en-US" sz="1800" b="1" kern="1200" dirty="0"/>
+              <a:t>Predicted Rates </a:t>
+            </a:r>
+            <a:endParaRPr lang="en-CA" sz="1800" b="1" kern="1200" dirty="0"/>
+          </a:p>
+        </p:txBody>
+      </p:sp>
+      <p:sp>
+        <p:nvSpPr>
+          <p:cNvPr id="7" name="TextBox 6">
+            <a:extLst>
+              <a:ext uri="{FF2B5EF4-FFF2-40B4-BE49-F238E27FC236}">
+                <a16:creationId xmlns:a16="http://schemas.microsoft.com/office/drawing/2014/main" id="{CF63465F-BC18-4EF3-8BBF-2C44DF33E3C6}"/>
+              </a:ext>
+            </a:extLst>
+          </p:cNvPr>
+          <p:cNvSpPr txBox="1"/>
+          <p:nvPr/>
+        </p:nvSpPr>
+        <p:spPr>
+          <a:xfrm>
+            <a:off x="1880946" y="2307280"/>
+            <a:ext cx="1556951" cy="461665"/>
+          </a:xfrm>
+          <a:prstGeom prst="rect">
+            <a:avLst/>
+          </a:prstGeom>
+          <a:noFill/>
+        </p:spPr>
+        <p:txBody>
+          <a:bodyPr wrap="square" rtlCol="0">
+            <a:spAutoFit/>
+          </a:bodyPr>
+          <a:lstStyle/>
+          <a:p>
+            <a:r>
+              <a:rPr lang="en-US" sz="2400" b="1" dirty="0"/>
+              <a:t>EXISTING</a:t>
+            </a:r>
+            <a:endParaRPr lang="en-CA" sz="2400" b="1" dirty="0"/>
+          </a:p>
+        </p:txBody>
+      </p:sp>
+      <p:sp>
+        <p:nvSpPr>
+          <p:cNvPr id="12" name="TextBox 11">
+            <a:extLst>
+              <a:ext uri="{FF2B5EF4-FFF2-40B4-BE49-F238E27FC236}">
+                <a16:creationId xmlns:a16="http://schemas.microsoft.com/office/drawing/2014/main" id="{F7D516A4-D57F-43E9-9281-41F4A8C9416F}"/>
+              </a:ext>
+            </a:extLst>
+          </p:cNvPr>
+          <p:cNvSpPr txBox="1"/>
+          <p:nvPr/>
+        </p:nvSpPr>
+        <p:spPr>
+          <a:xfrm>
+            <a:off x="9499221" y="2254420"/>
+            <a:ext cx="995378" cy="461665"/>
+          </a:xfrm>
+          <a:prstGeom prst="rect">
+            <a:avLst/>
+          </a:prstGeom>
+          <a:noFill/>
+        </p:spPr>
+        <p:txBody>
+          <a:bodyPr wrap="square" rtlCol="0">
+            <a:spAutoFit/>
+          </a:bodyPr>
+          <a:lstStyle/>
+          <a:p>
+            <a:r>
+              <a:rPr lang="en-US" sz="2400" b="1" dirty="0"/>
+              <a:t>NEW</a:t>
+            </a:r>
+            <a:endParaRPr lang="en-CA" sz="2400" b="1" dirty="0"/>
+          </a:p>
+        </p:txBody>
+      </p:sp>
+    </p:spTree>
+    <p:extLst>
+      <p:ext uri="{BB962C8B-B14F-4D97-AF65-F5344CB8AC3E}">
+        <p14:creationId xmlns:p14="http://schemas.microsoft.com/office/powerpoint/2010/main" val="2227089696"/>
+      </p:ext>
+    </p:extLst>
+  </p:cSld>
+  <p:clrMapOvr>
+    <a:masterClrMapping/>
+  </p:clrMapOvr>
+  <p:timing>
+    <p:tnLst>
+      <p:par>
+        <p:cTn id="1" dur="indefinite" restart="never" nodeType="tmRoot">
+          <p:childTnLst>
+            <p:seq concurrent="1" nextAc="seek">
+              <p:cTn id="2" dur="indefinite" nodeType="mainSeq">
+                <p:childTnLst>
+                  <p:par>
+                    <p:cTn id="3" fill="hold">
+                      <p:stCondLst>
+                        <p:cond delay="indefinite"/>
+                      </p:stCondLst>
+                      <p:childTnLst>
+                        <p:par>
+                          <p:cTn id="4" fill="hold">
+                            <p:stCondLst>
+                              <p:cond delay="0"/>
+                            </p:stCondLst>
+                            <p:childTnLst>
+                              <p:par>
+                                <p:cTn id="5" presetID="2" presetClass="entr" presetSubtype="8" fill="hold" grpId="0" nodeType="clickEffect">
+                                  <p:stCondLst>
+                                    <p:cond delay="0"/>
+                                  </p:stCondLst>
+                                  <p:childTnLst>
+                                    <p:set>
+                                      <p:cBhvr>
+                                        <p:cTn id="6" dur="1" fill="hold">
+                                          <p:stCondLst>
+                                            <p:cond delay="0"/>
+                                          </p:stCondLst>
+                                        </p:cTn>
+                                        <p:tgtEl>
+                                          <p:spTgt spid="7"/>
+                                        </p:tgtEl>
+                                        <p:attrNameLst>
+                                          <p:attrName>style.visibility</p:attrName>
+                                        </p:attrNameLst>
+                                      </p:cBhvr>
+                                      <p:to>
+                                        <p:strVal val="visible"/>
+                                      </p:to>
+                                    </p:set>
+                                    <p:anim calcmode="lin" valueType="num">
+                                      <p:cBhvr additive="base">
+                                        <p:cTn id="7" dur="500" fill="hold"/>
+                                        <p:tgtEl>
+                                          <p:spTgt spid="7"/>
+                                        </p:tgtEl>
+                                        <p:attrNameLst>
+                                          <p:attrName>ppt_x</p:attrName>
+                                        </p:attrNameLst>
+                                      </p:cBhvr>
+                                      <p:tavLst>
+                                        <p:tav tm="0">
+                                          <p:val>
+                                            <p:strVal val="0-#ppt_w/2"/>
+                                          </p:val>
+                                        </p:tav>
+                                        <p:tav tm="100000">
+                                          <p:val>
+                                            <p:strVal val="#ppt_x"/>
+                                          </p:val>
+                                        </p:tav>
+                                      </p:tavLst>
+                                    </p:anim>
+                                    <p:anim calcmode="lin" valueType="num">
+                                      <p:cBhvr additive="base">
+                                        <p:cTn id="8" dur="500" fill="hold"/>
+                                        <p:tgtEl>
+                                          <p:spTgt spid="7"/>
+                                        </p:tgtEl>
+                                        <p:attrNameLst>
+                                          <p:attrName>ppt_y</p:attrName>
+                                        </p:attrNameLst>
+                                      </p:cBhvr>
+                                      <p:tavLst>
+                                        <p:tav tm="0">
+                                          <p:val>
+                                            <p:strVal val="#ppt_y"/>
+                                          </p:val>
+                                        </p:tav>
+                                        <p:tav tm="100000">
+                                          <p:val>
+                                            <p:strVal val="#ppt_y"/>
+                                          </p:val>
+                                        </p:tav>
+                                      </p:tavLst>
+                                    </p:anim>
+                                  </p:childTnLst>
+                                </p:cTn>
+                              </p:par>
+                              <p:par>
+                                <p:cTn id="9" presetID="2" presetClass="entr" presetSubtype="8" fill="hold" grpId="0" nodeType="withEffect">
+                                  <p:stCondLst>
+                                    <p:cond delay="0"/>
+                                  </p:stCondLst>
+                                  <p:childTnLst>
+                                    <p:set>
+                                      <p:cBhvr>
+                                        <p:cTn id="10" dur="1" fill="hold">
+                                          <p:stCondLst>
+                                            <p:cond delay="0"/>
+                                          </p:stCondLst>
+                                        </p:cTn>
+                                        <p:tgtEl>
+                                          <p:spTgt spid="5"/>
+                                        </p:tgtEl>
+                                        <p:attrNameLst>
+                                          <p:attrName>style.visibility</p:attrName>
+                                        </p:attrNameLst>
+                                      </p:cBhvr>
+                                      <p:to>
+                                        <p:strVal val="visible"/>
+                                      </p:to>
+                                    </p:set>
+                                    <p:anim calcmode="lin" valueType="num">
+                                      <p:cBhvr additive="base">
+                                        <p:cTn id="11" dur="500" fill="hold"/>
+                                        <p:tgtEl>
+                                          <p:spTgt spid="5"/>
+                                        </p:tgtEl>
+                                        <p:attrNameLst>
+                                          <p:attrName>ppt_x</p:attrName>
+                                        </p:attrNameLst>
+                                      </p:cBhvr>
+                                      <p:tavLst>
+                                        <p:tav tm="0">
+                                          <p:val>
+                                            <p:strVal val="0-#ppt_w/2"/>
+                                          </p:val>
+                                        </p:tav>
+                                        <p:tav tm="100000">
+                                          <p:val>
+                                            <p:strVal val="#ppt_x"/>
+                                          </p:val>
+                                        </p:tav>
+                                      </p:tavLst>
+                                    </p:anim>
+                                    <p:anim calcmode="lin" valueType="num">
+                                      <p:cBhvr additive="base">
+                                        <p:cTn id="12" dur="500" fill="hold"/>
+                                        <p:tgtEl>
+                                          <p:spTgt spid="5"/>
+                                        </p:tgtEl>
+                                        <p:attrNameLst>
+                                          <p:attrName>ppt_y</p:attrName>
+                                        </p:attrNameLst>
+                                      </p:cBhvr>
+                                      <p:tavLst>
+                                        <p:tav tm="0">
+                                          <p:val>
+                                            <p:strVal val="#ppt_y"/>
+                                          </p:val>
+                                        </p:tav>
+                                        <p:tav tm="100000">
+                                          <p:val>
+                                            <p:strVal val="#ppt_y"/>
+                                          </p:val>
+                                        </p:tav>
+                                      </p:tavLst>
+                                    </p:anim>
+                                  </p:childTnLst>
+                                </p:cTn>
+                              </p:par>
+                            </p:childTnLst>
+                          </p:cTn>
+                        </p:par>
+                      </p:childTnLst>
+                    </p:cTn>
+                  </p:par>
+                  <p:par>
+                    <p:cTn id="13" fill="hold">
+                      <p:stCondLst>
+                        <p:cond delay="indefinite"/>
+                      </p:stCondLst>
+                      <p:childTnLst>
+                        <p:par>
+                          <p:cTn id="14" fill="hold">
+                            <p:stCondLst>
+                              <p:cond delay="0"/>
+                            </p:stCondLst>
+                            <p:childTnLst>
+                              <p:par>
+                                <p:cTn id="15" presetID="2" presetClass="entr" presetSubtype="2" fill="hold" grpId="0" nodeType="clickEffect">
+                                  <p:stCondLst>
+                                    <p:cond delay="0"/>
+                                  </p:stCondLst>
+                                  <p:childTnLst>
+                                    <p:set>
+                                      <p:cBhvr>
+                                        <p:cTn id="16" dur="1" fill="hold">
+                                          <p:stCondLst>
+                                            <p:cond delay="0"/>
+                                          </p:stCondLst>
+                                        </p:cTn>
+                                        <p:tgtEl>
+                                          <p:spTgt spid="8"/>
+                                        </p:tgtEl>
+                                        <p:attrNameLst>
+                                          <p:attrName>style.visibility</p:attrName>
+                                        </p:attrNameLst>
+                                      </p:cBhvr>
+                                      <p:to>
+                                        <p:strVal val="visible"/>
+                                      </p:to>
+                                    </p:set>
+                                    <p:anim calcmode="lin" valueType="num">
+                                      <p:cBhvr additive="base">
+                                        <p:cTn id="17" dur="500" fill="hold"/>
+                                        <p:tgtEl>
+                                          <p:spTgt spid="8"/>
+                                        </p:tgtEl>
+                                        <p:attrNameLst>
+                                          <p:attrName>ppt_x</p:attrName>
+                                        </p:attrNameLst>
+                                      </p:cBhvr>
+                                      <p:tavLst>
+                                        <p:tav tm="0">
+                                          <p:val>
+                                            <p:strVal val="1+#ppt_w/2"/>
+                                          </p:val>
+                                        </p:tav>
+                                        <p:tav tm="100000">
+                                          <p:val>
+                                            <p:strVal val="#ppt_x"/>
+                                          </p:val>
+                                        </p:tav>
+                                      </p:tavLst>
+                                    </p:anim>
+                                    <p:anim calcmode="lin" valueType="num">
+                                      <p:cBhvr additive="base">
+                                        <p:cTn id="18" dur="500" fill="hold"/>
+                                        <p:tgtEl>
+                                          <p:spTgt spid="8"/>
+                                        </p:tgtEl>
+                                        <p:attrNameLst>
+                                          <p:attrName>ppt_y</p:attrName>
+                                        </p:attrNameLst>
+                                      </p:cBhvr>
+                                      <p:tavLst>
+                                        <p:tav tm="0">
+                                          <p:val>
+                                            <p:strVal val="#ppt_y"/>
+                                          </p:val>
+                                        </p:tav>
+                                        <p:tav tm="100000">
+                                          <p:val>
+                                            <p:strVal val="#ppt_y"/>
+                                          </p:val>
+                                        </p:tav>
+                                      </p:tavLst>
+                                    </p:anim>
+                                  </p:childTnLst>
+                                </p:cTn>
+                              </p:par>
+                              <p:par>
+                                <p:cTn id="19" presetID="2" presetClass="entr" presetSubtype="2" fill="hold" grpId="0" nodeType="withEffect">
+                                  <p:stCondLst>
+                                    <p:cond delay="0"/>
+                                  </p:stCondLst>
+                                  <p:childTnLst>
+                                    <p:set>
+                                      <p:cBhvr>
+                                        <p:cTn id="20" dur="1" fill="hold">
+                                          <p:stCondLst>
+                                            <p:cond delay="0"/>
+                                          </p:stCondLst>
+                                        </p:cTn>
+                                        <p:tgtEl>
+                                          <p:spTgt spid="12"/>
+                                        </p:tgtEl>
+                                        <p:attrNameLst>
+                                          <p:attrName>style.visibility</p:attrName>
+                                        </p:attrNameLst>
+                                      </p:cBhvr>
+                                      <p:to>
+                                        <p:strVal val="visible"/>
+                                      </p:to>
+                                    </p:set>
+                                    <p:anim calcmode="lin" valueType="num">
+                                      <p:cBhvr additive="base">
+                                        <p:cTn id="21" dur="500" fill="hold"/>
+                                        <p:tgtEl>
+                                          <p:spTgt spid="12"/>
+                                        </p:tgtEl>
+                                        <p:attrNameLst>
+                                          <p:attrName>ppt_x</p:attrName>
+                                        </p:attrNameLst>
+                                      </p:cBhvr>
+                                      <p:tavLst>
+                                        <p:tav tm="0">
+                                          <p:val>
+                                            <p:strVal val="1+#ppt_w/2"/>
+                                          </p:val>
+                                        </p:tav>
+                                        <p:tav tm="100000">
+                                          <p:val>
+                                            <p:strVal val="#ppt_x"/>
+                                          </p:val>
+                                        </p:tav>
+                                      </p:tavLst>
+                                    </p:anim>
+                                    <p:anim calcmode="lin" valueType="num">
+                                      <p:cBhvr additive="base">
+                                        <p:cTn id="22" dur="500" fill="hold"/>
+                                        <p:tgtEl>
+                                          <p:spTgt spid="12"/>
+                                        </p:tgtEl>
+                                        <p:attrNameLst>
+                                          <p:attrName>ppt_y</p:attrName>
+                                        </p:attrNameLst>
+                                      </p:cBhvr>
+                                      <p:tavLst>
+                                        <p:tav tm="0">
+                                          <p:val>
+                                            <p:strVal val="#ppt_y"/>
+                                          </p:val>
+                                        </p:tav>
+                                        <p:tav tm="100000">
+                                          <p:val>
+                                            <p:strVal val="#ppt_y"/>
+                                          </p:val>
+                                        </p:tav>
+                                      </p:tavLst>
+                                    </p:anim>
+                                  </p:childTnLst>
+                                </p:cTn>
+                              </p:par>
+                            </p:childTnLst>
+                          </p:cTn>
+                        </p:par>
+                      </p:childTnLst>
+                    </p:cTn>
+                  </p:par>
+                </p:childTnLst>
+              </p:cTn>
+              <p:prevCondLst>
+                <p:cond evt="onPrev" delay="0">
+                  <p:tgtEl>
+                    <p:sldTgt/>
+                  </p:tgtEl>
+                </p:cond>
+              </p:prevCondLst>
+              <p:nextCondLst>
+                <p:cond evt="onNext" delay="0">
+                  <p:tgtEl>
+                    <p:sldTgt/>
+                  </p:tgtEl>
+                </p:cond>
+              </p:nextCondLst>
+            </p:seq>
+          </p:childTnLst>
+        </p:cTn>
+      </p:par>
+    </p:tnLst>
+    <p:bldLst>
+      <p:bldP spid="5" grpId="0" animBg="1"/>
+      <p:bldP spid="8" grpId="0" animBg="1"/>
+      <p:bldP spid="7" grpId="0"/>
+      <p:bldP spid="12" grpId="0"/>
+    </p:bldLst>
+  </p:timing>
+</p:sld>
+</file>
+
+<file path=ppt/slides/slide6.xml><?xml version="1.0" encoding="utf-8"?>
+<p:sld xmlns:a="http://schemas.openxmlformats.org/drawingml/2006/main" xmlns:r="http://schemas.openxmlformats.org/officeDocument/2006/relationships" xmlns:p="http://schemas.openxmlformats.org/presentationml/2006/main">
+  <p:cSld>
+    <p:spTree>
+      <p:nvGrpSpPr>
+        <p:cNvPr id="1" name=""/>
+        <p:cNvGrpSpPr/>
+        <p:nvPr/>
+      </p:nvGrpSpPr>
+      <p:grpSpPr>
+        <a:xfrm>
+          <a:off x="0" y="0"/>
+          <a:ext cx="0" cy="0"/>
+          <a:chOff x="0" y="0"/>
+          <a:chExt cx="0" cy="0"/>
+        </a:xfrm>
+      </p:grpSpPr>
+      <p:sp>
+        <p:nvSpPr>
+          <p:cNvPr id="2" name="Title 1">
+            <a:extLst>
+              <a:ext uri="{FF2B5EF4-FFF2-40B4-BE49-F238E27FC236}">
+                <a16:creationId xmlns:a16="http://schemas.microsoft.com/office/drawing/2014/main" id="{59B8B577-5676-3C4B-A107-E41DB331FD85}"/>
+              </a:ext>
+            </a:extLst>
+          </p:cNvPr>
+          <p:cNvSpPr>
+            <a:spLocks noGrp="1"/>
+          </p:cNvSpPr>
+          <p:nvPr>
+            <p:ph type="title"/>
+          </p:nvPr>
+        </p:nvSpPr>
+        <p:spPr>
+          <a:xfrm>
+            <a:off x="2721982" y="696475"/>
+            <a:ext cx="10515600" cy="1325563"/>
+          </a:xfrm>
+        </p:spPr>
+        <p:txBody>
+          <a:bodyPr>
+            <a:normAutofit/>
+          </a:bodyPr>
+          <a:lstStyle/>
+          <a:p>
+            <a:r>
+              <a:rPr lang="en-US" sz="4000" dirty="0">
+                <a:solidFill>
+                  <a:srgbClr val="EA5E46"/>
+                </a:solidFill>
+              </a:rPr>
               <a:t>Project Challenges</a:t>
             </a:r>
           </a:p>
@@ -15693,7 +16951,7 @@
         <p:spPr>
           <a:xfrm>
             <a:off x="4927054" y="1850531"/>
-            <a:ext cx="6069810" cy="6894195"/>
+            <a:ext cx="6069810" cy="7201972"/>
           </a:xfrm>
           <a:prstGeom prst="rect">
             <a:avLst/>
@@ -15716,18 +16974,19 @@
                 <a:ea typeface="Calibri" panose="020F0502020204030204" pitchFamily="34" charset="0"/>
                 <a:cs typeface="Times New Roman" panose="02020603050405020304" pitchFamily="18" charset="0"/>
               </a:rPr>
-              <a:t>Consolidating new datasets to the existing database.</a:t>
-            </a:r>
-          </a:p>
-          <a:p>
-            <a:r>
-              <a:rPr lang="en-US" sz="2000" dirty="0">
-                <a:latin typeface="Calibri" panose="020F0502020204030204" pitchFamily="34" charset="0"/>
-                <a:ea typeface="Calibri" panose="020F0502020204030204" pitchFamily="34" charset="0"/>
-                <a:cs typeface="Times New Roman" panose="02020603050405020304" pitchFamily="18" charset="0"/>
-              </a:rPr>
-              <a:t> </a:t>
-            </a:r>
+              <a:t>Finding the optimal data to fit in to our existing database.</a:t>
+            </a:r>
+          </a:p>
+          <a:p>
+            <a:pPr marL="285750" indent="-285750">
+              <a:buFont typeface="Arial" panose="020B0604020202020204" pitchFamily="34" charset="0"/>
+              <a:buChar char="•"/>
+            </a:pPr>
+            <a:endParaRPr lang="en-US" sz="2000" dirty="0">
+              <a:latin typeface="Calibri" panose="020F0502020204030204" pitchFamily="34" charset="0"/>
+              <a:ea typeface="Calibri" panose="020F0502020204030204" pitchFamily="34" charset="0"/>
+              <a:cs typeface="Times New Roman" panose="02020603050405020304" pitchFamily="18" charset="0"/>
+            </a:endParaRPr>
           </a:p>
           <a:p>
             <a:pPr marL="285750" indent="-285750">
@@ -16547,1013 +17806,6 @@
 </p:sld>
 </file>
 
-<file path=ppt/slides/slide6.xml><?xml version="1.0" encoding="utf-8"?>
-<p:sld xmlns:a="http://schemas.openxmlformats.org/drawingml/2006/main" xmlns:r="http://schemas.openxmlformats.org/officeDocument/2006/relationships" xmlns:p="http://schemas.openxmlformats.org/presentationml/2006/main">
-  <p:cSld>
-    <p:spTree>
-      <p:nvGrpSpPr>
-        <p:cNvPr id="1" name=""/>
-        <p:cNvGrpSpPr/>
-        <p:nvPr/>
-      </p:nvGrpSpPr>
-      <p:grpSpPr>
-        <a:xfrm>
-          <a:off x="0" y="0"/>
-          <a:ext cx="0" cy="0"/>
-          <a:chOff x="0" y="0"/>
-          <a:chExt cx="0" cy="0"/>
-        </a:xfrm>
-      </p:grpSpPr>
-      <p:sp>
-        <p:nvSpPr>
-          <p:cNvPr id="2" name="Title 1">
-            <a:extLst>
-              <a:ext uri="{FF2B5EF4-FFF2-40B4-BE49-F238E27FC236}">
-                <a16:creationId xmlns:a16="http://schemas.microsoft.com/office/drawing/2014/main" id="{59B8B577-5676-3C4B-A107-E41DB331FD85}"/>
-              </a:ext>
-            </a:extLst>
-          </p:cNvPr>
-          <p:cNvSpPr>
-            <a:spLocks noGrp="1"/>
-          </p:cNvSpPr>
-          <p:nvPr>
-            <p:ph type="title"/>
-          </p:nvPr>
-        </p:nvSpPr>
-        <p:spPr>
-          <a:xfrm>
-            <a:off x="2721982" y="696475"/>
-            <a:ext cx="10515600" cy="1325563"/>
-          </a:xfrm>
-        </p:spPr>
-        <p:txBody>
-          <a:bodyPr>
-            <a:normAutofit/>
-          </a:bodyPr>
-          <a:lstStyle/>
-          <a:p>
-            <a:r>
-              <a:rPr lang="en-US" sz="4000" dirty="0">
-                <a:solidFill>
-                  <a:srgbClr val="EA5E46"/>
-                </a:solidFill>
-              </a:rPr>
-              <a:t>Database Change</a:t>
-            </a:r>
-          </a:p>
-        </p:txBody>
-      </p:sp>
-      <p:pic>
-        <p:nvPicPr>
-          <p:cNvPr id="2050" name="Picture 2" descr="Image result for air bnb logo">
-            <a:extLst>
-              <a:ext uri="{FF2B5EF4-FFF2-40B4-BE49-F238E27FC236}">
-                <a16:creationId xmlns:a16="http://schemas.microsoft.com/office/drawing/2014/main" id="{A162C291-208B-BE48-BF44-7D5CD7EF6151}"/>
-              </a:ext>
-            </a:extLst>
-          </p:cNvPr>
-          <p:cNvPicPr>
-            <a:picLocks noChangeAspect="1" noChangeArrowheads="1"/>
-          </p:cNvPicPr>
-          <p:nvPr/>
-        </p:nvPicPr>
-        <p:blipFill>
-          <a:blip r:embed="rId3">
-            <a:extLst>
-              <a:ext uri="{28A0092B-C50C-407E-A947-70E740481C1C}">
-                <a14:useLocalDpi xmlns:a14="http://schemas.microsoft.com/office/drawing/2010/main" val="0"/>
-              </a:ext>
-            </a:extLst>
-          </a:blip>
-          <a:srcRect/>
-          <a:stretch>
-            <a:fillRect/>
-          </a:stretch>
-        </p:blipFill>
-        <p:spPr bwMode="auto">
-          <a:xfrm>
-            <a:off x="469817" y="108280"/>
-            <a:ext cx="2189605" cy="2022038"/>
-          </a:xfrm>
-          <a:prstGeom prst="rect">
-            <a:avLst/>
-          </a:prstGeom>
-          <a:noFill/>
-          <a:extLst>
-            <a:ext uri="{909E8E84-426E-40DD-AFC4-6F175D3DCCD1}">
-              <a14:hiddenFill xmlns:a14="http://schemas.microsoft.com/office/drawing/2010/main">
-                <a:solidFill>
-                  <a:srgbClr val="FFFFFF"/>
-                </a:solidFill>
-              </a14:hiddenFill>
-            </a:ext>
-          </a:extLst>
-        </p:spPr>
-      </p:pic>
-      <p:cxnSp>
-        <p:nvCxnSpPr>
-          <p:cNvPr id="6" name="Straight Connector 5">
-            <a:extLst>
-              <a:ext uri="{FF2B5EF4-FFF2-40B4-BE49-F238E27FC236}">
-                <a16:creationId xmlns:a16="http://schemas.microsoft.com/office/drawing/2014/main" id="{7D0926DC-6298-B648-9DF9-0D78D09F9FC8}"/>
-              </a:ext>
-            </a:extLst>
-          </p:cNvPr>
-          <p:cNvCxnSpPr>
-            <a:cxnSpLocks/>
-          </p:cNvCxnSpPr>
-          <p:nvPr/>
-        </p:nvCxnSpPr>
-        <p:spPr>
-          <a:xfrm>
-            <a:off x="975854" y="1822090"/>
-            <a:ext cx="9518745" cy="1"/>
-          </a:xfrm>
-          <a:prstGeom prst="line">
-            <a:avLst/>
-          </a:prstGeom>
-          <a:ln w="12700">
-            <a:solidFill>
-              <a:srgbClr val="EA5E46"/>
-            </a:solidFill>
-          </a:ln>
-        </p:spPr>
-        <p:style>
-          <a:lnRef idx="1">
-            <a:schemeClr val="accent2"/>
-          </a:lnRef>
-          <a:fillRef idx="0">
-            <a:schemeClr val="accent2"/>
-          </a:fillRef>
-          <a:effectRef idx="0">
-            <a:schemeClr val="accent2"/>
-          </a:effectRef>
-          <a:fontRef idx="minor">
-            <a:schemeClr val="tx1"/>
-          </a:fontRef>
-        </p:style>
-      </p:cxnSp>
-      <p:sp>
-        <p:nvSpPr>
-          <p:cNvPr id="5" name="Freeform: Shape 4">
-            <a:extLst>
-              <a:ext uri="{FF2B5EF4-FFF2-40B4-BE49-F238E27FC236}">
-                <a16:creationId xmlns:a16="http://schemas.microsoft.com/office/drawing/2014/main" id="{0F5E79D5-6DE8-4064-8485-34A459D016F8}"/>
-              </a:ext>
-            </a:extLst>
-          </p:cNvPr>
-          <p:cNvSpPr/>
-          <p:nvPr/>
-        </p:nvSpPr>
-        <p:spPr>
-          <a:xfrm>
-            <a:off x="2032447" y="2594267"/>
-            <a:ext cx="3936999" cy="3936999"/>
-          </a:xfrm>
-          <a:custGeom>
-            <a:avLst/>
-            <a:gdLst>
-              <a:gd name="connsiteX0" fmla="*/ 0 w 3936999"/>
-              <a:gd name="connsiteY0" fmla="*/ 2559049 h 3936999"/>
-              <a:gd name="connsiteX1" fmla="*/ 984250 w 3936999"/>
-              <a:gd name="connsiteY1" fmla="*/ 2559049 h 3936999"/>
-              <a:gd name="connsiteX2" fmla="*/ 984250 w 3936999"/>
-              <a:gd name="connsiteY2" fmla="*/ 0 h 3936999"/>
-              <a:gd name="connsiteX3" fmla="*/ 2952749 w 3936999"/>
-              <a:gd name="connsiteY3" fmla="*/ 0 h 3936999"/>
-              <a:gd name="connsiteX4" fmla="*/ 2952749 w 3936999"/>
-              <a:gd name="connsiteY4" fmla="*/ 2559049 h 3936999"/>
-              <a:gd name="connsiteX5" fmla="*/ 3936999 w 3936999"/>
-              <a:gd name="connsiteY5" fmla="*/ 2559049 h 3936999"/>
-              <a:gd name="connsiteX6" fmla="*/ 1968500 w 3936999"/>
-              <a:gd name="connsiteY6" fmla="*/ 3936999 h 3936999"/>
-              <a:gd name="connsiteX7" fmla="*/ 0 w 3936999"/>
-              <a:gd name="connsiteY7" fmla="*/ 2559049 h 3936999"/>
-            </a:gdLst>
-            <a:ahLst/>
-            <a:cxnLst>
-              <a:cxn ang="0">
-                <a:pos x="connsiteX0" y="connsiteY0"/>
-              </a:cxn>
-              <a:cxn ang="0">
-                <a:pos x="connsiteX1" y="connsiteY1"/>
-              </a:cxn>
-              <a:cxn ang="0">
-                <a:pos x="connsiteX2" y="connsiteY2"/>
-              </a:cxn>
-              <a:cxn ang="0">
-                <a:pos x="connsiteX3" y="connsiteY3"/>
-              </a:cxn>
-              <a:cxn ang="0">
-                <a:pos x="connsiteX4" y="connsiteY4"/>
-              </a:cxn>
-              <a:cxn ang="0">
-                <a:pos x="connsiteX5" y="connsiteY5"/>
-              </a:cxn>
-              <a:cxn ang="0">
-                <a:pos x="connsiteX6" y="connsiteY6"/>
-              </a:cxn>
-              <a:cxn ang="0">
-                <a:pos x="connsiteX7" y="connsiteY7"/>
-              </a:cxn>
-            </a:cxnLst>
-            <a:rect l="l" t="t" r="r" b="b"/>
-            <a:pathLst>
-              <a:path w="3936999" h="3936999">
-                <a:moveTo>
-                  <a:pt x="2559049" y="3936999"/>
-                </a:moveTo>
-                <a:lnTo>
-                  <a:pt x="2559049" y="2952749"/>
-                </a:lnTo>
-                <a:lnTo>
-                  <a:pt x="0" y="2952749"/>
-                </a:lnTo>
-                <a:lnTo>
-                  <a:pt x="0" y="984250"/>
-                </a:lnTo>
-                <a:lnTo>
-                  <a:pt x="2559049" y="984250"/>
-                </a:lnTo>
-                <a:lnTo>
-                  <a:pt x="2559049" y="0"/>
-                </a:lnTo>
-                <a:lnTo>
-                  <a:pt x="3936999" y="1968499"/>
-                </a:lnTo>
-                <a:lnTo>
-                  <a:pt x="2559049" y="3936999"/>
-                </a:lnTo>
-                <a:close/>
-              </a:path>
-            </a:pathLst>
-          </a:custGeom>
-          <a:solidFill>
-            <a:schemeClr val="bg2">
-              <a:lumMod val="75000"/>
-            </a:schemeClr>
-          </a:solidFill>
-        </p:spPr>
-        <p:style>
-          <a:lnRef idx="2">
-            <a:schemeClr val="lt1">
-              <a:hueOff val="0"/>
-              <a:satOff val="0"/>
-              <a:lumOff val="0"/>
-              <a:alphaOff val="0"/>
-            </a:schemeClr>
-          </a:lnRef>
-          <a:fillRef idx="1">
-            <a:scrgbClr r="0" g="0" b="0"/>
-          </a:fillRef>
-          <a:effectRef idx="0">
-            <a:schemeClr val="accent1">
-              <a:hueOff val="0"/>
-              <a:satOff val="0"/>
-              <a:lumOff val="0"/>
-              <a:alphaOff val="0"/>
-            </a:schemeClr>
-          </a:effectRef>
-          <a:fontRef idx="minor">
-            <a:schemeClr val="lt1"/>
-          </a:fontRef>
-        </p:style>
-        <p:txBody>
-          <a:bodyPr spcFirstLastPara="0" vert="horz" wrap="square" lIns="128017" tIns="1112266" rIns="816990" bIns="1112266" numCol="1" spcCol="1270" anchor="ctr" anchorCtr="0">
-            <a:noAutofit/>
-          </a:bodyPr>
-          <a:lstStyle/>
-          <a:p>
-            <a:pPr marL="0" lvl="0" indent="0" algn="l" defTabSz="800100">
-              <a:lnSpc>
-                <a:spcPct val="90000"/>
-              </a:lnSpc>
-              <a:spcBef>
-                <a:spcPct val="0"/>
-              </a:spcBef>
-              <a:spcAft>
-                <a:spcPct val="35000"/>
-              </a:spcAft>
-              <a:buNone/>
-            </a:pPr>
-            <a:r>
-              <a:rPr lang="en-US" sz="1800" kern="1200" dirty="0"/>
-              <a:t>Listings Masters</a:t>
-            </a:r>
-          </a:p>
-          <a:p>
-            <a:pPr marL="0" lvl="0" indent="0" algn="l" defTabSz="800100">
-              <a:lnSpc>
-                <a:spcPct val="90000"/>
-              </a:lnSpc>
-              <a:spcBef>
-                <a:spcPct val="0"/>
-              </a:spcBef>
-              <a:spcAft>
-                <a:spcPct val="35000"/>
-              </a:spcAft>
-              <a:buNone/>
-            </a:pPr>
-            <a:r>
-              <a:rPr lang="en-US" sz="1800" kern="1200" dirty="0"/>
-              <a:t>Borough ID</a:t>
-            </a:r>
-          </a:p>
-          <a:p>
-            <a:pPr marL="0" lvl="0" indent="0" algn="l" defTabSz="800100">
-              <a:lnSpc>
-                <a:spcPct val="90000"/>
-              </a:lnSpc>
-              <a:spcBef>
-                <a:spcPct val="0"/>
-              </a:spcBef>
-              <a:spcAft>
-                <a:spcPct val="35000"/>
-              </a:spcAft>
-              <a:buNone/>
-            </a:pPr>
-            <a:r>
-              <a:rPr lang="en-US" sz="1800" kern="1200" dirty="0" err="1"/>
-              <a:t>Neighbourhood</a:t>
-            </a:r>
-            <a:r>
-              <a:rPr lang="en-US" sz="1800" kern="1200" dirty="0"/>
-              <a:t> ID</a:t>
-            </a:r>
-          </a:p>
-          <a:p>
-            <a:pPr marL="0" lvl="0" indent="0" algn="l" defTabSz="800100">
-              <a:lnSpc>
-                <a:spcPct val="90000"/>
-              </a:lnSpc>
-              <a:spcBef>
-                <a:spcPct val="0"/>
-              </a:spcBef>
-              <a:spcAft>
-                <a:spcPct val="35000"/>
-              </a:spcAft>
-              <a:buNone/>
-            </a:pPr>
-            <a:r>
-              <a:rPr lang="en-US" sz="1800" kern="1200" dirty="0"/>
-              <a:t>Room Type ID</a:t>
-            </a:r>
-          </a:p>
-          <a:p>
-            <a:pPr marL="0" lvl="0" indent="0" algn="l" defTabSz="800100">
-              <a:lnSpc>
-                <a:spcPct val="90000"/>
-              </a:lnSpc>
-              <a:spcBef>
-                <a:spcPct val="0"/>
-              </a:spcBef>
-              <a:spcAft>
-                <a:spcPct val="35000"/>
-              </a:spcAft>
-              <a:buNone/>
-            </a:pPr>
-            <a:r>
-              <a:rPr lang="en-US" sz="1800" kern="1200" dirty="0"/>
-              <a:t>Yearly Rates</a:t>
-            </a:r>
-            <a:endParaRPr lang="en-CA" sz="1800" kern="1200" dirty="0"/>
-          </a:p>
-        </p:txBody>
-      </p:sp>
-      <p:sp>
-        <p:nvSpPr>
-          <p:cNvPr id="8" name="Freeform: Shape 7">
-            <a:extLst>
-              <a:ext uri="{FF2B5EF4-FFF2-40B4-BE49-F238E27FC236}">
-                <a16:creationId xmlns:a16="http://schemas.microsoft.com/office/drawing/2014/main" id="{8DCB0047-6DA4-4D47-AF82-016DE52DB9EC}"/>
-              </a:ext>
-            </a:extLst>
-          </p:cNvPr>
-          <p:cNvSpPr/>
-          <p:nvPr/>
-        </p:nvSpPr>
-        <p:spPr>
-          <a:xfrm>
-            <a:off x="6222996" y="2623564"/>
-            <a:ext cx="3936999" cy="3936999"/>
-          </a:xfrm>
-          <a:custGeom>
-            <a:avLst/>
-            <a:gdLst>
-              <a:gd name="connsiteX0" fmla="*/ 0 w 3936999"/>
-              <a:gd name="connsiteY0" fmla="*/ 2559049 h 3936999"/>
-              <a:gd name="connsiteX1" fmla="*/ 984250 w 3936999"/>
-              <a:gd name="connsiteY1" fmla="*/ 2559049 h 3936999"/>
-              <a:gd name="connsiteX2" fmla="*/ 984250 w 3936999"/>
-              <a:gd name="connsiteY2" fmla="*/ 0 h 3936999"/>
-              <a:gd name="connsiteX3" fmla="*/ 2952749 w 3936999"/>
-              <a:gd name="connsiteY3" fmla="*/ 0 h 3936999"/>
-              <a:gd name="connsiteX4" fmla="*/ 2952749 w 3936999"/>
-              <a:gd name="connsiteY4" fmla="*/ 2559049 h 3936999"/>
-              <a:gd name="connsiteX5" fmla="*/ 3936999 w 3936999"/>
-              <a:gd name="connsiteY5" fmla="*/ 2559049 h 3936999"/>
-              <a:gd name="connsiteX6" fmla="*/ 1968500 w 3936999"/>
-              <a:gd name="connsiteY6" fmla="*/ 3936999 h 3936999"/>
-              <a:gd name="connsiteX7" fmla="*/ 0 w 3936999"/>
-              <a:gd name="connsiteY7" fmla="*/ 2559049 h 3936999"/>
-            </a:gdLst>
-            <a:ahLst/>
-            <a:cxnLst>
-              <a:cxn ang="0">
-                <a:pos x="connsiteX0" y="connsiteY0"/>
-              </a:cxn>
-              <a:cxn ang="0">
-                <a:pos x="connsiteX1" y="connsiteY1"/>
-              </a:cxn>
-              <a:cxn ang="0">
-                <a:pos x="connsiteX2" y="connsiteY2"/>
-              </a:cxn>
-              <a:cxn ang="0">
-                <a:pos x="connsiteX3" y="connsiteY3"/>
-              </a:cxn>
-              <a:cxn ang="0">
-                <a:pos x="connsiteX4" y="connsiteY4"/>
-              </a:cxn>
-              <a:cxn ang="0">
-                <a:pos x="connsiteX5" y="connsiteY5"/>
-              </a:cxn>
-              <a:cxn ang="0">
-                <a:pos x="connsiteX6" y="connsiteY6"/>
-              </a:cxn>
-              <a:cxn ang="0">
-                <a:pos x="connsiteX7" y="connsiteY7"/>
-              </a:cxn>
-            </a:cxnLst>
-            <a:rect l="l" t="t" r="r" b="b"/>
-            <a:pathLst>
-              <a:path w="3936999" h="3936999">
-                <a:moveTo>
-                  <a:pt x="1377950" y="0"/>
-                </a:moveTo>
-                <a:lnTo>
-                  <a:pt x="1377950" y="984250"/>
-                </a:lnTo>
-                <a:lnTo>
-                  <a:pt x="3936999" y="984250"/>
-                </a:lnTo>
-                <a:lnTo>
-                  <a:pt x="3936999" y="2952749"/>
-                </a:lnTo>
-                <a:lnTo>
-                  <a:pt x="1377950" y="2952749"/>
-                </a:lnTo>
-                <a:lnTo>
-                  <a:pt x="1377950" y="3936999"/>
-                </a:lnTo>
-                <a:lnTo>
-                  <a:pt x="0" y="1968500"/>
-                </a:lnTo>
-                <a:lnTo>
-                  <a:pt x="1377950" y="0"/>
-                </a:lnTo>
-                <a:close/>
-              </a:path>
-            </a:pathLst>
-          </a:custGeom>
-          <a:solidFill>
-            <a:srgbClr val="E87572"/>
-          </a:solidFill>
-          <a:ln>
-            <a:solidFill>
-              <a:srgbClr val="E9766F"/>
-            </a:solidFill>
-          </a:ln>
-        </p:spPr>
-        <p:style>
-          <a:lnRef idx="2">
-            <a:scrgbClr r="0" g="0" b="0"/>
-          </a:lnRef>
-          <a:fillRef idx="1">
-            <a:scrgbClr r="0" g="0" b="0"/>
-          </a:fillRef>
-          <a:effectRef idx="0">
-            <a:schemeClr val="accent1">
-              <a:hueOff val="0"/>
-              <a:satOff val="0"/>
-              <a:lumOff val="0"/>
-              <a:alphaOff val="0"/>
-            </a:schemeClr>
-          </a:effectRef>
-          <a:fontRef idx="minor">
-            <a:schemeClr val="lt1"/>
-          </a:fontRef>
-        </p:style>
-        <p:txBody>
-          <a:bodyPr spcFirstLastPara="0" vert="horz" wrap="square" lIns="816992" tIns="1112266" rIns="128015" bIns="1112266" numCol="1" spcCol="1270" anchor="ctr" anchorCtr="0">
-            <a:noAutofit/>
-          </a:bodyPr>
-          <a:lstStyle/>
-          <a:p>
-            <a:pPr marL="0" lvl="0" indent="0" algn="r" defTabSz="800100">
-              <a:lnSpc>
-                <a:spcPct val="90000"/>
-              </a:lnSpc>
-              <a:spcBef>
-                <a:spcPct val="0"/>
-              </a:spcBef>
-              <a:spcAft>
-                <a:spcPct val="35000"/>
-              </a:spcAft>
-              <a:buNone/>
-            </a:pPr>
-            <a:r>
-              <a:rPr lang="en-US" sz="1800" b="1" kern="1200" dirty="0"/>
-              <a:t>Monthly Rates</a:t>
-            </a:r>
-          </a:p>
-          <a:p>
-            <a:pPr marL="0" lvl="0" indent="0" algn="r" defTabSz="800100">
-              <a:lnSpc>
-                <a:spcPct val="90000"/>
-              </a:lnSpc>
-              <a:spcBef>
-                <a:spcPct val="0"/>
-              </a:spcBef>
-              <a:spcAft>
-                <a:spcPct val="35000"/>
-              </a:spcAft>
-              <a:buNone/>
-            </a:pPr>
-            <a:r>
-              <a:rPr lang="en-US" sz="1800" b="1" kern="1200" dirty="0"/>
-              <a:t>Day of Week Rates</a:t>
-            </a:r>
-          </a:p>
-          <a:p>
-            <a:pPr marL="0" lvl="0" indent="0" algn="r" defTabSz="800100">
-              <a:lnSpc>
-                <a:spcPct val="90000"/>
-              </a:lnSpc>
-              <a:spcBef>
-                <a:spcPct val="0"/>
-              </a:spcBef>
-              <a:spcAft>
-                <a:spcPct val="35000"/>
-              </a:spcAft>
-              <a:buNone/>
-            </a:pPr>
-            <a:r>
-              <a:rPr lang="en-US" sz="1800" b="1" kern="1200" dirty="0"/>
-              <a:t>Predicted Rates </a:t>
-            </a:r>
-            <a:endParaRPr lang="en-CA" sz="1800" b="1" kern="1200" dirty="0"/>
-          </a:p>
-        </p:txBody>
-      </p:sp>
-      <p:sp>
-        <p:nvSpPr>
-          <p:cNvPr id="7" name="TextBox 6">
-            <a:extLst>
-              <a:ext uri="{FF2B5EF4-FFF2-40B4-BE49-F238E27FC236}">
-                <a16:creationId xmlns:a16="http://schemas.microsoft.com/office/drawing/2014/main" id="{CF63465F-BC18-4EF3-8BBF-2C44DF33E3C6}"/>
-              </a:ext>
-            </a:extLst>
-          </p:cNvPr>
-          <p:cNvSpPr txBox="1"/>
-          <p:nvPr/>
-        </p:nvSpPr>
-        <p:spPr>
-          <a:xfrm>
-            <a:off x="1880946" y="2307280"/>
-            <a:ext cx="1556951" cy="461665"/>
-          </a:xfrm>
-          <a:prstGeom prst="rect">
-            <a:avLst/>
-          </a:prstGeom>
-          <a:noFill/>
-        </p:spPr>
-        <p:txBody>
-          <a:bodyPr wrap="square" rtlCol="0">
-            <a:spAutoFit/>
-          </a:bodyPr>
-          <a:lstStyle/>
-          <a:p>
-            <a:r>
-              <a:rPr lang="en-US" sz="2400" b="1" dirty="0"/>
-              <a:t>EXISTING</a:t>
-            </a:r>
-            <a:endParaRPr lang="en-CA" sz="2400" b="1" dirty="0"/>
-          </a:p>
-        </p:txBody>
-      </p:sp>
-      <p:sp>
-        <p:nvSpPr>
-          <p:cNvPr id="12" name="TextBox 11">
-            <a:extLst>
-              <a:ext uri="{FF2B5EF4-FFF2-40B4-BE49-F238E27FC236}">
-                <a16:creationId xmlns:a16="http://schemas.microsoft.com/office/drawing/2014/main" id="{F7D516A4-D57F-43E9-9281-41F4A8C9416F}"/>
-              </a:ext>
-            </a:extLst>
-          </p:cNvPr>
-          <p:cNvSpPr txBox="1"/>
-          <p:nvPr/>
-        </p:nvSpPr>
-        <p:spPr>
-          <a:xfrm>
-            <a:off x="9499221" y="2254420"/>
-            <a:ext cx="995378" cy="461665"/>
-          </a:xfrm>
-          <a:prstGeom prst="rect">
-            <a:avLst/>
-          </a:prstGeom>
-          <a:noFill/>
-        </p:spPr>
-        <p:txBody>
-          <a:bodyPr wrap="square" rtlCol="0">
-            <a:spAutoFit/>
-          </a:bodyPr>
-          <a:lstStyle/>
-          <a:p>
-            <a:r>
-              <a:rPr lang="en-US" sz="2400" b="1" dirty="0"/>
-              <a:t>NEW</a:t>
-            </a:r>
-            <a:endParaRPr lang="en-CA" sz="2400" b="1" dirty="0"/>
-          </a:p>
-        </p:txBody>
-      </p:sp>
-    </p:spTree>
-    <p:extLst>
-      <p:ext uri="{BB962C8B-B14F-4D97-AF65-F5344CB8AC3E}">
-        <p14:creationId xmlns:p14="http://schemas.microsoft.com/office/powerpoint/2010/main" val="2227089696"/>
-      </p:ext>
-    </p:extLst>
-  </p:cSld>
-  <p:clrMapOvr>
-    <a:masterClrMapping/>
-  </p:clrMapOvr>
-  <p:timing>
-    <p:tnLst>
-      <p:par>
-        <p:cTn id="1" dur="indefinite" restart="never" nodeType="tmRoot">
-          <p:childTnLst>
-            <p:seq concurrent="1" nextAc="seek">
-              <p:cTn id="2" dur="indefinite" nodeType="mainSeq">
-                <p:childTnLst>
-                  <p:par>
-                    <p:cTn id="3" fill="hold">
-                      <p:stCondLst>
-                        <p:cond delay="indefinite"/>
-                      </p:stCondLst>
-                      <p:childTnLst>
-                        <p:par>
-                          <p:cTn id="4" fill="hold">
-                            <p:stCondLst>
-                              <p:cond delay="0"/>
-                            </p:stCondLst>
-                            <p:childTnLst>
-                              <p:par>
-                                <p:cTn id="5" presetID="2" presetClass="entr" presetSubtype="8" fill="hold" grpId="0" nodeType="clickEffect">
-                                  <p:stCondLst>
-                                    <p:cond delay="0"/>
-                                  </p:stCondLst>
-                                  <p:childTnLst>
-                                    <p:set>
-                                      <p:cBhvr>
-                                        <p:cTn id="6" dur="1" fill="hold">
-                                          <p:stCondLst>
-                                            <p:cond delay="0"/>
-                                          </p:stCondLst>
-                                        </p:cTn>
-                                        <p:tgtEl>
-                                          <p:spTgt spid="7"/>
-                                        </p:tgtEl>
-                                        <p:attrNameLst>
-                                          <p:attrName>style.visibility</p:attrName>
-                                        </p:attrNameLst>
-                                      </p:cBhvr>
-                                      <p:to>
-                                        <p:strVal val="visible"/>
-                                      </p:to>
-                                    </p:set>
-                                    <p:anim calcmode="lin" valueType="num">
-                                      <p:cBhvr additive="base">
-                                        <p:cTn id="7" dur="500" fill="hold"/>
-                                        <p:tgtEl>
-                                          <p:spTgt spid="7"/>
-                                        </p:tgtEl>
-                                        <p:attrNameLst>
-                                          <p:attrName>ppt_x</p:attrName>
-                                        </p:attrNameLst>
-                                      </p:cBhvr>
-                                      <p:tavLst>
-                                        <p:tav tm="0">
-                                          <p:val>
-                                            <p:strVal val="0-#ppt_w/2"/>
-                                          </p:val>
-                                        </p:tav>
-                                        <p:tav tm="100000">
-                                          <p:val>
-                                            <p:strVal val="#ppt_x"/>
-                                          </p:val>
-                                        </p:tav>
-                                      </p:tavLst>
-                                    </p:anim>
-                                    <p:anim calcmode="lin" valueType="num">
-                                      <p:cBhvr additive="base">
-                                        <p:cTn id="8" dur="500" fill="hold"/>
-                                        <p:tgtEl>
-                                          <p:spTgt spid="7"/>
-                                        </p:tgtEl>
-                                        <p:attrNameLst>
-                                          <p:attrName>ppt_y</p:attrName>
-                                        </p:attrNameLst>
-                                      </p:cBhvr>
-                                      <p:tavLst>
-                                        <p:tav tm="0">
-                                          <p:val>
-                                            <p:strVal val="#ppt_y"/>
-                                          </p:val>
-                                        </p:tav>
-                                        <p:tav tm="100000">
-                                          <p:val>
-                                            <p:strVal val="#ppt_y"/>
-                                          </p:val>
-                                        </p:tav>
-                                      </p:tavLst>
-                                    </p:anim>
-                                  </p:childTnLst>
-                                </p:cTn>
-                              </p:par>
-                              <p:par>
-                                <p:cTn id="9" presetID="2" presetClass="entr" presetSubtype="8" fill="hold" grpId="0" nodeType="withEffect">
-                                  <p:stCondLst>
-                                    <p:cond delay="0"/>
-                                  </p:stCondLst>
-                                  <p:childTnLst>
-                                    <p:set>
-                                      <p:cBhvr>
-                                        <p:cTn id="10" dur="1" fill="hold">
-                                          <p:stCondLst>
-                                            <p:cond delay="0"/>
-                                          </p:stCondLst>
-                                        </p:cTn>
-                                        <p:tgtEl>
-                                          <p:spTgt spid="5"/>
-                                        </p:tgtEl>
-                                        <p:attrNameLst>
-                                          <p:attrName>style.visibility</p:attrName>
-                                        </p:attrNameLst>
-                                      </p:cBhvr>
-                                      <p:to>
-                                        <p:strVal val="visible"/>
-                                      </p:to>
-                                    </p:set>
-                                    <p:anim calcmode="lin" valueType="num">
-                                      <p:cBhvr additive="base">
-                                        <p:cTn id="11" dur="500" fill="hold"/>
-                                        <p:tgtEl>
-                                          <p:spTgt spid="5"/>
-                                        </p:tgtEl>
-                                        <p:attrNameLst>
-                                          <p:attrName>ppt_x</p:attrName>
-                                        </p:attrNameLst>
-                                      </p:cBhvr>
-                                      <p:tavLst>
-                                        <p:tav tm="0">
-                                          <p:val>
-                                            <p:strVal val="0-#ppt_w/2"/>
-                                          </p:val>
-                                        </p:tav>
-                                        <p:tav tm="100000">
-                                          <p:val>
-                                            <p:strVal val="#ppt_x"/>
-                                          </p:val>
-                                        </p:tav>
-                                      </p:tavLst>
-                                    </p:anim>
-                                    <p:anim calcmode="lin" valueType="num">
-                                      <p:cBhvr additive="base">
-                                        <p:cTn id="12" dur="500" fill="hold"/>
-                                        <p:tgtEl>
-                                          <p:spTgt spid="5"/>
-                                        </p:tgtEl>
-                                        <p:attrNameLst>
-                                          <p:attrName>ppt_y</p:attrName>
-                                        </p:attrNameLst>
-                                      </p:cBhvr>
-                                      <p:tavLst>
-                                        <p:tav tm="0">
-                                          <p:val>
-                                            <p:strVal val="#ppt_y"/>
-                                          </p:val>
-                                        </p:tav>
-                                        <p:tav tm="100000">
-                                          <p:val>
-                                            <p:strVal val="#ppt_y"/>
-                                          </p:val>
-                                        </p:tav>
-                                      </p:tavLst>
-                                    </p:anim>
-                                  </p:childTnLst>
-                                </p:cTn>
-                              </p:par>
-                            </p:childTnLst>
-                          </p:cTn>
-                        </p:par>
-                      </p:childTnLst>
-                    </p:cTn>
-                  </p:par>
-                  <p:par>
-                    <p:cTn id="13" fill="hold">
-                      <p:stCondLst>
-                        <p:cond delay="indefinite"/>
-                      </p:stCondLst>
-                      <p:childTnLst>
-                        <p:par>
-                          <p:cTn id="14" fill="hold">
-                            <p:stCondLst>
-                              <p:cond delay="0"/>
-                            </p:stCondLst>
-                            <p:childTnLst>
-                              <p:par>
-                                <p:cTn id="15" presetID="2" presetClass="entr" presetSubtype="2" fill="hold" grpId="0" nodeType="clickEffect">
-                                  <p:stCondLst>
-                                    <p:cond delay="0"/>
-                                  </p:stCondLst>
-                                  <p:childTnLst>
-                                    <p:set>
-                                      <p:cBhvr>
-                                        <p:cTn id="16" dur="1" fill="hold">
-                                          <p:stCondLst>
-                                            <p:cond delay="0"/>
-                                          </p:stCondLst>
-                                        </p:cTn>
-                                        <p:tgtEl>
-                                          <p:spTgt spid="8"/>
-                                        </p:tgtEl>
-                                        <p:attrNameLst>
-                                          <p:attrName>style.visibility</p:attrName>
-                                        </p:attrNameLst>
-                                      </p:cBhvr>
-                                      <p:to>
-                                        <p:strVal val="visible"/>
-                                      </p:to>
-                                    </p:set>
-                                    <p:anim calcmode="lin" valueType="num">
-                                      <p:cBhvr additive="base">
-                                        <p:cTn id="17" dur="500" fill="hold"/>
-                                        <p:tgtEl>
-                                          <p:spTgt spid="8"/>
-                                        </p:tgtEl>
-                                        <p:attrNameLst>
-                                          <p:attrName>ppt_x</p:attrName>
-                                        </p:attrNameLst>
-                                      </p:cBhvr>
-                                      <p:tavLst>
-                                        <p:tav tm="0">
-                                          <p:val>
-                                            <p:strVal val="1+#ppt_w/2"/>
-                                          </p:val>
-                                        </p:tav>
-                                        <p:tav tm="100000">
-                                          <p:val>
-                                            <p:strVal val="#ppt_x"/>
-                                          </p:val>
-                                        </p:tav>
-                                      </p:tavLst>
-                                    </p:anim>
-                                    <p:anim calcmode="lin" valueType="num">
-                                      <p:cBhvr additive="base">
-                                        <p:cTn id="18" dur="500" fill="hold"/>
-                                        <p:tgtEl>
-                                          <p:spTgt spid="8"/>
-                                        </p:tgtEl>
-                                        <p:attrNameLst>
-                                          <p:attrName>ppt_y</p:attrName>
-                                        </p:attrNameLst>
-                                      </p:cBhvr>
-                                      <p:tavLst>
-                                        <p:tav tm="0">
-                                          <p:val>
-                                            <p:strVal val="#ppt_y"/>
-                                          </p:val>
-                                        </p:tav>
-                                        <p:tav tm="100000">
-                                          <p:val>
-                                            <p:strVal val="#ppt_y"/>
-                                          </p:val>
-                                        </p:tav>
-                                      </p:tavLst>
-                                    </p:anim>
-                                  </p:childTnLst>
-                                </p:cTn>
-                              </p:par>
-                              <p:par>
-                                <p:cTn id="19" presetID="2" presetClass="entr" presetSubtype="2" fill="hold" grpId="0" nodeType="withEffect">
-                                  <p:stCondLst>
-                                    <p:cond delay="0"/>
-                                  </p:stCondLst>
-                                  <p:childTnLst>
-                                    <p:set>
-                                      <p:cBhvr>
-                                        <p:cTn id="20" dur="1" fill="hold">
-                                          <p:stCondLst>
-                                            <p:cond delay="0"/>
-                                          </p:stCondLst>
-                                        </p:cTn>
-                                        <p:tgtEl>
-                                          <p:spTgt spid="12"/>
-                                        </p:tgtEl>
-                                        <p:attrNameLst>
-                                          <p:attrName>style.visibility</p:attrName>
-                                        </p:attrNameLst>
-                                      </p:cBhvr>
-                                      <p:to>
-                                        <p:strVal val="visible"/>
-                                      </p:to>
-                                    </p:set>
-                                    <p:anim calcmode="lin" valueType="num">
-                                      <p:cBhvr additive="base">
-                                        <p:cTn id="21" dur="500" fill="hold"/>
-                                        <p:tgtEl>
-                                          <p:spTgt spid="12"/>
-                                        </p:tgtEl>
-                                        <p:attrNameLst>
-                                          <p:attrName>ppt_x</p:attrName>
-                                        </p:attrNameLst>
-                                      </p:cBhvr>
-                                      <p:tavLst>
-                                        <p:tav tm="0">
-                                          <p:val>
-                                            <p:strVal val="1+#ppt_w/2"/>
-                                          </p:val>
-                                        </p:tav>
-                                        <p:tav tm="100000">
-                                          <p:val>
-                                            <p:strVal val="#ppt_x"/>
-                                          </p:val>
-                                        </p:tav>
-                                      </p:tavLst>
-                                    </p:anim>
-                                    <p:anim calcmode="lin" valueType="num">
-                                      <p:cBhvr additive="base">
-                                        <p:cTn id="22" dur="500" fill="hold"/>
-                                        <p:tgtEl>
-                                          <p:spTgt spid="12"/>
-                                        </p:tgtEl>
-                                        <p:attrNameLst>
-                                          <p:attrName>ppt_y</p:attrName>
-                                        </p:attrNameLst>
-                                      </p:cBhvr>
-                                      <p:tavLst>
-                                        <p:tav tm="0">
-                                          <p:val>
-                                            <p:strVal val="#ppt_y"/>
-                                          </p:val>
-                                        </p:tav>
-                                        <p:tav tm="100000">
-                                          <p:val>
-                                            <p:strVal val="#ppt_y"/>
-                                          </p:val>
-                                        </p:tav>
-                                      </p:tavLst>
-                                    </p:anim>
-                                  </p:childTnLst>
-                                </p:cTn>
-                              </p:par>
-                            </p:childTnLst>
-                          </p:cTn>
-                        </p:par>
-                      </p:childTnLst>
-                    </p:cTn>
-                  </p:par>
-                </p:childTnLst>
-              </p:cTn>
-              <p:prevCondLst>
-                <p:cond evt="onPrev" delay="0">
-                  <p:tgtEl>
-                    <p:sldTgt/>
-                  </p:tgtEl>
-                </p:cond>
-              </p:prevCondLst>
-              <p:nextCondLst>
-                <p:cond evt="onNext" delay="0">
-                  <p:tgtEl>
-                    <p:sldTgt/>
-                  </p:tgtEl>
-                </p:cond>
-              </p:nextCondLst>
-            </p:seq>
-          </p:childTnLst>
-        </p:cTn>
-      </p:par>
-    </p:tnLst>
-    <p:bldLst>
-      <p:bldP spid="5" grpId="0" animBg="1"/>
-      <p:bldP spid="8" grpId="0" animBg="1"/>
-      <p:bldP spid="7" grpId="0"/>
-      <p:bldP spid="12" grpId="0"/>
-    </p:bldLst>
-  </p:timing>
-</p:sld>
-</file>
-
 <file path=ppt/slides/slide7.xml><?xml version="1.0" encoding="utf-8"?>
 <p:sld xmlns:a="http://schemas.openxmlformats.org/drawingml/2006/main" xmlns:r="http://schemas.openxmlformats.org/officeDocument/2006/relationships" xmlns:p="http://schemas.openxmlformats.org/presentationml/2006/main">
   <p:cSld>
@@ -18305,8 +18557,8 @@
         </p:nvSpPr>
         <p:spPr>
           <a:xfrm>
-            <a:off x="1055716" y="1899025"/>
-            <a:ext cx="5259115" cy="4524315"/>
+            <a:off x="1055716" y="1684830"/>
+            <a:ext cx="5259115" cy="5078313"/>
           </a:xfrm>
           <a:prstGeom prst="rect">
             <a:avLst/>
@@ -18323,9 +18575,16 @@
               <a:buFont typeface="+mj-lt"/>
               <a:buAutoNum type="arabicPeriod"/>
             </a:pPr>
+            <a:endParaRPr lang="en-US" dirty="0"/>
+          </a:p>
+          <a:p>
+            <a:pPr marL="342900" indent="-342900">
+              <a:buFont typeface="+mj-lt"/>
+              <a:buAutoNum type="arabicPeriod"/>
+            </a:pPr>
             <a:r>
               <a:rPr lang="en-US" dirty="0"/>
-              <a:t>Seasonality and Trends have a big impact on how to price your listings.</a:t>
+              <a:t>Slight upward trend in the future.</a:t>
             </a:r>
           </a:p>
           <a:p>
@@ -18342,7 +18601,7 @@
             </a:pPr>
             <a:r>
               <a:rPr lang="en-US" dirty="0"/>
-              <a:t>Location, Room Type and Accommodation Features are major factors that determine the price.</a:t>
+              <a:t>Location is a key factor that segregates the rates from one area to another.</a:t>
             </a:r>
           </a:p>
           <a:p>
@@ -18359,7 +18618,7 @@
             </a:pPr>
             <a:r>
               <a:rPr lang="en-US" dirty="0"/>
-              <a:t>Amenities are nice features to add some value in your Airbnb listings.</a:t>
+              <a:t>Low-Moderate clustering impact in predicting prices based on local average of a specific area.</a:t>
             </a:r>
           </a:p>
           <a:p>
@@ -18376,7 +18635,7 @@
             </a:pPr>
             <a:r>
               <a:rPr lang="en-US" dirty="0"/>
-              <a:t>Low-Moderate impact in predicting prices based on local average of a specific area.</a:t>
+              <a:t>Room Type and Accommodation Features are major factors that determine the price.</a:t>
             </a:r>
           </a:p>
           <a:p>
@@ -18393,11 +18652,25 @@
             </a:pPr>
             <a:r>
               <a:rPr lang="en-US" dirty="0"/>
-              <a:t>Upward trend in prices for the future.</a:t>
-            </a:r>
-          </a:p>
-          <a:p>
+              <a:t>Seasonality and Trends have a big impact on how to price your listings.</a:t>
+            </a:r>
+          </a:p>
+          <a:p>
+            <a:pPr marL="342900" indent="-342900">
+              <a:buFont typeface="+mj-lt"/>
+              <a:buAutoNum type="arabicPeriod"/>
+            </a:pPr>
             <a:endParaRPr lang="en-US" dirty="0"/>
+          </a:p>
+          <a:p>
+            <a:pPr marL="342900" indent="-342900">
+              <a:buFont typeface="+mj-lt"/>
+              <a:buAutoNum type="arabicPeriod"/>
+            </a:pPr>
+            <a:r>
+              <a:rPr lang="en-US" dirty="0"/>
+              <a:t>Amenities are only nice-to-have features that have a slight impact in your Airbnb listings.</a:t>
+            </a:r>
           </a:p>
           <a:p>
             <a:pPr marL="342900" indent="-342900">
@@ -18429,7 +18702,7 @@
         </p:blipFill>
         <p:spPr>
           <a:xfrm>
-            <a:off x="6893705" y="1831027"/>
+            <a:off x="6893705" y="1945100"/>
             <a:ext cx="3505688" cy="4315313"/>
           </a:xfrm>
           <a:prstGeom prst="rect">
@@ -18483,7 +18756,7 @@
                                         <p:tgtEl>
                                           <p:spTgt spid="5">
                                             <p:txEl>
-                                              <p:pRg st="0" end="0"/>
+                                              <p:pRg st="3" end="3"/>
                                             </p:txEl>
                                           </p:spTgt>
                                         </p:tgtEl>
@@ -18501,7 +18774,7 @@
                                         <p:tgtEl>
                                           <p:spTgt spid="5">
                                             <p:txEl>
-                                              <p:pRg st="0" end="0"/>
+                                              <p:pRg st="3" end="3"/>
                                             </p:txEl>
                                           </p:spTgt>
                                         </p:tgtEl>
@@ -18528,7 +18801,7 @@
                                         <p:tgtEl>
                                           <p:spTgt spid="5">
                                             <p:txEl>
-                                              <p:pRg st="0" end="0"/>
+                                              <p:pRg st="3" end="3"/>
                                             </p:txEl>
                                           </p:spTgt>
                                         </p:tgtEl>
@@ -18586,7 +18859,7 @@
                                         <p:tgtEl>
                                           <p:spTgt spid="5">
                                             <p:txEl>
-                                              <p:pRg st="2" end="2"/>
+                                              <p:pRg st="1" end="1"/>
                                             </p:txEl>
                                           </p:spTgt>
                                         </p:tgtEl>
@@ -18604,7 +18877,7 @@
                                         <p:tgtEl>
                                           <p:spTgt spid="5">
                                             <p:txEl>
-                                              <p:pRg st="2" end="2"/>
+                                              <p:pRg st="1" end="1"/>
                                             </p:txEl>
                                           </p:spTgt>
                                         </p:tgtEl>
@@ -18631,7 +18904,419 @@
                                         <p:tgtEl>
                                           <p:spTgt spid="5">
                                             <p:txEl>
-                                              <p:pRg st="2" end="2"/>
+                                              <p:pRg st="1" end="1"/>
+                                            </p:txEl>
+                                          </p:spTgt>
+                                        </p:tgtEl>
+                                        <p:attrNameLst>
+                                          <p:attrName>ppt_y</p:attrName>
+                                        </p:attrNameLst>
+                                      </p:cBhvr>
+                                      <p:tavLst>
+                                        <p:tav tm="0">
+                                          <p:val>
+                                            <p:strVal val="#ppt_y"/>
+                                          </p:val>
+                                        </p:tav>
+                                        <p:tav tm="100000">
+                                          <p:val>
+                                            <p:strVal val="#ppt_y"/>
+                                          </p:val>
+                                        </p:tav>
+                                      </p:tavLst>
+                                    </p:anim>
+                                  </p:childTnLst>
+                                </p:cTn>
+                              </p:par>
+                            </p:childTnLst>
+                          </p:cTn>
+                        </p:par>
+                      </p:childTnLst>
+                    </p:cTn>
+                  </p:par>
+                  <p:par>
+                    <p:cTn id="15" fill="hold">
+                      <p:stCondLst>
+                        <p:cond delay="indefinite"/>
+                      </p:stCondLst>
+                      <p:childTnLst>
+                        <p:par>
+                          <p:cTn id="16" fill="hold">
+                            <p:stCondLst>
+                              <p:cond delay="0"/>
+                            </p:stCondLst>
+                            <p:childTnLst>
+                              <p:par>
+                                <p:cTn id="17" presetID="2" presetClass="entr" presetSubtype="8" fill="hold" nodeType="clickEffect">
+                                  <p:stCondLst>
+                                    <p:cond delay="0"/>
+                                  </p:stCondLst>
+                                  <p:childTnLst>
+                                    <p:set>
+                                      <p:cBhvr>
+                                        <p:cTn id="18" dur="1" fill="hold">
+                                          <p:stCondLst>
+                                            <p:cond delay="0"/>
+                                          </p:stCondLst>
+                                        </p:cTn>
+                                        <p:tgtEl>
+                                          <p:spTgt spid="5">
+                                            <p:txEl>
+                                              <p:pRg st="5" end="5"/>
+                                            </p:txEl>
+                                          </p:spTgt>
+                                        </p:tgtEl>
+                                        <p:attrNameLst>
+                                          <p:attrName>style.visibility</p:attrName>
+                                        </p:attrNameLst>
+                                      </p:cBhvr>
+                                      <p:to>
+                                        <p:strVal val="visible"/>
+                                      </p:to>
+                                    </p:set>
+                                    <p:anim calcmode="lin" valueType="num">
+                                      <p:cBhvr additive="base">
+                                        <p:cTn id="19" dur="500" fill="hold"/>
+                                        <p:tgtEl>
+                                          <p:spTgt spid="5">
+                                            <p:txEl>
+                                              <p:pRg st="5" end="5"/>
+                                            </p:txEl>
+                                          </p:spTgt>
+                                        </p:tgtEl>
+                                        <p:attrNameLst>
+                                          <p:attrName>ppt_x</p:attrName>
+                                        </p:attrNameLst>
+                                      </p:cBhvr>
+                                      <p:tavLst>
+                                        <p:tav tm="0">
+                                          <p:val>
+                                            <p:strVal val="0-#ppt_w/2"/>
+                                          </p:val>
+                                        </p:tav>
+                                        <p:tav tm="100000">
+                                          <p:val>
+                                            <p:strVal val="#ppt_x"/>
+                                          </p:val>
+                                        </p:tav>
+                                      </p:tavLst>
+                                    </p:anim>
+                                    <p:anim calcmode="lin" valueType="num">
+                                      <p:cBhvr additive="base">
+                                        <p:cTn id="20" dur="500" fill="hold"/>
+                                        <p:tgtEl>
+                                          <p:spTgt spid="5">
+                                            <p:txEl>
+                                              <p:pRg st="5" end="5"/>
+                                            </p:txEl>
+                                          </p:spTgt>
+                                        </p:tgtEl>
+                                        <p:attrNameLst>
+                                          <p:attrName>ppt_y</p:attrName>
+                                        </p:attrNameLst>
+                                      </p:cBhvr>
+                                      <p:tavLst>
+                                        <p:tav tm="0">
+                                          <p:val>
+                                            <p:strVal val="#ppt_y"/>
+                                          </p:val>
+                                        </p:tav>
+                                        <p:tav tm="100000">
+                                          <p:val>
+                                            <p:strVal val="#ppt_y"/>
+                                          </p:val>
+                                        </p:tav>
+                                      </p:tavLst>
+                                    </p:anim>
+                                  </p:childTnLst>
+                                </p:cTn>
+                              </p:par>
+                            </p:childTnLst>
+                          </p:cTn>
+                        </p:par>
+                      </p:childTnLst>
+                    </p:cTn>
+                  </p:par>
+                  <p:par>
+                    <p:cTn id="21" fill="hold">
+                      <p:stCondLst>
+                        <p:cond delay="indefinite"/>
+                      </p:stCondLst>
+                      <p:childTnLst>
+                        <p:par>
+                          <p:cTn id="22" fill="hold">
+                            <p:stCondLst>
+                              <p:cond delay="0"/>
+                            </p:stCondLst>
+                            <p:childTnLst>
+                              <p:par>
+                                <p:cTn id="23" presetID="2" presetClass="entr" presetSubtype="8" fill="hold" nodeType="clickEffect">
+                                  <p:stCondLst>
+                                    <p:cond delay="0"/>
+                                  </p:stCondLst>
+                                  <p:childTnLst>
+                                    <p:set>
+                                      <p:cBhvr>
+                                        <p:cTn id="24" dur="1" fill="hold">
+                                          <p:stCondLst>
+                                            <p:cond delay="0"/>
+                                          </p:stCondLst>
+                                        </p:cTn>
+                                        <p:tgtEl>
+                                          <p:spTgt spid="5">
+                                            <p:txEl>
+                                              <p:pRg st="7" end="7"/>
+                                            </p:txEl>
+                                          </p:spTgt>
+                                        </p:tgtEl>
+                                        <p:attrNameLst>
+                                          <p:attrName>style.visibility</p:attrName>
+                                        </p:attrNameLst>
+                                      </p:cBhvr>
+                                      <p:to>
+                                        <p:strVal val="visible"/>
+                                      </p:to>
+                                    </p:set>
+                                    <p:anim calcmode="lin" valueType="num">
+                                      <p:cBhvr additive="base">
+                                        <p:cTn id="25" dur="500" fill="hold"/>
+                                        <p:tgtEl>
+                                          <p:spTgt spid="5">
+                                            <p:txEl>
+                                              <p:pRg st="7" end="7"/>
+                                            </p:txEl>
+                                          </p:spTgt>
+                                        </p:tgtEl>
+                                        <p:attrNameLst>
+                                          <p:attrName>ppt_x</p:attrName>
+                                        </p:attrNameLst>
+                                      </p:cBhvr>
+                                      <p:tavLst>
+                                        <p:tav tm="0">
+                                          <p:val>
+                                            <p:strVal val="0-#ppt_w/2"/>
+                                          </p:val>
+                                        </p:tav>
+                                        <p:tav tm="100000">
+                                          <p:val>
+                                            <p:strVal val="#ppt_x"/>
+                                          </p:val>
+                                        </p:tav>
+                                      </p:tavLst>
+                                    </p:anim>
+                                    <p:anim calcmode="lin" valueType="num">
+                                      <p:cBhvr additive="base">
+                                        <p:cTn id="26" dur="500" fill="hold"/>
+                                        <p:tgtEl>
+                                          <p:spTgt spid="5">
+                                            <p:txEl>
+                                              <p:pRg st="7" end="7"/>
+                                            </p:txEl>
+                                          </p:spTgt>
+                                        </p:tgtEl>
+                                        <p:attrNameLst>
+                                          <p:attrName>ppt_y</p:attrName>
+                                        </p:attrNameLst>
+                                      </p:cBhvr>
+                                      <p:tavLst>
+                                        <p:tav tm="0">
+                                          <p:val>
+                                            <p:strVal val="#ppt_y"/>
+                                          </p:val>
+                                        </p:tav>
+                                        <p:tav tm="100000">
+                                          <p:val>
+                                            <p:strVal val="#ppt_y"/>
+                                          </p:val>
+                                        </p:tav>
+                                      </p:tavLst>
+                                    </p:anim>
+                                  </p:childTnLst>
+                                </p:cTn>
+                              </p:par>
+                            </p:childTnLst>
+                          </p:cTn>
+                        </p:par>
+                      </p:childTnLst>
+                    </p:cTn>
+                  </p:par>
+                  <p:par>
+                    <p:cTn id="27" fill="hold">
+                      <p:stCondLst>
+                        <p:cond delay="indefinite"/>
+                      </p:stCondLst>
+                      <p:childTnLst>
+                        <p:par>
+                          <p:cTn id="28" fill="hold">
+                            <p:stCondLst>
+                              <p:cond delay="0"/>
+                            </p:stCondLst>
+                            <p:childTnLst>
+                              <p:par>
+                                <p:cTn id="29" presetID="2" presetClass="entr" presetSubtype="8" fill="hold" nodeType="clickEffect">
+                                  <p:stCondLst>
+                                    <p:cond delay="0"/>
+                                  </p:stCondLst>
+                                  <p:childTnLst>
+                                    <p:set>
+                                      <p:cBhvr>
+                                        <p:cTn id="30" dur="1" fill="hold">
+                                          <p:stCondLst>
+                                            <p:cond delay="0"/>
+                                          </p:stCondLst>
+                                        </p:cTn>
+                                        <p:tgtEl>
+                                          <p:spTgt spid="5">
+                                            <p:txEl>
+                                              <p:pRg st="9" end="9"/>
+                                            </p:txEl>
+                                          </p:spTgt>
+                                        </p:tgtEl>
+                                        <p:attrNameLst>
+                                          <p:attrName>style.visibility</p:attrName>
+                                        </p:attrNameLst>
+                                      </p:cBhvr>
+                                      <p:to>
+                                        <p:strVal val="visible"/>
+                                      </p:to>
+                                    </p:set>
+                                    <p:anim calcmode="lin" valueType="num">
+                                      <p:cBhvr additive="base">
+                                        <p:cTn id="31" dur="500" fill="hold"/>
+                                        <p:tgtEl>
+                                          <p:spTgt spid="5">
+                                            <p:txEl>
+                                              <p:pRg st="9" end="9"/>
+                                            </p:txEl>
+                                          </p:spTgt>
+                                        </p:tgtEl>
+                                        <p:attrNameLst>
+                                          <p:attrName>ppt_x</p:attrName>
+                                        </p:attrNameLst>
+                                      </p:cBhvr>
+                                      <p:tavLst>
+                                        <p:tav tm="0">
+                                          <p:val>
+                                            <p:strVal val="0-#ppt_w/2"/>
+                                          </p:val>
+                                        </p:tav>
+                                        <p:tav tm="100000">
+                                          <p:val>
+                                            <p:strVal val="#ppt_x"/>
+                                          </p:val>
+                                        </p:tav>
+                                      </p:tavLst>
+                                    </p:anim>
+                                    <p:anim calcmode="lin" valueType="num">
+                                      <p:cBhvr additive="base">
+                                        <p:cTn id="32" dur="500" fill="hold"/>
+                                        <p:tgtEl>
+                                          <p:spTgt spid="5">
+                                            <p:txEl>
+                                              <p:pRg st="9" end="9"/>
+                                            </p:txEl>
+                                          </p:spTgt>
+                                        </p:tgtEl>
+                                        <p:attrNameLst>
+                                          <p:attrName>ppt_y</p:attrName>
+                                        </p:attrNameLst>
+                                      </p:cBhvr>
+                                      <p:tavLst>
+                                        <p:tav tm="0">
+                                          <p:val>
+                                            <p:strVal val="#ppt_y"/>
+                                          </p:val>
+                                        </p:tav>
+                                        <p:tav tm="100000">
+                                          <p:val>
+                                            <p:strVal val="#ppt_y"/>
+                                          </p:val>
+                                        </p:tav>
+                                      </p:tavLst>
+                                    </p:anim>
+                                  </p:childTnLst>
+                                </p:cTn>
+                              </p:par>
+                            </p:childTnLst>
+                          </p:cTn>
+                        </p:par>
+                      </p:childTnLst>
+                    </p:cTn>
+                  </p:par>
+                  <p:par>
+                    <p:cTn id="33" fill="hold">
+                      <p:stCondLst>
+                        <p:cond delay="indefinite"/>
+                      </p:stCondLst>
+                      <p:childTnLst>
+                        <p:par>
+                          <p:cTn id="34" fill="hold">
+                            <p:stCondLst>
+                              <p:cond delay="0"/>
+                            </p:stCondLst>
+                            <p:childTnLst>
+                              <p:par>
+                                <p:cTn id="35" presetID="2" presetClass="entr" presetSubtype="8" fill="hold" nodeType="clickEffect">
+                                  <p:stCondLst>
+                                    <p:cond delay="0"/>
+                                  </p:stCondLst>
+                                  <p:childTnLst>
+                                    <p:set>
+                                      <p:cBhvr>
+                                        <p:cTn id="36" dur="1" fill="hold">
+                                          <p:stCondLst>
+                                            <p:cond delay="0"/>
+                                          </p:stCondLst>
+                                        </p:cTn>
+                                        <p:tgtEl>
+                                          <p:spTgt spid="5">
+                                            <p:txEl>
+                                              <p:pRg st="11" end="11"/>
+                                            </p:txEl>
+                                          </p:spTgt>
+                                        </p:tgtEl>
+                                        <p:attrNameLst>
+                                          <p:attrName>style.visibility</p:attrName>
+                                        </p:attrNameLst>
+                                      </p:cBhvr>
+                                      <p:to>
+                                        <p:strVal val="visible"/>
+                                      </p:to>
+                                    </p:set>
+                                    <p:anim calcmode="lin" valueType="num">
+                                      <p:cBhvr additive="base">
+                                        <p:cTn id="37" dur="500" fill="hold"/>
+                                        <p:tgtEl>
+                                          <p:spTgt spid="5">
+                                            <p:txEl>
+                                              <p:pRg st="11" end="11"/>
+                                            </p:txEl>
+                                          </p:spTgt>
+                                        </p:tgtEl>
+                                        <p:attrNameLst>
+                                          <p:attrName>ppt_x</p:attrName>
+                                        </p:attrNameLst>
+                                      </p:cBhvr>
+                                      <p:tavLst>
+                                        <p:tav tm="0">
+                                          <p:val>
+                                            <p:strVal val="0-#ppt_w/2"/>
+                                          </p:val>
+                                        </p:tav>
+                                        <p:tav tm="100000">
+                                          <p:val>
+                                            <p:strVal val="#ppt_x"/>
+                                          </p:val>
+                                        </p:tav>
+                                      </p:tavLst>
+                                    </p:anim>
+                                    <p:anim calcmode="lin" valueType="num">
+                                      <p:cBhvr additive="base">
+                                        <p:cTn id="38" dur="500" fill="hold"/>
+                                        <p:tgtEl>
+                                          <p:spTgt spid="5">
+                                            <p:txEl>
+                                              <p:pRg st="11" end="11"/>
                                             </p:txEl>
                                           </p:spTgt>
                                         </p:tgtEl>
@@ -18737,7 +19422,7 @@
                   <a:srgbClr val="EA5E46"/>
                 </a:solidFill>
               </a:rPr>
-              <a:t>Model Data Transformation – RF, LGBM, KNN</a:t>
+              <a:t>Model Data Transformation – Regressors</a:t>
             </a:r>
           </a:p>
         </p:txBody>
@@ -18806,7 +19491,7 @@
         <p:spPr>
           <a:xfrm>
             <a:off x="975854" y="1684829"/>
-            <a:ext cx="9518745" cy="1"/>
+            <a:ext cx="10258203" cy="0"/>
           </a:xfrm>
           <a:prstGeom prst="line">
             <a:avLst/>
@@ -18963,6 +19648,41 @@
                                   </p:childTnLst>
                                 </p:cTn>
                               </p:par>
+                              <p:par>
+                                <p:cTn id="8" presetID="16" presetClass="entr" presetSubtype="21" fill="hold" grpId="0" nodeType="withEffect">
+                                  <p:stCondLst>
+                                    <p:cond delay="0"/>
+                                  </p:stCondLst>
+                                  <p:childTnLst>
+                                    <p:set>
+                                      <p:cBhvr>
+                                        <p:cTn id="9" dur="1" fill="hold">
+                                          <p:stCondLst>
+                                            <p:cond delay="0"/>
+                                          </p:stCondLst>
+                                        </p:cTn>
+                                        <p:tgtEl>
+                                          <p:spTgt spid="3"/>
+                                        </p:tgtEl>
+                                        <p:attrNameLst>
+                                          <p:attrName>style.visibility</p:attrName>
+                                        </p:attrNameLst>
+                                      </p:cBhvr>
+                                      <p:to>
+                                        <p:strVal val="visible"/>
+                                      </p:to>
+                                    </p:set>
+                                    <p:animEffect transition="in" filter="barn(inVertical)">
+                                      <p:cBhvr>
+                                        <p:cTn id="10" dur="500"/>
+                                        <p:tgtEl>
+                                          <p:spTgt spid="3"/>
+                                        </p:tgtEl>
+                                      </p:cBhvr>
+                                    </p:animEffect>
+                                  </p:childTnLst>
+                                </p:cTn>
+                              </p:par>
                             </p:childTnLst>
                           </p:cTn>
                         </p:par>
@@ -18990,6 +19710,9 @@
         </p:cTn>
       </p:par>
     </p:tnLst>
+    <p:bldLst>
+      <p:bldP spid="3" grpId="0"/>
+    </p:bldLst>
   </p:timing>
 </p:sld>
 </file>

</xml_diff>

<commit_message>
Update Airbnb Price Predictions (Model).pptx
</commit_message>
<xml_diff>
--- a/Airbnb Price Predictions (Model).pptx
+++ b/Airbnb Price Predictions (Model).pptx
@@ -6563,10 +6563,10 @@
       </p:grpSpPr>
       <p:sp>
         <p:nvSpPr>
-          <p:cNvPr id="13" name="TextBox 12">
+          <p:cNvPr id="20" name="TextBox 19">
             <a:extLst>
               <a:ext uri="{FF2B5EF4-FFF2-40B4-BE49-F238E27FC236}">
-                <a16:creationId xmlns:a16="http://schemas.microsoft.com/office/drawing/2014/main" id="{31ECE876-8EDD-084B-A4A3-59D0BF476534}"/>
+                <a16:creationId xmlns:a16="http://schemas.microsoft.com/office/drawing/2014/main" id="{F14FB99A-DF85-EA42-BC5C-C8B98E98F4D8}"/>
               </a:ext>
             </a:extLst>
           </p:cNvPr>
@@ -6574,9 +6574,9 @@
           <p:nvPr/>
         </p:nvSpPr>
         <p:spPr>
-          <a:xfrm>
-            <a:off x="3588884" y="984325"/>
-            <a:ext cx="8412480" cy="646331"/>
+          <a:xfrm rot="10800000" flipV="1">
+            <a:off x="2326534" y="5474034"/>
+            <a:ext cx="7738946" cy="1200329"/>
           </a:xfrm>
           <a:prstGeom prst="rect">
             <a:avLst/>
@@ -6591,49 +6591,91 @@
           <a:p>
             <a:pPr algn="ctr"/>
             <a:r>
-              <a:rPr lang="en-US" sz="3600" dirty="0">
+              <a:rPr lang="en-US" i="1" dirty="0">
                 <a:latin typeface="+mj-lt"/>
               </a:rPr>
-              <a:t>Airbnb Price Predictions – 03/25/21</a:t>
-            </a:r>
-            <a:endParaRPr lang="en-US" dirty="0"/>
+              <a:t>Kapil </a:t>
+            </a:r>
+            <a:r>
+              <a:rPr lang="en-US" i="1" dirty="0" err="1">
+                <a:latin typeface="+mj-lt"/>
+              </a:rPr>
+              <a:t>Pundhir</a:t>
+            </a:r>
+            <a:r>
+              <a:rPr lang="en-US" i="1" dirty="0">
+                <a:latin typeface="+mj-lt"/>
+              </a:rPr>
+              <a:t>, Hillary </a:t>
+            </a:r>
+            <a:r>
+              <a:rPr lang="en-US" i="1" dirty="0" err="1">
+                <a:latin typeface="+mj-lt"/>
+              </a:rPr>
+              <a:t>Mandich</a:t>
+            </a:r>
+            <a:r>
+              <a:rPr lang="en-US" i="1" dirty="0">
+                <a:latin typeface="+mj-lt"/>
+              </a:rPr>
+              <a:t>, Cecilia Leung, Amaris Hassan, Caitlan </a:t>
+            </a:r>
+            <a:r>
+              <a:rPr lang="en-US" i="1" dirty="0" err="1">
+                <a:latin typeface="+mj-lt"/>
+              </a:rPr>
+              <a:t>Beachey</a:t>
+            </a:r>
+            <a:endParaRPr lang="en-US" i="1" dirty="0">
+              <a:latin typeface="+mj-lt"/>
+            </a:endParaRPr>
+          </a:p>
+          <a:p>
+            <a:endParaRPr lang="en-US" i="1" dirty="0"/>
+          </a:p>
+          <a:p>
+            <a:endParaRPr lang="en-US" i="1" dirty="0"/>
+          </a:p>
+          <a:p>
+            <a:endParaRPr lang="en-US" i="1" dirty="0"/>
           </a:p>
         </p:txBody>
       </p:sp>
       <p:pic>
         <p:nvPicPr>
-          <p:cNvPr id="19" name="Content Placeholder 18">
+          <p:cNvPr id="10" name="Picture 9">
             <a:extLst>
               <a:ext uri="{FF2B5EF4-FFF2-40B4-BE49-F238E27FC236}">
-                <a16:creationId xmlns:a16="http://schemas.microsoft.com/office/drawing/2014/main" id="{C7170052-2AC0-DD47-9864-B904FD1811BD}"/>
+                <a16:creationId xmlns:a16="http://schemas.microsoft.com/office/drawing/2014/main" id="{B8C5A2CB-15F1-CC48-9521-46BCD4DCF226}"/>
               </a:ext>
             </a:extLst>
           </p:cNvPr>
           <p:cNvPicPr>
-            <a:picLocks noGrp="1" noChangeAspect="1"/>
+            <a:picLocks noChangeAspect="1"/>
           </p:cNvPicPr>
-          <p:nvPr>
-            <p:ph idx="1"/>
-          </p:nvPr>
+          <p:nvPr/>
         </p:nvPicPr>
         <p:blipFill rotWithShape="1">
           <a:blip r:embed="rId3"/>
-          <a:srcRect l="26590" t="20798" r="31668" b="40721"/>
+          <a:srcRect r="7095" b="19499"/>
           <a:stretch/>
         </p:blipFill>
         <p:spPr>
           <a:xfrm>
-            <a:off x="46667" y="1010278"/>
-            <a:ext cx="3872497" cy="4181824"/>
+            <a:off x="2387068" y="63416"/>
+            <a:ext cx="7189884" cy="4672426"/>
           </a:xfrm>
+          <a:prstGeom prst="rect">
+            <a:avLst/>
+          </a:prstGeom>
         </p:spPr>
       </p:pic>
       <p:sp>
         <p:nvSpPr>
-          <p:cNvPr id="20" name="TextBox 19">
+          <p:cNvPr id="11" name="TextBox 10">
             <a:extLst>
               <a:ext uri="{FF2B5EF4-FFF2-40B4-BE49-F238E27FC236}">
-                <a16:creationId xmlns:a16="http://schemas.microsoft.com/office/drawing/2014/main" id="{F14FB99A-DF85-EA42-BC5C-C8B98E98F4D8}"/>
+                <a16:creationId xmlns:a16="http://schemas.microsoft.com/office/drawing/2014/main" id="{AE689CC2-7137-DD49-A0E7-81EE8E907007}"/>
               </a:ext>
             </a:extLst>
           </p:cNvPr>
@@ -6642,8 +6684,8 @@
         </p:nvSpPr>
         <p:spPr>
           <a:xfrm>
-            <a:off x="4253326" y="6016017"/>
-            <a:ext cx="7938674" cy="1200329"/>
+            <a:off x="1955179" y="4458371"/>
+            <a:ext cx="9478535" cy="1015663"/>
           </a:xfrm>
           <a:prstGeom prst="rect">
             <a:avLst/>
@@ -6657,51 +6699,14 @@
           <a:lstStyle/>
           <a:p>
             <a:r>
-              <a:rPr lang="en-US" i="1"/>
-              <a:t>Kapil Pundhir, Hillary Mandich, Cecilia Leung, Amaris Hassan, Caitlan Beachey</a:t>
-            </a:r>
-          </a:p>
-          <a:p>
-            <a:endParaRPr lang="en-US" i="1"/>
-          </a:p>
-          <a:p>
-            <a:endParaRPr lang="en-US" i="1"/>
-          </a:p>
-          <a:p>
-            <a:endParaRPr lang="en-US" i="1" dirty="0"/>
+              <a:rPr lang="en-US" sz="6000" dirty="0">
+                <a:latin typeface="+mj-lt"/>
+              </a:rPr>
+              <a:t>AIRBNB PRICE PREDICTION</a:t>
+            </a:r>
           </a:p>
         </p:txBody>
       </p:sp>
-      <p:pic>
-        <p:nvPicPr>
-          <p:cNvPr id="3" name="Picture 2">
-            <a:extLst>
-              <a:ext uri="{FF2B5EF4-FFF2-40B4-BE49-F238E27FC236}">
-                <a16:creationId xmlns:a16="http://schemas.microsoft.com/office/drawing/2014/main" id="{DE1EFA3F-4D39-40BA-A4E2-E29A1EFB9C4E}"/>
-              </a:ext>
-            </a:extLst>
-          </p:cNvPr>
-          <p:cNvPicPr>
-            <a:picLocks noChangeAspect="1"/>
-          </p:cNvPicPr>
-          <p:nvPr/>
-        </p:nvPicPr>
-        <p:blipFill>
-          <a:blip r:embed="rId4"/>
-          <a:stretch>
-            <a:fillRect/>
-          </a:stretch>
-        </p:blipFill>
-        <p:spPr>
-          <a:xfrm>
-            <a:off x="4474670" y="1814945"/>
-            <a:ext cx="5675169" cy="3568971"/>
-          </a:xfrm>
-          <a:prstGeom prst="rect">
-            <a:avLst/>
-          </a:prstGeom>
-        </p:spPr>
-      </p:pic>
     </p:spTree>
     <p:extLst>
       <p:ext uri="{BB962C8B-B14F-4D97-AF65-F5344CB8AC3E}">
@@ -14013,7 +14018,7 @@
         </p:nvPicPr>
         <p:blipFill>
           <a:blip r:embed="rId3">
-            <a:alphaModFix amt="85000"/>
+            <a:alphaModFix amt="35000"/>
             <a:extLst>
               <a:ext uri="{28A0092B-C50C-407E-A947-70E740481C1C}">
                 <a14:useLocalDpi xmlns:a14="http://schemas.microsoft.com/office/drawing/2010/main" val="0"/>
@@ -14027,22 +14032,42 @@
         </p:blipFill>
         <p:spPr bwMode="auto">
           <a:xfrm>
-            <a:off x="530565" y="1721720"/>
-            <a:ext cx="10827204" cy="5012327"/>
+            <a:off x="420914" y="310559"/>
+            <a:ext cx="11169082" cy="6236881"/>
           </a:xfrm>
           <a:prstGeom prst="rect">
             <a:avLst/>
           </a:prstGeom>
-          <a:ln>
-            <a:noFill/>
+          <a:solidFill>
+            <a:srgbClr val="FFFFFF">
+              <a:shade val="85000"/>
+            </a:srgbClr>
+          </a:solidFill>
+          <a:ln w="88900" cap="sq">
+            <a:solidFill>
+              <a:srgbClr val="FFFFFF"/>
+            </a:solidFill>
+            <a:miter lim="800000"/>
           </a:ln>
           <a:effectLst>
-            <a:outerShdw blurRad="292100" dist="139700" dir="2700000" algn="tl" rotWithShape="0">
-              <a:srgbClr val="333333">
-                <a:alpha val="65000"/>
+            <a:outerShdw blurRad="55000" dist="18000" dir="5400000" algn="tl" rotWithShape="0">
+              <a:srgbClr val="000000">
+                <a:alpha val="40000"/>
               </a:srgbClr>
             </a:outerShdw>
           </a:effectLst>
+          <a:scene3d>
+            <a:camera prst="orthographicFront"/>
+            <a:lightRig rig="twoPt" dir="t">
+              <a:rot lat="0" lon="0" rev="7200000"/>
+            </a:lightRig>
+          </a:scene3d>
+          <a:sp3d>
+            <a:bevelT w="25400" h="19050"/>
+            <a:contourClr>
+              <a:srgbClr val="FFFFFF"/>
+            </a:contourClr>
+          </a:sp3d>
           <a:extLst>
             <a:ext uri="{909E8E84-426E-40DD-AFC4-6F175D3DCCD1}">
               <a14:hiddenFill xmlns:a14="http://schemas.microsoft.com/office/drawing/2010/main">
@@ -14072,7 +14097,7 @@
         </p:nvSpPr>
         <p:spPr>
           <a:xfrm>
-            <a:off x="2721982" y="696475"/>
+            <a:off x="929254" y="370578"/>
             <a:ext cx="10515600" cy="1325563"/>
           </a:xfrm>
         </p:spPr>
@@ -14083,104 +14108,15 @@
           <a:lstStyle/>
           <a:p>
             <a:r>
-              <a:rPr lang="en-US" sz="4000" dirty="0">
-                <a:solidFill>
-                  <a:srgbClr val="EA5E46"/>
-                </a:solidFill>
+              <a:rPr lang="en-US" sz="3600" dirty="0">
+                <a:latin typeface="Baloo Bhai" panose="03080902040302020200" pitchFamily="66" charset="77"/>
+                <a:cs typeface="Baloo Bhai" panose="03080902040302020200" pitchFamily="66" charset="77"/>
               </a:rPr>
-              <a:t>Airbnb Pricing Background</a:t>
+              <a:t>How is listing price determined?</a:t>
             </a:r>
           </a:p>
         </p:txBody>
       </p:sp>
-      <p:pic>
-        <p:nvPicPr>
-          <p:cNvPr id="2050" name="Picture 2" descr="Image result for air bnb logo">
-            <a:extLst>
-              <a:ext uri="{FF2B5EF4-FFF2-40B4-BE49-F238E27FC236}">
-                <a16:creationId xmlns:a16="http://schemas.microsoft.com/office/drawing/2014/main" id="{A162C291-208B-BE48-BF44-7D5CD7EF6151}"/>
-              </a:ext>
-            </a:extLst>
-          </p:cNvPr>
-          <p:cNvPicPr>
-            <a:picLocks noChangeAspect="1" noChangeArrowheads="1"/>
-          </p:cNvPicPr>
-          <p:nvPr/>
-        </p:nvPicPr>
-        <p:blipFill rotWithShape="1">
-          <a:blip r:embed="rId4">
-            <a:extLst>
-              <a:ext uri="{28A0092B-C50C-407E-A947-70E740481C1C}">
-                <a14:useLocalDpi xmlns:a14="http://schemas.microsoft.com/office/drawing/2010/main" val="0"/>
-              </a:ext>
-            </a:extLst>
-          </a:blip>
-          <a:srcRect r="8891" b="23856"/>
-          <a:stretch/>
-        </p:blipFill>
-        <p:spPr bwMode="auto">
-          <a:xfrm>
-            <a:off x="530565" y="108278"/>
-            <a:ext cx="1994922" cy="1539663"/>
-          </a:xfrm>
-          <a:prstGeom prst="rect">
-            <a:avLst/>
-          </a:prstGeom>
-          <a:noFill/>
-          <a:extLst>
-            <a:ext uri="{909E8E84-426E-40DD-AFC4-6F175D3DCCD1}">
-              <a14:hiddenFill xmlns:a14="http://schemas.microsoft.com/office/drawing/2010/main">
-                <a:solidFill>
-                  <a:srgbClr val="FFFFFF"/>
-                </a:solidFill>
-              </a14:hiddenFill>
-            </a:ext>
-          </a:extLst>
-        </p:spPr>
-      </p:pic>
-      <p:cxnSp>
-        <p:nvCxnSpPr>
-          <p:cNvPr id="6" name="Straight Connector 5">
-            <a:extLst>
-              <a:ext uri="{FF2B5EF4-FFF2-40B4-BE49-F238E27FC236}">
-                <a16:creationId xmlns:a16="http://schemas.microsoft.com/office/drawing/2014/main" id="{7D0926DC-6298-B648-9DF9-0D78D09F9FC8}"/>
-              </a:ext>
-            </a:extLst>
-          </p:cNvPr>
-          <p:cNvCxnSpPr>
-            <a:cxnSpLocks/>
-          </p:cNvCxnSpPr>
-          <p:nvPr/>
-        </p:nvCxnSpPr>
-        <p:spPr>
-          <a:xfrm>
-            <a:off x="975854" y="1684830"/>
-            <a:ext cx="9518745" cy="1"/>
-          </a:xfrm>
-          <a:prstGeom prst="line">
-            <a:avLst/>
-          </a:prstGeom>
-          <a:ln w="12700">
-            <a:solidFill>
-              <a:srgbClr val="EA5E46"/>
-            </a:solidFill>
-          </a:ln>
-        </p:spPr>
-        <p:style>
-          <a:lnRef idx="1">
-            <a:schemeClr val="accent2"/>
-          </a:lnRef>
-          <a:fillRef idx="0">
-            <a:schemeClr val="accent2"/>
-          </a:fillRef>
-          <a:effectRef idx="0">
-            <a:schemeClr val="accent2"/>
-          </a:effectRef>
-          <a:fontRef idx="minor">
-            <a:schemeClr val="tx1"/>
-          </a:fontRef>
-        </p:style>
-      </p:cxnSp>
       <p:sp>
         <p:nvSpPr>
           <p:cNvPr id="3" name="TextBox 2">
@@ -14195,8 +14131,8 @@
         </p:nvSpPr>
         <p:spPr>
           <a:xfrm>
-            <a:off x="834231" y="1518508"/>
-            <a:ext cx="5596660" cy="4247317"/>
+            <a:off x="602004" y="1306750"/>
+            <a:ext cx="9079025" cy="3693319"/>
           </a:xfrm>
           <a:prstGeom prst="rect">
             <a:avLst/>
@@ -14219,7 +14155,7 @@
               <a:buChar char="•"/>
             </a:pPr>
             <a:r>
-              <a:rPr lang="en-US" dirty="0">
+              <a:rPr lang="en-US" sz="2000" dirty="0">
                 <a:latin typeface="+mj-lt"/>
               </a:rPr>
               <a:t>Airbnb hosts in New York face lots of competition with approx. 37, 000 active listings</a:t>
@@ -14230,7 +14166,7 @@
               <a:buFont typeface="Arial" panose="020B0604020202020204" pitchFamily="34" charset="0"/>
               <a:buChar char="•"/>
             </a:pPr>
-            <a:endParaRPr lang="en-US" dirty="0">
+            <a:endParaRPr lang="en-US" sz="2000" dirty="0">
               <a:latin typeface="+mj-lt"/>
             </a:endParaRPr>
           </a:p>
@@ -14240,7 +14176,7 @@
               <a:buChar char="•"/>
             </a:pPr>
             <a:r>
-              <a:rPr lang="en-US" dirty="0">
+              <a:rPr lang="en-US" sz="2000" dirty="0">
                 <a:latin typeface="+mj-lt"/>
               </a:rPr>
               <a:t>Currently there are no free services which help hosts price their properties. </a:t>
@@ -14251,7 +14187,7 @@
               <a:buFont typeface="Arial" panose="020B0604020202020204" pitchFamily="34" charset="0"/>
               <a:buChar char="•"/>
             </a:pPr>
-            <a:endParaRPr lang="en-US" dirty="0">
+            <a:endParaRPr lang="en-US" sz="2000" dirty="0">
               <a:latin typeface="+mj-lt"/>
             </a:endParaRPr>
           </a:p>
@@ -14261,14 +14197,22 @@
               <a:buChar char="•"/>
             </a:pPr>
             <a:r>
-              <a:rPr lang="en-US" dirty="0">
+              <a:rPr lang="en-US" sz="2000" dirty="0">
                 <a:latin typeface="+mj-lt"/>
               </a:rPr>
-              <a:t>Challenging task for owner to determine a hosting price that is both affordable and profitable</a:t>
-            </a:r>
-          </a:p>
-          <a:p>
-            <a:endParaRPr lang="en-US" dirty="0">
+              <a:t>Challenging task for owner to determine a hosting price that is both </a:t>
+            </a:r>
+          </a:p>
+          <a:p>
+            <a:r>
+              <a:rPr lang="en-US" sz="2000" dirty="0">
+                <a:latin typeface="+mj-lt"/>
+              </a:rPr>
+              <a:t>     affordable and profitable</a:t>
+            </a:r>
+          </a:p>
+          <a:p>
+            <a:endParaRPr lang="en-US" sz="2000" dirty="0">
               <a:latin typeface="+mj-lt"/>
             </a:endParaRPr>
           </a:p>
@@ -14278,7 +14222,7 @@
               <a:buChar char="•"/>
             </a:pPr>
             <a:r>
-              <a:rPr lang="en-US" dirty="0">
+              <a:rPr lang="en-US" sz="2000" dirty="0">
                 <a:latin typeface="+mj-lt"/>
               </a:rPr>
               <a:t>Guests have limited knowledge of property prices in New York and can also benefit from understanding the pricing dynamics of the Airbnb marketplace </a:t>
@@ -17392,7 +17336,7 @@
         </p:nvSpPr>
         <p:spPr>
           <a:xfrm>
-            <a:off x="2721982" y="696475"/>
+            <a:off x="-2717179" y="696472"/>
             <a:ext cx="10515600" cy="1325563"/>
           </a:xfrm>
         </p:spPr>
@@ -17402,23 +17346,102 @@
           </a:bodyPr>
           <a:lstStyle/>
           <a:p>
-            <a:r>
-              <a:rPr lang="en-US" sz="4000" dirty="0">
-                <a:solidFill>
-                  <a:srgbClr val="EA5E46"/>
-                </a:solidFill>
+            <a:pPr algn="ctr"/>
+            <a:r>
+              <a:rPr lang="en-US" sz="4800" dirty="0">
+                <a:latin typeface="Baloo Bhai" panose="03080902040302020200" pitchFamily="66" charset="77"/>
+                <a:cs typeface="Baloo Bhai" panose="03080902040302020200" pitchFamily="66" charset="77"/>
               </a:rPr>
-              <a:t>Objective</a:t>
+              <a:t>OBJECTIVE</a:t>
+            </a:r>
+          </a:p>
+        </p:txBody>
+      </p:sp>
+      <p:sp>
+        <p:nvSpPr>
+          <p:cNvPr id="3" name="TextBox 2">
+            <a:extLst>
+              <a:ext uri="{FF2B5EF4-FFF2-40B4-BE49-F238E27FC236}">
+                <a16:creationId xmlns:a16="http://schemas.microsoft.com/office/drawing/2014/main" id="{BD82BCEE-EA9A-9B44-8939-A6C9288900EA}"/>
+              </a:ext>
+            </a:extLst>
+          </p:cNvPr>
+          <p:cNvSpPr txBox="1"/>
+          <p:nvPr/>
+        </p:nvSpPr>
+        <p:spPr>
+          <a:xfrm>
+            <a:off x="735979" y="2022035"/>
+            <a:ext cx="6796935" cy="4154984"/>
+          </a:xfrm>
+          <a:prstGeom prst="rect">
+            <a:avLst/>
+          </a:prstGeom>
+          <a:noFill/>
+        </p:spPr>
+        <p:txBody>
+          <a:bodyPr wrap="square" rtlCol="0">
+            <a:spAutoFit/>
+          </a:bodyPr>
+          <a:lstStyle/>
+          <a:p>
+            <a:pPr marL="285750" indent="-285750">
+              <a:buFont typeface="Arial" panose="020B0604020202020204" pitchFamily="34" charset="0"/>
+              <a:buChar char="•"/>
+            </a:pPr>
+            <a:r>
+              <a:rPr lang="en-US" sz="2400" dirty="0">
+                <a:latin typeface="+mj-lt"/>
+              </a:rPr>
+              <a:t>Accurately predict the optimal price for Airbnb properties in NYC according to their listing features and seasonal availability</a:t>
+            </a:r>
+          </a:p>
+          <a:p>
+            <a:endParaRPr lang="en-US" sz="2400" dirty="0">
+              <a:latin typeface="+mj-lt"/>
+            </a:endParaRPr>
+          </a:p>
+          <a:p>
+            <a:pPr marL="285750" indent="-285750">
+              <a:buFont typeface="Arial" panose="020B0604020202020204" pitchFamily="34" charset="0"/>
+              <a:buChar char="•"/>
+            </a:pPr>
+            <a:r>
+              <a:rPr lang="en-US" sz="2400" dirty="0">
+                <a:latin typeface="+mj-lt"/>
+              </a:rPr>
+              <a:t>Analyze 36923 active listings using attributes such as location, room type, amenities, and rating to create the model</a:t>
+            </a:r>
+          </a:p>
+          <a:p>
+            <a:pPr marL="285750" indent="-285750">
+              <a:buFont typeface="Arial" panose="020B0604020202020204" pitchFamily="34" charset="0"/>
+              <a:buChar char="•"/>
+            </a:pPr>
+            <a:endParaRPr lang="en-US" sz="2400" dirty="0">
+              <a:latin typeface="+mj-lt"/>
+            </a:endParaRPr>
+          </a:p>
+          <a:p>
+            <a:pPr marL="285750" indent="-285750">
+              <a:buFont typeface="Arial" panose="020B0604020202020204" pitchFamily="34" charset="0"/>
+              <a:buChar char="•"/>
+            </a:pPr>
+            <a:r>
+              <a:rPr lang="en-US" sz="2400" dirty="0">
+                <a:latin typeface="+mj-lt"/>
+              </a:rPr>
+              <a:t>Aim to help both guest and host understand whether the current listing price is worthy and the best time to book/make a room available on Airbnb</a:t>
             </a:r>
           </a:p>
         </p:txBody>
       </p:sp>
       <p:pic>
         <p:nvPicPr>
-          <p:cNvPr id="2050" name="Picture 2" descr="Image result for air bnb logo">
+          <p:cNvPr id="2052" name="Picture 4" descr="Question mark PNG">
             <a:extLst>
               <a:ext uri="{FF2B5EF4-FFF2-40B4-BE49-F238E27FC236}">
-                <a16:creationId xmlns:a16="http://schemas.microsoft.com/office/drawing/2014/main" id="{A162C291-208B-BE48-BF44-7D5CD7EF6151}"/>
+                <a16:creationId xmlns:a16="http://schemas.microsoft.com/office/drawing/2014/main" id="{A39EBD93-1AB0-1A44-BD46-4313A3FD3069}"/>
               </a:ext>
             </a:extLst>
           </p:cNvPr>
@@ -17442,8 +17465,8 @@
         </p:blipFill>
         <p:spPr bwMode="auto">
           <a:xfrm>
-            <a:off x="530564" y="108278"/>
-            <a:ext cx="2189605" cy="2022038"/>
+            <a:off x="6760770" y="2918749"/>
+            <a:ext cx="5431230" cy="3595474"/>
           </a:xfrm>
           <a:prstGeom prst="rect">
             <a:avLst/>
@@ -17460,128 +17483,6 @@
           </a:extLst>
         </p:spPr>
       </p:pic>
-      <p:cxnSp>
-        <p:nvCxnSpPr>
-          <p:cNvPr id="6" name="Straight Connector 5">
-            <a:extLst>
-              <a:ext uri="{FF2B5EF4-FFF2-40B4-BE49-F238E27FC236}">
-                <a16:creationId xmlns:a16="http://schemas.microsoft.com/office/drawing/2014/main" id="{7D0926DC-6298-B648-9DF9-0D78D09F9FC8}"/>
-              </a:ext>
-            </a:extLst>
-          </p:cNvPr>
-          <p:cNvCxnSpPr>
-            <a:cxnSpLocks/>
-          </p:cNvCxnSpPr>
-          <p:nvPr/>
-        </p:nvCxnSpPr>
-        <p:spPr>
-          <a:xfrm>
-            <a:off x="975854" y="1684830"/>
-            <a:ext cx="9518745" cy="1"/>
-          </a:xfrm>
-          <a:prstGeom prst="line">
-            <a:avLst/>
-          </a:prstGeom>
-          <a:ln w="12700">
-            <a:solidFill>
-              <a:srgbClr val="EA5E46"/>
-            </a:solidFill>
-          </a:ln>
-        </p:spPr>
-        <p:style>
-          <a:lnRef idx="1">
-            <a:schemeClr val="accent2"/>
-          </a:lnRef>
-          <a:fillRef idx="0">
-            <a:schemeClr val="accent2"/>
-          </a:fillRef>
-          <a:effectRef idx="0">
-            <a:schemeClr val="accent2"/>
-          </a:effectRef>
-          <a:fontRef idx="minor">
-            <a:schemeClr val="tx1"/>
-          </a:fontRef>
-        </p:style>
-      </p:cxnSp>
-      <p:sp>
-        <p:nvSpPr>
-          <p:cNvPr id="3" name="TextBox 2">
-            <a:extLst>
-              <a:ext uri="{FF2B5EF4-FFF2-40B4-BE49-F238E27FC236}">
-                <a16:creationId xmlns:a16="http://schemas.microsoft.com/office/drawing/2014/main" id="{BD82BCEE-EA9A-9B44-8939-A6C9288900EA}"/>
-              </a:ext>
-            </a:extLst>
-          </p:cNvPr>
-          <p:cNvSpPr txBox="1"/>
-          <p:nvPr/>
-        </p:nvSpPr>
-        <p:spPr>
-          <a:xfrm>
-            <a:off x="735979" y="2022036"/>
-            <a:ext cx="10925457" cy="3046988"/>
-          </a:xfrm>
-          <a:prstGeom prst="rect">
-            <a:avLst/>
-          </a:prstGeom>
-          <a:noFill/>
-        </p:spPr>
-        <p:txBody>
-          <a:bodyPr wrap="square" rtlCol="0">
-            <a:spAutoFit/>
-          </a:bodyPr>
-          <a:lstStyle/>
-          <a:p>
-            <a:pPr marL="285750" indent="-285750">
-              <a:buFont typeface="Arial" panose="020B0604020202020204" pitchFamily="34" charset="0"/>
-              <a:buChar char="•"/>
-            </a:pPr>
-            <a:r>
-              <a:rPr lang="en-US" sz="2400" dirty="0">
-                <a:latin typeface="+mj-lt"/>
-              </a:rPr>
-              <a:t>Accurately predict the optimal price for Airbnb properties in NYC according to their listing features and seasonal availability</a:t>
-            </a:r>
-          </a:p>
-          <a:p>
-            <a:endParaRPr lang="en-US" sz="2400" dirty="0">
-              <a:latin typeface="+mj-lt"/>
-            </a:endParaRPr>
-          </a:p>
-          <a:p>
-            <a:pPr marL="285750" indent="-285750">
-              <a:buFont typeface="Arial" panose="020B0604020202020204" pitchFamily="34" charset="0"/>
-              <a:buChar char="•"/>
-            </a:pPr>
-            <a:r>
-              <a:rPr lang="en-US" sz="2400" dirty="0">
-                <a:latin typeface="+mj-lt"/>
-              </a:rPr>
-              <a:t>Analyze 36923 active listings using attributes such as location, room type, amenities, and rating to create the model</a:t>
-            </a:r>
-          </a:p>
-          <a:p>
-            <a:pPr marL="285750" indent="-285750">
-              <a:buFont typeface="Arial" panose="020B0604020202020204" pitchFamily="34" charset="0"/>
-              <a:buChar char="•"/>
-            </a:pPr>
-            <a:endParaRPr lang="en-US" sz="2400" dirty="0">
-              <a:latin typeface="+mj-lt"/>
-            </a:endParaRPr>
-          </a:p>
-          <a:p>
-            <a:pPr marL="285750" indent="-285750">
-              <a:buFont typeface="Arial" panose="020B0604020202020204" pitchFamily="34" charset="0"/>
-              <a:buChar char="•"/>
-            </a:pPr>
-            <a:r>
-              <a:rPr lang="en-US" sz="2400" dirty="0">
-                <a:latin typeface="+mj-lt"/>
-              </a:rPr>
-              <a:t>Aim to help both guest and host understand whether the current listing price is worthy and the best time to book/make a room available on Airbnb</a:t>
-            </a:r>
-          </a:p>
-        </p:txBody>
-      </p:sp>
     </p:spTree>
     <p:extLst>
       <p:ext uri="{BB962C8B-B14F-4D97-AF65-F5344CB8AC3E}">
@@ -17755,10 +17656,10 @@
         </p:nvGrpSpPr>
         <p:grpSpPr>
           <a:xfrm>
-            <a:off x="1453073" y="2884453"/>
-            <a:ext cx="2845864" cy="2645488"/>
-            <a:chOff x="1404492" y="2564906"/>
-            <a:chExt cx="2845864" cy="2645488"/>
+            <a:off x="975854" y="2335014"/>
+            <a:ext cx="3323083" cy="3057583"/>
+            <a:chOff x="1404492" y="2575398"/>
+            <a:chExt cx="2845864" cy="2521723"/>
           </a:xfrm>
         </p:grpSpPr>
         <p:pic>
@@ -17783,7 +17684,7 @@
           </p:blipFill>
           <p:spPr>
             <a:xfrm>
-              <a:off x="1418384" y="2564906"/>
+              <a:off x="1804446" y="2575398"/>
               <a:ext cx="2189605" cy="1657172"/>
             </a:xfrm>
             <a:prstGeom prst="rect">
@@ -17806,7 +17707,7 @@
           <p:spPr>
             <a:xfrm>
               <a:off x="1404492" y="4564063"/>
-              <a:ext cx="2845864" cy="646331"/>
+              <a:ext cx="2845864" cy="533058"/>
             </a:xfrm>
             <a:prstGeom prst="rect">
               <a:avLst/>
@@ -17819,12 +17720,14 @@
             </a:bodyPr>
             <a:lstStyle/>
             <a:p>
+              <a:pPr algn="ctr"/>
               <a:r>
                 <a:rPr lang="en-US" dirty="0"/>
                 <a:t>Random Forest </a:t>
               </a:r>
             </a:p>
             <a:p>
+              <a:pPr algn="ctr"/>
               <a:r>
                 <a:rPr lang="en-US" dirty="0"/>
                 <a:t>LGBM</a:t>
@@ -17848,8 +17751,8 @@
         </p:nvGrpSpPr>
         <p:grpSpPr>
           <a:xfrm>
-            <a:off x="5304459" y="3000246"/>
-            <a:ext cx="3324836" cy="2281203"/>
+            <a:off x="5021943" y="2335014"/>
+            <a:ext cx="3970209" cy="3151133"/>
             <a:chOff x="5255878" y="2680699"/>
             <a:chExt cx="3324836" cy="2281203"/>
           </a:xfrm>
@@ -17935,8 +17838,8 @@
         </p:nvGrpSpPr>
         <p:grpSpPr>
           <a:xfrm>
-            <a:off x="8376664" y="3125653"/>
-            <a:ext cx="3147076" cy="2156579"/>
+            <a:off x="8356460" y="2335014"/>
+            <a:ext cx="3630675" cy="3098867"/>
             <a:chOff x="8328083" y="2806106"/>
             <a:chExt cx="3147076" cy="2156579"/>
           </a:xfrm>

</xml_diff>

<commit_message>
powerpoint  & add image
</commit_message>
<xml_diff>
--- a/Airbnb Price Predictions (Model).pptx
+++ b/Airbnb Price Predictions (Model).pptx
@@ -16847,6 +16847,14 @@
 <file path=ppt/slides/slide21.xml><?xml version="1.0" encoding="utf-8"?>
 <p:sld xmlns:a="http://schemas.openxmlformats.org/drawingml/2006/main" xmlns:r="http://schemas.openxmlformats.org/officeDocument/2006/relationships" xmlns:p="http://schemas.openxmlformats.org/presentationml/2006/main">
   <p:cSld>
+    <p:bg>
+      <p:bgPr>
+        <a:solidFill>
+          <a:schemeClr val="bg1"/>
+        </a:solidFill>
+        <a:effectLst/>
+      </p:bgPr>
+    </p:bg>
     <p:spTree>
       <p:nvGrpSpPr>
         <p:cNvPr id="1" name=""/>
@@ -16863,141 +16871,159 @@
       </p:grpSpPr>
       <p:sp>
         <p:nvSpPr>
-          <p:cNvPr id="2" name="Title 1">
+          <p:cNvPr id="60" name="Rectangle 20">
             <a:extLst>
               <a:ext uri="{FF2B5EF4-FFF2-40B4-BE49-F238E27FC236}">
-                <a16:creationId xmlns:a16="http://schemas.microsoft.com/office/drawing/2014/main" id="{59B8B577-5676-3C4B-A107-E41DB331FD85}"/>
+                <a16:creationId xmlns:a16="http://schemas.microsoft.com/office/drawing/2014/main" id="{32BC26D8-82FB-445E-AA49-62A77D7C1EE0}"/>
+              </a:ext>
+              <a:ext uri="{C183D7F6-B498-43B3-948B-1728B52AA6E4}">
+                <adec:decorative xmlns:adec="http://schemas.microsoft.com/office/drawing/2017/decorative" val="1"/>
               </a:ext>
             </a:extLst>
           </p:cNvPr>
           <p:cNvSpPr>
-            <a:spLocks noGrp="1"/>
+            <a:spLocks noGrp="1" noRot="1" noChangeAspect="1" noMove="1" noResize="1" noEditPoints="1" noAdjustHandles="1" noChangeArrowheads="1" noChangeShapeType="1" noTextEdit="1"/>
           </p:cNvSpPr>
           <p:nvPr>
-            <p:ph type="title"/>
+            <p:extLst>
+              <p:ext uri="{386F3935-93C4-4BCD-93E2-E3B085C9AB24}">
+                <p16:designElem xmlns:p16="http://schemas.microsoft.com/office/powerpoint/2015/main" val="1"/>
+              </p:ext>
+            </p:extLst>
           </p:nvPr>
         </p:nvSpPr>
         <p:spPr>
           <a:xfrm>
-            <a:off x="3853543" y="2264789"/>
-            <a:ext cx="10515600" cy="1335013"/>
+            <a:off x="0" y="0"/>
+            <a:ext cx="12192000" cy="6858000"/>
           </a:xfrm>
+          <a:prstGeom prst="rect">
+            <a:avLst/>
+          </a:prstGeom>
+          <a:solidFill>
+            <a:srgbClr val="C47090"/>
+          </a:solidFill>
+          <a:ln>
+            <a:noFill/>
+          </a:ln>
         </p:spPr>
+        <p:style>
+          <a:lnRef idx="2">
+            <a:schemeClr val="accent1">
+              <a:shade val="50000"/>
+            </a:schemeClr>
+          </a:lnRef>
+          <a:fillRef idx="1">
+            <a:schemeClr val="accent1"/>
+          </a:fillRef>
+          <a:effectRef idx="0">
+            <a:schemeClr val="accent1"/>
+          </a:effectRef>
+          <a:fontRef idx="minor">
+            <a:schemeClr val="lt1"/>
+          </a:fontRef>
+        </p:style>
         <p:txBody>
-          <a:bodyPr>
-            <a:normAutofit/>
-          </a:bodyPr>
+          <a:bodyPr rtlCol="0" anchor="ctr"/>
           <a:lstStyle/>
           <a:p>
-            <a:r>
-              <a:rPr lang="en-US" sz="5400" b="1" dirty="0">
-                <a:solidFill>
-                  <a:srgbClr val="EA5E46"/>
-                </a:solidFill>
-              </a:rPr>
-              <a:t>Dashboard Demo</a:t>
-            </a:r>
+            <a:pPr algn="ctr"/>
+            <a:endParaRPr lang="en-US"/>
+          </a:p>
+        </p:txBody>
+      </p:sp>
+      <p:sp>
+        <p:nvSpPr>
+          <p:cNvPr id="23" name="Rectangle 22">
+            <a:extLst>
+              <a:ext uri="{FF2B5EF4-FFF2-40B4-BE49-F238E27FC236}">
+                <a16:creationId xmlns:a16="http://schemas.microsoft.com/office/drawing/2014/main" id="{CB44330D-EA18-4254-AA95-EB49948539B8}"/>
+              </a:ext>
+              <a:ext uri="{C183D7F6-B498-43B3-948B-1728B52AA6E4}">
+                <adec:decorative xmlns:adec="http://schemas.microsoft.com/office/drawing/2017/decorative" val="1"/>
+              </a:ext>
+            </a:extLst>
+          </p:cNvPr>
+          <p:cNvSpPr>
+            <a:spLocks noGrp="1" noRot="1" noChangeAspect="1" noMove="1" noResize="1" noEditPoints="1" noAdjustHandles="1" noChangeArrowheads="1" noChangeShapeType="1" noTextEdit="1"/>
+          </p:cNvSpPr>
+          <p:nvPr>
+            <p:extLst>
+              <p:ext uri="{386F3935-93C4-4BCD-93E2-E3B085C9AB24}">
+                <p16:designElem xmlns:p16="http://schemas.microsoft.com/office/powerpoint/2015/main" val="1"/>
+              </p:ext>
+            </p:extLst>
+          </p:nvPr>
+        </p:nvSpPr>
+        <p:spPr>
+          <a:xfrm>
+            <a:off x="477012" y="480060"/>
+            <a:ext cx="11237976" cy="5897880"/>
+          </a:xfrm>
+          <a:prstGeom prst="rect">
+            <a:avLst/>
+          </a:prstGeom>
+          <a:solidFill>
+            <a:srgbClr val="FFFFFF"/>
+          </a:solidFill>
+          <a:ln>
+            <a:noFill/>
+          </a:ln>
+        </p:spPr>
+        <p:style>
+          <a:lnRef idx="2">
+            <a:schemeClr val="accent1">
+              <a:shade val="50000"/>
+            </a:schemeClr>
+          </a:lnRef>
+          <a:fillRef idx="1">
+            <a:schemeClr val="accent1"/>
+          </a:fillRef>
+          <a:effectRef idx="0">
+            <a:schemeClr val="accent1"/>
+          </a:effectRef>
+          <a:fontRef idx="minor">
+            <a:schemeClr val="lt1"/>
+          </a:fontRef>
+        </p:style>
+        <p:txBody>
+          <a:bodyPr rtlCol="0" anchor="ctr"/>
+          <a:lstStyle/>
+          <a:p>
+            <a:pPr algn="ctr"/>
+            <a:endParaRPr lang="en-US"/>
           </a:p>
         </p:txBody>
       </p:sp>
       <p:pic>
         <p:nvPicPr>
-          <p:cNvPr id="2050" name="Picture 2" descr="Image result for air bnb logo">
+          <p:cNvPr id="7" name="Picture 6" descr="A picture containing icon&#10;&#10;Description automatically generated">
             <a:extLst>
               <a:ext uri="{FF2B5EF4-FFF2-40B4-BE49-F238E27FC236}">
-                <a16:creationId xmlns:a16="http://schemas.microsoft.com/office/drawing/2014/main" id="{A162C291-208B-BE48-BF44-7D5CD7EF6151}"/>
+                <a16:creationId xmlns:a16="http://schemas.microsoft.com/office/drawing/2014/main" id="{02F5BB8D-DBD3-4A8A-A95D-37CCB2F89129}"/>
               </a:ext>
             </a:extLst>
           </p:cNvPr>
           <p:cNvPicPr>
-            <a:picLocks noChangeAspect="1" noChangeArrowheads="1"/>
+            <a:picLocks noChangeAspect="1"/>
           </p:cNvPicPr>
           <p:nvPr/>
         </p:nvPicPr>
         <p:blipFill rotWithShape="1">
-          <a:blip r:embed="rId3">
-            <a:extLst>
-              <a:ext uri="{28A0092B-C50C-407E-A947-70E740481C1C}">
-                <a14:useLocalDpi xmlns:a14="http://schemas.microsoft.com/office/drawing/2010/main" val="0"/>
-              </a:ext>
-            </a:extLst>
-          </a:blip>
-          <a:srcRect r="25085"/>
+          <a:blip r:embed="rId3"/>
+          <a:srcRect t="1126" r="1" b="9839"/>
           <a:stretch/>
         </p:blipFill>
-        <p:spPr bwMode="auto">
+        <p:spPr>
           <a:xfrm>
-            <a:off x="1990510" y="1914070"/>
-            <a:ext cx="1640347" cy="2036453"/>
+            <a:off x="919670" y="643467"/>
+            <a:ext cx="10352660" cy="5571066"/>
           </a:xfrm>
           <a:prstGeom prst="rect">
             <a:avLst/>
           </a:prstGeom>
-          <a:noFill/>
-          <a:extLst>
-            <a:ext uri="{909E8E84-426E-40DD-AFC4-6F175D3DCCD1}">
-              <a14:hiddenFill xmlns:a14="http://schemas.microsoft.com/office/drawing/2010/main">
-                <a:solidFill>
-                  <a:srgbClr val="FFFFFF"/>
-                </a:solidFill>
-              </a14:hiddenFill>
-            </a:ext>
-          </a:extLst>
         </p:spPr>
       </p:pic>
-      <p:sp>
-        <p:nvSpPr>
-          <p:cNvPr id="3" name="TextBox 2">
-            <a:extLst>
-              <a:ext uri="{FF2B5EF4-FFF2-40B4-BE49-F238E27FC236}">
-                <a16:creationId xmlns:a16="http://schemas.microsoft.com/office/drawing/2014/main" id="{E105B1D8-EEED-4CD3-9578-96BC5E37D626}"/>
-              </a:ext>
-            </a:extLst>
-          </p:cNvPr>
-          <p:cNvSpPr txBox="1"/>
-          <p:nvPr/>
-        </p:nvSpPr>
-        <p:spPr>
-          <a:xfrm>
-            <a:off x="939800" y="3749307"/>
-            <a:ext cx="10629900" cy="369332"/>
-          </a:xfrm>
-          <a:prstGeom prst="rect">
-            <a:avLst/>
-          </a:prstGeom>
-          <a:noFill/>
-        </p:spPr>
-        <p:txBody>
-          <a:bodyPr wrap="square" rtlCol="0">
-            <a:spAutoFit/>
-          </a:bodyPr>
-          <a:lstStyle/>
-          <a:p>
-            <a:r>
-              <a:rPr lang="en-CA" b="1" i="0" u="none" strike="noStrike" dirty="0">
-                <a:solidFill>
-                  <a:srgbClr val="EA5E46"/>
-                </a:solidFill>
-                <a:effectLst/>
-                <a:latin typeface="Slack-Lato"/>
-                <a:hlinkClick r:id="rId4">
-                  <a:extLst>
-                    <a:ext uri="{A12FA001-AC4F-418D-AE19-62706E023703}">
-                      <ahyp:hlinkClr xmlns:ahyp="http://schemas.microsoft.com/office/drawing/2018/hyperlinkcolor" val="tx"/>
-                    </a:ext>
-                  </a:extLst>
-                </a:hlinkClick>
-              </a:rPr>
-              <a:t>https://public.tableau.com/profile/kapil.pundhir#!/vizhome/AirBnb_Dashboard/AirBnbAnalysis?publish=yes</a:t>
-            </a:r>
-            <a:endParaRPr lang="en-CA" b="1" dirty="0">
-              <a:solidFill>
-                <a:srgbClr val="EA5E46"/>
-              </a:solidFill>
-            </a:endParaRPr>
-          </a:p>
-        </p:txBody>
-      </p:sp>
     </p:spTree>
     <p:extLst>
       <p:ext uri="{BB962C8B-B14F-4D97-AF65-F5344CB8AC3E}">
@@ -17008,892 +17034,6 @@
   <p:clrMapOvr>
     <a:masterClrMapping/>
   </p:clrMapOvr>
-  <p:timing>
-    <p:tnLst>
-      <p:par>
-        <p:cTn id="1" dur="indefinite" restart="never" nodeType="tmRoot">
-          <p:childTnLst>
-            <p:seq concurrent="1" nextAc="seek">
-              <p:cTn id="2" dur="indefinite" nodeType="mainSeq">
-                <p:childTnLst>
-                  <p:par>
-                    <p:cTn id="3" fill="hold">
-                      <p:stCondLst>
-                        <p:cond delay="indefinite"/>
-                      </p:stCondLst>
-                      <p:childTnLst>
-                        <p:par>
-                          <p:cTn id="4" fill="hold">
-                            <p:stCondLst>
-                              <p:cond delay="0"/>
-                            </p:stCondLst>
-                            <p:childTnLst>
-                              <p:par>
-                                <p:cTn id="5" presetID="26" presetClass="entr" presetSubtype="0" fill="hold" nodeType="clickEffect">
-                                  <p:stCondLst>
-                                    <p:cond delay="0"/>
-                                  </p:stCondLst>
-                                  <p:childTnLst>
-                                    <p:set>
-                                      <p:cBhvr>
-                                        <p:cTn id="6" dur="1" fill="hold">
-                                          <p:stCondLst>
-                                            <p:cond delay="0"/>
-                                          </p:stCondLst>
-                                        </p:cTn>
-                                        <p:tgtEl>
-                                          <p:spTgt spid="2050"/>
-                                        </p:tgtEl>
-                                        <p:attrNameLst>
-                                          <p:attrName>style.visibility</p:attrName>
-                                        </p:attrNameLst>
-                                      </p:cBhvr>
-                                      <p:to>
-                                        <p:strVal val="visible"/>
-                                      </p:to>
-                                    </p:set>
-                                    <p:animEffect transition="in" filter="wipe(down)">
-                                      <p:cBhvr>
-                                        <p:cTn id="7" dur="580">
-                                          <p:stCondLst>
-                                            <p:cond delay="0"/>
-                                          </p:stCondLst>
-                                        </p:cTn>
-                                        <p:tgtEl>
-                                          <p:spTgt spid="2050"/>
-                                        </p:tgtEl>
-                                      </p:cBhvr>
-                                    </p:animEffect>
-                                    <p:anim calcmode="lin" valueType="num">
-                                      <p:cBhvr>
-                                        <p:cTn id="8" dur="1822" tmFilter="0,0; 0.14,0.36; 0.43,0.73; 0.71,0.91; 1.0,1.0">
-                                          <p:stCondLst>
-                                            <p:cond delay="0"/>
-                                          </p:stCondLst>
-                                        </p:cTn>
-                                        <p:tgtEl>
-                                          <p:spTgt spid="2050"/>
-                                        </p:tgtEl>
-                                        <p:attrNameLst>
-                                          <p:attrName>ppt_x</p:attrName>
-                                        </p:attrNameLst>
-                                      </p:cBhvr>
-                                      <p:tavLst>
-                                        <p:tav tm="0">
-                                          <p:val>
-                                            <p:strVal val="#ppt_x-0.25"/>
-                                          </p:val>
-                                        </p:tav>
-                                        <p:tav tm="100000">
-                                          <p:val>
-                                            <p:strVal val="#ppt_x"/>
-                                          </p:val>
-                                        </p:tav>
-                                      </p:tavLst>
-                                    </p:anim>
-                                    <p:anim calcmode="lin" valueType="num">
-                                      <p:cBhvr>
-                                        <p:cTn id="9" dur="664" tmFilter="0.0,0.0; 0.25,0.07; 0.50,0.2; 0.75,0.467; 1.0,1.0">
-                                          <p:stCondLst>
-                                            <p:cond delay="0"/>
-                                          </p:stCondLst>
-                                        </p:cTn>
-                                        <p:tgtEl>
-                                          <p:spTgt spid="2050"/>
-                                        </p:tgtEl>
-                                        <p:attrNameLst>
-                                          <p:attrName>ppt_y</p:attrName>
-                                        </p:attrNameLst>
-                                      </p:cBhvr>
-                                      <p:tavLst>
-                                        <p:tav tm="0" fmla="#ppt_y-sin(pi*$)/3">
-                                          <p:val>
-                                            <p:fltVal val="0.5"/>
-                                          </p:val>
-                                        </p:tav>
-                                        <p:tav tm="100000">
-                                          <p:val>
-                                            <p:fltVal val="1"/>
-                                          </p:val>
-                                        </p:tav>
-                                      </p:tavLst>
-                                    </p:anim>
-                                    <p:anim calcmode="lin" valueType="num">
-                                      <p:cBhvr>
-                                        <p:cTn id="10" dur="664" tmFilter="0, 0; 0.125,0.2665; 0.25,0.4; 0.375,0.465; 0.5,0.5;  0.625,0.535; 0.75,0.6; 0.875,0.7335; 1,1">
-                                          <p:stCondLst>
-                                            <p:cond delay="664"/>
-                                          </p:stCondLst>
-                                        </p:cTn>
-                                        <p:tgtEl>
-                                          <p:spTgt spid="2050"/>
-                                        </p:tgtEl>
-                                        <p:attrNameLst>
-                                          <p:attrName>ppt_y</p:attrName>
-                                        </p:attrNameLst>
-                                      </p:cBhvr>
-                                      <p:tavLst>
-                                        <p:tav tm="0" fmla="#ppt_y-sin(pi*$)/9">
-                                          <p:val>
-                                            <p:fltVal val="0"/>
-                                          </p:val>
-                                        </p:tav>
-                                        <p:tav tm="100000">
-                                          <p:val>
-                                            <p:fltVal val="1"/>
-                                          </p:val>
-                                        </p:tav>
-                                      </p:tavLst>
-                                    </p:anim>
-                                    <p:anim calcmode="lin" valueType="num">
-                                      <p:cBhvr>
-                                        <p:cTn id="11" dur="332" tmFilter="0, 0; 0.125,0.2665; 0.25,0.4; 0.375,0.465; 0.5,0.5;  0.625,0.535; 0.75,0.6; 0.875,0.7335; 1,1">
-                                          <p:stCondLst>
-                                            <p:cond delay="1324"/>
-                                          </p:stCondLst>
-                                        </p:cTn>
-                                        <p:tgtEl>
-                                          <p:spTgt spid="2050"/>
-                                        </p:tgtEl>
-                                        <p:attrNameLst>
-                                          <p:attrName>ppt_y</p:attrName>
-                                        </p:attrNameLst>
-                                      </p:cBhvr>
-                                      <p:tavLst>
-                                        <p:tav tm="0" fmla="#ppt_y-sin(pi*$)/27">
-                                          <p:val>
-                                            <p:fltVal val="0"/>
-                                          </p:val>
-                                        </p:tav>
-                                        <p:tav tm="100000">
-                                          <p:val>
-                                            <p:fltVal val="1"/>
-                                          </p:val>
-                                        </p:tav>
-                                      </p:tavLst>
-                                    </p:anim>
-                                    <p:anim calcmode="lin" valueType="num">
-                                      <p:cBhvr>
-                                        <p:cTn id="12" dur="164" tmFilter="0, 0; 0.125,0.2665; 0.25,0.4; 0.375,0.465; 0.5,0.5;  0.625,0.535; 0.75,0.6; 0.875,0.7335; 1,1">
-                                          <p:stCondLst>
-                                            <p:cond delay="1656"/>
-                                          </p:stCondLst>
-                                        </p:cTn>
-                                        <p:tgtEl>
-                                          <p:spTgt spid="2050"/>
-                                        </p:tgtEl>
-                                        <p:attrNameLst>
-                                          <p:attrName>ppt_y</p:attrName>
-                                        </p:attrNameLst>
-                                      </p:cBhvr>
-                                      <p:tavLst>
-                                        <p:tav tm="0" fmla="#ppt_y-sin(pi*$)/81">
-                                          <p:val>
-                                            <p:fltVal val="0"/>
-                                          </p:val>
-                                        </p:tav>
-                                        <p:tav tm="100000">
-                                          <p:val>
-                                            <p:fltVal val="1"/>
-                                          </p:val>
-                                        </p:tav>
-                                      </p:tavLst>
-                                    </p:anim>
-                                    <p:animScale>
-                                      <p:cBhvr>
-                                        <p:cTn id="13" dur="26">
-                                          <p:stCondLst>
-                                            <p:cond delay="650"/>
-                                          </p:stCondLst>
-                                        </p:cTn>
-                                        <p:tgtEl>
-                                          <p:spTgt spid="2050"/>
-                                        </p:tgtEl>
-                                      </p:cBhvr>
-                                      <p:to x="100000" y="60000"/>
-                                    </p:animScale>
-                                    <p:animScale>
-                                      <p:cBhvr>
-                                        <p:cTn id="14" dur="166" decel="50000">
-                                          <p:stCondLst>
-                                            <p:cond delay="676"/>
-                                          </p:stCondLst>
-                                        </p:cTn>
-                                        <p:tgtEl>
-                                          <p:spTgt spid="2050"/>
-                                        </p:tgtEl>
-                                      </p:cBhvr>
-                                      <p:to x="100000" y="100000"/>
-                                    </p:animScale>
-                                    <p:animScale>
-                                      <p:cBhvr>
-                                        <p:cTn id="15" dur="26">
-                                          <p:stCondLst>
-                                            <p:cond delay="1312"/>
-                                          </p:stCondLst>
-                                        </p:cTn>
-                                        <p:tgtEl>
-                                          <p:spTgt spid="2050"/>
-                                        </p:tgtEl>
-                                      </p:cBhvr>
-                                      <p:to x="100000" y="80000"/>
-                                    </p:animScale>
-                                    <p:animScale>
-                                      <p:cBhvr>
-                                        <p:cTn id="16" dur="166" decel="50000">
-                                          <p:stCondLst>
-                                            <p:cond delay="1338"/>
-                                          </p:stCondLst>
-                                        </p:cTn>
-                                        <p:tgtEl>
-                                          <p:spTgt spid="2050"/>
-                                        </p:tgtEl>
-                                      </p:cBhvr>
-                                      <p:to x="100000" y="100000"/>
-                                    </p:animScale>
-                                    <p:animScale>
-                                      <p:cBhvr>
-                                        <p:cTn id="17" dur="26">
-                                          <p:stCondLst>
-                                            <p:cond delay="1642"/>
-                                          </p:stCondLst>
-                                        </p:cTn>
-                                        <p:tgtEl>
-                                          <p:spTgt spid="2050"/>
-                                        </p:tgtEl>
-                                      </p:cBhvr>
-                                      <p:to x="100000" y="90000"/>
-                                    </p:animScale>
-                                    <p:animScale>
-                                      <p:cBhvr>
-                                        <p:cTn id="18" dur="166" decel="50000">
-                                          <p:stCondLst>
-                                            <p:cond delay="1668"/>
-                                          </p:stCondLst>
-                                        </p:cTn>
-                                        <p:tgtEl>
-                                          <p:spTgt spid="2050"/>
-                                        </p:tgtEl>
-                                      </p:cBhvr>
-                                      <p:to x="100000" y="100000"/>
-                                    </p:animScale>
-                                    <p:animScale>
-                                      <p:cBhvr>
-                                        <p:cTn id="19" dur="26">
-                                          <p:stCondLst>
-                                            <p:cond delay="1808"/>
-                                          </p:stCondLst>
-                                        </p:cTn>
-                                        <p:tgtEl>
-                                          <p:spTgt spid="2050"/>
-                                        </p:tgtEl>
-                                      </p:cBhvr>
-                                      <p:to x="100000" y="95000"/>
-                                    </p:animScale>
-                                    <p:animScale>
-                                      <p:cBhvr>
-                                        <p:cTn id="20" dur="166" decel="50000">
-                                          <p:stCondLst>
-                                            <p:cond delay="1834"/>
-                                          </p:stCondLst>
-                                        </p:cTn>
-                                        <p:tgtEl>
-                                          <p:spTgt spid="2050"/>
-                                        </p:tgtEl>
-                                      </p:cBhvr>
-                                      <p:to x="100000" y="100000"/>
-                                    </p:animScale>
-                                  </p:childTnLst>
-                                </p:cTn>
-                              </p:par>
-                              <p:par>
-                                <p:cTn id="21" presetID="26" presetClass="entr" presetSubtype="0" fill="hold" grpId="0" nodeType="withEffect">
-                                  <p:stCondLst>
-                                    <p:cond delay="0"/>
-                                  </p:stCondLst>
-                                  <p:childTnLst>
-                                    <p:set>
-                                      <p:cBhvr>
-                                        <p:cTn id="22" dur="1" fill="hold">
-                                          <p:stCondLst>
-                                            <p:cond delay="0"/>
-                                          </p:stCondLst>
-                                        </p:cTn>
-                                        <p:tgtEl>
-                                          <p:spTgt spid="2"/>
-                                        </p:tgtEl>
-                                        <p:attrNameLst>
-                                          <p:attrName>style.visibility</p:attrName>
-                                        </p:attrNameLst>
-                                      </p:cBhvr>
-                                      <p:to>
-                                        <p:strVal val="visible"/>
-                                      </p:to>
-                                    </p:set>
-                                    <p:animEffect transition="in" filter="wipe(down)">
-                                      <p:cBhvr>
-                                        <p:cTn id="23" dur="580">
-                                          <p:stCondLst>
-                                            <p:cond delay="0"/>
-                                          </p:stCondLst>
-                                        </p:cTn>
-                                        <p:tgtEl>
-                                          <p:spTgt spid="2"/>
-                                        </p:tgtEl>
-                                      </p:cBhvr>
-                                    </p:animEffect>
-                                    <p:anim calcmode="lin" valueType="num">
-                                      <p:cBhvr>
-                                        <p:cTn id="24" dur="1822" tmFilter="0,0; 0.14,0.36; 0.43,0.73; 0.71,0.91; 1.0,1.0">
-                                          <p:stCondLst>
-                                            <p:cond delay="0"/>
-                                          </p:stCondLst>
-                                        </p:cTn>
-                                        <p:tgtEl>
-                                          <p:spTgt spid="2"/>
-                                        </p:tgtEl>
-                                        <p:attrNameLst>
-                                          <p:attrName>ppt_x</p:attrName>
-                                        </p:attrNameLst>
-                                      </p:cBhvr>
-                                      <p:tavLst>
-                                        <p:tav tm="0">
-                                          <p:val>
-                                            <p:strVal val="#ppt_x-0.25"/>
-                                          </p:val>
-                                        </p:tav>
-                                        <p:tav tm="100000">
-                                          <p:val>
-                                            <p:strVal val="#ppt_x"/>
-                                          </p:val>
-                                        </p:tav>
-                                      </p:tavLst>
-                                    </p:anim>
-                                    <p:anim calcmode="lin" valueType="num">
-                                      <p:cBhvr>
-                                        <p:cTn id="25" dur="664" tmFilter="0.0,0.0; 0.25,0.07; 0.50,0.2; 0.75,0.467; 1.0,1.0">
-                                          <p:stCondLst>
-                                            <p:cond delay="0"/>
-                                          </p:stCondLst>
-                                        </p:cTn>
-                                        <p:tgtEl>
-                                          <p:spTgt spid="2"/>
-                                        </p:tgtEl>
-                                        <p:attrNameLst>
-                                          <p:attrName>ppt_y</p:attrName>
-                                        </p:attrNameLst>
-                                      </p:cBhvr>
-                                      <p:tavLst>
-                                        <p:tav tm="0" fmla="#ppt_y-sin(pi*$)/3">
-                                          <p:val>
-                                            <p:fltVal val="0.5"/>
-                                          </p:val>
-                                        </p:tav>
-                                        <p:tav tm="100000">
-                                          <p:val>
-                                            <p:fltVal val="1"/>
-                                          </p:val>
-                                        </p:tav>
-                                      </p:tavLst>
-                                    </p:anim>
-                                    <p:anim calcmode="lin" valueType="num">
-                                      <p:cBhvr>
-                                        <p:cTn id="26" dur="664" tmFilter="0, 0; 0.125,0.2665; 0.25,0.4; 0.375,0.465; 0.5,0.5;  0.625,0.535; 0.75,0.6; 0.875,0.7335; 1,1">
-                                          <p:stCondLst>
-                                            <p:cond delay="664"/>
-                                          </p:stCondLst>
-                                        </p:cTn>
-                                        <p:tgtEl>
-                                          <p:spTgt spid="2"/>
-                                        </p:tgtEl>
-                                        <p:attrNameLst>
-                                          <p:attrName>ppt_y</p:attrName>
-                                        </p:attrNameLst>
-                                      </p:cBhvr>
-                                      <p:tavLst>
-                                        <p:tav tm="0" fmla="#ppt_y-sin(pi*$)/9">
-                                          <p:val>
-                                            <p:fltVal val="0"/>
-                                          </p:val>
-                                        </p:tav>
-                                        <p:tav tm="100000">
-                                          <p:val>
-                                            <p:fltVal val="1"/>
-                                          </p:val>
-                                        </p:tav>
-                                      </p:tavLst>
-                                    </p:anim>
-                                    <p:anim calcmode="lin" valueType="num">
-                                      <p:cBhvr>
-                                        <p:cTn id="27" dur="332" tmFilter="0, 0; 0.125,0.2665; 0.25,0.4; 0.375,0.465; 0.5,0.5;  0.625,0.535; 0.75,0.6; 0.875,0.7335; 1,1">
-                                          <p:stCondLst>
-                                            <p:cond delay="1324"/>
-                                          </p:stCondLst>
-                                        </p:cTn>
-                                        <p:tgtEl>
-                                          <p:spTgt spid="2"/>
-                                        </p:tgtEl>
-                                        <p:attrNameLst>
-                                          <p:attrName>ppt_y</p:attrName>
-                                        </p:attrNameLst>
-                                      </p:cBhvr>
-                                      <p:tavLst>
-                                        <p:tav tm="0" fmla="#ppt_y-sin(pi*$)/27">
-                                          <p:val>
-                                            <p:fltVal val="0"/>
-                                          </p:val>
-                                        </p:tav>
-                                        <p:tav tm="100000">
-                                          <p:val>
-                                            <p:fltVal val="1"/>
-                                          </p:val>
-                                        </p:tav>
-                                      </p:tavLst>
-                                    </p:anim>
-                                    <p:anim calcmode="lin" valueType="num">
-                                      <p:cBhvr>
-                                        <p:cTn id="28" dur="164" tmFilter="0, 0; 0.125,0.2665; 0.25,0.4; 0.375,0.465; 0.5,0.5;  0.625,0.535; 0.75,0.6; 0.875,0.7335; 1,1">
-                                          <p:stCondLst>
-                                            <p:cond delay="1656"/>
-                                          </p:stCondLst>
-                                        </p:cTn>
-                                        <p:tgtEl>
-                                          <p:spTgt spid="2"/>
-                                        </p:tgtEl>
-                                        <p:attrNameLst>
-                                          <p:attrName>ppt_y</p:attrName>
-                                        </p:attrNameLst>
-                                      </p:cBhvr>
-                                      <p:tavLst>
-                                        <p:tav tm="0" fmla="#ppt_y-sin(pi*$)/81">
-                                          <p:val>
-                                            <p:fltVal val="0"/>
-                                          </p:val>
-                                        </p:tav>
-                                        <p:tav tm="100000">
-                                          <p:val>
-                                            <p:fltVal val="1"/>
-                                          </p:val>
-                                        </p:tav>
-                                      </p:tavLst>
-                                    </p:anim>
-                                    <p:animScale>
-                                      <p:cBhvr>
-                                        <p:cTn id="29" dur="26">
-                                          <p:stCondLst>
-                                            <p:cond delay="650"/>
-                                          </p:stCondLst>
-                                        </p:cTn>
-                                        <p:tgtEl>
-                                          <p:spTgt spid="2"/>
-                                        </p:tgtEl>
-                                      </p:cBhvr>
-                                      <p:to x="100000" y="60000"/>
-                                    </p:animScale>
-                                    <p:animScale>
-                                      <p:cBhvr>
-                                        <p:cTn id="30" dur="166" decel="50000">
-                                          <p:stCondLst>
-                                            <p:cond delay="676"/>
-                                          </p:stCondLst>
-                                        </p:cTn>
-                                        <p:tgtEl>
-                                          <p:spTgt spid="2"/>
-                                        </p:tgtEl>
-                                      </p:cBhvr>
-                                      <p:to x="100000" y="100000"/>
-                                    </p:animScale>
-                                    <p:animScale>
-                                      <p:cBhvr>
-                                        <p:cTn id="31" dur="26">
-                                          <p:stCondLst>
-                                            <p:cond delay="1312"/>
-                                          </p:stCondLst>
-                                        </p:cTn>
-                                        <p:tgtEl>
-                                          <p:spTgt spid="2"/>
-                                        </p:tgtEl>
-                                      </p:cBhvr>
-                                      <p:to x="100000" y="80000"/>
-                                    </p:animScale>
-                                    <p:animScale>
-                                      <p:cBhvr>
-                                        <p:cTn id="32" dur="166" decel="50000">
-                                          <p:stCondLst>
-                                            <p:cond delay="1338"/>
-                                          </p:stCondLst>
-                                        </p:cTn>
-                                        <p:tgtEl>
-                                          <p:spTgt spid="2"/>
-                                        </p:tgtEl>
-                                      </p:cBhvr>
-                                      <p:to x="100000" y="100000"/>
-                                    </p:animScale>
-                                    <p:animScale>
-                                      <p:cBhvr>
-                                        <p:cTn id="33" dur="26">
-                                          <p:stCondLst>
-                                            <p:cond delay="1642"/>
-                                          </p:stCondLst>
-                                        </p:cTn>
-                                        <p:tgtEl>
-                                          <p:spTgt spid="2"/>
-                                        </p:tgtEl>
-                                      </p:cBhvr>
-                                      <p:to x="100000" y="90000"/>
-                                    </p:animScale>
-                                    <p:animScale>
-                                      <p:cBhvr>
-                                        <p:cTn id="34" dur="166" decel="50000">
-                                          <p:stCondLst>
-                                            <p:cond delay="1668"/>
-                                          </p:stCondLst>
-                                        </p:cTn>
-                                        <p:tgtEl>
-                                          <p:spTgt spid="2"/>
-                                        </p:tgtEl>
-                                      </p:cBhvr>
-                                      <p:to x="100000" y="100000"/>
-                                    </p:animScale>
-                                    <p:animScale>
-                                      <p:cBhvr>
-                                        <p:cTn id="35" dur="26">
-                                          <p:stCondLst>
-                                            <p:cond delay="1808"/>
-                                          </p:stCondLst>
-                                        </p:cTn>
-                                        <p:tgtEl>
-                                          <p:spTgt spid="2"/>
-                                        </p:tgtEl>
-                                      </p:cBhvr>
-                                      <p:to x="100000" y="95000"/>
-                                    </p:animScale>
-                                    <p:animScale>
-                                      <p:cBhvr>
-                                        <p:cTn id="36" dur="166" decel="50000">
-                                          <p:stCondLst>
-                                            <p:cond delay="1834"/>
-                                          </p:stCondLst>
-                                        </p:cTn>
-                                        <p:tgtEl>
-                                          <p:spTgt spid="2"/>
-                                        </p:tgtEl>
-                                      </p:cBhvr>
-                                      <p:to x="100000" y="100000"/>
-                                    </p:animScale>
-                                  </p:childTnLst>
-                                </p:cTn>
-                              </p:par>
-                              <p:par>
-                                <p:cTn id="37" presetID="26" presetClass="entr" presetSubtype="0" fill="hold" grpId="0" nodeType="withEffect">
-                                  <p:stCondLst>
-                                    <p:cond delay="0"/>
-                                  </p:stCondLst>
-                                  <p:childTnLst>
-                                    <p:set>
-                                      <p:cBhvr>
-                                        <p:cTn id="38" dur="1" fill="hold">
-                                          <p:stCondLst>
-                                            <p:cond delay="0"/>
-                                          </p:stCondLst>
-                                        </p:cTn>
-                                        <p:tgtEl>
-                                          <p:spTgt spid="3"/>
-                                        </p:tgtEl>
-                                        <p:attrNameLst>
-                                          <p:attrName>style.visibility</p:attrName>
-                                        </p:attrNameLst>
-                                      </p:cBhvr>
-                                      <p:to>
-                                        <p:strVal val="visible"/>
-                                      </p:to>
-                                    </p:set>
-                                    <p:animEffect transition="in" filter="wipe(down)">
-                                      <p:cBhvr>
-                                        <p:cTn id="39" dur="580">
-                                          <p:stCondLst>
-                                            <p:cond delay="0"/>
-                                          </p:stCondLst>
-                                        </p:cTn>
-                                        <p:tgtEl>
-                                          <p:spTgt spid="3"/>
-                                        </p:tgtEl>
-                                      </p:cBhvr>
-                                    </p:animEffect>
-                                    <p:anim calcmode="lin" valueType="num">
-                                      <p:cBhvr>
-                                        <p:cTn id="40" dur="1822" tmFilter="0,0; 0.14,0.36; 0.43,0.73; 0.71,0.91; 1.0,1.0">
-                                          <p:stCondLst>
-                                            <p:cond delay="0"/>
-                                          </p:stCondLst>
-                                        </p:cTn>
-                                        <p:tgtEl>
-                                          <p:spTgt spid="3"/>
-                                        </p:tgtEl>
-                                        <p:attrNameLst>
-                                          <p:attrName>ppt_x</p:attrName>
-                                        </p:attrNameLst>
-                                      </p:cBhvr>
-                                      <p:tavLst>
-                                        <p:tav tm="0">
-                                          <p:val>
-                                            <p:strVal val="#ppt_x-0.25"/>
-                                          </p:val>
-                                        </p:tav>
-                                        <p:tav tm="100000">
-                                          <p:val>
-                                            <p:strVal val="#ppt_x"/>
-                                          </p:val>
-                                        </p:tav>
-                                      </p:tavLst>
-                                    </p:anim>
-                                    <p:anim calcmode="lin" valueType="num">
-                                      <p:cBhvr>
-                                        <p:cTn id="41" dur="664" tmFilter="0.0,0.0; 0.25,0.07; 0.50,0.2; 0.75,0.467; 1.0,1.0">
-                                          <p:stCondLst>
-                                            <p:cond delay="0"/>
-                                          </p:stCondLst>
-                                        </p:cTn>
-                                        <p:tgtEl>
-                                          <p:spTgt spid="3"/>
-                                        </p:tgtEl>
-                                        <p:attrNameLst>
-                                          <p:attrName>ppt_y</p:attrName>
-                                        </p:attrNameLst>
-                                      </p:cBhvr>
-                                      <p:tavLst>
-                                        <p:tav tm="0" fmla="#ppt_y-sin(pi*$)/3">
-                                          <p:val>
-                                            <p:fltVal val="0.5"/>
-                                          </p:val>
-                                        </p:tav>
-                                        <p:tav tm="100000">
-                                          <p:val>
-                                            <p:fltVal val="1"/>
-                                          </p:val>
-                                        </p:tav>
-                                      </p:tavLst>
-                                    </p:anim>
-                                    <p:anim calcmode="lin" valueType="num">
-                                      <p:cBhvr>
-                                        <p:cTn id="42" dur="664" tmFilter="0, 0; 0.125,0.2665; 0.25,0.4; 0.375,0.465; 0.5,0.5;  0.625,0.535; 0.75,0.6; 0.875,0.7335; 1,1">
-                                          <p:stCondLst>
-                                            <p:cond delay="664"/>
-                                          </p:stCondLst>
-                                        </p:cTn>
-                                        <p:tgtEl>
-                                          <p:spTgt spid="3"/>
-                                        </p:tgtEl>
-                                        <p:attrNameLst>
-                                          <p:attrName>ppt_y</p:attrName>
-                                        </p:attrNameLst>
-                                      </p:cBhvr>
-                                      <p:tavLst>
-                                        <p:tav tm="0" fmla="#ppt_y-sin(pi*$)/9">
-                                          <p:val>
-                                            <p:fltVal val="0"/>
-                                          </p:val>
-                                        </p:tav>
-                                        <p:tav tm="100000">
-                                          <p:val>
-                                            <p:fltVal val="1"/>
-                                          </p:val>
-                                        </p:tav>
-                                      </p:tavLst>
-                                    </p:anim>
-                                    <p:anim calcmode="lin" valueType="num">
-                                      <p:cBhvr>
-                                        <p:cTn id="43" dur="332" tmFilter="0, 0; 0.125,0.2665; 0.25,0.4; 0.375,0.465; 0.5,0.5;  0.625,0.535; 0.75,0.6; 0.875,0.7335; 1,1">
-                                          <p:stCondLst>
-                                            <p:cond delay="1324"/>
-                                          </p:stCondLst>
-                                        </p:cTn>
-                                        <p:tgtEl>
-                                          <p:spTgt spid="3"/>
-                                        </p:tgtEl>
-                                        <p:attrNameLst>
-                                          <p:attrName>ppt_y</p:attrName>
-                                        </p:attrNameLst>
-                                      </p:cBhvr>
-                                      <p:tavLst>
-                                        <p:tav tm="0" fmla="#ppt_y-sin(pi*$)/27">
-                                          <p:val>
-                                            <p:fltVal val="0"/>
-                                          </p:val>
-                                        </p:tav>
-                                        <p:tav tm="100000">
-                                          <p:val>
-                                            <p:fltVal val="1"/>
-                                          </p:val>
-                                        </p:tav>
-                                      </p:tavLst>
-                                    </p:anim>
-                                    <p:anim calcmode="lin" valueType="num">
-                                      <p:cBhvr>
-                                        <p:cTn id="44" dur="164" tmFilter="0, 0; 0.125,0.2665; 0.25,0.4; 0.375,0.465; 0.5,0.5;  0.625,0.535; 0.75,0.6; 0.875,0.7335; 1,1">
-                                          <p:stCondLst>
-                                            <p:cond delay="1656"/>
-                                          </p:stCondLst>
-                                        </p:cTn>
-                                        <p:tgtEl>
-                                          <p:spTgt spid="3"/>
-                                        </p:tgtEl>
-                                        <p:attrNameLst>
-                                          <p:attrName>ppt_y</p:attrName>
-                                        </p:attrNameLst>
-                                      </p:cBhvr>
-                                      <p:tavLst>
-                                        <p:tav tm="0" fmla="#ppt_y-sin(pi*$)/81">
-                                          <p:val>
-                                            <p:fltVal val="0"/>
-                                          </p:val>
-                                        </p:tav>
-                                        <p:tav tm="100000">
-                                          <p:val>
-                                            <p:fltVal val="1"/>
-                                          </p:val>
-                                        </p:tav>
-                                      </p:tavLst>
-                                    </p:anim>
-                                    <p:animScale>
-                                      <p:cBhvr>
-                                        <p:cTn id="45" dur="26">
-                                          <p:stCondLst>
-                                            <p:cond delay="650"/>
-                                          </p:stCondLst>
-                                        </p:cTn>
-                                        <p:tgtEl>
-                                          <p:spTgt spid="3"/>
-                                        </p:tgtEl>
-                                      </p:cBhvr>
-                                      <p:to x="100000" y="60000"/>
-                                    </p:animScale>
-                                    <p:animScale>
-                                      <p:cBhvr>
-                                        <p:cTn id="46" dur="166" decel="50000">
-                                          <p:stCondLst>
-                                            <p:cond delay="676"/>
-                                          </p:stCondLst>
-                                        </p:cTn>
-                                        <p:tgtEl>
-                                          <p:spTgt spid="3"/>
-                                        </p:tgtEl>
-                                      </p:cBhvr>
-                                      <p:to x="100000" y="100000"/>
-                                    </p:animScale>
-                                    <p:animScale>
-                                      <p:cBhvr>
-                                        <p:cTn id="47" dur="26">
-                                          <p:stCondLst>
-                                            <p:cond delay="1312"/>
-                                          </p:stCondLst>
-                                        </p:cTn>
-                                        <p:tgtEl>
-                                          <p:spTgt spid="3"/>
-                                        </p:tgtEl>
-                                      </p:cBhvr>
-                                      <p:to x="100000" y="80000"/>
-                                    </p:animScale>
-                                    <p:animScale>
-                                      <p:cBhvr>
-                                        <p:cTn id="48" dur="166" decel="50000">
-                                          <p:stCondLst>
-                                            <p:cond delay="1338"/>
-                                          </p:stCondLst>
-                                        </p:cTn>
-                                        <p:tgtEl>
-                                          <p:spTgt spid="3"/>
-                                        </p:tgtEl>
-                                      </p:cBhvr>
-                                      <p:to x="100000" y="100000"/>
-                                    </p:animScale>
-                                    <p:animScale>
-                                      <p:cBhvr>
-                                        <p:cTn id="49" dur="26">
-                                          <p:stCondLst>
-                                            <p:cond delay="1642"/>
-                                          </p:stCondLst>
-                                        </p:cTn>
-                                        <p:tgtEl>
-                                          <p:spTgt spid="3"/>
-                                        </p:tgtEl>
-                                      </p:cBhvr>
-                                      <p:to x="100000" y="90000"/>
-                                    </p:animScale>
-                                    <p:animScale>
-                                      <p:cBhvr>
-                                        <p:cTn id="50" dur="166" decel="50000">
-                                          <p:stCondLst>
-                                            <p:cond delay="1668"/>
-                                          </p:stCondLst>
-                                        </p:cTn>
-                                        <p:tgtEl>
-                                          <p:spTgt spid="3"/>
-                                        </p:tgtEl>
-                                      </p:cBhvr>
-                                      <p:to x="100000" y="100000"/>
-                                    </p:animScale>
-                                    <p:animScale>
-                                      <p:cBhvr>
-                                        <p:cTn id="51" dur="26">
-                                          <p:stCondLst>
-                                            <p:cond delay="1808"/>
-                                          </p:stCondLst>
-                                        </p:cTn>
-                                        <p:tgtEl>
-                                          <p:spTgt spid="3"/>
-                                        </p:tgtEl>
-                                      </p:cBhvr>
-                                      <p:to x="100000" y="95000"/>
-                                    </p:animScale>
-                                    <p:animScale>
-                                      <p:cBhvr>
-                                        <p:cTn id="52" dur="166" decel="50000">
-                                          <p:stCondLst>
-                                            <p:cond delay="1834"/>
-                                          </p:stCondLst>
-                                        </p:cTn>
-                                        <p:tgtEl>
-                                          <p:spTgt spid="3"/>
-                                        </p:tgtEl>
-                                      </p:cBhvr>
-                                      <p:to x="100000" y="100000"/>
-                                    </p:animScale>
-                                  </p:childTnLst>
-                                </p:cTn>
-                              </p:par>
-                            </p:childTnLst>
-                          </p:cTn>
-                        </p:par>
-                      </p:childTnLst>
-                    </p:cTn>
-                  </p:par>
-                </p:childTnLst>
-              </p:cTn>
-              <p:prevCondLst>
-                <p:cond evt="onPrev" delay="0">
-                  <p:tgtEl>
-                    <p:sldTgt/>
-                  </p:tgtEl>
-                </p:cond>
-              </p:prevCondLst>
-              <p:nextCondLst>
-                <p:cond evt="onNext" delay="0">
-                  <p:tgtEl>
-                    <p:sldTgt/>
-                  </p:tgtEl>
-                </p:cond>
-              </p:nextCondLst>
-            </p:seq>
-          </p:childTnLst>
-        </p:cTn>
-      </p:par>
-    </p:tnLst>
-    <p:bldLst>
-      <p:bldP spid="2" grpId="0"/>
-      <p:bldP spid="3" grpId="0"/>
-    </p:bldLst>
-  </p:timing>
 </p:sld>
 </file>
 

</xml_diff>